<commit_message>
Updated presentation and included data viz images
</commit_message>
<xml_diff>
--- a/Vaccine Hesitancy Presentation.pptx
+++ b/Vaccine Hesitancy Presentation.pptx
@@ -2,39 +2,43 @@
 <file path=ppt/presentation.xml><?xml version="1.0" encoding="utf-8"?>
 <p:presentation xmlns:a="http://schemas.openxmlformats.org/drawingml/2006/main" xmlns:r="http://schemas.openxmlformats.org/officeDocument/2006/relationships" xmlns:mc="http://schemas.openxmlformats.org/markup-compatibility/2006" xmlns:mv="urn:schemas-microsoft-com:mac:vml" xmlns:p="http://schemas.openxmlformats.org/presentationml/2006/main" xmlns:c="http://schemas.openxmlformats.org/drawingml/2006/chart" xmlns:dgm="http://schemas.openxmlformats.org/drawingml/2006/diagram" xmlns:o="urn:schemas-microsoft-com:office:office" xmlns:v="urn:schemas-microsoft-com:vml" xmlns:pvml="urn:schemas-microsoft-com:office:powerpoint" xmlns:com="http://schemas.openxmlformats.org/drawingml/2006/compatibility" xmlns:p14="http://schemas.microsoft.com/office/powerpoint/2010/main" xmlns:p15="http://schemas.microsoft.com/office/powerpoint/2012/main" xmlns:ahyp="http://schemas.microsoft.com/office/drawing/2018/hyperlinkcolor" autoCompressPictures="0" embedTrueTypeFonts="1" strictFirstAndLastChars="0" saveSubsetFonts="1">
   <p:sldMasterIdLst>
-    <p:sldMasterId id="2147483659" r:id="rId4"/>
+    <p:sldMasterId id="2147483659" r:id="rId5"/>
   </p:sldMasterIdLst>
   <p:notesMasterIdLst>
-    <p:notesMasterId r:id="rId5"/>
+    <p:notesMasterId r:id="rId6"/>
   </p:notesMasterIdLst>
   <p:sldIdLst>
-    <p:sldId id="256" r:id="rId6"/>
-    <p:sldId id="257" r:id="rId7"/>
-    <p:sldId id="258" r:id="rId8"/>
-    <p:sldId id="259" r:id="rId9"/>
-    <p:sldId id="260" r:id="rId10"/>
-    <p:sldId id="261" r:id="rId11"/>
-    <p:sldId id="262" r:id="rId12"/>
-    <p:sldId id="263" r:id="rId13"/>
-    <p:sldId id="264" r:id="rId14"/>
-    <p:sldId id="265" r:id="rId15"/>
+    <p:sldId id="256" r:id="rId7"/>
+    <p:sldId id="257" r:id="rId8"/>
+    <p:sldId id="258" r:id="rId9"/>
+    <p:sldId id="259" r:id="rId10"/>
+    <p:sldId id="260" r:id="rId11"/>
+    <p:sldId id="261" r:id="rId12"/>
+    <p:sldId id="262" r:id="rId13"/>
+    <p:sldId id="263" r:id="rId14"/>
+    <p:sldId id="264" r:id="rId15"/>
+    <p:sldId id="265" r:id="rId16"/>
+    <p:sldId id="266" r:id="rId17"/>
+    <p:sldId id="267" r:id="rId18"/>
+    <p:sldId id="268" r:id="rId19"/>
+    <p:sldId id="269" r:id="rId20"/>
   </p:sldIdLst>
   <p:sldSz cy="5143500" cx="9144000"/>
   <p:notesSz cx="6858000" cy="9144000"/>
   <p:embeddedFontLst>
     <p:embeddedFont>
       <p:font typeface="Roboto"/>
-      <p:regular r:id="rId16"/>
-      <p:bold r:id="rId17"/>
-      <p:italic r:id="rId18"/>
-      <p:boldItalic r:id="rId19"/>
+      <p:regular r:id="rId21"/>
+      <p:bold r:id="rId22"/>
+      <p:italic r:id="rId23"/>
+      <p:boldItalic r:id="rId24"/>
     </p:embeddedFont>
     <p:embeddedFont>
       <p:font typeface="Merriweather"/>
-      <p:regular r:id="rId20"/>
-      <p:bold r:id="rId21"/>
-      <p:italic r:id="rId22"/>
-      <p:boldItalic r:id="rId23"/>
+      <p:regular r:id="rId25"/>
+      <p:bold r:id="rId26"/>
+      <p:italic r:id="rId27"/>
+      <p:boldItalic r:id="rId28"/>
     </p:embeddedFont>
   </p:embeddedFontLst>
   <p:defaultTextStyle>
@@ -815,7 +819,7 @@
   <p:cSld>
     <p:spTree>
       <p:nvGrpSpPr>
-        <p:cNvPr id="117" name="Shape 117"/>
+        <p:cNvPr id="125" name="Shape 125"/>
         <p:cNvGrpSpPr/>
         <p:nvPr/>
       </p:nvGrpSpPr>
@@ -829,7 +833,7 @@
       </p:grpSpPr>
       <p:sp>
         <p:nvSpPr>
-          <p:cNvPr id="118" name="Google Shape;118;gda8216b607_2_47:notes"/>
+          <p:cNvPr id="126" name="Google Shape;126;gdd6f716e79_0_27:notes"/>
           <p:cNvSpPr/>
           <p:nvPr>
             <p:ph idx="2" type="sldImg"/>
@@ -864,7 +868,435 @@
       </p:sp>
       <p:sp>
         <p:nvSpPr>
-          <p:cNvPr id="119" name="Google Shape;119;gda8216b607_2_47:notes"/>
+          <p:cNvPr id="127" name="Google Shape;127;gdd6f716e79_0_27:notes"/>
+          <p:cNvSpPr txBox="1"/>
+          <p:nvPr>
+            <p:ph idx="1" type="body"/>
+          </p:nvPr>
+        </p:nvSpPr>
+        <p:spPr>
+          <a:xfrm>
+            <a:off x="685800" y="4343400"/>
+            <a:ext cx="5486400" cy="4114800"/>
+          </a:xfrm>
+          <a:prstGeom prst="rect">
+            <a:avLst/>
+          </a:prstGeom>
+        </p:spPr>
+        <p:txBody>
+          <a:bodyPr anchorCtr="0" anchor="t" bIns="91425" lIns="91425" spcFirstLastPara="1" rIns="91425" wrap="square" tIns="91425">
+            <a:noAutofit/>
+          </a:bodyPr>
+          <a:lstStyle/>
+          <a:p>
+            <a:pPr indent="-298450" lvl="0" marL="457200" rtl="0" algn="l">
+              <a:spcBef>
+                <a:spcPts val="0"/>
+              </a:spcBef>
+              <a:spcAft>
+                <a:spcPts val="0"/>
+              </a:spcAft>
+              <a:buSzPts val="1100"/>
+              <a:buChar char="●"/>
+            </a:pPr>
+            <a:r>
+              <a:rPr lang="en"/>
+              <a:t>Discuss heatmap of % population vaccine hesitant</a:t>
+            </a:r>
+            <a:endParaRPr/>
+          </a:p>
+        </p:txBody>
+      </p:sp>
+    </p:spTree>
+  </p:cSld>
+  <p:clrMapOvr>
+    <a:masterClrMapping/>
+  </p:clrMapOvr>
+</p:notes>
+</file>
+
+<file path=ppt/notesSlides/notesSlide11.xml><?xml version="1.0" encoding="utf-8"?>
+<p:notes xmlns:a="http://schemas.openxmlformats.org/drawingml/2006/main" xmlns:r="http://schemas.openxmlformats.org/officeDocument/2006/relationships" xmlns:mc="http://schemas.openxmlformats.org/markup-compatibility/2006" xmlns:mv="urn:schemas-microsoft-com:mac:vml" xmlns:p="http://schemas.openxmlformats.org/presentationml/2006/main" xmlns:c="http://schemas.openxmlformats.org/drawingml/2006/chart" xmlns:dgm="http://schemas.openxmlformats.org/drawingml/2006/diagram" xmlns:o="urn:schemas-microsoft-com:office:office" xmlns:v="urn:schemas-microsoft-com:vml" xmlns:pvml="urn:schemas-microsoft-com:office:powerpoint" xmlns:com="http://schemas.openxmlformats.org/drawingml/2006/compatibility" xmlns:p14="http://schemas.microsoft.com/office/powerpoint/2010/main" xmlns:p15="http://schemas.microsoft.com/office/powerpoint/2012/main" xmlns:ahyp="http://schemas.microsoft.com/office/drawing/2018/hyperlinkcolor" showMasterPhAnim="0" showMasterSp="0">
+  <p:cSld>
+    <p:spTree>
+      <p:nvGrpSpPr>
+        <p:cNvPr id="132" name="Shape 132"/>
+        <p:cNvGrpSpPr/>
+        <p:nvPr/>
+      </p:nvGrpSpPr>
+      <p:grpSpPr>
+        <a:xfrm>
+          <a:off x="0" y="0"/>
+          <a:ext cx="0" cy="0"/>
+          <a:chOff x="0" y="0"/>
+          <a:chExt cx="0" cy="0"/>
+        </a:xfrm>
+      </p:grpSpPr>
+      <p:sp>
+        <p:nvSpPr>
+          <p:cNvPr id="133" name="Google Shape;133;gdd6f716e79_0_31:notes"/>
+          <p:cNvSpPr/>
+          <p:nvPr>
+            <p:ph idx="2" type="sldImg"/>
+          </p:nvPr>
+        </p:nvSpPr>
+        <p:spPr>
+          <a:xfrm>
+            <a:off x="381300" y="685800"/>
+            <a:ext cx="6096000" cy="3429000"/>
+          </a:xfrm>
+          <a:custGeom>
+            <a:rect b="b" l="l" r="r" t="t"/>
+            <a:pathLst>
+              <a:path extrusionOk="0" h="120000" w="120000">
+                <a:moveTo>
+                  <a:pt x="0" y="0"/>
+                </a:moveTo>
+                <a:lnTo>
+                  <a:pt x="120000" y="0"/>
+                </a:lnTo>
+                <a:lnTo>
+                  <a:pt x="120000" y="120000"/>
+                </a:lnTo>
+                <a:lnTo>
+                  <a:pt x="0" y="120000"/>
+                </a:lnTo>
+                <a:close/>
+              </a:path>
+            </a:pathLst>
+          </a:custGeom>
+        </p:spPr>
+      </p:sp>
+      <p:sp>
+        <p:nvSpPr>
+          <p:cNvPr id="134" name="Google Shape;134;gdd6f716e79_0_31:notes"/>
+          <p:cNvSpPr txBox="1"/>
+          <p:nvPr>
+            <p:ph idx="1" type="body"/>
+          </p:nvPr>
+        </p:nvSpPr>
+        <p:spPr>
+          <a:xfrm>
+            <a:off x="685800" y="4343400"/>
+            <a:ext cx="5486400" cy="4114800"/>
+          </a:xfrm>
+          <a:prstGeom prst="rect">
+            <a:avLst/>
+          </a:prstGeom>
+        </p:spPr>
+        <p:txBody>
+          <a:bodyPr anchorCtr="0" anchor="t" bIns="91425" lIns="91425" spcFirstLastPara="1" rIns="91425" wrap="square" tIns="91425">
+            <a:noAutofit/>
+          </a:bodyPr>
+          <a:lstStyle/>
+          <a:p>
+            <a:pPr indent="-298450" lvl="0" marL="457200" rtl="0" algn="l">
+              <a:spcBef>
+                <a:spcPts val="0"/>
+              </a:spcBef>
+              <a:spcAft>
+                <a:spcPts val="0"/>
+              </a:spcAft>
+              <a:buSzPts val="1100"/>
+              <a:buChar char="●"/>
+            </a:pPr>
+            <a:r>
+              <a:rPr lang="en"/>
+              <a:t>Increasing</a:t>
+            </a:r>
+            <a:r>
+              <a:rPr lang="en"/>
+              <a:t> trend seen in SVI by % population vaccine hesitant bar graph</a:t>
+            </a:r>
+            <a:endParaRPr/>
+          </a:p>
+          <a:p>
+            <a:pPr indent="0" lvl="0" marL="457200" rtl="0" algn="l">
+              <a:spcBef>
+                <a:spcPts val="0"/>
+              </a:spcBef>
+              <a:spcAft>
+                <a:spcPts val="0"/>
+              </a:spcAft>
+              <a:buNone/>
+            </a:pPr>
+            <a:r>
+              <a:t/>
+            </a:r>
+            <a:endParaRPr/>
+          </a:p>
+        </p:txBody>
+      </p:sp>
+    </p:spTree>
+  </p:cSld>
+  <p:clrMapOvr>
+    <a:masterClrMapping/>
+  </p:clrMapOvr>
+</p:notes>
+</file>
+
+<file path=ppt/notesSlides/notesSlide12.xml><?xml version="1.0" encoding="utf-8"?>
+<p:notes xmlns:a="http://schemas.openxmlformats.org/drawingml/2006/main" xmlns:r="http://schemas.openxmlformats.org/officeDocument/2006/relationships" xmlns:mc="http://schemas.openxmlformats.org/markup-compatibility/2006" xmlns:mv="urn:schemas-microsoft-com:mac:vml" xmlns:p="http://schemas.openxmlformats.org/presentationml/2006/main" xmlns:c="http://schemas.openxmlformats.org/drawingml/2006/chart" xmlns:dgm="http://schemas.openxmlformats.org/drawingml/2006/diagram" xmlns:o="urn:schemas-microsoft-com:office:office" xmlns:v="urn:schemas-microsoft-com:vml" xmlns:pvml="urn:schemas-microsoft-com:office:powerpoint" xmlns:com="http://schemas.openxmlformats.org/drawingml/2006/compatibility" xmlns:p14="http://schemas.microsoft.com/office/powerpoint/2010/main" xmlns:p15="http://schemas.microsoft.com/office/powerpoint/2012/main" xmlns:ahyp="http://schemas.microsoft.com/office/drawing/2018/hyperlinkcolor" showMasterPhAnim="0" showMasterSp="0">
+  <p:cSld>
+    <p:spTree>
+      <p:nvGrpSpPr>
+        <p:cNvPr id="139" name="Shape 139"/>
+        <p:cNvGrpSpPr/>
+        <p:nvPr/>
+      </p:nvGrpSpPr>
+      <p:grpSpPr>
+        <a:xfrm>
+          <a:off x="0" y="0"/>
+          <a:ext cx="0" cy="0"/>
+          <a:chOff x="0" y="0"/>
+          <a:chExt cx="0" cy="0"/>
+        </a:xfrm>
+      </p:grpSpPr>
+      <p:sp>
+        <p:nvSpPr>
+          <p:cNvPr id="140" name="Google Shape;140;gdd6f716e79_0_35:notes"/>
+          <p:cNvSpPr/>
+          <p:nvPr>
+            <p:ph idx="2" type="sldImg"/>
+          </p:nvPr>
+        </p:nvSpPr>
+        <p:spPr>
+          <a:xfrm>
+            <a:off x="381300" y="685800"/>
+            <a:ext cx="6096000" cy="3429000"/>
+          </a:xfrm>
+          <a:custGeom>
+            <a:rect b="b" l="l" r="r" t="t"/>
+            <a:pathLst>
+              <a:path extrusionOk="0" h="120000" w="120000">
+                <a:moveTo>
+                  <a:pt x="0" y="0"/>
+                </a:moveTo>
+                <a:lnTo>
+                  <a:pt x="120000" y="0"/>
+                </a:lnTo>
+                <a:lnTo>
+                  <a:pt x="120000" y="120000"/>
+                </a:lnTo>
+                <a:lnTo>
+                  <a:pt x="0" y="120000"/>
+                </a:lnTo>
+                <a:close/>
+              </a:path>
+            </a:pathLst>
+          </a:custGeom>
+        </p:spPr>
+      </p:sp>
+      <p:sp>
+        <p:nvSpPr>
+          <p:cNvPr id="141" name="Google Shape;141;gdd6f716e79_0_35:notes"/>
+          <p:cNvSpPr txBox="1"/>
+          <p:nvPr>
+            <p:ph idx="1" type="body"/>
+          </p:nvPr>
+        </p:nvSpPr>
+        <p:spPr>
+          <a:xfrm>
+            <a:off x="685800" y="4343400"/>
+            <a:ext cx="5486400" cy="4114800"/>
+          </a:xfrm>
+          <a:prstGeom prst="rect">
+            <a:avLst/>
+          </a:prstGeom>
+        </p:spPr>
+        <p:txBody>
+          <a:bodyPr anchorCtr="0" anchor="t" bIns="91425" lIns="91425" spcFirstLastPara="1" rIns="91425" wrap="square" tIns="91425">
+            <a:noAutofit/>
+          </a:bodyPr>
+          <a:lstStyle/>
+          <a:p>
+            <a:pPr indent="-298450" lvl="0" marL="457200" rtl="0" algn="l">
+              <a:spcBef>
+                <a:spcPts val="0"/>
+              </a:spcBef>
+              <a:spcAft>
+                <a:spcPts val="0"/>
+              </a:spcAft>
+              <a:buClr>
+                <a:schemeClr val="dk1"/>
+              </a:buClr>
+              <a:buSzPts val="1100"/>
+              <a:buChar char="●"/>
+            </a:pPr>
+            <a:r>
+              <a:rPr lang="en">
+                <a:solidFill>
+                  <a:schemeClr val="dk1"/>
+                </a:solidFill>
+              </a:rPr>
+              <a:t>Increasing trend seen in % population vaccine hesitant by SVI line graph</a:t>
+            </a:r>
+            <a:endParaRPr/>
+          </a:p>
+        </p:txBody>
+      </p:sp>
+    </p:spTree>
+  </p:cSld>
+  <p:clrMapOvr>
+    <a:masterClrMapping/>
+  </p:clrMapOvr>
+</p:notes>
+</file>
+
+<file path=ppt/notesSlides/notesSlide13.xml><?xml version="1.0" encoding="utf-8"?>
+<p:notes xmlns:a="http://schemas.openxmlformats.org/drawingml/2006/main" xmlns:r="http://schemas.openxmlformats.org/officeDocument/2006/relationships" xmlns:mc="http://schemas.openxmlformats.org/markup-compatibility/2006" xmlns:mv="urn:schemas-microsoft-com:mac:vml" xmlns:p="http://schemas.openxmlformats.org/presentationml/2006/main" xmlns:c="http://schemas.openxmlformats.org/drawingml/2006/chart" xmlns:dgm="http://schemas.openxmlformats.org/drawingml/2006/diagram" xmlns:o="urn:schemas-microsoft-com:office:office" xmlns:v="urn:schemas-microsoft-com:vml" xmlns:pvml="urn:schemas-microsoft-com:office:powerpoint" xmlns:com="http://schemas.openxmlformats.org/drawingml/2006/compatibility" xmlns:p14="http://schemas.microsoft.com/office/powerpoint/2010/main" xmlns:p15="http://schemas.microsoft.com/office/powerpoint/2012/main" xmlns:ahyp="http://schemas.microsoft.com/office/drawing/2018/hyperlinkcolor" showMasterPhAnim="0" showMasterSp="0">
+  <p:cSld>
+    <p:spTree>
+      <p:nvGrpSpPr>
+        <p:cNvPr id="146" name="Shape 146"/>
+        <p:cNvGrpSpPr/>
+        <p:nvPr/>
+      </p:nvGrpSpPr>
+      <p:grpSpPr>
+        <a:xfrm>
+          <a:off x="0" y="0"/>
+          <a:ext cx="0" cy="0"/>
+          <a:chOff x="0" y="0"/>
+          <a:chExt cx="0" cy="0"/>
+        </a:xfrm>
+      </p:grpSpPr>
+      <p:sp>
+        <p:nvSpPr>
+          <p:cNvPr id="147" name="Google Shape;147;gda8216b607_2_43:notes"/>
+          <p:cNvSpPr/>
+          <p:nvPr>
+            <p:ph idx="2" type="sldImg"/>
+          </p:nvPr>
+        </p:nvSpPr>
+        <p:spPr>
+          <a:xfrm>
+            <a:off x="381300" y="685800"/>
+            <a:ext cx="6096000" cy="3429000"/>
+          </a:xfrm>
+          <a:custGeom>
+            <a:rect b="b" l="l" r="r" t="t"/>
+            <a:pathLst>
+              <a:path extrusionOk="0" h="120000" w="120000">
+                <a:moveTo>
+                  <a:pt x="0" y="0"/>
+                </a:moveTo>
+                <a:lnTo>
+                  <a:pt x="120000" y="0"/>
+                </a:lnTo>
+                <a:lnTo>
+                  <a:pt x="120000" y="120000"/>
+                </a:lnTo>
+                <a:lnTo>
+                  <a:pt x="0" y="120000"/>
+                </a:lnTo>
+                <a:close/>
+              </a:path>
+            </a:pathLst>
+          </a:custGeom>
+        </p:spPr>
+      </p:sp>
+      <p:sp>
+        <p:nvSpPr>
+          <p:cNvPr id="148" name="Google Shape;148;gda8216b607_2_43:notes"/>
+          <p:cNvSpPr txBox="1"/>
+          <p:nvPr>
+            <p:ph idx="1" type="body"/>
+          </p:nvPr>
+        </p:nvSpPr>
+        <p:spPr>
+          <a:xfrm>
+            <a:off x="685800" y="4343400"/>
+            <a:ext cx="5486400" cy="4114800"/>
+          </a:xfrm>
+          <a:prstGeom prst="rect">
+            <a:avLst/>
+          </a:prstGeom>
+        </p:spPr>
+        <p:txBody>
+          <a:bodyPr anchorCtr="0" anchor="t" bIns="91425" lIns="91425" spcFirstLastPara="1" rIns="91425" wrap="square" tIns="91425">
+            <a:noAutofit/>
+          </a:bodyPr>
+          <a:lstStyle/>
+          <a:p>
+            <a:pPr indent="0" lvl="0" marL="0" rtl="0" algn="l">
+              <a:spcBef>
+                <a:spcPts val="0"/>
+              </a:spcBef>
+              <a:spcAft>
+                <a:spcPts val="0"/>
+              </a:spcAft>
+              <a:buNone/>
+            </a:pPr>
+            <a:r>
+              <a:t/>
+            </a:r>
+            <a:endParaRPr/>
+          </a:p>
+        </p:txBody>
+      </p:sp>
+    </p:spTree>
+  </p:cSld>
+  <p:clrMapOvr>
+    <a:masterClrMapping/>
+  </p:clrMapOvr>
+</p:notes>
+</file>
+
+<file path=ppt/notesSlides/notesSlide14.xml><?xml version="1.0" encoding="utf-8"?>
+<p:notes xmlns:a="http://schemas.openxmlformats.org/drawingml/2006/main" xmlns:r="http://schemas.openxmlformats.org/officeDocument/2006/relationships" xmlns:mc="http://schemas.openxmlformats.org/markup-compatibility/2006" xmlns:mv="urn:schemas-microsoft-com:mac:vml" xmlns:p="http://schemas.openxmlformats.org/presentationml/2006/main" xmlns:c="http://schemas.openxmlformats.org/drawingml/2006/chart" xmlns:dgm="http://schemas.openxmlformats.org/drawingml/2006/diagram" xmlns:o="urn:schemas-microsoft-com:office:office" xmlns:v="urn:schemas-microsoft-com:vml" xmlns:pvml="urn:schemas-microsoft-com:office:powerpoint" xmlns:com="http://schemas.openxmlformats.org/drawingml/2006/compatibility" xmlns:p14="http://schemas.microsoft.com/office/powerpoint/2010/main" xmlns:p15="http://schemas.microsoft.com/office/powerpoint/2012/main" xmlns:ahyp="http://schemas.microsoft.com/office/drawing/2018/hyperlinkcolor" showMasterPhAnim="0" showMasterSp="0">
+  <p:cSld>
+    <p:spTree>
+      <p:nvGrpSpPr>
+        <p:cNvPr id="152" name="Shape 152"/>
+        <p:cNvGrpSpPr/>
+        <p:nvPr/>
+      </p:nvGrpSpPr>
+      <p:grpSpPr>
+        <a:xfrm>
+          <a:off x="0" y="0"/>
+          <a:ext cx="0" cy="0"/>
+          <a:chOff x="0" y="0"/>
+          <a:chExt cx="0" cy="0"/>
+        </a:xfrm>
+      </p:grpSpPr>
+      <p:sp>
+        <p:nvSpPr>
+          <p:cNvPr id="153" name="Google Shape;153;gda8216b607_2_47:notes"/>
+          <p:cNvSpPr/>
+          <p:nvPr>
+            <p:ph idx="2" type="sldImg"/>
+          </p:nvPr>
+        </p:nvSpPr>
+        <p:spPr>
+          <a:xfrm>
+            <a:off x="381300" y="685800"/>
+            <a:ext cx="6096000" cy="3429000"/>
+          </a:xfrm>
+          <a:custGeom>
+            <a:rect b="b" l="l" r="r" t="t"/>
+            <a:pathLst>
+              <a:path extrusionOk="0" h="120000" w="120000">
+                <a:moveTo>
+                  <a:pt x="0" y="0"/>
+                </a:moveTo>
+                <a:lnTo>
+                  <a:pt x="120000" y="0"/>
+                </a:lnTo>
+                <a:lnTo>
+                  <a:pt x="120000" y="120000"/>
+                </a:lnTo>
+                <a:lnTo>
+                  <a:pt x="0" y="120000"/>
+                </a:lnTo>
+                <a:close/>
+              </a:path>
+            </a:pathLst>
+          </a:custGeom>
+        </p:spPr>
+      </p:sp>
+      <p:sp>
+        <p:nvSpPr>
+          <p:cNvPr id="154" name="Google Shape;154;gda8216b607_2_47:notes"/>
           <p:cNvSpPr txBox="1"/>
           <p:nvPr>
             <p:ph idx="1" type="body"/>
@@ -1083,17 +1515,75 @@
           </a:bodyPr>
           <a:lstStyle/>
           <a:p>
-            <a:pPr indent="0" lvl="0" marL="0" rtl="0" algn="l">
-              <a:spcBef>
-                <a:spcPts val="0"/>
-              </a:spcBef>
-              <a:spcAft>
-                <a:spcPts val="0"/>
-              </a:spcAft>
-              <a:buNone/>
+            <a:pPr indent="-298450" lvl="0" marL="457200" rtl="0" algn="l">
+              <a:spcBef>
+                <a:spcPts val="0"/>
+              </a:spcBef>
+              <a:spcAft>
+                <a:spcPts val="0"/>
+              </a:spcAft>
+              <a:buSzPts val="1100"/>
+              <a:buChar char="●"/>
             </a:pPr>
             <a:r>
-              <a:t/>
+              <a:rPr lang="en"/>
+              <a:t>Research suggests COVID-19 has </a:t>
+            </a:r>
+            <a:r>
+              <a:rPr lang="en"/>
+              <a:t>disproportionately</a:t>
+            </a:r>
+            <a:r>
+              <a:rPr lang="en"/>
+              <a:t> affected priority populations greater, and our team was interested in </a:t>
+            </a:r>
+            <a:r>
+              <a:rPr lang="en"/>
+              <a:t>determining</a:t>
+            </a:r>
+            <a:r>
+              <a:rPr lang="en"/>
+              <a:t> correlations between vaccine </a:t>
+            </a:r>
+            <a:r>
+              <a:rPr lang="en"/>
+              <a:t>hesitancy</a:t>
+            </a:r>
+            <a:r>
+              <a:rPr lang="en"/>
+              <a:t> and sociodemographic data. </a:t>
+            </a:r>
+            <a:endParaRPr/>
+          </a:p>
+          <a:p>
+            <a:pPr indent="-298450" lvl="0" marL="457200" rtl="0" algn="l">
+              <a:spcBef>
+                <a:spcPts val="0"/>
+              </a:spcBef>
+              <a:spcAft>
+                <a:spcPts val="0"/>
+              </a:spcAft>
+              <a:buSzPts val="1100"/>
+              <a:buChar char="●"/>
+            </a:pPr>
+            <a:r>
+              <a:rPr lang="en">
+                <a:solidFill>
+                  <a:srgbClr val="202124"/>
+                </a:solidFill>
+              </a:rPr>
+              <a:t>Socio-demographic variables</a:t>
+            </a:r>
+            <a:r>
+              <a:rPr lang="en">
+                <a:solidFill>
+                  <a:srgbClr val="202124"/>
+                </a:solidFill>
+                <a:highlight>
+                  <a:srgbClr val="FFFFFF"/>
+                </a:highlight>
+              </a:rPr>
+              <a:t> include, for example, age, sex, education, migration background and ethnicity, religious affiliation, marital status, household, employment, and income. </a:t>
             </a:r>
             <a:endParaRPr/>
           </a:p>
@@ -1112,7 +1602,7 @@
   <p:cSld>
     <p:spTree>
       <p:nvGrpSpPr>
-        <p:cNvPr id="80" name="Shape 80"/>
+        <p:cNvPr id="81" name="Shape 81"/>
         <p:cNvGrpSpPr/>
         <p:nvPr/>
       </p:nvGrpSpPr>
@@ -1126,7 +1616,7 @@
       </p:grpSpPr>
       <p:sp>
         <p:nvSpPr>
-          <p:cNvPr id="81" name="Google Shape;81;gda8216b607_2_27:notes"/>
+          <p:cNvPr id="82" name="Google Shape;82;gda8216b607_2_27:notes"/>
           <p:cNvSpPr/>
           <p:nvPr>
             <p:ph idx="2" type="sldImg"/>
@@ -1161,7 +1651,7 @@
       </p:sp>
       <p:sp>
         <p:nvSpPr>
-          <p:cNvPr id="82" name="Google Shape;82;gda8216b607_2_27:notes"/>
+          <p:cNvPr id="83" name="Google Shape;83;gda8216b607_2_27:notes"/>
           <p:cNvSpPr txBox="1"/>
           <p:nvPr>
             <p:ph idx="1" type="body"/>
@@ -1182,18 +1672,61 @@
           </a:bodyPr>
           <a:lstStyle/>
           <a:p>
-            <a:pPr indent="0" lvl="0" marL="0" rtl="0" algn="l">
-              <a:spcBef>
-                <a:spcPts val="0"/>
-              </a:spcBef>
-              <a:spcAft>
-                <a:spcPts val="0"/>
-              </a:spcAft>
-              <a:buNone/>
+            <a:pPr indent="-298450" lvl="0" marL="457200" rtl="0" algn="l">
+              <a:spcBef>
+                <a:spcPts val="0"/>
+              </a:spcBef>
+              <a:spcAft>
+                <a:spcPts val="0"/>
+              </a:spcAft>
+              <a:buClr>
+                <a:schemeClr val="dk1"/>
+              </a:buClr>
+              <a:buSzPts val="1100"/>
+              <a:buChar char="●"/>
             </a:pPr>
             <a:r>
               <a:rPr lang="en"/>
               <a:t>Kaggle dataset was sourced from data.gov an open-source US data platform. </a:t>
+            </a:r>
+            <a:endParaRPr/>
+          </a:p>
+          <a:p>
+            <a:pPr indent="-298450" lvl="0" marL="457200" rtl="0" algn="l">
+              <a:spcBef>
+                <a:spcPts val="0"/>
+              </a:spcBef>
+              <a:spcAft>
+                <a:spcPts val="0"/>
+              </a:spcAft>
+              <a:buClr>
+                <a:schemeClr val="dk1"/>
+              </a:buClr>
+              <a:buSzPts val="1100"/>
+              <a:buChar char="●"/>
+            </a:pPr>
+            <a:r>
+              <a:rPr lang="en" u="sng">
+                <a:solidFill>
+                  <a:srgbClr val="009384"/>
+                </a:solidFill>
+                <a:hlinkClick r:id="rId2">
+                  <a:extLst>
+                    <a:ext uri="{A12FA001-AC4F-418D-AE19-62706E023703}">
+                      <ahyp:hlinkClr val="tx"/>
+                    </a:ext>
+                  </a:extLst>
+                </a:hlinkClick>
+              </a:rPr>
+              <a:t>https://coronavirus.jhu.edu/us-map</a:t>
+            </a:r>
+            <a:r>
+              <a:rPr lang="en">
+                <a:solidFill>
+                  <a:schemeClr val="dk1"/>
+                </a:solidFill>
+              </a:rPr>
+              <a:t> </a:t>
             </a:r>
             <a:endParaRPr/>
           </a:p>
@@ -1212,7 +1745,7 @@
   <p:cSld>
     <p:spTree>
       <p:nvGrpSpPr>
-        <p:cNvPr id="87" name="Shape 87"/>
+        <p:cNvPr id="90" name="Shape 90"/>
         <p:cNvGrpSpPr/>
         <p:nvPr/>
       </p:nvGrpSpPr>
@@ -1226,7 +1759,7 @@
       </p:grpSpPr>
       <p:sp>
         <p:nvSpPr>
-          <p:cNvPr id="88" name="Google Shape;88;gda8216b607_2_31:notes"/>
+          <p:cNvPr id="91" name="Google Shape;91;gda8216b607_2_31:notes"/>
           <p:cNvSpPr/>
           <p:nvPr>
             <p:ph idx="2" type="sldImg"/>
@@ -1261,7 +1794,7 @@
       </p:sp>
       <p:sp>
         <p:nvSpPr>
-          <p:cNvPr id="89" name="Google Shape;89;gda8216b607_2_31:notes"/>
+          <p:cNvPr id="92" name="Google Shape;92;gda8216b607_2_31:notes"/>
           <p:cNvSpPr txBox="1"/>
           <p:nvPr>
             <p:ph idx="1" type="body"/>
@@ -1282,17 +1815,19 @@
           </a:bodyPr>
           <a:lstStyle/>
           <a:p>
-            <a:pPr indent="0" lvl="0" marL="0" rtl="0" algn="l">
-              <a:spcBef>
-                <a:spcPts val="0"/>
-              </a:spcBef>
-              <a:spcAft>
-                <a:spcPts val="0"/>
-              </a:spcAft>
-              <a:buNone/>
+            <a:pPr indent="-298450" lvl="0" marL="457200" rtl="0" algn="l">
+              <a:spcBef>
+                <a:spcPts val="0"/>
+              </a:spcBef>
+              <a:spcAft>
+                <a:spcPts val="0"/>
+              </a:spcAft>
+              <a:buSzPts val="1100"/>
+              <a:buChar char="●"/>
             </a:pPr>
             <a:r>
-              <a:t/>
+              <a:rPr lang="en"/>
+              <a:t>Determine null values (Ho, Ha)</a:t>
             </a:r>
             <a:endParaRPr/>
           </a:p>
@@ -1311,7 +1846,7 @@
   <p:cSld>
     <p:spTree>
       <p:nvGrpSpPr>
-        <p:cNvPr id="93" name="Shape 93"/>
+        <p:cNvPr id="96" name="Shape 96"/>
         <p:cNvGrpSpPr/>
         <p:nvPr/>
       </p:nvGrpSpPr>
@@ -1325,7 +1860,7 @@
       </p:grpSpPr>
       <p:sp>
         <p:nvSpPr>
-          <p:cNvPr id="94" name="Google Shape;94;gda8216b607_2_35:notes"/>
+          <p:cNvPr id="97" name="Google Shape;97;gda8216b607_2_35:notes"/>
           <p:cNvSpPr/>
           <p:nvPr>
             <p:ph idx="2" type="sldImg"/>
@@ -1360,7 +1895,7 @@
       </p:sp>
       <p:sp>
         <p:nvSpPr>
-          <p:cNvPr id="95" name="Google Shape;95;gda8216b607_2_35:notes"/>
+          <p:cNvPr id="98" name="Google Shape;98;gda8216b607_2_35:notes"/>
           <p:cNvSpPr txBox="1"/>
           <p:nvPr>
             <p:ph idx="1" type="body"/>
@@ -1381,9 +1916,197 @@
           </a:bodyPr>
           <a:lstStyle/>
           <a:p>
+            <a:pPr indent="-298450" lvl="0" marL="457200" rtl="0" algn="l">
+              <a:lnSpc>
+                <a:spcPct val="115000"/>
+              </a:lnSpc>
+              <a:spcBef>
+                <a:spcPts val="0"/>
+              </a:spcBef>
+              <a:spcAft>
+                <a:spcPts val="0"/>
+              </a:spcAft>
+              <a:buSzPts val="1100"/>
+              <a:buChar char="●"/>
+            </a:pPr>
+            <a:r>
+              <a:rPr b="1" lang="en">
+                <a:solidFill>
+                  <a:srgbClr val="24292E"/>
+                </a:solidFill>
+              </a:rPr>
+              <a:t>Description of preliminary data preprocessing:</a:t>
+            </a:r>
+            <a:r>
+              <a:rPr lang="en">
+                <a:solidFill>
+                  <a:srgbClr val="24292E"/>
+                </a:solidFill>
+              </a:rPr>
+              <a:t> The </a:t>
+            </a:r>
+            <a:r>
+              <a:rPr lang="en">
+                <a:solidFill>
+                  <a:schemeClr val="hlink"/>
+                </a:solidFill>
+                <a:uFill>
+                  <a:noFill/>
+                </a:uFill>
+                <a:hlinkClick r:id="rId2"/>
+              </a:rPr>
+              <a:t>merged dataset</a:t>
+            </a:r>
+            <a:r>
+              <a:rPr lang="en">
+                <a:solidFill>
+                  <a:srgbClr val="24292E"/>
+                </a:solidFill>
+              </a:rPr>
+              <a:t> was used for the </a:t>
+            </a:r>
+            <a:r>
+              <a:rPr lang="en">
+                <a:solidFill>
+                  <a:schemeClr val="hlink"/>
+                </a:solidFill>
+                <a:uFill>
+                  <a:noFill/>
+                </a:uFill>
+                <a:hlinkClick r:id="rId3"/>
+              </a:rPr>
+              <a:t>data preprocessing</a:t>
+            </a:r>
+            <a:r>
+              <a:rPr lang="en">
+                <a:solidFill>
+                  <a:srgbClr val="24292E"/>
+                </a:solidFill>
+              </a:rPr>
+              <a:t> in preparation for the machine learning models. Unnecessary feature columns were dropped. Remaining feature columns only had 1 row found to have a null value which was filled with 0. The </a:t>
+            </a:r>
+            <a:r>
+              <a:rPr lang="en">
+                <a:solidFill>
+                  <a:schemeClr val="hlink"/>
+                </a:solidFill>
+                <a:uFill>
+                  <a:noFill/>
+                </a:uFill>
+                <a:hlinkClick r:id="rId4"/>
+              </a:rPr>
+              <a:t>clean dataset</a:t>
+            </a:r>
+            <a:r>
+              <a:rPr lang="en">
+                <a:solidFill>
+                  <a:srgbClr val="24292E"/>
+                </a:solidFill>
+              </a:rPr>
+              <a:t> was then connected with the database.</a:t>
+            </a:r>
+            <a:endParaRPr>
+              <a:solidFill>
+                <a:srgbClr val="24292E"/>
+              </a:solidFill>
+            </a:endParaRPr>
+          </a:p>
+          <a:p>
+            <a:pPr indent="-298450" lvl="0" marL="457200" rtl="0" algn="l">
+              <a:lnSpc>
+                <a:spcPct val="115000"/>
+              </a:lnSpc>
+              <a:spcBef>
+                <a:spcPts val="0"/>
+              </a:spcBef>
+              <a:spcAft>
+                <a:spcPts val="0"/>
+              </a:spcAft>
+              <a:buClr>
+                <a:srgbClr val="24292E"/>
+              </a:buClr>
+              <a:buSzPts val="1100"/>
+              <a:buChar char="●"/>
+            </a:pPr>
+            <a:r>
+              <a:rPr b="1" lang="en">
+                <a:solidFill>
+                  <a:srgbClr val="24292E"/>
+                </a:solidFill>
+              </a:rPr>
+              <a:t>Description of preliminary feature engineering and preliminary feature selection, including the decision-making process: </a:t>
+            </a:r>
+            <a:r>
+              <a:rPr lang="en">
+                <a:solidFill>
+                  <a:srgbClr val="24292E"/>
+                </a:solidFill>
+              </a:rPr>
+              <a:t>In the original dataset, two target outcomes were available: percent of population vaccine hesitant and percent of population strongly vaccine hesitant. Only one target outcome was chosen, percent vaccine hesitant, as it is unclear how the data/survey distinguished the difference between estimated vaccine hesitancy and estimated strong vaccine hesitancy. In the decision-making process for features, all columns with irrelevant/redundant data was removed. For example, the 'svi_category'(object) was a redundant column as the 'social_vulnerability_index'(float64) was available to use as a feature to train and test the models.</a:t>
+            </a:r>
+            <a:endParaRPr>
+              <a:solidFill>
+                <a:srgbClr val="24292E"/>
+              </a:solidFill>
+            </a:endParaRPr>
+          </a:p>
+          <a:p>
+            <a:pPr indent="-298450" lvl="0" marL="457200" rtl="0" algn="l">
+              <a:lnSpc>
+                <a:spcPct val="115000"/>
+              </a:lnSpc>
+              <a:spcBef>
+                <a:spcPts val="0"/>
+              </a:spcBef>
+              <a:spcAft>
+                <a:spcPts val="0"/>
+              </a:spcAft>
+              <a:buClr>
+                <a:srgbClr val="24292E"/>
+              </a:buClr>
+              <a:buSzPts val="1100"/>
+              <a:buChar char="●"/>
+            </a:pPr>
+            <a:r>
+              <a:t/>
+            </a:r>
+            <a:endParaRPr>
+              <a:solidFill>
+                <a:srgbClr val="24292E"/>
+              </a:solidFill>
+            </a:endParaRPr>
+          </a:p>
+          <a:p>
             <a:pPr indent="0" lvl="0" marL="0" rtl="0" algn="l">
-              <a:spcBef>
-                <a:spcPts val="0"/>
+              <a:lnSpc>
+                <a:spcPct val="115000"/>
+              </a:lnSpc>
+              <a:spcBef>
+                <a:spcPts val="1200"/>
+              </a:spcBef>
+              <a:spcAft>
+                <a:spcPts val="0"/>
+              </a:spcAft>
+              <a:buClr>
+                <a:schemeClr val="dk1"/>
+              </a:buClr>
+              <a:buSzPts val="1100"/>
+              <a:buFont typeface="Arial"/>
+              <a:buNone/>
+            </a:pPr>
+            <a:r>
+              <a:t/>
+            </a:r>
+            <a:endParaRPr sz="1200">
+              <a:solidFill>
+                <a:srgbClr val="24292E"/>
+              </a:solidFill>
+            </a:endParaRPr>
+          </a:p>
+          <a:p>
+            <a:pPr indent="0" lvl="0" marL="0" rtl="0" algn="l">
+              <a:spcBef>
+                <a:spcPts val="1200"/>
               </a:spcBef>
               <a:spcAft>
                 <a:spcPts val="0"/>
@@ -1410,7 +2133,7 @@
   <p:cSld>
     <p:spTree>
       <p:nvGrpSpPr>
-        <p:cNvPr id="99" name="Shape 99"/>
+        <p:cNvPr id="102" name="Shape 102"/>
         <p:cNvGrpSpPr/>
         <p:nvPr/>
       </p:nvGrpSpPr>
@@ -1424,7 +2147,7 @@
       </p:grpSpPr>
       <p:sp>
         <p:nvSpPr>
-          <p:cNvPr id="100" name="Google Shape;100;gda8216b607_2_39:notes"/>
+          <p:cNvPr id="103" name="Google Shape;103;gda8216b607_2_39:notes"/>
           <p:cNvSpPr/>
           <p:nvPr>
             <p:ph idx="2" type="sldImg"/>
@@ -1459,7 +2182,7 @@
       </p:sp>
       <p:sp>
         <p:nvSpPr>
-          <p:cNvPr id="101" name="Google Shape;101;gda8216b607_2_39:notes"/>
+          <p:cNvPr id="104" name="Google Shape;104;gda8216b607_2_39:notes"/>
           <p:cNvSpPr txBox="1"/>
           <p:nvPr>
             <p:ph idx="1" type="body"/>
@@ -1481,8 +2204,55 @@
           <a:lstStyle/>
           <a:p>
             <a:pPr indent="0" lvl="0" marL="0" rtl="0" algn="l">
-              <a:spcBef>
-                <a:spcPts val="0"/>
+              <a:lnSpc>
+                <a:spcPct val="115000"/>
+              </a:lnSpc>
+              <a:spcBef>
+                <a:spcPts val="0"/>
+              </a:spcBef>
+              <a:spcAft>
+                <a:spcPts val="0"/>
+              </a:spcAft>
+              <a:buNone/>
+            </a:pPr>
+            <a:r>
+              <a:rPr lang="en" sz="1200">
+                <a:solidFill>
+                  <a:srgbClr val="24292E"/>
+                </a:solidFill>
+              </a:rPr>
+              <a:t>Linear regression was the first model used to predict the potential effects of sociodemographic indicators on vaccine hesitancy. It is beneficial as it is a fast and efficient model for initial machine learning analysis. A simple </a:t>
+            </a:r>
+            <a:r>
+              <a:rPr lang="en" sz="1200">
+                <a:solidFill>
+                  <a:schemeClr val="hlink"/>
+                </a:solidFill>
+                <a:uFill>
+                  <a:noFill/>
+                </a:uFill>
+                <a:hlinkClick r:id="rId2"/>
+              </a:rPr>
+              <a:t>linear regression</a:t>
+            </a:r>
+            <a:r>
+              <a:rPr lang="en" sz="1200">
+                <a:solidFill>
+                  <a:srgbClr val="24292E"/>
+                </a:solidFill>
+              </a:rPr>
+              <a:t> was used first to test if the data is linear or non-linear. The results of the linear regression model indicated a more complex model should be used as the predictions were not very close to the original targets. The major limitation of linear regression model is non-linear data.</a:t>
+            </a:r>
+            <a:endParaRPr sz="1200">
+              <a:solidFill>
+                <a:srgbClr val="24292E"/>
+              </a:solidFill>
+            </a:endParaRPr>
+          </a:p>
+          <a:p>
+            <a:pPr indent="0" lvl="0" marL="0" rtl="0" algn="l">
+              <a:spcBef>
+                <a:spcPts val="1200"/>
               </a:spcBef>
               <a:spcAft>
                 <a:spcPts val="0"/>
@@ -1509,7 +2279,7 @@
   <p:cSld>
     <p:spTree>
       <p:nvGrpSpPr>
-        <p:cNvPr id="105" name="Shape 105"/>
+        <p:cNvPr id="108" name="Shape 108"/>
         <p:cNvGrpSpPr/>
         <p:nvPr/>
       </p:nvGrpSpPr>
@@ -1523,7 +2293,7 @@
       </p:grpSpPr>
       <p:sp>
         <p:nvSpPr>
-          <p:cNvPr id="106" name="Google Shape;106;gdab4b50a20_0_4:notes"/>
+          <p:cNvPr id="109" name="Google Shape;109;gdd6f716e79_0_8:notes"/>
           <p:cNvSpPr/>
           <p:nvPr>
             <p:ph idx="2" type="sldImg"/>
@@ -1558,7 +2328,7 @@
       </p:sp>
       <p:sp>
         <p:nvSpPr>
-          <p:cNvPr id="107" name="Google Shape;107;gdab4b50a20_0_4:notes"/>
+          <p:cNvPr id="110" name="Google Shape;110;gdd6f716e79_0_8:notes"/>
           <p:cNvSpPr txBox="1"/>
           <p:nvPr>
             <p:ph idx="1" type="body"/>
@@ -1579,9 +2349,198 @@
           </a:bodyPr>
           <a:lstStyle/>
           <a:p>
+            <a:pPr indent="-298450" lvl="0" marL="457200" rtl="0" algn="l">
+              <a:lnSpc>
+                <a:spcPct val="115000"/>
+              </a:lnSpc>
+              <a:spcBef>
+                <a:spcPts val="0"/>
+              </a:spcBef>
+              <a:spcAft>
+                <a:spcPts val="0"/>
+              </a:spcAft>
+              <a:buClr>
+                <a:srgbClr val="24292E"/>
+              </a:buClr>
+              <a:buSzPts val="1100"/>
+              <a:buChar char="●"/>
+            </a:pPr>
+            <a:r>
+              <a:rPr lang="en">
+                <a:solidFill>
+                  <a:srgbClr val="24292E"/>
+                </a:solidFill>
+              </a:rPr>
+              <a:t>A few examples of regression analysis using selected features - positive, negative, and fairly static relationships. </a:t>
+            </a:r>
+            <a:endParaRPr>
+              <a:solidFill>
+                <a:srgbClr val="24292E"/>
+              </a:solidFill>
+            </a:endParaRPr>
+          </a:p>
+          <a:p>
+            <a:pPr indent="-298450" lvl="0" marL="457200" rtl="0" algn="l">
+              <a:lnSpc>
+                <a:spcPct val="115000"/>
+              </a:lnSpc>
+              <a:spcBef>
+                <a:spcPts val="0"/>
+              </a:spcBef>
+              <a:spcAft>
+                <a:spcPts val="0"/>
+              </a:spcAft>
+              <a:buClr>
+                <a:srgbClr val="24292E"/>
+              </a:buClr>
+              <a:buSzPts val="1100"/>
+              <a:buChar char="●"/>
+            </a:pPr>
+            <a:r>
+              <a:rPr lang="en">
+                <a:solidFill>
+                  <a:srgbClr val="24292E"/>
+                </a:solidFill>
+              </a:rPr>
+              <a:t>Regression Metrics:</a:t>
+            </a:r>
+            <a:endParaRPr>
+              <a:solidFill>
+                <a:srgbClr val="24292E"/>
+              </a:solidFill>
+            </a:endParaRPr>
+          </a:p>
+          <a:p>
+            <a:pPr indent="-298450" lvl="0" marL="914400" rtl="0" algn="l">
+              <a:lnSpc>
+                <a:spcPct val="115000"/>
+              </a:lnSpc>
+              <a:spcBef>
+                <a:spcPts val="0"/>
+              </a:spcBef>
+              <a:spcAft>
+                <a:spcPts val="0"/>
+              </a:spcAft>
+              <a:buClr>
+                <a:srgbClr val="24292E"/>
+              </a:buClr>
+              <a:buSzPts val="1100"/>
+              <a:buChar char="●"/>
+            </a:pPr>
+            <a:r>
+              <a:rPr lang="en">
+                <a:solidFill>
+                  <a:srgbClr val="24292E"/>
+                </a:solidFill>
+              </a:rPr>
+              <a:t>Mean Absolute Error</a:t>
+            </a:r>
+            <a:endParaRPr>
+              <a:solidFill>
+                <a:srgbClr val="24292E"/>
+              </a:solidFill>
+            </a:endParaRPr>
+          </a:p>
+          <a:p>
+            <a:pPr indent="-298450" lvl="0" marL="914400" rtl="0" algn="l">
+              <a:lnSpc>
+                <a:spcPct val="115000"/>
+              </a:lnSpc>
+              <a:spcBef>
+                <a:spcPts val="0"/>
+              </a:spcBef>
+              <a:spcAft>
+                <a:spcPts val="0"/>
+              </a:spcAft>
+              <a:buClr>
+                <a:srgbClr val="24292E"/>
+              </a:buClr>
+              <a:buSzPts val="1100"/>
+              <a:buChar char="●"/>
+            </a:pPr>
+            <a:r>
+              <a:rPr lang="en">
+                <a:solidFill>
+                  <a:srgbClr val="24292E"/>
+                </a:solidFill>
+              </a:rPr>
+              <a:t>Mean Squared Error</a:t>
+            </a:r>
+            <a:endParaRPr>
+              <a:solidFill>
+                <a:srgbClr val="24292E"/>
+              </a:solidFill>
+            </a:endParaRPr>
+          </a:p>
+          <a:p>
+            <a:pPr indent="-298450" lvl="0" marL="914400" rtl="0" algn="l">
+              <a:lnSpc>
+                <a:spcPct val="115000"/>
+              </a:lnSpc>
+              <a:spcBef>
+                <a:spcPts val="0"/>
+              </a:spcBef>
+              <a:spcAft>
+                <a:spcPts val="0"/>
+              </a:spcAft>
+              <a:buClr>
+                <a:srgbClr val="24292E"/>
+              </a:buClr>
+              <a:buSzPts val="1100"/>
+              <a:buChar char="●"/>
+            </a:pPr>
+            <a:r>
+              <a:rPr lang="en">
+                <a:solidFill>
+                  <a:srgbClr val="24292E"/>
+                </a:solidFill>
+              </a:rPr>
+              <a:t>R Squared Score</a:t>
+            </a:r>
+            <a:endParaRPr>
+              <a:solidFill>
+                <a:srgbClr val="24292E"/>
+              </a:solidFill>
+            </a:endParaRPr>
+          </a:p>
+          <a:p>
+            <a:pPr indent="-298450" lvl="0" marL="914400" rtl="0" algn="l">
+              <a:lnSpc>
+                <a:spcPct val="115000"/>
+              </a:lnSpc>
+              <a:spcBef>
+                <a:spcPts val="0"/>
+              </a:spcBef>
+              <a:spcAft>
+                <a:spcPts val="0"/>
+              </a:spcAft>
+              <a:buClr>
+                <a:srgbClr val="24292E"/>
+              </a:buClr>
+              <a:buSzPts val="1100"/>
+              <a:buChar char="●"/>
+            </a:pPr>
+            <a:r>
+              <a:rPr lang="en">
+                <a:solidFill>
+                  <a:srgbClr val="24292E"/>
+                </a:solidFill>
+              </a:rPr>
+              <a:t>Explained Variance Score</a:t>
+            </a:r>
+            <a:endParaRPr>
+              <a:solidFill>
+                <a:srgbClr val="24292E"/>
+              </a:solidFill>
+            </a:endParaRPr>
+          </a:p>
+          <a:p>
             <a:pPr indent="0" lvl="0" marL="0" rtl="0" algn="l">
-              <a:spcBef>
-                <a:spcPts val="0"/>
+              <a:lnSpc>
+                <a:spcPct val="115000"/>
+              </a:lnSpc>
+              <a:spcBef>
+                <a:spcPts val="1200"/>
               </a:spcBef>
               <a:spcAft>
                 <a:spcPts val="0"/>
@@ -1589,9 +2548,177 @@
               <a:buNone/>
             </a:pPr>
             <a:r>
+              <a:rPr b="1" lang="en">
+                <a:solidFill>
+                  <a:srgbClr val="202124"/>
+                </a:solidFill>
+              </a:rPr>
+              <a:t>R</a:t>
+            </a:r>
+            <a:r>
+              <a:rPr lang="en">
+                <a:solidFill>
+                  <a:srgbClr val="202124"/>
+                </a:solidFill>
+                <a:highlight>
+                  <a:srgbClr val="FFFFFF"/>
+                </a:highlight>
+              </a:rPr>
+              <a:t>-</a:t>
+            </a:r>
+            <a:r>
+              <a:rPr b="1" lang="en">
+                <a:solidFill>
+                  <a:srgbClr val="202124"/>
+                </a:solidFill>
+              </a:rPr>
+              <a:t>squared</a:t>
+            </a:r>
+            <a:r>
+              <a:rPr lang="en">
+                <a:solidFill>
+                  <a:srgbClr val="202124"/>
+                </a:solidFill>
+                <a:highlight>
+                  <a:srgbClr val="FFFFFF"/>
+                </a:highlight>
+              </a:rPr>
+              <a:t> (</a:t>
+            </a:r>
+            <a:r>
+              <a:rPr b="1" lang="en">
+                <a:solidFill>
+                  <a:srgbClr val="202124"/>
+                </a:solidFill>
+              </a:rPr>
+              <a:t>R2</a:t>
+            </a:r>
+            <a:r>
+              <a:rPr lang="en">
+                <a:solidFill>
+                  <a:srgbClr val="202124"/>
+                </a:solidFill>
+                <a:highlight>
+                  <a:srgbClr val="FFFFFF"/>
+                </a:highlight>
+              </a:rPr>
+              <a:t>), which is the proportion of variation in the outcome that is explained by the predictor variables. In multiple </a:t>
+            </a:r>
+            <a:r>
+              <a:rPr b="1" lang="en">
+                <a:solidFill>
+                  <a:srgbClr val="202124"/>
+                </a:solidFill>
+              </a:rPr>
+              <a:t>regression</a:t>
+            </a:r>
+            <a:r>
+              <a:rPr lang="en">
+                <a:solidFill>
+                  <a:srgbClr val="202124"/>
+                </a:solidFill>
+                <a:highlight>
+                  <a:srgbClr val="FFFFFF"/>
+                </a:highlight>
+              </a:rPr>
+              <a:t> models, </a:t>
+            </a:r>
+            <a:r>
+              <a:rPr b="1" lang="en">
+                <a:solidFill>
+                  <a:srgbClr val="202124"/>
+                </a:solidFill>
+              </a:rPr>
+              <a:t>R2</a:t>
+            </a:r>
+            <a:r>
+              <a:rPr lang="en">
+                <a:solidFill>
+                  <a:srgbClr val="202124"/>
+                </a:solidFill>
+                <a:highlight>
+                  <a:srgbClr val="FFFFFF"/>
+                </a:highlight>
+              </a:rPr>
+              <a:t> corresponds to the </a:t>
+            </a:r>
+            <a:r>
+              <a:rPr b="1" lang="en">
+                <a:solidFill>
+                  <a:srgbClr val="202124"/>
+                </a:solidFill>
+              </a:rPr>
+              <a:t>squared </a:t>
+            </a:r>
+            <a:r>
+              <a:rPr lang="en">
+                <a:solidFill>
+                  <a:srgbClr val="202124"/>
+                </a:solidFill>
+                <a:highlight>
+                  <a:srgbClr val="FFFFFF"/>
+                </a:highlight>
+              </a:rPr>
+              <a:t>correlation between the observed outcome values and the predicted values by the model. The higher the </a:t>
+            </a:r>
+            <a:r>
+              <a:rPr b="1" lang="en">
+                <a:solidFill>
+                  <a:srgbClr val="202124"/>
+                </a:solidFill>
+              </a:rPr>
+              <a:t>R</a:t>
+            </a:r>
+            <a:r>
+              <a:rPr lang="en">
+                <a:solidFill>
+                  <a:srgbClr val="202124"/>
+                </a:solidFill>
+                <a:highlight>
+                  <a:srgbClr val="FFFFFF"/>
+                </a:highlight>
+              </a:rPr>
+              <a:t>-</a:t>
+            </a:r>
+            <a:r>
+              <a:rPr b="1" lang="en">
+                <a:solidFill>
+                  <a:srgbClr val="202124"/>
+                </a:solidFill>
+              </a:rPr>
+              <a:t>squared</a:t>
+            </a:r>
+            <a:r>
+              <a:rPr lang="en">
+                <a:solidFill>
+                  <a:srgbClr val="202124"/>
+                </a:solidFill>
+                <a:highlight>
+                  <a:srgbClr val="FFFFFF"/>
+                </a:highlight>
+              </a:rPr>
+              <a:t>, the better the model.</a:t>
+            </a:r>
+            <a:endParaRPr>
+              <a:solidFill>
+                <a:srgbClr val="24292E"/>
+              </a:solidFill>
+            </a:endParaRPr>
+          </a:p>
+          <a:p>
+            <a:pPr indent="0" lvl="0" marL="0" rtl="0" algn="l">
+              <a:spcBef>
+                <a:spcPts val="1200"/>
+              </a:spcBef>
+              <a:spcAft>
+                <a:spcPts val="0"/>
+              </a:spcAft>
+              <a:buNone/>
+            </a:pPr>
+            <a:r>
               <a:t/>
             </a:r>
-            <a:endParaRPr/>
+            <a:endParaRPr sz="1200"/>
           </a:p>
         </p:txBody>
       </p:sp>
@@ -1608,7 +2735,7 @@
   <p:cSld>
     <p:spTree>
       <p:nvGrpSpPr>
-        <p:cNvPr id="111" name="Shape 111"/>
+        <p:cNvPr id="118" name="Shape 118"/>
         <p:cNvGrpSpPr/>
         <p:nvPr/>
       </p:nvGrpSpPr>
@@ -1622,7 +2749,7 @@
       </p:grpSpPr>
       <p:sp>
         <p:nvSpPr>
-          <p:cNvPr id="112" name="Google Shape;112;gda8216b607_2_43:notes"/>
+          <p:cNvPr id="119" name="Google Shape;119;gdab4b50a20_0_4:notes"/>
           <p:cNvSpPr/>
           <p:nvPr>
             <p:ph idx="2" type="sldImg"/>
@@ -1657,7 +2784,7 @@
       </p:sp>
       <p:sp>
         <p:nvSpPr>
-          <p:cNvPr id="113" name="Google Shape;113;gda8216b607_2_43:notes"/>
+          <p:cNvPr id="120" name="Google Shape;120;gdab4b50a20_0_4:notes"/>
           <p:cNvSpPr txBox="1"/>
           <p:nvPr>
             <p:ph idx="1" type="body"/>
@@ -1678,19 +2805,77 @@
           </a:bodyPr>
           <a:lstStyle/>
           <a:p>
-            <a:pPr indent="0" lvl="0" marL="0" rtl="0" algn="l">
-              <a:spcBef>
-                <a:spcPts val="0"/>
-              </a:spcBef>
-              <a:spcAft>
-                <a:spcPts val="0"/>
-              </a:spcAft>
-              <a:buNone/>
+            <a:pPr indent="-298450" lvl="0" marL="457200" rtl="0" algn="l">
+              <a:lnSpc>
+                <a:spcPct val="115000"/>
+              </a:lnSpc>
+              <a:spcBef>
+                <a:spcPts val="0"/>
+              </a:spcBef>
+              <a:spcAft>
+                <a:spcPts val="0"/>
+              </a:spcAft>
+              <a:buClr>
+                <a:srgbClr val="24292E"/>
+              </a:buClr>
+              <a:buSzPts val="1100"/>
+              <a:buChar char="●"/>
             </a:pPr>
             <a:r>
-              <a:t/>
-            </a:r>
-            <a:endParaRPr/>
+              <a:rPr b="1" lang="en">
+                <a:solidFill>
+                  <a:srgbClr val="24292E"/>
+                </a:solidFill>
+              </a:rPr>
+              <a:t>Description of how data was split into training and testing sets:</a:t>
+            </a:r>
+            <a:r>
+              <a:rPr lang="en">
+                <a:solidFill>
+                  <a:srgbClr val="24292E"/>
+                </a:solidFill>
+              </a:rPr>
+              <a:t> For the random forest regression model, the training set used 70% of the data and the testing set used the remaining 30% of the data.</a:t>
+            </a:r>
+            <a:endParaRPr>
+              <a:solidFill>
+                <a:srgbClr val="24292E"/>
+              </a:solidFill>
+            </a:endParaRPr>
+          </a:p>
+          <a:p>
+            <a:pPr indent="-298450" lvl="0" marL="457200" rtl="0" algn="l">
+              <a:lnSpc>
+                <a:spcPct val="115000"/>
+              </a:lnSpc>
+              <a:spcBef>
+                <a:spcPts val="0"/>
+              </a:spcBef>
+              <a:spcAft>
+                <a:spcPts val="0"/>
+              </a:spcAft>
+              <a:buClr>
+                <a:srgbClr val="24292E"/>
+              </a:buClr>
+              <a:buSzPts val="1100"/>
+              <a:buChar char="●"/>
+            </a:pPr>
+            <a:r>
+              <a:rPr lang="en">
+                <a:solidFill>
+                  <a:srgbClr val="24292E"/>
+                </a:solidFill>
+                <a:highlight>
+                  <a:srgbClr val="FFFFFF"/>
+                </a:highlight>
+              </a:rPr>
+              <a:t>The random forest model is beneficial in this analysis as it can input multiple features in a fast and powerful algorithm which is not prone to overfitting. However, random forest is limited as all predictions are within the training set and it is unable to extrapolate values which are not within the dataset.</a:t>
+            </a:r>
+            <a:endParaRPr>
+              <a:solidFill>
+                <a:srgbClr val="24292E"/>
+              </a:solidFill>
+            </a:endParaRPr>
           </a:p>
         </p:txBody>
       </p:sp>
@@ -8043,7 +9228,7 @@
                 <a:cs typeface="Roboto"/>
                 <a:sym typeface="Roboto"/>
               </a:rPr>
-              <a:t>Due: June 6th 2021</a:t>
+              <a:t>Due: June 9th 2021</a:t>
             </a:r>
             <a:endParaRPr>
               <a:solidFill>
@@ -8098,7 +9283,7 @@
   <p:cSld>
     <p:spTree>
       <p:nvGrpSpPr>
-        <p:cNvPr id="120" name="Shape 120"/>
+        <p:cNvPr id="128" name="Shape 128"/>
         <p:cNvGrpSpPr/>
         <p:nvPr/>
       </p:nvGrpSpPr>
@@ -8112,7 +9297,732 @@
       </p:grpSpPr>
       <p:sp>
         <p:nvSpPr>
-          <p:cNvPr id="121" name="Google Shape;121;p22"/>
+          <p:cNvPr id="129" name="Google Shape;129;p22"/>
+          <p:cNvSpPr txBox="1"/>
+          <p:nvPr>
+            <p:ph type="title"/>
+          </p:nvPr>
+        </p:nvSpPr>
+        <p:spPr>
+          <a:xfrm>
+            <a:off x="311725" y="500925"/>
+            <a:ext cx="3127500" cy="1829100"/>
+          </a:xfrm>
+          <a:prstGeom prst="rect">
+            <a:avLst/>
+          </a:prstGeom>
+        </p:spPr>
+        <p:txBody>
+          <a:bodyPr anchorCtr="0" anchor="t" bIns="91425" lIns="91425" spcFirstLastPara="1" rIns="91425" wrap="square" tIns="91425">
+            <a:normAutofit/>
+          </a:bodyPr>
+          <a:lstStyle/>
+          <a:p>
+            <a:pPr indent="0" lvl="0" marL="0" rtl="0" algn="l">
+              <a:spcBef>
+                <a:spcPts val="0"/>
+              </a:spcBef>
+              <a:spcAft>
+                <a:spcPts val="0"/>
+              </a:spcAft>
+              <a:buNone/>
+            </a:pPr>
+            <a:r>
+              <a:rPr lang="en"/>
+              <a:t>Data Visualizations</a:t>
+            </a:r>
+            <a:endParaRPr/>
+          </a:p>
+        </p:txBody>
+      </p:sp>
+      <p:pic>
+        <p:nvPicPr>
+          <p:cNvPr id="130" name="Google Shape;130;p22"/>
+          <p:cNvPicPr preferRelativeResize="0"/>
+          <p:nvPr/>
+        </p:nvPicPr>
+        <p:blipFill>
+          <a:blip r:embed="rId3">
+            <a:alphaModFix/>
+          </a:blip>
+          <a:stretch>
+            <a:fillRect/>
+          </a:stretch>
+        </p:blipFill>
+        <p:spPr>
+          <a:xfrm>
+            <a:off x="3860083" y="69075"/>
+            <a:ext cx="5230742" cy="4998225"/>
+          </a:xfrm>
+          <a:prstGeom prst="rect">
+            <a:avLst/>
+          </a:prstGeom>
+          <a:noFill/>
+          <a:ln cap="flat" cmpd="sng" w="9525">
+            <a:solidFill>
+              <a:schemeClr val="accent1"/>
+            </a:solidFill>
+            <a:prstDash val="solid"/>
+            <a:round/>
+            <a:headEnd len="sm" w="sm" type="none"/>
+            <a:tailEnd len="sm" w="sm" type="none"/>
+          </a:ln>
+        </p:spPr>
+      </p:pic>
+      <p:sp>
+        <p:nvSpPr>
+          <p:cNvPr id="131" name="Google Shape;131;p22"/>
+          <p:cNvSpPr txBox="1"/>
+          <p:nvPr>
+            <p:ph idx="1" type="body"/>
+          </p:nvPr>
+        </p:nvSpPr>
+        <p:spPr>
+          <a:xfrm>
+            <a:off x="311700" y="2390650"/>
+            <a:ext cx="3127500" cy="2298000"/>
+          </a:xfrm>
+          <a:prstGeom prst="rect">
+            <a:avLst/>
+          </a:prstGeom>
+        </p:spPr>
+        <p:txBody>
+          <a:bodyPr anchorCtr="0" anchor="t" bIns="91425" lIns="91425" spcFirstLastPara="1" rIns="91425" wrap="square" tIns="91425">
+            <a:normAutofit/>
+          </a:bodyPr>
+          <a:lstStyle/>
+          <a:p>
+            <a:pPr indent="0" lvl="0" marL="0" rtl="0" algn="l">
+              <a:spcBef>
+                <a:spcPts val="0"/>
+              </a:spcBef>
+              <a:spcAft>
+                <a:spcPts val="1200"/>
+              </a:spcAft>
+              <a:buNone/>
+            </a:pPr>
+            <a:r>
+              <a:rPr lang="en" sz="1800">
+                <a:latin typeface="Arial"/>
+                <a:ea typeface="Arial"/>
+                <a:cs typeface="Arial"/>
+                <a:sym typeface="Arial"/>
+              </a:rPr>
+              <a:t>Heat map of US States by % of Populations that are Vaccine Hesitant</a:t>
+            </a:r>
+            <a:endParaRPr sz="1800">
+              <a:latin typeface="Arial"/>
+              <a:ea typeface="Arial"/>
+              <a:cs typeface="Arial"/>
+              <a:sym typeface="Arial"/>
+            </a:endParaRPr>
+          </a:p>
+        </p:txBody>
+      </p:sp>
+    </p:spTree>
+  </p:cSld>
+  <p:clrMapOvr>
+    <a:masterClrMapping/>
+  </p:clrMapOvr>
+</p:sld>
+</file>
+
+<file path=ppt/slides/slide11.xml><?xml version="1.0" encoding="utf-8"?>
+<p:sld xmlns:a="http://schemas.openxmlformats.org/drawingml/2006/main" xmlns:r="http://schemas.openxmlformats.org/officeDocument/2006/relationships" xmlns:mc="http://schemas.openxmlformats.org/markup-compatibility/2006" xmlns:mv="urn:schemas-microsoft-com:mac:vml" xmlns:p="http://schemas.openxmlformats.org/presentationml/2006/main" xmlns:c="http://schemas.openxmlformats.org/drawingml/2006/chart" xmlns:dgm="http://schemas.openxmlformats.org/drawingml/2006/diagram" xmlns:o="urn:schemas-microsoft-com:office:office" xmlns:v="urn:schemas-microsoft-com:vml" xmlns:pvml="urn:schemas-microsoft-com:office:powerpoint" xmlns:com="http://schemas.openxmlformats.org/drawingml/2006/compatibility" xmlns:p14="http://schemas.microsoft.com/office/powerpoint/2010/main" xmlns:p15="http://schemas.microsoft.com/office/powerpoint/2012/main" xmlns:ahyp="http://schemas.microsoft.com/office/drawing/2018/hyperlinkcolor">
+  <p:cSld>
+    <p:spTree>
+      <p:nvGrpSpPr>
+        <p:cNvPr id="135" name="Shape 135"/>
+        <p:cNvGrpSpPr/>
+        <p:nvPr/>
+      </p:nvGrpSpPr>
+      <p:grpSpPr>
+        <a:xfrm>
+          <a:off x="0" y="0"/>
+          <a:ext cx="0" cy="0"/>
+          <a:chOff x="0" y="0"/>
+          <a:chExt cx="0" cy="0"/>
+        </a:xfrm>
+      </p:grpSpPr>
+      <p:sp>
+        <p:nvSpPr>
+          <p:cNvPr id="136" name="Google Shape;136;p23"/>
+          <p:cNvSpPr txBox="1"/>
+          <p:nvPr>
+            <p:ph type="title"/>
+          </p:nvPr>
+        </p:nvSpPr>
+        <p:spPr>
+          <a:xfrm>
+            <a:off x="311725" y="500925"/>
+            <a:ext cx="3127500" cy="1829100"/>
+          </a:xfrm>
+          <a:prstGeom prst="rect">
+            <a:avLst/>
+          </a:prstGeom>
+        </p:spPr>
+        <p:txBody>
+          <a:bodyPr anchorCtr="0" anchor="t" bIns="91425" lIns="91425" spcFirstLastPara="1" rIns="91425" wrap="square" tIns="91425">
+            <a:normAutofit/>
+          </a:bodyPr>
+          <a:lstStyle/>
+          <a:p>
+            <a:pPr indent="0" lvl="0" marL="0" rtl="0" algn="l">
+              <a:spcBef>
+                <a:spcPts val="0"/>
+              </a:spcBef>
+              <a:spcAft>
+                <a:spcPts val="0"/>
+              </a:spcAft>
+              <a:buNone/>
+            </a:pPr>
+            <a:r>
+              <a:rPr lang="en"/>
+              <a:t>Data Visualizations</a:t>
+            </a:r>
+            <a:endParaRPr/>
+          </a:p>
+        </p:txBody>
+      </p:sp>
+      <p:sp>
+        <p:nvSpPr>
+          <p:cNvPr id="137" name="Google Shape;137;p23"/>
+          <p:cNvSpPr txBox="1"/>
+          <p:nvPr>
+            <p:ph idx="1" type="body"/>
+          </p:nvPr>
+        </p:nvSpPr>
+        <p:spPr>
+          <a:xfrm>
+            <a:off x="311700" y="2390650"/>
+            <a:ext cx="3127500" cy="2298000"/>
+          </a:xfrm>
+          <a:prstGeom prst="rect">
+            <a:avLst/>
+          </a:prstGeom>
+        </p:spPr>
+        <p:txBody>
+          <a:bodyPr anchorCtr="0" anchor="t" bIns="91425" lIns="91425" spcFirstLastPara="1" rIns="91425" wrap="square" tIns="91425">
+            <a:normAutofit/>
+          </a:bodyPr>
+          <a:lstStyle/>
+          <a:p>
+            <a:pPr indent="0" lvl="0" marL="0" rtl="0" algn="l">
+              <a:spcBef>
+                <a:spcPts val="0"/>
+              </a:spcBef>
+              <a:spcAft>
+                <a:spcPts val="1200"/>
+              </a:spcAft>
+              <a:buNone/>
+            </a:pPr>
+            <a:r>
+              <a:rPr lang="en" sz="1800">
+                <a:latin typeface="Arial"/>
+                <a:ea typeface="Arial"/>
+                <a:cs typeface="Arial"/>
+                <a:sym typeface="Arial"/>
+              </a:rPr>
+              <a:t>Average Social Vulnerability Index (per County) by Percentage of Population Vaccine Hesitant</a:t>
+            </a:r>
+            <a:endParaRPr sz="1800">
+              <a:latin typeface="Arial"/>
+              <a:ea typeface="Arial"/>
+              <a:cs typeface="Arial"/>
+              <a:sym typeface="Arial"/>
+            </a:endParaRPr>
+          </a:p>
+        </p:txBody>
+      </p:sp>
+      <p:pic>
+        <p:nvPicPr>
+          <p:cNvPr id="138" name="Google Shape;138;p23"/>
+          <p:cNvPicPr preferRelativeResize="0"/>
+          <p:nvPr/>
+        </p:nvPicPr>
+        <p:blipFill>
+          <a:blip r:embed="rId3">
+            <a:alphaModFix/>
+          </a:blip>
+          <a:stretch>
+            <a:fillRect/>
+          </a:stretch>
+        </p:blipFill>
+        <p:spPr>
+          <a:xfrm>
+            <a:off x="3868000" y="152400"/>
+            <a:ext cx="5073917" cy="4838702"/>
+          </a:xfrm>
+          <a:prstGeom prst="rect">
+            <a:avLst/>
+          </a:prstGeom>
+          <a:noFill/>
+          <a:ln>
+            <a:noFill/>
+          </a:ln>
+        </p:spPr>
+      </p:pic>
+    </p:spTree>
+  </p:cSld>
+  <p:clrMapOvr>
+    <a:masterClrMapping/>
+  </p:clrMapOvr>
+</p:sld>
+</file>
+
+<file path=ppt/slides/slide12.xml><?xml version="1.0" encoding="utf-8"?>
+<p:sld xmlns:a="http://schemas.openxmlformats.org/drawingml/2006/main" xmlns:r="http://schemas.openxmlformats.org/officeDocument/2006/relationships" xmlns:mc="http://schemas.openxmlformats.org/markup-compatibility/2006" xmlns:mv="urn:schemas-microsoft-com:mac:vml" xmlns:p="http://schemas.openxmlformats.org/presentationml/2006/main" xmlns:c="http://schemas.openxmlformats.org/drawingml/2006/chart" xmlns:dgm="http://schemas.openxmlformats.org/drawingml/2006/diagram" xmlns:o="urn:schemas-microsoft-com:office:office" xmlns:v="urn:schemas-microsoft-com:vml" xmlns:pvml="urn:schemas-microsoft-com:office:powerpoint" xmlns:com="http://schemas.openxmlformats.org/drawingml/2006/compatibility" xmlns:p14="http://schemas.microsoft.com/office/powerpoint/2010/main" xmlns:p15="http://schemas.microsoft.com/office/powerpoint/2012/main" xmlns:ahyp="http://schemas.microsoft.com/office/drawing/2018/hyperlinkcolor">
+  <p:cSld>
+    <p:spTree>
+      <p:nvGrpSpPr>
+        <p:cNvPr id="142" name="Shape 142"/>
+        <p:cNvGrpSpPr/>
+        <p:nvPr/>
+      </p:nvGrpSpPr>
+      <p:grpSpPr>
+        <a:xfrm>
+          <a:off x="0" y="0"/>
+          <a:ext cx="0" cy="0"/>
+          <a:chOff x="0" y="0"/>
+          <a:chExt cx="0" cy="0"/>
+        </a:xfrm>
+      </p:grpSpPr>
+      <p:sp>
+        <p:nvSpPr>
+          <p:cNvPr id="143" name="Google Shape;143;p24"/>
+          <p:cNvSpPr txBox="1"/>
+          <p:nvPr>
+            <p:ph type="title"/>
+          </p:nvPr>
+        </p:nvSpPr>
+        <p:spPr>
+          <a:xfrm>
+            <a:off x="311725" y="500925"/>
+            <a:ext cx="3127500" cy="1829100"/>
+          </a:xfrm>
+          <a:prstGeom prst="rect">
+            <a:avLst/>
+          </a:prstGeom>
+        </p:spPr>
+        <p:txBody>
+          <a:bodyPr anchorCtr="0" anchor="t" bIns="91425" lIns="91425" spcFirstLastPara="1" rIns="91425" wrap="square" tIns="91425">
+            <a:normAutofit/>
+          </a:bodyPr>
+          <a:lstStyle/>
+          <a:p>
+            <a:pPr indent="0" lvl="0" marL="0" rtl="0" algn="l">
+              <a:spcBef>
+                <a:spcPts val="0"/>
+              </a:spcBef>
+              <a:spcAft>
+                <a:spcPts val="0"/>
+              </a:spcAft>
+              <a:buNone/>
+            </a:pPr>
+            <a:r>
+              <a:rPr lang="en"/>
+              <a:t>Data Visualizations</a:t>
+            </a:r>
+            <a:endParaRPr/>
+          </a:p>
+        </p:txBody>
+      </p:sp>
+      <p:sp>
+        <p:nvSpPr>
+          <p:cNvPr id="144" name="Google Shape;144;p24"/>
+          <p:cNvSpPr txBox="1"/>
+          <p:nvPr>
+            <p:ph idx="1" type="body"/>
+          </p:nvPr>
+        </p:nvSpPr>
+        <p:spPr>
+          <a:xfrm>
+            <a:off x="311700" y="2390650"/>
+            <a:ext cx="3127500" cy="2298000"/>
+          </a:xfrm>
+          <a:prstGeom prst="rect">
+            <a:avLst/>
+          </a:prstGeom>
+        </p:spPr>
+        <p:txBody>
+          <a:bodyPr anchorCtr="0" anchor="t" bIns="91425" lIns="91425" spcFirstLastPara="1" rIns="91425" wrap="square" tIns="91425">
+            <a:normAutofit/>
+          </a:bodyPr>
+          <a:lstStyle/>
+          <a:p>
+            <a:pPr indent="0" lvl="0" marL="0" rtl="0" algn="l">
+              <a:spcBef>
+                <a:spcPts val="0"/>
+              </a:spcBef>
+              <a:spcAft>
+                <a:spcPts val="1200"/>
+              </a:spcAft>
+              <a:buNone/>
+            </a:pPr>
+            <a:r>
+              <a:rPr lang="en" sz="1800">
+                <a:latin typeface="Arial"/>
+                <a:ea typeface="Arial"/>
+                <a:cs typeface="Arial"/>
+                <a:sym typeface="Arial"/>
+              </a:rPr>
+              <a:t>Average Percentage of Population Vaccine Hesitant by Social Vulnerability Index (per County) </a:t>
+            </a:r>
+            <a:endParaRPr sz="1800">
+              <a:latin typeface="Arial"/>
+              <a:ea typeface="Arial"/>
+              <a:cs typeface="Arial"/>
+              <a:sym typeface="Arial"/>
+            </a:endParaRPr>
+          </a:p>
+        </p:txBody>
+      </p:sp>
+      <p:pic>
+        <p:nvPicPr>
+          <p:cNvPr id="145" name="Google Shape;145;p24"/>
+          <p:cNvPicPr preferRelativeResize="0"/>
+          <p:nvPr/>
+        </p:nvPicPr>
+        <p:blipFill>
+          <a:blip r:embed="rId3">
+            <a:alphaModFix/>
+          </a:blip>
+          <a:stretch>
+            <a:fillRect/>
+          </a:stretch>
+        </p:blipFill>
+        <p:spPr>
+          <a:xfrm>
+            <a:off x="3797675" y="443550"/>
+            <a:ext cx="5224626" cy="4162001"/>
+          </a:xfrm>
+          <a:prstGeom prst="rect">
+            <a:avLst/>
+          </a:prstGeom>
+          <a:noFill/>
+          <a:ln>
+            <a:noFill/>
+          </a:ln>
+        </p:spPr>
+      </p:pic>
+    </p:spTree>
+  </p:cSld>
+  <p:clrMapOvr>
+    <a:masterClrMapping/>
+  </p:clrMapOvr>
+</p:sld>
+</file>
+
+<file path=ppt/slides/slide13.xml><?xml version="1.0" encoding="utf-8"?>
+<p:sld xmlns:a="http://schemas.openxmlformats.org/drawingml/2006/main" xmlns:r="http://schemas.openxmlformats.org/officeDocument/2006/relationships" xmlns:mc="http://schemas.openxmlformats.org/markup-compatibility/2006" xmlns:mv="urn:schemas-microsoft-com:mac:vml" xmlns:p="http://schemas.openxmlformats.org/presentationml/2006/main" xmlns:c="http://schemas.openxmlformats.org/drawingml/2006/chart" xmlns:dgm="http://schemas.openxmlformats.org/drawingml/2006/diagram" xmlns:o="urn:schemas-microsoft-com:office:office" xmlns:v="urn:schemas-microsoft-com:vml" xmlns:pvml="urn:schemas-microsoft-com:office:powerpoint" xmlns:com="http://schemas.openxmlformats.org/drawingml/2006/compatibility" xmlns:p14="http://schemas.microsoft.com/office/powerpoint/2010/main" xmlns:p15="http://schemas.microsoft.com/office/powerpoint/2012/main" xmlns:ahyp="http://schemas.microsoft.com/office/drawing/2018/hyperlinkcolor">
+  <p:cSld>
+    <p:spTree>
+      <p:nvGrpSpPr>
+        <p:cNvPr id="149" name="Shape 149"/>
+        <p:cNvGrpSpPr/>
+        <p:nvPr/>
+      </p:nvGrpSpPr>
+      <p:grpSpPr>
+        <a:xfrm>
+          <a:off x="0" y="0"/>
+          <a:ext cx="0" cy="0"/>
+          <a:chOff x="0" y="0"/>
+          <a:chExt cx="0" cy="0"/>
+        </a:xfrm>
+      </p:grpSpPr>
+      <p:sp>
+        <p:nvSpPr>
+          <p:cNvPr id="150" name="Google Shape;150;p25"/>
+          <p:cNvSpPr txBox="1"/>
+          <p:nvPr>
+            <p:ph type="title"/>
+          </p:nvPr>
+        </p:nvSpPr>
+        <p:spPr>
+          <a:xfrm>
+            <a:off x="311725" y="500925"/>
+            <a:ext cx="8520600" cy="623700"/>
+          </a:xfrm>
+          <a:prstGeom prst="rect">
+            <a:avLst/>
+          </a:prstGeom>
+        </p:spPr>
+        <p:txBody>
+          <a:bodyPr anchorCtr="0" anchor="t" bIns="91425" lIns="91425" spcFirstLastPara="1" rIns="91425" wrap="square" tIns="91425">
+            <a:normAutofit/>
+          </a:bodyPr>
+          <a:lstStyle/>
+          <a:p>
+            <a:pPr indent="0" lvl="0" marL="0" rtl="0" algn="l">
+              <a:spcBef>
+                <a:spcPts val="0"/>
+              </a:spcBef>
+              <a:spcAft>
+                <a:spcPts val="0"/>
+              </a:spcAft>
+              <a:buNone/>
+            </a:pPr>
+            <a:r>
+              <a:rPr lang="en"/>
+              <a:t>Conclusion and Next Steps</a:t>
+            </a:r>
+            <a:endParaRPr/>
+          </a:p>
+        </p:txBody>
+      </p:sp>
+      <p:sp>
+        <p:nvSpPr>
+          <p:cNvPr id="151" name="Google Shape;151;p25"/>
+          <p:cNvSpPr txBox="1"/>
+          <p:nvPr/>
+        </p:nvSpPr>
+        <p:spPr>
+          <a:xfrm>
+            <a:off x="206700" y="1356900"/>
+            <a:ext cx="8727900" cy="3648000"/>
+          </a:xfrm>
+          <a:prstGeom prst="rect">
+            <a:avLst/>
+          </a:prstGeom>
+          <a:noFill/>
+          <a:ln>
+            <a:noFill/>
+          </a:ln>
+        </p:spPr>
+        <p:txBody>
+          <a:bodyPr anchorCtr="0" anchor="t" bIns="91425" lIns="91425" spcFirstLastPara="1" rIns="91425" wrap="square" tIns="91425">
+            <a:spAutoFit/>
+          </a:bodyPr>
+          <a:lstStyle/>
+          <a:p>
+            <a:pPr indent="0" lvl="0" marL="0" rtl="0" algn="l">
+              <a:lnSpc>
+                <a:spcPct val="115000"/>
+              </a:lnSpc>
+              <a:spcBef>
+                <a:spcPts val="0"/>
+              </a:spcBef>
+              <a:spcAft>
+                <a:spcPts val="0"/>
+              </a:spcAft>
+              <a:buNone/>
+            </a:pPr>
+            <a:r>
+              <a:rPr b="1" lang="en" sz="1800">
+                <a:solidFill>
+                  <a:srgbClr val="24292E"/>
+                </a:solidFill>
+                <a:highlight>
+                  <a:srgbClr val="FFFFFF"/>
+                </a:highlight>
+              </a:rPr>
+              <a:t>Inferences</a:t>
+            </a:r>
+            <a:endParaRPr b="1" sz="1800">
+              <a:solidFill>
+                <a:srgbClr val="24292E"/>
+              </a:solidFill>
+              <a:highlight>
+                <a:srgbClr val="FFFFFF"/>
+              </a:highlight>
+            </a:endParaRPr>
+          </a:p>
+          <a:p>
+            <a:pPr indent="-342900" lvl="0" marL="457200" rtl="0" algn="l">
+              <a:lnSpc>
+                <a:spcPct val="115000"/>
+              </a:lnSpc>
+              <a:spcBef>
+                <a:spcPts val="0"/>
+              </a:spcBef>
+              <a:spcAft>
+                <a:spcPts val="0"/>
+              </a:spcAft>
+              <a:buClr>
+                <a:srgbClr val="24292E"/>
+              </a:buClr>
+              <a:buSzPts val="1800"/>
+              <a:buChar char="●"/>
+            </a:pPr>
+            <a:r>
+              <a:rPr lang="en" sz="1800">
+                <a:solidFill>
+                  <a:srgbClr val="24292E"/>
+                </a:solidFill>
+                <a:highlight>
+                  <a:srgbClr val="FFFFFF"/>
+                </a:highlight>
+              </a:rPr>
+              <a:t>Our linear regression models suggest some sociodemographic features were more impactful than others in predicting vaccine hesitancy, however our data was not always linear.</a:t>
+            </a:r>
+            <a:endParaRPr sz="1800">
+              <a:solidFill>
+                <a:srgbClr val="24292E"/>
+              </a:solidFill>
+              <a:highlight>
+                <a:srgbClr val="FFFFFF"/>
+              </a:highlight>
+            </a:endParaRPr>
+          </a:p>
+          <a:p>
+            <a:pPr indent="-342900" lvl="0" marL="457200" rtl="0" algn="l">
+              <a:lnSpc>
+                <a:spcPct val="115000"/>
+              </a:lnSpc>
+              <a:spcBef>
+                <a:spcPts val="0"/>
+              </a:spcBef>
+              <a:spcAft>
+                <a:spcPts val="0"/>
+              </a:spcAft>
+              <a:buClr>
+                <a:srgbClr val="24292E"/>
+              </a:buClr>
+              <a:buSzPts val="1800"/>
+              <a:buChar char="●"/>
+            </a:pPr>
+            <a:r>
+              <a:rPr lang="en" sz="1800">
+                <a:solidFill>
+                  <a:srgbClr val="24292E"/>
+                </a:solidFill>
+                <a:highlight>
+                  <a:srgbClr val="FFFFFF"/>
+                </a:highlight>
+              </a:rPr>
+              <a:t>The random forest regression machine learning model was overall more accurate in predicting values, however our R squared value of 43% suggests that the outcome of vaccine </a:t>
+            </a:r>
+            <a:r>
+              <a:rPr lang="en" sz="1800">
+                <a:solidFill>
+                  <a:srgbClr val="24292E"/>
+                </a:solidFill>
+                <a:highlight>
+                  <a:srgbClr val="FFFFFF"/>
+                </a:highlight>
+              </a:rPr>
+              <a:t>hesitancy</a:t>
+            </a:r>
+            <a:r>
+              <a:rPr lang="en" sz="1800">
+                <a:solidFill>
+                  <a:srgbClr val="24292E"/>
+                </a:solidFill>
+                <a:highlight>
+                  <a:srgbClr val="FFFFFF"/>
+                </a:highlight>
+              </a:rPr>
+              <a:t> is only moderately explained by the feature values in our dataset. </a:t>
+            </a:r>
+            <a:endParaRPr sz="1800">
+              <a:solidFill>
+                <a:srgbClr val="24292E"/>
+              </a:solidFill>
+              <a:highlight>
+                <a:srgbClr val="FFFFFF"/>
+              </a:highlight>
+            </a:endParaRPr>
+          </a:p>
+          <a:p>
+            <a:pPr indent="0" lvl="0" marL="0" rtl="0" algn="l">
+              <a:lnSpc>
+                <a:spcPct val="115000"/>
+              </a:lnSpc>
+              <a:spcBef>
+                <a:spcPts val="0"/>
+              </a:spcBef>
+              <a:spcAft>
+                <a:spcPts val="0"/>
+              </a:spcAft>
+              <a:buNone/>
+            </a:pPr>
+            <a:r>
+              <a:rPr b="1" lang="en" sz="1800">
+                <a:solidFill>
+                  <a:srgbClr val="24292E"/>
+                </a:solidFill>
+                <a:highlight>
+                  <a:srgbClr val="FFFFFF"/>
+                </a:highlight>
+              </a:rPr>
+              <a:t>Ontario Context</a:t>
+            </a:r>
+            <a:endParaRPr b="1" sz="1800">
+              <a:solidFill>
+                <a:srgbClr val="24292E"/>
+              </a:solidFill>
+              <a:highlight>
+                <a:srgbClr val="FFFFFF"/>
+              </a:highlight>
+            </a:endParaRPr>
+          </a:p>
+          <a:p>
+            <a:pPr indent="-342900" lvl="0" marL="457200" rtl="0" algn="l">
+              <a:lnSpc>
+                <a:spcPct val="115000"/>
+              </a:lnSpc>
+              <a:spcBef>
+                <a:spcPts val="0"/>
+              </a:spcBef>
+              <a:spcAft>
+                <a:spcPts val="0"/>
+              </a:spcAft>
+              <a:buClr>
+                <a:srgbClr val="24292E"/>
+              </a:buClr>
+              <a:buSzPts val="1800"/>
+              <a:buChar char="●"/>
+            </a:pPr>
+            <a:r>
+              <a:rPr lang="en" sz="1800">
+                <a:solidFill>
+                  <a:srgbClr val="24292E"/>
+                </a:solidFill>
+                <a:highlight>
+                  <a:srgbClr val="FFFFFF"/>
+                </a:highlight>
+              </a:rPr>
+              <a:t>With an emphasis on collecting sociodemographic data in public health, future exploration of vaccine hesitancy with a more robust dataset would be beneficial.</a:t>
+            </a:r>
+            <a:endParaRPr sz="1800">
+              <a:solidFill>
+                <a:srgbClr val="24292E"/>
+              </a:solidFill>
+              <a:highlight>
+                <a:srgbClr val="FFFFFF"/>
+              </a:highlight>
+            </a:endParaRPr>
+          </a:p>
+        </p:txBody>
+      </p:sp>
+    </p:spTree>
+  </p:cSld>
+  <p:clrMapOvr>
+    <a:masterClrMapping/>
+  </p:clrMapOvr>
+</p:sld>
+</file>
+
+<file path=ppt/slides/slide14.xml><?xml version="1.0" encoding="utf-8"?>
+<p:sld xmlns:a="http://schemas.openxmlformats.org/drawingml/2006/main" xmlns:r="http://schemas.openxmlformats.org/officeDocument/2006/relationships" xmlns:mc="http://schemas.openxmlformats.org/markup-compatibility/2006" xmlns:mv="urn:schemas-microsoft-com:mac:vml" xmlns:p="http://schemas.openxmlformats.org/presentationml/2006/main" xmlns:c="http://schemas.openxmlformats.org/drawingml/2006/chart" xmlns:dgm="http://schemas.openxmlformats.org/drawingml/2006/diagram" xmlns:o="urn:schemas-microsoft-com:office:office" xmlns:v="urn:schemas-microsoft-com:vml" xmlns:pvml="urn:schemas-microsoft-com:office:powerpoint" xmlns:com="http://schemas.openxmlformats.org/drawingml/2006/compatibility" xmlns:p14="http://schemas.microsoft.com/office/powerpoint/2010/main" xmlns:p15="http://schemas.microsoft.com/office/powerpoint/2012/main" xmlns:ahyp="http://schemas.microsoft.com/office/drawing/2018/hyperlinkcolor">
+  <p:cSld>
+    <p:spTree>
+      <p:nvGrpSpPr>
+        <p:cNvPr id="155" name="Shape 155"/>
+        <p:cNvGrpSpPr/>
+        <p:nvPr/>
+      </p:nvGrpSpPr>
+      <p:grpSpPr>
+        <a:xfrm>
+          <a:off x="0" y="0"/>
+          <a:ext cx="0" cy="0"/>
+          <a:chOff x="0" y="0"/>
+          <a:chExt cx="0" cy="0"/>
+        </a:xfrm>
+      </p:grpSpPr>
+      <p:sp>
+        <p:nvSpPr>
+          <p:cNvPr id="156" name="Google Shape;156;p26"/>
           <p:cNvSpPr txBox="1"/>
           <p:nvPr>
             <p:ph type="ctrTitle"/>
@@ -8242,7 +10152,7 @@
         <p:spPr>
           <a:xfrm>
             <a:off x="4637450" y="183375"/>
-            <a:ext cx="4166400" cy="4327200"/>
+            <a:ext cx="4166400" cy="4831500"/>
           </a:xfrm>
           <a:prstGeom prst="rect">
             <a:avLst/>
@@ -8405,7 +10315,7 @@
                   <a:srgbClr val="000000"/>
                 </a:solidFill>
               </a:rPr>
-              <a:t>Analysis</a:t>
+              <a:t>Analysis and data visualizations</a:t>
             </a:r>
             <a:endParaRPr sz="2400">
               <a:solidFill>
@@ -8516,8 +10426,8 @@
         </p:nvSpPr>
         <p:spPr>
           <a:xfrm>
-            <a:off x="206650" y="1407775"/>
-            <a:ext cx="4558800" cy="3232500"/>
+            <a:off x="165600" y="1659925"/>
+            <a:ext cx="4558800" cy="2955300"/>
           </a:xfrm>
           <a:prstGeom prst="rect">
             <a:avLst/>
@@ -8597,12 +10507,40 @@
                   <a:srgbClr val="FFFFFF"/>
                 </a:highlight>
               </a:rPr>
-              <a:t>Given the global presence of COVID-19 and the implementation of recent months of vaccine rollout have been a positive change in Ontario, our team decided to look into vaccine hesitancy to understand this issue better.</a:t>
+              <a:t>Given the global presence of COVID-19 and the implementation of vaccines in recent months. Our team decided to look into vaccine hesitancy to understand this issue better.</a:t>
             </a:r>
             <a:endParaRPr sz="1800"/>
           </a:p>
         </p:txBody>
       </p:sp>
+      <p:pic>
+        <p:nvPicPr>
+          <p:cNvPr id="80" name="Google Shape;80;p15"/>
+          <p:cNvPicPr preferRelativeResize="0"/>
+          <p:nvPr/>
+        </p:nvPicPr>
+        <p:blipFill>
+          <a:blip r:embed="rId3">
+            <a:alphaModFix/>
+          </a:blip>
+          <a:stretch>
+            <a:fillRect/>
+          </a:stretch>
+        </p:blipFill>
+        <p:spPr>
+          <a:xfrm>
+            <a:off x="4724400" y="1745938"/>
+            <a:ext cx="4141674" cy="2757576"/>
+          </a:xfrm>
+          <a:prstGeom prst="rect">
+            <a:avLst/>
+          </a:prstGeom>
+          <a:noFill/>
+          <a:ln>
+            <a:noFill/>
+          </a:ln>
+        </p:spPr>
+      </p:pic>
     </p:spTree>
   </p:cSld>
   <p:clrMapOvr>
@@ -8616,7 +10554,7 @@
   <p:cSld>
     <p:spTree>
       <p:nvGrpSpPr>
-        <p:cNvPr id="83" name="Shape 83"/>
+        <p:cNvPr id="84" name="Shape 84"/>
         <p:cNvGrpSpPr/>
         <p:nvPr/>
       </p:nvGrpSpPr>
@@ -8630,7 +10568,7 @@
       </p:grpSpPr>
       <p:sp>
         <p:nvSpPr>
-          <p:cNvPr id="84" name="Google Shape;84;p16"/>
+          <p:cNvPr id="85" name="Google Shape;85;p16"/>
           <p:cNvSpPr txBox="1"/>
           <p:nvPr>
             <p:ph type="title"/>
@@ -8674,7 +10612,7 @@
       </p:sp>
       <p:sp>
         <p:nvSpPr>
-          <p:cNvPr id="85" name="Google Shape;85;p16"/>
+          <p:cNvPr id="86" name="Google Shape;86;p16"/>
           <p:cNvSpPr txBox="1"/>
           <p:nvPr/>
         </p:nvSpPr>
@@ -8720,14 +10658,14 @@
       </p:sp>
       <p:sp>
         <p:nvSpPr>
-          <p:cNvPr id="86" name="Google Shape;86;p16"/>
+          <p:cNvPr id="87" name="Google Shape;87;p16"/>
           <p:cNvSpPr txBox="1"/>
           <p:nvPr/>
         </p:nvSpPr>
         <p:spPr>
           <a:xfrm>
-            <a:off x="206700" y="1356900"/>
-            <a:ext cx="5485800" cy="3509400"/>
+            <a:off x="206700" y="1280700"/>
+            <a:ext cx="4827000" cy="3786600"/>
           </a:xfrm>
           <a:prstGeom prst="rect">
             <a:avLst/>
@@ -8763,7 +10701,7 @@
                   <a:srgbClr val="FFFFFF"/>
                 </a:highlight>
               </a:rPr>
-              <a:t>Secured a dataset from Kaggle that captures US county-level data that includes:</a:t>
+              <a:t>Our team secured a dataset from Kaggle that captures US county-level data that includes:</a:t>
             </a:r>
             <a:endParaRPr sz="1800">
               <a:solidFill>
@@ -8926,6 +10864,86 @@
               <a:t>The dataset contained information from 3,142 counties in the US.</a:t>
             </a:r>
             <a:endParaRPr sz="1800"/>
+          </a:p>
+        </p:txBody>
+      </p:sp>
+      <p:pic>
+        <p:nvPicPr>
+          <p:cNvPr id="88" name="Google Shape;88;p16"/>
+          <p:cNvPicPr preferRelativeResize="0"/>
+          <p:nvPr/>
+        </p:nvPicPr>
+        <p:blipFill>
+          <a:blip r:embed="rId3">
+            <a:alphaModFix/>
+          </a:blip>
+          <a:stretch>
+            <a:fillRect/>
+          </a:stretch>
+        </p:blipFill>
+        <p:spPr>
+          <a:xfrm>
+            <a:off x="5000488" y="1763350"/>
+            <a:ext cx="3949225" cy="2530776"/>
+          </a:xfrm>
+          <a:prstGeom prst="rect">
+            <a:avLst/>
+          </a:prstGeom>
+          <a:noFill/>
+          <a:ln>
+            <a:noFill/>
+          </a:ln>
+        </p:spPr>
+      </p:pic>
+      <p:sp>
+        <p:nvSpPr>
+          <p:cNvPr id="89" name="Google Shape;89;p16"/>
+          <p:cNvSpPr txBox="1"/>
+          <p:nvPr/>
+        </p:nvSpPr>
+        <p:spPr>
+          <a:xfrm flipH="1">
+            <a:off x="5033788" y="4294125"/>
+            <a:ext cx="3882600" cy="554100"/>
+          </a:xfrm>
+          <a:prstGeom prst="rect">
+            <a:avLst/>
+          </a:prstGeom>
+          <a:noFill/>
+          <a:ln>
+            <a:noFill/>
+          </a:ln>
+        </p:spPr>
+        <p:txBody>
+          <a:bodyPr anchorCtr="0" anchor="t" bIns="91425" lIns="91425" spcFirstLastPara="1" rIns="91425" wrap="square" tIns="91425">
+            <a:spAutoFit/>
+          </a:bodyPr>
+          <a:lstStyle/>
+          <a:p>
+            <a:pPr indent="0" lvl="0" marL="0" rtl="0" algn="ctr">
+              <a:spcBef>
+                <a:spcPts val="0"/>
+              </a:spcBef>
+              <a:spcAft>
+                <a:spcPts val="0"/>
+              </a:spcAft>
+              <a:buNone/>
+            </a:pPr>
+            <a:r>
+              <a:rPr lang="en" sz="1200">
+                <a:latin typeface="Roboto"/>
+                <a:ea typeface="Roboto"/>
+                <a:cs typeface="Roboto"/>
+                <a:sym typeface="Roboto"/>
+              </a:rPr>
+              <a:t>Heat map of COVID-19 cases in the US - John Hopkins Coronavirus Resource Center</a:t>
+            </a:r>
+            <a:endParaRPr sz="1200">
+              <a:latin typeface="Roboto"/>
+              <a:ea typeface="Roboto"/>
+              <a:cs typeface="Roboto"/>
+              <a:sym typeface="Roboto"/>
+            </a:endParaRPr>
           </a:p>
         </p:txBody>
       </p:sp>
@@ -8942,7 +10960,7 @@
   <p:cSld>
     <p:spTree>
       <p:nvGrpSpPr>
-        <p:cNvPr id="90" name="Shape 90"/>
+        <p:cNvPr id="93" name="Shape 93"/>
         <p:cNvGrpSpPr/>
         <p:nvPr/>
       </p:nvGrpSpPr>
@@ -8956,7 +10974,7 @@
       </p:grpSpPr>
       <p:sp>
         <p:nvSpPr>
-          <p:cNvPr id="91" name="Google Shape;91;p17"/>
+          <p:cNvPr id="94" name="Google Shape;94;p17"/>
           <p:cNvSpPr txBox="1"/>
           <p:nvPr>
             <p:ph type="title"/>
@@ -8994,159 +11012,322 @@
           </a:p>
         </p:txBody>
       </p:sp>
-      <p:sp>
-        <p:nvSpPr>
-          <p:cNvPr id="92" name="Google Shape;92;p17"/>
-          <p:cNvSpPr txBox="1"/>
+      <p:graphicFrame>
+        <p:nvGraphicFramePr>
+          <p:cNvPr id="95" name="Google Shape;95;p17"/>
+          <p:cNvGraphicFramePr/>
           <p:nvPr/>
-        </p:nvSpPr>
-        <p:spPr>
-          <a:xfrm>
-            <a:off x="206700" y="1356900"/>
-            <a:ext cx="8727900" cy="2439600"/>
-          </a:xfrm>
-          <a:prstGeom prst="rect">
-            <a:avLst/>
-          </a:prstGeom>
-          <a:noFill/>
-          <a:ln>
-            <a:noFill/>
-          </a:ln>
-        </p:spPr>
-        <p:txBody>
-          <a:bodyPr anchorCtr="0" anchor="t" bIns="91425" lIns="91425" spcFirstLastPara="1" rIns="91425" wrap="square" tIns="91425">
-            <a:spAutoFit/>
-          </a:bodyPr>
-          <a:lstStyle/>
-          <a:p>
-            <a:pPr indent="-342900" lvl="0" marL="457200" rtl="0" algn="l">
-              <a:lnSpc>
-                <a:spcPct val="115000"/>
-              </a:lnSpc>
-              <a:spcBef>
-                <a:spcPts val="0"/>
-              </a:spcBef>
-              <a:spcAft>
-                <a:spcPts val="0"/>
-              </a:spcAft>
-              <a:buClr>
-                <a:srgbClr val="24292E"/>
-              </a:buClr>
-              <a:buSzPts val="1800"/>
-              <a:buAutoNum type="arabicPeriod"/>
-            </a:pPr>
-            <a:r>
-              <a:rPr lang="en" sz="1800">
-                <a:solidFill>
-                  <a:srgbClr val="24292E"/>
-                </a:solidFill>
-              </a:rPr>
-              <a:t>Based on the sociodemographic indicators available, are we able to predict vaccine hesitancy in US counties?</a:t>
-            </a:r>
-            <a:endParaRPr sz="1800">
-              <a:solidFill>
-                <a:srgbClr val="24292E"/>
-              </a:solidFill>
-            </a:endParaRPr>
-          </a:p>
-          <a:p>
-            <a:pPr indent="-342900" lvl="0" marL="457200" rtl="0" algn="l">
-              <a:lnSpc>
-                <a:spcPct val="115000"/>
-              </a:lnSpc>
-              <a:spcBef>
-                <a:spcPts val="1000"/>
-              </a:spcBef>
-              <a:spcAft>
-                <a:spcPts val="0"/>
-              </a:spcAft>
-              <a:buClr>
-                <a:srgbClr val="24292E"/>
-              </a:buClr>
-              <a:buSzPts val="1800"/>
-              <a:buAutoNum type="arabicPeriod"/>
-            </a:pPr>
-            <a:r>
-              <a:rPr lang="en" sz="1800">
-                <a:solidFill>
-                  <a:srgbClr val="24292E"/>
-                </a:solidFill>
-              </a:rPr>
-              <a:t>How do sociodemographic indicators affect vaccine hesitancy?</a:t>
-            </a:r>
-            <a:endParaRPr sz="1800">
-              <a:solidFill>
-                <a:srgbClr val="24292E"/>
-              </a:solidFill>
-            </a:endParaRPr>
-          </a:p>
-          <a:p>
-            <a:pPr indent="-342900" lvl="0" marL="457200" rtl="0" algn="l">
-              <a:lnSpc>
-                <a:spcPct val="115000"/>
-              </a:lnSpc>
-              <a:spcBef>
-                <a:spcPts val="1000"/>
-              </a:spcBef>
-              <a:spcAft>
-                <a:spcPts val="0"/>
-              </a:spcAft>
-              <a:buClr>
-                <a:srgbClr val="24292E"/>
-              </a:buClr>
-              <a:buSzPts val="1800"/>
-              <a:buAutoNum type="arabicPeriod"/>
-            </a:pPr>
-            <a:r>
-              <a:rPr lang="en" sz="1800">
-                <a:solidFill>
-                  <a:srgbClr val="24292E"/>
-                </a:solidFill>
-              </a:rPr>
-              <a:t>What barriers exist in vaccine implementation and how can these be mitigated?</a:t>
-            </a:r>
-            <a:endParaRPr sz="1800">
-              <a:solidFill>
-                <a:srgbClr val="24292E"/>
-              </a:solidFill>
-            </a:endParaRPr>
-          </a:p>
-          <a:p>
-            <a:pPr indent="-342900" lvl="0" marL="457200" rtl="0" algn="l">
-              <a:lnSpc>
-                <a:spcPct val="115000"/>
-              </a:lnSpc>
-              <a:spcBef>
-                <a:spcPts val="1000"/>
-              </a:spcBef>
-              <a:spcAft>
-                <a:spcPts val="1000"/>
-              </a:spcAft>
-              <a:buClr>
-                <a:srgbClr val="24292E"/>
-              </a:buClr>
-              <a:buSzPts val="1800"/>
-              <a:buAutoNum type="arabicPeriod"/>
-            </a:pPr>
-            <a:r>
-              <a:rPr lang="en" sz="1800">
-                <a:solidFill>
-                  <a:srgbClr val="24292E"/>
-                </a:solidFill>
-              </a:rPr>
-              <a:t>How can this analysis inform vaccine implementation strategies within an Ontario context?</a:t>
-            </a:r>
-            <a:endParaRPr sz="1800">
-              <a:solidFill>
-                <a:srgbClr val="24292E"/>
-              </a:solidFill>
-              <a:highlight>
-                <a:srgbClr val="FFFFFF"/>
-              </a:highlight>
-            </a:endParaRPr>
-          </a:p>
-        </p:txBody>
-      </p:sp>
+        </p:nvGraphicFramePr>
+        <p:xfrm>
+          <a:off x="502000" y="1490800"/>
+          <a:ext cx="3000000" cy="3000000"/>
+        </p:xfrm>
+        <a:graphic>
+          <a:graphicData uri="http://schemas.openxmlformats.org/drawingml/2006/table">
+            <a:tbl>
+              <a:tblPr>
+                <a:noFill/>
+                <a:tableStyleId>{21505AE1-6527-4DC1-9B4E-D2E2568C3C92}</a:tableStyleId>
+              </a:tblPr>
+              <a:tblGrid>
+                <a:gridCol w="2061825"/>
+                <a:gridCol w="2045400"/>
+                <a:gridCol w="1907100"/>
+                <a:gridCol w="2036325"/>
+              </a:tblGrid>
+              <a:tr h="457175">
+                <a:tc>
+                  <a:txBody>
+                    <a:bodyPr/>
+                    <a:lstStyle/>
+                    <a:p>
+                      <a:pPr indent="0" lvl="0" marL="0" rtl="0" algn="l">
+                        <a:spcBef>
+                          <a:spcPts val="0"/>
+                        </a:spcBef>
+                        <a:spcAft>
+                          <a:spcPts val="0"/>
+                        </a:spcAft>
+                        <a:buNone/>
+                      </a:pPr>
+                      <a:r>
+                        <a:rPr b="1" lang="en" sz="1800"/>
+                        <a:t>Predict</a:t>
+                      </a:r>
+                      <a:endParaRPr b="1" sz="1800"/>
+                    </a:p>
+                  </a:txBody>
+                  <a:tcPr marT="91425" marB="91425" marR="91425" marL="91425">
+                    <a:solidFill>
+                      <a:srgbClr val="E6B8AF"/>
+                    </a:solidFill>
+                  </a:tcPr>
+                </a:tc>
+                <a:tc>
+                  <a:txBody>
+                    <a:bodyPr/>
+                    <a:lstStyle/>
+                    <a:p>
+                      <a:pPr indent="0" lvl="0" marL="0" rtl="0" algn="l">
+                        <a:spcBef>
+                          <a:spcPts val="0"/>
+                        </a:spcBef>
+                        <a:spcAft>
+                          <a:spcPts val="0"/>
+                        </a:spcAft>
+                        <a:buNone/>
+                      </a:pPr>
+                      <a:r>
+                        <a:rPr b="1" lang="en" sz="1800"/>
+                        <a:t>Impacts</a:t>
+                      </a:r>
+                      <a:endParaRPr b="1" sz="1800"/>
+                    </a:p>
+                  </a:txBody>
+                  <a:tcPr marT="91425" marB="91425" marR="91425" marL="91425">
+                    <a:solidFill>
+                      <a:srgbClr val="A2C4C9"/>
+                    </a:solidFill>
+                  </a:tcPr>
+                </a:tc>
+                <a:tc>
+                  <a:txBody>
+                    <a:bodyPr/>
+                    <a:lstStyle/>
+                    <a:p>
+                      <a:pPr indent="0" lvl="0" marL="0" rtl="0" algn="l">
+                        <a:spcBef>
+                          <a:spcPts val="0"/>
+                        </a:spcBef>
+                        <a:spcAft>
+                          <a:spcPts val="0"/>
+                        </a:spcAft>
+                        <a:buNone/>
+                      </a:pPr>
+                      <a:r>
+                        <a:rPr b="1" lang="en" sz="1800"/>
+                        <a:t>Analysis</a:t>
+                      </a:r>
+                      <a:endParaRPr b="1" sz="1800"/>
+                    </a:p>
+                  </a:txBody>
+                  <a:tcPr marT="91425" marB="91425" marR="91425" marL="91425">
+                    <a:solidFill>
+                      <a:srgbClr val="C9DAF8"/>
+                    </a:solidFill>
+                  </a:tcPr>
+                </a:tc>
+                <a:tc>
+                  <a:txBody>
+                    <a:bodyPr/>
+                    <a:lstStyle/>
+                    <a:p>
+                      <a:pPr indent="0" lvl="0" marL="0" rtl="0" algn="l">
+                        <a:spcBef>
+                          <a:spcPts val="0"/>
+                        </a:spcBef>
+                        <a:spcAft>
+                          <a:spcPts val="0"/>
+                        </a:spcAft>
+                        <a:buNone/>
+                      </a:pPr>
+                      <a:r>
+                        <a:rPr b="1" lang="en" sz="1800"/>
+                        <a:t>Extrapolate</a:t>
+                      </a:r>
+                      <a:endParaRPr b="1" sz="1800"/>
+                    </a:p>
+                  </a:txBody>
+                  <a:tcPr marT="91425" marB="91425" marR="91425" marL="91425">
+                    <a:solidFill>
+                      <a:srgbClr val="D9D2E9"/>
+                    </a:solidFill>
+                  </a:tcPr>
+                </a:tc>
+              </a:tr>
+              <a:tr h="2731475">
+                <a:tc>
+                  <a:txBody>
+                    <a:bodyPr/>
+                    <a:lstStyle/>
+                    <a:p>
+                      <a:pPr indent="0" lvl="0" marL="0" rtl="0" algn="l">
+                        <a:lnSpc>
+                          <a:spcPct val="115000"/>
+                        </a:lnSpc>
+                        <a:spcBef>
+                          <a:spcPts val="0"/>
+                        </a:spcBef>
+                        <a:spcAft>
+                          <a:spcPts val="1000"/>
+                        </a:spcAft>
+                        <a:buNone/>
+                      </a:pPr>
+                      <a:r>
+                        <a:rPr lang="en" sz="1800">
+                          <a:solidFill>
+                            <a:srgbClr val="24292E"/>
+                          </a:solidFill>
+                        </a:rPr>
+                        <a:t>Based on the sociodemographic indicators available, are we able to predict vaccine hesitancy in US counties?</a:t>
+                      </a:r>
+                      <a:endParaRPr/>
+                    </a:p>
+                  </a:txBody>
+                  <a:tcPr marT="91425" marB="91425" marR="91425" marL="91425">
+                    <a:solidFill>
+                      <a:srgbClr val="E6B8AF"/>
+                    </a:solidFill>
+                  </a:tcPr>
+                </a:tc>
+                <a:tc>
+                  <a:txBody>
+                    <a:bodyPr/>
+                    <a:lstStyle/>
+                    <a:p>
+                      <a:pPr indent="0" lvl="0" marL="0" rtl="0" algn="l">
+                        <a:lnSpc>
+                          <a:spcPct val="115000"/>
+                        </a:lnSpc>
+                        <a:spcBef>
+                          <a:spcPts val="0"/>
+                        </a:spcBef>
+                        <a:spcAft>
+                          <a:spcPts val="0"/>
+                        </a:spcAft>
+                        <a:buNone/>
+                      </a:pPr>
+                      <a:r>
+                        <a:rPr lang="en" sz="1800">
+                          <a:solidFill>
+                            <a:srgbClr val="24292E"/>
+                          </a:solidFill>
+                        </a:rPr>
+                        <a:t>How do sociodemographic indicators affect vaccine hesitancy?</a:t>
+                      </a:r>
+                      <a:endParaRPr sz="1800">
+                        <a:solidFill>
+                          <a:srgbClr val="24292E"/>
+                        </a:solidFill>
+                      </a:endParaRPr>
+                    </a:p>
+                    <a:p>
+                      <a:pPr indent="0" lvl="0" marL="0" rtl="0" algn="l">
+                        <a:spcBef>
+                          <a:spcPts val="1000"/>
+                        </a:spcBef>
+                        <a:spcAft>
+                          <a:spcPts val="0"/>
+                        </a:spcAft>
+                        <a:buNone/>
+                      </a:pPr>
+                      <a:r>
+                        <a:t/>
+                      </a:r>
+                      <a:endParaRPr/>
+                    </a:p>
+                  </a:txBody>
+                  <a:tcPr marT="91425" marB="91425" marR="91425" marL="91425">
+                    <a:solidFill>
+                      <a:srgbClr val="A2C4C9"/>
+                    </a:solidFill>
+                  </a:tcPr>
+                </a:tc>
+                <a:tc>
+                  <a:txBody>
+                    <a:bodyPr/>
+                    <a:lstStyle/>
+                    <a:p>
+                      <a:pPr indent="0" lvl="0" marL="0" rtl="0" algn="l">
+                        <a:lnSpc>
+                          <a:spcPct val="115000"/>
+                        </a:lnSpc>
+                        <a:spcBef>
+                          <a:spcPts val="0"/>
+                        </a:spcBef>
+                        <a:spcAft>
+                          <a:spcPts val="1000"/>
+                        </a:spcAft>
+                        <a:buNone/>
+                      </a:pPr>
+                      <a:r>
+                        <a:rPr lang="en" sz="1800">
+                          <a:solidFill>
+                            <a:srgbClr val="24292E"/>
+                          </a:solidFill>
+                        </a:rPr>
+                        <a:t>What barriers exist in vaccine implementation and how can these be mitigated?</a:t>
+                      </a:r>
+                      <a:endParaRPr/>
+                    </a:p>
+                  </a:txBody>
+                  <a:tcPr marT="91425" marB="91425" marR="91425" marL="91425">
+                    <a:solidFill>
+                      <a:srgbClr val="C9DAF8"/>
+                    </a:solidFill>
+                  </a:tcPr>
+                </a:tc>
+                <a:tc>
+                  <a:txBody>
+                    <a:bodyPr/>
+                    <a:lstStyle/>
+                    <a:p>
+                      <a:pPr indent="0" lvl="0" marL="0" rtl="0" algn="l">
+                        <a:lnSpc>
+                          <a:spcPct val="115000"/>
+                        </a:lnSpc>
+                        <a:spcBef>
+                          <a:spcPts val="300"/>
+                        </a:spcBef>
+                        <a:spcAft>
+                          <a:spcPts val="0"/>
+                        </a:spcAft>
+                        <a:buNone/>
+                      </a:pPr>
+                      <a:r>
+                        <a:rPr lang="en" sz="1800">
+                          <a:solidFill>
+                            <a:srgbClr val="24292E"/>
+                          </a:solidFill>
+                        </a:rPr>
+                        <a:t>How can this analysis inform vaccine implementation strategies within an Ontario context?</a:t>
+                      </a:r>
+                      <a:endParaRPr sz="1800">
+                        <a:solidFill>
+                          <a:srgbClr val="24292E"/>
+                        </a:solidFill>
+                        <a:highlight>
+                          <a:schemeClr val="lt1"/>
+                        </a:highlight>
+                      </a:endParaRPr>
+                    </a:p>
+                    <a:p>
+                      <a:pPr indent="0" lvl="0" marL="0" rtl="0" algn="l">
+                        <a:spcBef>
+                          <a:spcPts val="1000"/>
+                        </a:spcBef>
+                        <a:spcAft>
+                          <a:spcPts val="0"/>
+                        </a:spcAft>
+                        <a:buNone/>
+                      </a:pPr>
+                      <a:r>
+                        <a:t/>
+                      </a:r>
+                      <a:endParaRPr/>
+                    </a:p>
+                  </a:txBody>
+                  <a:tcPr marT="91425" marB="91425" marR="91425" marL="91425">
+                    <a:solidFill>
+                      <a:srgbClr val="D9D2E9"/>
+                    </a:solidFill>
+                  </a:tcPr>
+                </a:tc>
+              </a:tr>
+            </a:tbl>
+          </a:graphicData>
+        </a:graphic>
+      </p:graphicFrame>
     </p:spTree>
   </p:cSld>
   <p:clrMapOvr>
@@ -9160,7 +11341,7 @@
   <p:cSld>
     <p:spTree>
       <p:nvGrpSpPr>
-        <p:cNvPr id="96" name="Shape 96"/>
+        <p:cNvPr id="99" name="Shape 99"/>
         <p:cNvGrpSpPr/>
         <p:nvPr/>
       </p:nvGrpSpPr>
@@ -9174,7 +11355,7 @@
       </p:grpSpPr>
       <p:sp>
         <p:nvSpPr>
-          <p:cNvPr id="97" name="Google Shape;97;p18"/>
+          <p:cNvPr id="100" name="Google Shape;100;p18"/>
           <p:cNvSpPr txBox="1"/>
           <p:nvPr>
             <p:ph type="title"/>
@@ -9214,7 +11395,7 @@
       </p:sp>
       <p:sp>
         <p:nvSpPr>
-          <p:cNvPr id="98" name="Google Shape;98;p18"/>
+          <p:cNvPr id="101" name="Google Shape;101;p18"/>
           <p:cNvSpPr txBox="1"/>
           <p:nvPr/>
         </p:nvSpPr>
@@ -9302,7 +11483,7 @@
                   <a:srgbClr val="24292E"/>
                 </a:solidFill>
               </a:rPr>
-              <a:t> of interest,</a:t>
+              <a:t> of interest.</a:t>
             </a:r>
             <a:endParaRPr sz="1800">
               <a:solidFill>
@@ -9349,7 +11530,23 @@
                   <a:srgbClr val="24292E"/>
                 </a:solidFill>
               </a:rPr>
-              <a:t> % of population determined as vaccine hesitant as our target column of interest,</a:t>
+              <a:t> our target column of interest as the percentage</a:t>
+            </a:r>
+            <a:r>
+              <a:rPr lang="en" sz="1800">
+                <a:solidFill>
+                  <a:srgbClr val="24292E"/>
+                </a:solidFill>
+              </a:rPr>
+              <a:t> of population vaccine hesitant</a:t>
+            </a:r>
+            <a:r>
+              <a:rPr lang="en" sz="1800">
+                <a:solidFill>
+                  <a:srgbClr val="24292E"/>
+                </a:solidFill>
+              </a:rPr>
+              <a:t>.</a:t>
             </a:r>
             <a:endParaRPr sz="1800">
               <a:solidFill>
@@ -9380,7 +11577,7 @@
                   <a:srgbClr val="24292E"/>
                 </a:solidFill>
               </a:rPr>
-              <a:t>Null values were identified and replaced with zeros (0),</a:t>
+              <a:t>Null values were identified and replaced with zeros (0).</a:t>
             </a:r>
             <a:endParaRPr sz="1800">
               <a:solidFill>
@@ -9411,7 +11608,7 @@
                   <a:srgbClr val="24292E"/>
                 </a:solidFill>
               </a:rPr>
-              <a:t>Our cleaned dataset had nine columns and 3142 rows and was uploaded into our SQL database. </a:t>
+              <a:t>Our cleaned dataset had nine (9) columns and 3,142 rows and was uploaded into our SQL database. </a:t>
             </a:r>
             <a:endParaRPr sz="1800">
               <a:solidFill>
@@ -9434,7 +11631,7 @@
   <p:cSld>
     <p:spTree>
       <p:nvGrpSpPr>
-        <p:cNvPr id="102" name="Shape 102"/>
+        <p:cNvPr id="105" name="Shape 105"/>
         <p:cNvGrpSpPr/>
         <p:nvPr/>
       </p:nvGrpSpPr>
@@ -9448,7 +11645,7 @@
       </p:grpSpPr>
       <p:sp>
         <p:nvSpPr>
-          <p:cNvPr id="103" name="Google Shape;103;p19"/>
+          <p:cNvPr id="106" name="Google Shape;106;p19"/>
           <p:cNvSpPr txBox="1"/>
           <p:nvPr>
             <p:ph type="title"/>
@@ -9488,14 +11685,14 @@
       </p:sp>
       <p:sp>
         <p:nvSpPr>
-          <p:cNvPr id="104" name="Google Shape;104;p19"/>
+          <p:cNvPr id="107" name="Google Shape;107;p19"/>
           <p:cNvSpPr txBox="1"/>
           <p:nvPr/>
         </p:nvSpPr>
         <p:spPr>
           <a:xfrm>
             <a:off x="206700" y="1356900"/>
-            <a:ext cx="8727900" cy="3282000"/>
+            <a:ext cx="8727900" cy="3496200"/>
           </a:xfrm>
           <a:prstGeom prst="rect">
             <a:avLst/>
@@ -9511,12 +11708,65 @@
           </a:bodyPr>
           <a:lstStyle/>
           <a:p>
+            <a:pPr indent="-342900" lvl="0" marL="457200" rtl="0" algn="l">
+              <a:lnSpc>
+                <a:spcPct val="115000"/>
+              </a:lnSpc>
+              <a:spcBef>
+                <a:spcPts val="300"/>
+              </a:spcBef>
+              <a:spcAft>
+                <a:spcPts val="0"/>
+              </a:spcAft>
+              <a:buClr>
+                <a:srgbClr val="24292E"/>
+              </a:buClr>
+              <a:buSzPts val="1800"/>
+              <a:buChar char="●"/>
+            </a:pPr>
+            <a:r>
+              <a:rPr lang="en" sz="1800">
+                <a:solidFill>
+                  <a:srgbClr val="24292E"/>
+                </a:solidFill>
+                <a:highlight>
+                  <a:srgbClr val="FFFFFF"/>
+                </a:highlight>
+              </a:rPr>
+              <a:t>We chose to use supervised machine learning linear regression models as our dataset has a continuous target outcome</a:t>
+            </a:r>
+            <a:r>
+              <a:rPr lang="en" sz="1800">
+                <a:solidFill>
+                  <a:srgbClr val="24292E"/>
+                </a:solidFill>
+              </a:rPr>
+              <a:t> </a:t>
+            </a:r>
+            <a:r>
+              <a:rPr lang="en" sz="1800">
+                <a:solidFill>
+                  <a:srgbClr val="24292E"/>
+                </a:solidFill>
+                <a:highlight>
+                  <a:srgbClr val="FFFFFF"/>
+                </a:highlight>
+              </a:rPr>
+              <a:t>that could be used for the model predictions within the numeric range of 0-1.</a:t>
+            </a:r>
+            <a:endParaRPr b="1" sz="1800">
+              <a:solidFill>
+                <a:srgbClr val="24292E"/>
+              </a:solidFill>
+            </a:endParaRPr>
+          </a:p>
+          <a:p>
             <a:pPr indent="0" lvl="0" marL="0" rtl="0" algn="l">
               <a:lnSpc>
                 <a:spcPct val="115000"/>
               </a:lnSpc>
               <a:spcBef>
-                <a:spcPts val="300"/>
+                <a:spcPts val="1000"/>
               </a:spcBef>
               <a:spcAft>
                 <a:spcPts val="0"/>
@@ -9529,7 +11779,7 @@
                   <a:srgbClr val="24292E"/>
                 </a:solidFill>
               </a:rPr>
-              <a:t>Linear Regression</a:t>
+              <a:t>Linear Regression - Model Selection</a:t>
             </a:r>
             <a:endParaRPr b="1" sz="1800">
               <a:solidFill>
@@ -9543,7 +11793,7 @@
                 <a:spcPct val="115000"/>
               </a:lnSpc>
               <a:spcBef>
-                <a:spcPts val="1000"/>
+                <a:spcPts val="300"/>
               </a:spcBef>
               <a:spcAft>
                 <a:spcPts val="0"/>
@@ -9559,8 +11809,79 @@
                 <a:solidFill>
                   <a:srgbClr val="24292E"/>
                 </a:solidFill>
+                <a:highlight>
+                  <a:srgbClr val="FFFFFF"/>
+                </a:highlight>
               </a:rPr>
-              <a:t>Linear regression models were chosen for our dataset because our target outcome was a continuous variable (% of population determined as vaccine hesitant),</a:t>
+              <a:t>Linear regression models were used to predict the potential effects of sociodemographic indicators on vaccine hesitancy.</a:t>
+            </a:r>
+            <a:endParaRPr sz="1800">
+              <a:solidFill>
+                <a:srgbClr val="24292E"/>
+              </a:solidFill>
+              <a:highlight>
+                <a:srgbClr val="FFFFFF"/>
+              </a:highlight>
+            </a:endParaRPr>
+          </a:p>
+          <a:p>
+            <a:pPr indent="-342900" lvl="0" marL="457200" rtl="0" algn="l">
+              <a:lnSpc>
+                <a:spcPct val="115000"/>
+              </a:lnSpc>
+              <a:spcBef>
+                <a:spcPts val="0"/>
+              </a:spcBef>
+              <a:spcAft>
+                <a:spcPts val="0"/>
+              </a:spcAft>
+              <a:buClr>
+                <a:srgbClr val="24292E"/>
+              </a:buClr>
+              <a:buSzPts val="1800"/>
+              <a:buChar char="●"/>
+            </a:pPr>
+            <a:r>
+              <a:rPr lang="en" sz="1800">
+                <a:solidFill>
+                  <a:srgbClr val="24292E"/>
+                </a:solidFill>
+              </a:rPr>
+              <a:t>A simple </a:t>
+            </a:r>
+            <a:r>
+              <a:rPr lang="en" sz="1800">
+                <a:solidFill>
+                  <a:srgbClr val="202124"/>
+                </a:solidFill>
+                <a:uFill>
+                  <a:noFill/>
+                </a:uFill>
+                <a:hlinkClick r:id="rId3">
+                  <a:extLst>
+                    <a:ext uri="{A12FA001-AC4F-418D-AE19-62706E023703}">
+                      <ahyp:hlinkClr val="tx"/>
+                    </a:ext>
+                  </a:extLst>
+                </a:hlinkClick>
+              </a:rPr>
+              <a:t>linear regression</a:t>
+            </a:r>
+            <a:r>
+              <a:rPr lang="en" sz="1800">
+                <a:solidFill>
+                  <a:srgbClr val="202124"/>
+                </a:solidFill>
+              </a:rPr>
+              <a:t> </a:t>
+            </a:r>
+            <a:r>
+              <a:rPr lang="en" sz="1800">
+                <a:solidFill>
+                  <a:srgbClr val="24292E"/>
+                </a:solidFill>
+              </a:rPr>
+              <a:t>was used first to test if the data is linear or non-linear.</a:t>
             </a:r>
             <a:endParaRPr sz="1800">
               <a:solidFill>
@@ -9591,164 +11912,9 @@
                   <a:srgbClr val="24292E"/>
                 </a:solidFill>
               </a:rPr>
-              <a:t>Each selected feature column was applied to a linear regression model,</a:t>
+              <a:t>The results of the linear regression model indicated a more complex model should be used as the predictions were not very close to the original targets. </a:t>
             </a:r>
             <a:endParaRPr sz="1800">
-              <a:solidFill>
-                <a:srgbClr val="24292E"/>
-              </a:solidFill>
-            </a:endParaRPr>
-          </a:p>
-          <a:p>
-            <a:pPr indent="-342900" lvl="0" marL="457200" rtl="0" algn="l">
-              <a:lnSpc>
-                <a:spcPct val="115000"/>
-              </a:lnSpc>
-              <a:spcBef>
-                <a:spcPts val="0"/>
-              </a:spcBef>
-              <a:spcAft>
-                <a:spcPts val="0"/>
-              </a:spcAft>
-              <a:buClr>
-                <a:srgbClr val="24292E"/>
-              </a:buClr>
-              <a:buSzPts val="1800"/>
-              <a:buChar char="●"/>
-            </a:pPr>
-            <a:r>
-              <a:rPr lang="en" sz="1800">
-                <a:solidFill>
-                  <a:srgbClr val="24292E"/>
-                </a:solidFill>
-              </a:rPr>
-              <a:t>The outcome of each model was factored into a linear regression analysis and key values were determined:</a:t>
-            </a:r>
-            <a:endParaRPr sz="1800">
-              <a:solidFill>
-                <a:srgbClr val="24292E"/>
-              </a:solidFill>
-            </a:endParaRPr>
-          </a:p>
-          <a:p>
-            <a:pPr indent="-304800" lvl="1" marL="914400" rtl="0" algn="l">
-              <a:lnSpc>
-                <a:spcPct val="100000"/>
-              </a:lnSpc>
-              <a:spcBef>
-                <a:spcPts val="0"/>
-              </a:spcBef>
-              <a:spcAft>
-                <a:spcPts val="0"/>
-              </a:spcAft>
-              <a:buClr>
-                <a:srgbClr val="24292E"/>
-              </a:buClr>
-              <a:buSzPts val="1200"/>
-              <a:buChar char="○"/>
-            </a:pPr>
-            <a:r>
-              <a:rPr lang="en" sz="1200">
-                <a:highlight>
-                  <a:srgbClr val="FFFFFF"/>
-                </a:highlight>
-              </a:rPr>
-              <a:t>Mean Absolute Error:  0.02927772839133723</a:t>
-            </a:r>
-            <a:endParaRPr sz="1200">
-              <a:highlight>
-                <a:srgbClr val="FFFFFF"/>
-              </a:highlight>
-            </a:endParaRPr>
-          </a:p>
-          <a:p>
-            <a:pPr indent="-304800" lvl="1" marL="914400" rtl="0" algn="l">
-              <a:lnSpc>
-                <a:spcPct val="100000"/>
-              </a:lnSpc>
-              <a:spcBef>
-                <a:spcPts val="0"/>
-              </a:spcBef>
-              <a:spcAft>
-                <a:spcPts val="0"/>
-              </a:spcAft>
-              <a:buClr>
-                <a:srgbClr val="24292E"/>
-              </a:buClr>
-              <a:buSzPts val="1200"/>
-              <a:buChar char="○"/>
-            </a:pPr>
-            <a:r>
-              <a:rPr lang="en" sz="1200">
-                <a:highlight>
-                  <a:srgbClr val="FFFFFF"/>
-                </a:highlight>
-              </a:rPr>
-              <a:t>Mean Squared Error:  0.001480100119979317</a:t>
-            </a:r>
-            <a:endParaRPr sz="1200">
-              <a:highlight>
-                <a:srgbClr val="FFFFFF"/>
-              </a:highlight>
-            </a:endParaRPr>
-          </a:p>
-          <a:p>
-            <a:pPr indent="-304800" lvl="1" marL="914400" rtl="0" algn="l">
-              <a:lnSpc>
-                <a:spcPct val="100000"/>
-              </a:lnSpc>
-              <a:spcBef>
-                <a:spcPts val="0"/>
-              </a:spcBef>
-              <a:spcAft>
-                <a:spcPts val="0"/>
-              </a:spcAft>
-              <a:buClr>
-                <a:srgbClr val="24292E"/>
-              </a:buClr>
-              <a:buSzPts val="1200"/>
-              <a:buChar char="○"/>
-            </a:pPr>
-            <a:r>
-              <a:rPr lang="en" sz="1200">
-                <a:highlight>
-                  <a:srgbClr val="FFFFFF"/>
-                </a:highlight>
-              </a:rPr>
-              <a:t>R Squared Score:  0.30918537078714614</a:t>
-            </a:r>
-            <a:endParaRPr sz="1200">
-              <a:highlight>
-                <a:srgbClr val="FFFFFF"/>
-              </a:highlight>
-            </a:endParaRPr>
-          </a:p>
-          <a:p>
-            <a:pPr indent="-304800" lvl="1" marL="914400" rtl="0" algn="l">
-              <a:lnSpc>
-                <a:spcPct val="100000"/>
-              </a:lnSpc>
-              <a:spcBef>
-                <a:spcPts val="0"/>
-              </a:spcBef>
-              <a:spcAft>
-                <a:spcPts val="0"/>
-              </a:spcAft>
-              <a:buClr>
-                <a:srgbClr val="24292E"/>
-              </a:buClr>
-              <a:buSzPts val="1200"/>
-              <a:buChar char="○"/>
-            </a:pPr>
-            <a:r>
-              <a:rPr lang="en" sz="1200">
-                <a:highlight>
-                  <a:srgbClr val="FFFFFF"/>
-                </a:highlight>
-              </a:rPr>
-              <a:t>Explained Variance Score:  0.30918537078714625</a:t>
-            </a:r>
-            <a:endParaRPr sz="1200">
               <a:solidFill>
                 <a:srgbClr val="24292E"/>
               </a:solidFill>
@@ -9769,7 +11935,7 @@
   <p:cSld>
     <p:spTree>
       <p:nvGrpSpPr>
-        <p:cNvPr id="108" name="Shape 108"/>
+        <p:cNvPr id="111" name="Shape 111"/>
         <p:cNvGrpSpPr/>
         <p:nvPr/>
       </p:nvGrpSpPr>
@@ -9783,7 +11949,7 @@
       </p:grpSpPr>
       <p:sp>
         <p:nvSpPr>
-          <p:cNvPr id="109" name="Google Shape;109;p20"/>
+          <p:cNvPr id="112" name="Google Shape;112;p20"/>
           <p:cNvSpPr txBox="1"/>
           <p:nvPr>
             <p:ph type="title"/>
@@ -9823,14 +11989,14 @@
       </p:sp>
       <p:sp>
         <p:nvSpPr>
-          <p:cNvPr id="110" name="Google Shape;110;p20"/>
+          <p:cNvPr id="113" name="Google Shape;113;p20"/>
           <p:cNvSpPr txBox="1"/>
           <p:nvPr/>
         </p:nvSpPr>
         <p:spPr>
           <a:xfrm>
             <a:off x="206700" y="1356900"/>
-            <a:ext cx="8727900" cy="3476100"/>
+            <a:ext cx="8727900" cy="780300"/>
           </a:xfrm>
           <a:prstGeom prst="rect">
             <a:avLst/>
@@ -9864,7 +12030,7 @@
                   <a:srgbClr val="24292E"/>
                 </a:solidFill>
               </a:rPr>
-              <a:t>Random Forest Regression Machine Learning Model</a:t>
+              <a:t>Linear Regression - Outputs</a:t>
             </a:r>
             <a:endParaRPr b="1" sz="1800">
               <a:solidFill>
@@ -9873,29 +12039,20 @@
             </a:endParaRPr>
           </a:p>
           <a:p>
-            <a:pPr indent="-342900" lvl="0" marL="457200" rtl="0" algn="l">
+            <a:pPr indent="0" lvl="0" marL="0" rtl="0" algn="l">
               <a:lnSpc>
                 <a:spcPct val="115000"/>
               </a:lnSpc>
               <a:spcBef>
-                <a:spcPts val="1000"/>
-              </a:spcBef>
-              <a:spcAft>
-                <a:spcPts val="0"/>
-              </a:spcAft>
-              <a:buClr>
-                <a:srgbClr val="24292E"/>
-              </a:buClr>
-              <a:buSzPts val="1800"/>
-              <a:buChar char="●"/>
+                <a:spcPts val="0"/>
+              </a:spcBef>
+              <a:spcAft>
+                <a:spcPts val="1200"/>
+              </a:spcAft>
+              <a:buNone/>
             </a:pPr>
             <a:r>
-              <a:rPr lang="en" sz="1800">
-                <a:solidFill>
-                  <a:srgbClr val="24292E"/>
-                </a:solidFill>
-              </a:rPr>
-              <a:t>A machine learning model was explored to assess efficiency and efficacy compared to the linear regression model outputs,</a:t>
+              <a:t/>
             </a:r>
             <a:endParaRPr sz="1800">
               <a:solidFill>
@@ -9903,6 +12060,137 @@
               </a:solidFill>
             </a:endParaRPr>
           </a:p>
+        </p:txBody>
+      </p:sp>
+      <p:pic>
+        <p:nvPicPr>
+          <p:cNvPr id="114" name="Google Shape;114;p20"/>
+          <p:cNvPicPr preferRelativeResize="0"/>
+          <p:nvPr/>
+        </p:nvPicPr>
+        <p:blipFill>
+          <a:blip r:embed="rId3">
+            <a:alphaModFix/>
+          </a:blip>
+          <a:stretch>
+            <a:fillRect/>
+          </a:stretch>
+        </p:blipFill>
+        <p:spPr>
+          <a:xfrm>
+            <a:off x="5946450" y="1916816"/>
+            <a:ext cx="3147950" cy="2033709"/>
+          </a:xfrm>
+          <a:prstGeom prst="rect">
+            <a:avLst/>
+          </a:prstGeom>
+          <a:noFill/>
+          <a:ln>
+            <a:noFill/>
+          </a:ln>
+        </p:spPr>
+      </p:pic>
+      <p:pic>
+        <p:nvPicPr>
+          <p:cNvPr id="115" name="Google Shape;115;p20"/>
+          <p:cNvPicPr preferRelativeResize="0"/>
+          <p:nvPr/>
+        </p:nvPicPr>
+        <p:blipFill>
+          <a:blip r:embed="rId4">
+            <a:alphaModFix/>
+          </a:blip>
+          <a:stretch>
+            <a:fillRect/>
+          </a:stretch>
+        </p:blipFill>
+        <p:spPr>
+          <a:xfrm>
+            <a:off x="2874700" y="1865897"/>
+            <a:ext cx="3147950" cy="2014377"/>
+          </a:xfrm>
+          <a:prstGeom prst="rect">
+            <a:avLst/>
+          </a:prstGeom>
+          <a:noFill/>
+          <a:ln>
+            <a:noFill/>
+          </a:ln>
+        </p:spPr>
+      </p:pic>
+      <p:pic>
+        <p:nvPicPr>
+          <p:cNvPr id="116" name="Google Shape;116;p20"/>
+          <p:cNvPicPr preferRelativeResize="0"/>
+          <p:nvPr/>
+        </p:nvPicPr>
+        <p:blipFill>
+          <a:blip r:embed="rId5">
+            <a:alphaModFix/>
+          </a:blip>
+          <a:stretch>
+            <a:fillRect/>
+          </a:stretch>
+        </p:blipFill>
+        <p:spPr>
+          <a:xfrm>
+            <a:off x="0" y="1898200"/>
+            <a:ext cx="2918075" cy="1913839"/>
+          </a:xfrm>
+          <a:prstGeom prst="rect">
+            <a:avLst/>
+          </a:prstGeom>
+          <a:noFill/>
+          <a:ln>
+            <a:noFill/>
+          </a:ln>
+        </p:spPr>
+      </p:pic>
+      <p:sp>
+        <p:nvSpPr>
+          <p:cNvPr id="117" name="Google Shape;117;p20"/>
+          <p:cNvSpPr txBox="1"/>
+          <p:nvPr/>
+        </p:nvSpPr>
+        <p:spPr>
+          <a:xfrm>
+            <a:off x="311725" y="3880275"/>
+            <a:ext cx="3803100" cy="1098900"/>
+          </a:xfrm>
+          <a:prstGeom prst="rect">
+            <a:avLst/>
+          </a:prstGeom>
+          <a:solidFill>
+            <a:srgbClr val="F4CCCC"/>
+          </a:solidFill>
+          <a:ln>
+            <a:noFill/>
+          </a:ln>
+        </p:spPr>
+        <p:txBody>
+          <a:bodyPr anchorCtr="0" anchor="t" bIns="91425" lIns="91425" spcFirstLastPara="1" rIns="91425" wrap="square" tIns="91425">
+            <a:spAutoFit/>
+          </a:bodyPr>
+          <a:lstStyle/>
+          <a:p>
+            <a:pPr indent="0" lvl="0" marL="0" rtl="0" algn="l">
+              <a:lnSpc>
+                <a:spcPct val="115000"/>
+              </a:lnSpc>
+              <a:spcBef>
+                <a:spcPts val="0"/>
+              </a:spcBef>
+              <a:spcAft>
+                <a:spcPts val="0"/>
+              </a:spcAft>
+              <a:buNone/>
+            </a:pPr>
+            <a:r>
+              <a:rPr b="1" lang="en" sz="1800"/>
+              <a:t>Regression metrics:</a:t>
+            </a:r>
+            <a:endParaRPr b="1" sz="1800"/>
+          </a:p>
           <a:p>
             <a:pPr indent="-342900" lvl="0" marL="457200" rtl="0" algn="l">
               <a:lnSpc>
@@ -9914,152 +12202,20 @@
               <a:spcAft>
                 <a:spcPts val="0"/>
               </a:spcAft>
-              <a:buClr>
-                <a:srgbClr val="24292E"/>
-              </a:buClr>
               <a:buSzPts val="1800"/>
               <a:buChar char="●"/>
             </a:pPr>
             <a:r>
-              <a:rPr lang="en" sz="1800">
-                <a:solidFill>
-                  <a:srgbClr val="24292E"/>
-                </a:solidFill>
-              </a:rPr>
-              <a:t>A random forest regression model was used to intake all feature columns and selected target column and key values were determined:</a:t>
-            </a:r>
-            <a:endParaRPr sz="1800">
-              <a:solidFill>
-                <a:srgbClr val="24292E"/>
-              </a:solidFill>
-            </a:endParaRPr>
-          </a:p>
-          <a:p>
-            <a:pPr indent="-304800" lvl="1" marL="914400" rtl="0" algn="l">
-              <a:spcBef>
-                <a:spcPts val="0"/>
-              </a:spcBef>
-              <a:spcAft>
-                <a:spcPts val="0"/>
-              </a:spcAft>
-              <a:buClr>
-                <a:srgbClr val="24292E"/>
-              </a:buClr>
-              <a:buSzPts val="1200"/>
-              <a:buChar char="○"/>
-            </a:pPr>
-            <a:r>
-              <a:rPr lang="en" sz="1200">
-                <a:highlight>
-                  <a:srgbClr val="FFFFFF"/>
-                </a:highlight>
-              </a:rPr>
-              <a:t>Mean Absolute Error:  </a:t>
-            </a:r>
-            <a:r>
-              <a:rPr lang="en" sz="1200"/>
-              <a:t>0.025843266171792157</a:t>
-            </a:r>
-            <a:endParaRPr sz="1200">
-              <a:highlight>
-                <a:srgbClr val="FFFFFF"/>
-              </a:highlight>
-            </a:endParaRPr>
-          </a:p>
-          <a:p>
-            <a:pPr indent="-304800" lvl="1" marL="914400" rtl="0" algn="l">
-              <a:spcBef>
-                <a:spcPts val="0"/>
-              </a:spcBef>
-              <a:spcAft>
-                <a:spcPts val="0"/>
-              </a:spcAft>
-              <a:buClr>
-                <a:srgbClr val="24292E"/>
-              </a:buClr>
-              <a:buSzPts val="1200"/>
-              <a:buChar char="○"/>
-            </a:pPr>
-            <a:r>
-              <a:rPr lang="en" sz="1200">
-                <a:highlight>
-                  <a:srgbClr val="FFFFFF"/>
-                </a:highlight>
-              </a:rPr>
-              <a:t>Mean Squared Error:  </a:t>
-            </a:r>
-            <a:r>
-              <a:rPr lang="en" sz="1200"/>
-              <a:t>0.001178815440084836</a:t>
-            </a:r>
-            <a:endParaRPr sz="1200">
-              <a:highlight>
-                <a:srgbClr val="FFFFFF"/>
-              </a:highlight>
-            </a:endParaRPr>
-          </a:p>
-          <a:p>
-            <a:pPr indent="-304800" lvl="1" marL="914400" rtl="0" algn="l">
-              <a:spcBef>
-                <a:spcPts val="0"/>
-              </a:spcBef>
-              <a:spcAft>
-                <a:spcPts val="0"/>
-              </a:spcAft>
-              <a:buClr>
-                <a:srgbClr val="24292E"/>
-              </a:buClr>
-              <a:buSzPts val="1200"/>
-              <a:buChar char="○"/>
-            </a:pPr>
-            <a:r>
-              <a:rPr lang="en" sz="1200">
-                <a:highlight>
-                  <a:srgbClr val="FFFFFF"/>
-                </a:highlight>
-              </a:rPr>
-              <a:t>R Squared Score:  </a:t>
-            </a:r>
-            <a:r>
-              <a:rPr lang="en" sz="1200"/>
-              <a:t>0.4366239872338896</a:t>
-            </a:r>
-            <a:endParaRPr sz="1200">
-              <a:highlight>
-                <a:srgbClr val="FFFFFF"/>
-              </a:highlight>
-            </a:endParaRPr>
-          </a:p>
-          <a:p>
-            <a:pPr indent="-304800" lvl="1" marL="914400" rtl="0" algn="l">
-              <a:spcBef>
-                <a:spcPts val="0"/>
-              </a:spcBef>
-              <a:spcAft>
-                <a:spcPts val="0"/>
-              </a:spcAft>
-              <a:buClr>
-                <a:srgbClr val="24292E"/>
-              </a:buClr>
-              <a:buSzPts val="1200"/>
-              <a:buChar char="○"/>
-            </a:pPr>
-            <a:r>
-              <a:rPr lang="en" sz="1200">
-                <a:highlight>
-                  <a:srgbClr val="FFFFFF"/>
-                </a:highlight>
-              </a:rPr>
-              <a:t>Explained Variance Score:  </a:t>
-            </a:r>
-            <a:r>
-              <a:rPr lang="en" sz="1200"/>
-              <a:t>0.43779166797622604,</a:t>
-            </a:r>
-            <a:endParaRPr sz="1200"/>
+              <a:rPr lang="en" sz="1800"/>
+              <a:t>R Squared Score: 0.309</a:t>
+            </a:r>
+            <a:endParaRPr sz="1800"/>
           </a:p>
           <a:p>
             <a:pPr indent="-342900" lvl="0" marL="457200" rtl="0" algn="l">
+              <a:lnSpc>
+                <a:spcPct val="115000"/>
+              </a:lnSpc>
               <a:spcBef>
                 <a:spcPts val="0"/>
               </a:spcBef>
@@ -10071,7 +12227,7 @@
             </a:pPr>
             <a:r>
               <a:rPr lang="en" sz="1800"/>
-              <a:t>Overall the machine learning model was more effective in approximating real-world data points and we would recommend this model if using a similar dataset. </a:t>
+              <a:t>Explained Variance Score: 309</a:t>
             </a:r>
             <a:endParaRPr sz="1800"/>
           </a:p>
@@ -10090,7 +12246,7 @@
   <p:cSld>
     <p:spTree>
       <p:nvGrpSpPr>
-        <p:cNvPr id="114" name="Shape 114"/>
+        <p:cNvPr id="121" name="Shape 121"/>
         <p:cNvGrpSpPr/>
         <p:nvPr/>
       </p:nvGrpSpPr>
@@ -10104,7 +12260,7 @@
       </p:grpSpPr>
       <p:sp>
         <p:nvSpPr>
-          <p:cNvPr id="115" name="Google Shape;115;p21"/>
+          <p:cNvPr id="122" name="Google Shape;122;p21"/>
           <p:cNvSpPr txBox="1"/>
           <p:nvPr>
             <p:ph type="title"/>
@@ -10136,7 +12292,7 @@
             </a:pPr>
             <a:r>
               <a:rPr lang="en"/>
-              <a:t>Conclusion and Next Steps</a:t>
+              <a:t>Data Analysis</a:t>
             </a:r>
             <a:endParaRPr/>
           </a:p>
@@ -10144,14 +12300,14 @@
       </p:sp>
       <p:sp>
         <p:nvSpPr>
-          <p:cNvPr id="116" name="Google Shape;116;p21"/>
+          <p:cNvPr id="123" name="Google Shape;123;p21"/>
           <p:cNvSpPr txBox="1"/>
           <p:nvPr/>
         </p:nvSpPr>
         <p:spPr>
           <a:xfrm>
-            <a:off x="206700" y="1356900"/>
-            <a:ext cx="8727900" cy="3010800"/>
+            <a:off x="208050" y="1314025"/>
+            <a:ext cx="8727900" cy="2730600"/>
           </a:xfrm>
           <a:prstGeom prst="rect">
             <a:avLst/>
@@ -10167,12 +12323,39 @@
           </a:bodyPr>
           <a:lstStyle/>
           <a:p>
+            <a:pPr indent="0" lvl="0" marL="0" rtl="0" algn="l">
+              <a:lnSpc>
+                <a:spcPct val="115000"/>
+              </a:lnSpc>
+              <a:spcBef>
+                <a:spcPts val="300"/>
+              </a:spcBef>
+              <a:spcAft>
+                <a:spcPts val="0"/>
+              </a:spcAft>
+              <a:buNone/>
+            </a:pPr>
+            <a:r>
+              <a:rPr b="1" lang="en" sz="1800">
+                <a:solidFill>
+                  <a:srgbClr val="24292E"/>
+                </a:solidFill>
+              </a:rPr>
+              <a:t>Random Forest Regression - Model Selection</a:t>
+            </a:r>
+            <a:endParaRPr b="1" sz="1800">
+              <a:solidFill>
+                <a:srgbClr val="24292E"/>
+              </a:solidFill>
+            </a:endParaRPr>
+          </a:p>
+          <a:p>
             <a:pPr indent="-342900" lvl="0" marL="457200" rtl="0" algn="l">
               <a:lnSpc>
                 <a:spcPct val="115000"/>
               </a:lnSpc>
               <a:spcBef>
-                <a:spcPts val="0"/>
+                <a:spcPts val="300"/>
               </a:spcBef>
               <a:spcAft>
                 <a:spcPts val="0"/>
@@ -10192,44 +12375,7 @@
                   <a:srgbClr val="FFFFFF"/>
                 </a:highlight>
               </a:rPr>
-              <a:t>Inferences from results,</a:t>
-            </a:r>
-            <a:endParaRPr sz="1800">
-              <a:solidFill>
-                <a:srgbClr val="24292E"/>
-              </a:solidFill>
-              <a:highlight>
-                <a:srgbClr val="FFFFFF"/>
-              </a:highlight>
-            </a:endParaRPr>
-          </a:p>
-          <a:p>
-            <a:pPr indent="-342900" lvl="1" marL="914400" rtl="0" algn="l">
-              <a:lnSpc>
-                <a:spcPct val="115000"/>
-              </a:lnSpc>
-              <a:spcBef>
-                <a:spcPts val="0"/>
-              </a:spcBef>
-              <a:spcAft>
-                <a:spcPts val="0"/>
-              </a:spcAft>
-              <a:buClr>
-                <a:srgbClr val="24292E"/>
-              </a:buClr>
-              <a:buSzPts val="1800"/>
-              <a:buChar char="○"/>
-            </a:pPr>
-            <a:r>
-              <a:rPr lang="en" sz="1800">
-                <a:solidFill>
-                  <a:srgbClr val="24292E"/>
-                </a:solidFill>
-                <a:highlight>
-                  <a:srgbClr val="FFFFFF"/>
-                </a:highlight>
-              </a:rPr>
-              <a:t>Correlation determined between specific features and outcomes,</a:t>
+              <a:t>This model was used to compare the efficiency and efficacy of the predictions to the linear regression model. </a:t>
             </a:r>
             <a:endParaRPr sz="1800">
               <a:solidFill>
@@ -10266,44 +12412,36 @@
                   <a:srgbClr val="FFFFFF"/>
                 </a:highlight>
               </a:rPr>
-              <a:t>Exploration of other types of ML models,</a:t>
-            </a:r>
-            <a:endParaRPr sz="1800">
-              <a:solidFill>
-                <a:srgbClr val="24292E"/>
-              </a:solidFill>
-              <a:highlight>
-                <a:srgbClr val="FFFFFF"/>
-              </a:highlight>
-            </a:endParaRPr>
-          </a:p>
-          <a:p>
-            <a:pPr indent="-342900" lvl="1" marL="914400" rtl="0" algn="l">
-              <a:lnSpc>
-                <a:spcPct val="115000"/>
-              </a:lnSpc>
-              <a:spcBef>
-                <a:spcPts val="0"/>
-              </a:spcBef>
-              <a:spcAft>
-                <a:spcPts val="0"/>
-              </a:spcAft>
-              <a:buClr>
-                <a:srgbClr val="24292E"/>
-              </a:buClr>
-              <a:buSzPts val="1800"/>
-              <a:buChar char="○"/>
-            </a:pPr>
+              <a:t>The </a:t>
+            </a:r>
             <a:r>
               <a:rPr lang="en" sz="1800">
                 <a:solidFill>
-                  <a:srgbClr val="24292E"/>
+                  <a:srgbClr val="202124"/>
+                </a:solidFill>
+                <a:uFill>
+                  <a:noFill/>
+                </a:uFill>
+                <a:hlinkClick r:id="rId3">
+                  <a:extLst>
+                    <a:ext uri="{A12FA001-AC4F-418D-AE19-62706E023703}">
+                      <ahyp:hlinkClr val="tx"/>
+                    </a:ext>
+                  </a:extLst>
+                </a:hlinkClick>
+              </a:rPr>
+              <a:t>random forest model</a:t>
+            </a:r>
+            <a:r>
+              <a:rPr lang="en" sz="1800">
+                <a:solidFill>
+                  <a:srgbClr val="202124"/>
                 </a:solidFill>
                 <a:highlight>
                   <a:srgbClr val="FFFFFF"/>
                 </a:highlight>
               </a:rPr>
-              <a:t>Considering determining threshold and making target outcome binary and </a:t>
+              <a:t> </a:t>
             </a:r>
             <a:r>
               <a:rPr lang="en" sz="1800">
@@ -10314,55 +12452,7 @@
                   <a:srgbClr val="FFFFFF"/>
                 </a:highlight>
               </a:rPr>
-              <a:t>utilizing</a:t>
-            </a:r>
-            <a:r>
-              <a:rPr lang="en" sz="1800">
-                <a:solidFill>
-                  <a:srgbClr val="24292E"/>
-                </a:solidFill>
-                <a:highlight>
-                  <a:srgbClr val="FFFFFF"/>
-                </a:highlight>
-              </a:rPr>
-              <a:t> classification ML models,</a:t>
-            </a:r>
-            <a:endParaRPr sz="1800">
-              <a:solidFill>
-                <a:srgbClr val="24292E"/>
-              </a:solidFill>
-              <a:highlight>
-                <a:srgbClr val="FFFFFF"/>
-              </a:highlight>
-            </a:endParaRPr>
-          </a:p>
-          <a:p>
-            <a:pPr indent="-342900" lvl="1" marL="914400" rtl="0" algn="l">
-              <a:lnSpc>
-                <a:spcPct val="115000"/>
-              </a:lnSpc>
-              <a:spcBef>
-                <a:spcPts val="0"/>
-              </a:spcBef>
-              <a:spcAft>
-                <a:spcPts val="0"/>
-              </a:spcAft>
-              <a:buClr>
-                <a:srgbClr val="24292E"/>
-              </a:buClr>
-              <a:buSzPts val="1800"/>
-              <a:buChar char="○"/>
-            </a:pPr>
-            <a:r>
-              <a:rPr lang="en" sz="1800">
-                <a:solidFill>
-                  <a:srgbClr val="24292E"/>
-                </a:solidFill>
-                <a:highlight>
-                  <a:srgbClr val="FFFFFF"/>
-                </a:highlight>
-              </a:rPr>
-              <a:t>Adding more features into dataset (if possible),</a:t>
+              <a:t>was able to intake all feature columns to build several simple decision trees to predict the percent vaccine hesitancy. </a:t>
             </a:r>
             <a:endParaRPr sz="1800">
               <a:solidFill>
@@ -10391,24 +12481,57 @@
               <a:buChar char="●"/>
             </a:pPr>
             <a:r>
-              <a:rPr lang="en" sz="1800">
-                <a:solidFill>
-                  <a:srgbClr val="24292E"/>
-                </a:solidFill>
-                <a:highlight>
-                  <a:srgbClr val="FFFFFF"/>
-                </a:highlight>
-              </a:rPr>
-              <a:t>Connection to Ontario - datasets available with similar sociodemographic data, </a:t>
-            </a:r>
-            <a:endParaRPr sz="1800">
-              <a:solidFill>
-                <a:srgbClr val="24292E"/>
-              </a:solidFill>
-              <a:highlight>
-                <a:srgbClr val="FFFFFF"/>
-              </a:highlight>
-            </a:endParaRPr>
+              <a:rPr lang="en" sz="1800"/>
+              <a:t>Overall the machine learning model was more effective in approximating real-world data points and we would recommend this model if using a similar dataset. </a:t>
+            </a:r>
+            <a:endParaRPr sz="1800"/>
+          </a:p>
+        </p:txBody>
+      </p:sp>
+      <p:sp>
+        <p:nvSpPr>
+          <p:cNvPr id="124" name="Google Shape;124;p21"/>
+          <p:cNvSpPr txBox="1"/>
+          <p:nvPr/>
+        </p:nvSpPr>
+        <p:spPr>
+          <a:xfrm>
+            <a:off x="206700" y="3971925"/>
+            <a:ext cx="3836700" cy="1098900"/>
+          </a:xfrm>
+          <a:prstGeom prst="rect">
+            <a:avLst/>
+          </a:prstGeom>
+          <a:solidFill>
+            <a:srgbClr val="F4CCCC"/>
+          </a:solidFill>
+          <a:ln>
+            <a:noFill/>
+          </a:ln>
+        </p:spPr>
+        <p:txBody>
+          <a:bodyPr anchorCtr="0" anchor="t" bIns="91425" lIns="91425" spcFirstLastPara="1" rIns="91425" wrap="square" tIns="91425">
+            <a:spAutoFit/>
+          </a:bodyPr>
+          <a:lstStyle/>
+          <a:p>
+            <a:pPr indent="0" lvl="0" marL="0" rtl="0" algn="l">
+              <a:lnSpc>
+                <a:spcPct val="115000"/>
+              </a:lnSpc>
+              <a:spcBef>
+                <a:spcPts val="0"/>
+              </a:spcBef>
+              <a:spcAft>
+                <a:spcPts val="0"/>
+              </a:spcAft>
+              <a:buNone/>
+            </a:pPr>
+            <a:r>
+              <a:rPr b="1" lang="en" sz="1800"/>
+              <a:t>Regression metrics:</a:t>
+            </a:r>
+            <a:endParaRPr b="1" sz="1800"/>
           </a:p>
           <a:p>
             <a:pPr indent="-342900" lvl="0" marL="457200" rtl="0" algn="l">
@@ -10421,52 +12544,38 @@
               <a:spcAft>
                 <a:spcPts val="0"/>
               </a:spcAft>
-              <a:buClr>
-                <a:srgbClr val="24292E"/>
-              </a:buClr>
               <a:buSzPts val="1800"/>
               <a:buChar char="●"/>
             </a:pPr>
             <a:r>
-              <a:rPr lang="en" sz="1800">
-                <a:solidFill>
-                  <a:srgbClr val="24292E"/>
-                </a:solidFill>
-                <a:highlight>
-                  <a:srgbClr val="FFFFFF"/>
-                </a:highlight>
-              </a:rPr>
-              <a:t>How </a:t>
-            </a:r>
-            <a:r>
-              <a:rPr lang="en" sz="1800">
-                <a:solidFill>
-                  <a:srgbClr val="24292E"/>
-                </a:solidFill>
-                <a:highlight>
-                  <a:srgbClr val="FFFFFF"/>
-                </a:highlight>
-              </a:rPr>
-              <a:t>predictive</a:t>
-            </a:r>
-            <a:r>
-              <a:rPr lang="en" sz="1800">
-                <a:solidFill>
-                  <a:srgbClr val="24292E"/>
-                </a:solidFill>
-                <a:highlight>
-                  <a:srgbClr val="FFFFFF"/>
-                </a:highlight>
-              </a:rPr>
-              <a:t> models would be helpful in addressing barriers to vaccine implementation and reducing vaccine hesitancy.</a:t>
-            </a:r>
-            <a:endParaRPr sz="1800">
-              <a:solidFill>
-                <a:srgbClr val="24292E"/>
-              </a:solidFill>
-              <a:highlight>
-                <a:srgbClr val="FFFFFF"/>
-              </a:highlight>
+              <a:rPr lang="en" sz="1800"/>
+              <a:t>R Squared Score: 0.437</a:t>
+            </a:r>
+            <a:endParaRPr sz="1800"/>
+          </a:p>
+          <a:p>
+            <a:pPr indent="-342900" lvl="0" marL="457200" rtl="0" algn="l">
+              <a:lnSpc>
+                <a:spcPct val="115000"/>
+              </a:lnSpc>
+              <a:spcBef>
+                <a:spcPts val="0"/>
+              </a:spcBef>
+              <a:spcAft>
+                <a:spcPts val="0"/>
+              </a:spcAft>
+              <a:buSzPts val="1800"/>
+              <a:buChar char="●"/>
+            </a:pPr>
+            <a:r>
+              <a:rPr lang="en" sz="1800"/>
+              <a:t>Explained Variance Score: 438</a:t>
+            </a:r>
+            <a:endParaRPr>
+              <a:latin typeface="Roboto"/>
+              <a:ea typeface="Roboto"/>
+              <a:cs typeface="Roboto"/>
+              <a:sym typeface="Roboto"/>
             </a:endParaRPr>
           </a:p>
         </p:txBody>
@@ -10480,6 +12589,285 @@
 </file>
 
 <file path=ppt/theme/theme1.xml><?xml version="1.0" encoding="utf-8"?>
+<a:theme xmlns:a="http://schemas.openxmlformats.org/drawingml/2006/main" xmlns:r="http://schemas.openxmlformats.org/officeDocument/2006/relationships">
+  <a:themeElements>
+    <a:clrScheme name="Default">
+      <a:dk1>
+        <a:srgbClr val="000000"/>
+      </a:dk1>
+      <a:lt1>
+        <a:srgbClr val="FFFFFF"/>
+      </a:lt1>
+      <a:dk2>
+        <a:srgbClr val="158158"/>
+      </a:dk2>
+      <a:lt2>
+        <a:srgbClr val="F3F3F3"/>
+      </a:lt2>
+      <a:accent1>
+        <a:srgbClr val="058DC7"/>
+      </a:accent1>
+      <a:accent2>
+        <a:srgbClr val="50B432"/>
+      </a:accent2>
+      <a:accent3>
+        <a:srgbClr val="ED561B"/>
+      </a:accent3>
+      <a:accent4>
+        <a:srgbClr val="EDEF00"/>
+      </a:accent4>
+      <a:accent5>
+        <a:srgbClr val="24CBE5"/>
+      </a:accent5>
+      <a:accent6>
+        <a:srgbClr val="64E572"/>
+      </a:accent6>
+      <a:hlink>
+        <a:srgbClr val="2200CC"/>
+      </a:hlink>
+      <a:folHlink>
+        <a:srgbClr val="551A8B"/>
+      </a:folHlink>
+    </a:clrScheme>
+    <a:fontScheme name="Office">
+      <a:majorFont>
+        <a:latin typeface="Arial"/>
+        <a:ea typeface=""/>
+        <a:cs typeface=""/>
+        <a:font script="Jpan" typeface="ＭＳ Ｐゴシック"/>
+        <a:font script="Hang" typeface="맑은 고딕"/>
+        <a:font script="Hans" typeface="宋体"/>
+        <a:font script="Hant" typeface="新細明體"/>
+        <a:font script="Arab" typeface="Times New Roman"/>
+        <a:font script="Hebr" typeface="Times New Roman"/>
+        <a:font script="Thai" typeface="Angsana New"/>
+        <a:font script="Ethi" typeface="Nyala"/>
+        <a:font script="Beng" typeface="Vrinda"/>
+        <a:font script="Gujr" typeface="Shruti"/>
+        <a:font script="Khmr" typeface="MoolBoran"/>
+        <a:font script="Knda" typeface="Tunga"/>
+        <a:font script="Guru" typeface="Raavi"/>
+        <a:font script="Cans" typeface="Euphemia"/>
+        <a:font script="Cher" typeface="Plantagenet Cherokee"/>
+        <a:font script="Yiii" typeface="Microsoft Yi Baiti"/>
+        <a:font script="Tibt" typeface="Microsoft Himalaya"/>
+        <a:font script="Thaa" typeface="MV Boli"/>
+        <a:font script="Deva" typeface="Mangal"/>
+        <a:font script="Telu" typeface="Gautami"/>
+        <a:font script="Taml" typeface="Latha"/>
+        <a:font script="Syrc" typeface="Estrangelo Edessa"/>
+        <a:font script="Orya" typeface="Kalinga"/>
+        <a:font script="Mlym" typeface="Kartika"/>
+        <a:font script="Laoo" typeface="DokChampa"/>
+        <a:font script="Sinh" typeface="Iskoola Pota"/>
+        <a:font script="Mong" typeface="Mongolian Baiti"/>
+        <a:font script="Viet" typeface="Times New Roman"/>
+        <a:font script="Uigh" typeface="Microsoft Uighur"/>
+        <a:font script="Geor" typeface="Sylfaen"/>
+      </a:majorFont>
+      <a:minorFont>
+        <a:latin typeface="Arial"/>
+        <a:ea typeface=""/>
+        <a:cs typeface=""/>
+        <a:font script="Jpan" typeface="ＭＳ Ｐゴシック"/>
+        <a:font script="Hang" typeface="맑은 고딕"/>
+        <a:font script="Hans" typeface="宋体"/>
+        <a:font script="Hant" typeface="新細明體"/>
+        <a:font script="Arab" typeface="Arial"/>
+        <a:font script="Hebr" typeface="Arial"/>
+        <a:font script="Thai" typeface="Cordia New"/>
+        <a:font script="Ethi" typeface="Nyala"/>
+        <a:font script="Beng" typeface="Vrinda"/>
+        <a:font script="Gujr" typeface="Shruti"/>
+        <a:font script="Khmr" typeface="DaunPenh"/>
+        <a:font script="Knda" typeface="Tunga"/>
+        <a:font script="Guru" typeface="Raavi"/>
+        <a:font script="Cans" typeface="Euphemia"/>
+        <a:font script="Cher" typeface="Plantagenet Cherokee"/>
+        <a:font script="Yiii" typeface="Microsoft Yi Baiti"/>
+        <a:font script="Tibt" typeface="Microsoft Himalaya"/>
+        <a:font script="Thaa" typeface="MV Boli"/>
+        <a:font script="Deva" typeface="Mangal"/>
+        <a:font script="Telu" typeface="Gautami"/>
+        <a:font script="Taml" typeface="Latha"/>
+        <a:font script="Syrc" typeface="Estrangelo Edessa"/>
+        <a:font script="Orya" typeface="Kalinga"/>
+        <a:font script="Mlym" typeface="Kartika"/>
+        <a:font script="Laoo" typeface="DokChampa"/>
+        <a:font script="Sinh" typeface="Iskoola Pota"/>
+        <a:font script="Mong" typeface="Mongolian Baiti"/>
+        <a:font script="Viet" typeface="Arial"/>
+        <a:font script="Uigh" typeface="Microsoft Uighur"/>
+        <a:font script="Geor" typeface="Sylfaen"/>
+      </a:minorFont>
+    </a:fontScheme>
+    <a:fmtScheme name="Office">
+      <a:fillStyleLst>
+        <a:solidFill>
+          <a:schemeClr val="phClr"/>
+        </a:solidFill>
+        <a:gradFill rotWithShape="1">
+          <a:gsLst>
+            <a:gs pos="0">
+              <a:schemeClr val="phClr">
+                <a:tint val="50000"/>
+                <a:satMod val="300000"/>
+              </a:schemeClr>
+            </a:gs>
+            <a:gs pos="35000">
+              <a:schemeClr val="phClr">
+                <a:tint val="37000"/>
+                <a:satMod val="300000"/>
+              </a:schemeClr>
+            </a:gs>
+            <a:gs pos="100000">
+              <a:schemeClr val="phClr">
+                <a:tint val="15000"/>
+                <a:satMod val="350000"/>
+              </a:schemeClr>
+            </a:gs>
+          </a:gsLst>
+          <a:lin ang="16200000" scaled="1"/>
+        </a:gradFill>
+        <a:gradFill rotWithShape="1">
+          <a:gsLst>
+            <a:gs pos="0">
+              <a:schemeClr val="phClr">
+                <a:tint val="100000"/>
+                <a:shade val="100000"/>
+                <a:satMod val="130000"/>
+              </a:schemeClr>
+            </a:gs>
+            <a:gs pos="100000">
+              <a:schemeClr val="phClr">
+                <a:tint val="50000"/>
+                <a:shade val="100000"/>
+                <a:satMod val="350000"/>
+              </a:schemeClr>
+            </a:gs>
+          </a:gsLst>
+          <a:lin ang="16200000" scaled="0"/>
+        </a:gradFill>
+      </a:fillStyleLst>
+      <a:lnStyleLst>
+        <a:ln w="9525" cap="flat" cmpd="sng" algn="ctr">
+          <a:solidFill>
+            <a:schemeClr val="phClr">
+              <a:shade val="95000"/>
+              <a:satMod val="105000"/>
+            </a:schemeClr>
+          </a:solidFill>
+          <a:prstDash val="solid"/>
+        </a:ln>
+        <a:ln w="25400" cap="flat" cmpd="sng" algn="ctr">
+          <a:solidFill>
+            <a:schemeClr val="phClr"/>
+          </a:solidFill>
+          <a:prstDash val="solid"/>
+        </a:ln>
+        <a:ln w="38100" cap="flat" cmpd="sng" algn="ctr">
+          <a:solidFill>
+            <a:schemeClr val="phClr"/>
+          </a:solidFill>
+          <a:prstDash val="solid"/>
+        </a:ln>
+      </a:lnStyleLst>
+      <a:effectStyleLst>
+        <a:effectStyle>
+          <a:effectLst>
+            <a:outerShdw blurRad="40000" dist="20000" dir="5400000" rotWithShape="0">
+              <a:srgbClr val="000000">
+                <a:alpha val="38000"/>
+              </a:srgbClr>
+            </a:outerShdw>
+          </a:effectLst>
+        </a:effectStyle>
+        <a:effectStyle>
+          <a:effectLst>
+            <a:outerShdw blurRad="40000" dist="23000" dir="5400000" rotWithShape="0">
+              <a:srgbClr val="000000">
+                <a:alpha val="35000"/>
+              </a:srgbClr>
+            </a:outerShdw>
+          </a:effectLst>
+        </a:effectStyle>
+        <a:effectStyle>
+          <a:effectLst>
+            <a:outerShdw blurRad="40000" dist="23000" dir="5400000" rotWithShape="0">
+              <a:srgbClr val="000000">
+                <a:alpha val="35000"/>
+              </a:srgbClr>
+            </a:outerShdw>
+          </a:effectLst>
+          <a:scene3d>
+            <a:camera prst="orthographicFront">
+              <a:rot lat="0" lon="0" rev="0"/>
+            </a:camera>
+            <a:lightRig rig="threePt" dir="t">
+              <a:rot lat="0" lon="0" rev="1200000"/>
+            </a:lightRig>
+          </a:scene3d>
+          <a:sp3d>
+            <a:bevelT w="63500" h="25400"/>
+          </a:sp3d>
+        </a:effectStyle>
+      </a:effectStyleLst>
+      <a:bgFillStyleLst>
+        <a:solidFill>
+          <a:schemeClr val="phClr"/>
+        </a:solidFill>
+        <a:gradFill rotWithShape="1">
+          <a:gsLst>
+            <a:gs pos="0">
+              <a:schemeClr val="phClr">
+                <a:tint val="40000"/>
+                <a:satMod val="350000"/>
+              </a:schemeClr>
+            </a:gs>
+            <a:gs pos="40000">
+              <a:schemeClr val="phClr">
+                <a:tint val="45000"/>
+                <a:shade val="99000"/>
+                <a:satMod val="350000"/>
+              </a:schemeClr>
+            </a:gs>
+            <a:gs pos="100000">
+              <a:schemeClr val="phClr">
+                <a:shade val="20000"/>
+                <a:satMod val="255000"/>
+              </a:schemeClr>
+            </a:gs>
+          </a:gsLst>
+          <a:path path="circle">
+            <a:fillToRect l="50000" t="-80000" r="50000" b="180000"/>
+          </a:path>
+        </a:gradFill>
+        <a:gradFill rotWithShape="1">
+          <a:gsLst>
+            <a:gs pos="0">
+              <a:schemeClr val="phClr">
+                <a:tint val="80000"/>
+                <a:satMod val="300000"/>
+              </a:schemeClr>
+            </a:gs>
+            <a:gs pos="100000">
+              <a:schemeClr val="phClr">
+                <a:shade val="30000"/>
+                <a:satMod val="200000"/>
+              </a:schemeClr>
+            </a:gs>
+          </a:gsLst>
+          <a:path path="circle">
+            <a:fillToRect l="50000" t="50000" r="50000" b="50000"/>
+          </a:path>
+        </a:gradFill>
+      </a:bgFillStyleLst>
+    </a:fmtScheme>
+  </a:themeElements>
+</a:theme>
+</file>
+
+<file path=ppt/theme/theme2.xml><?xml version="1.0" encoding="utf-8"?>
 <a:theme xmlns:a="http://schemas.openxmlformats.org/drawingml/2006/main" xmlns:r="http://schemas.openxmlformats.org/officeDocument/2006/relationships" name="Paradigm">
   <a:themeElements>
     <a:clrScheme name="Paradigm">
@@ -10756,283 +13144,4 @@
     </a:fmtScheme>
   </a:themeElements>
 </a:theme>
-</file>
-
-<file path=ppt/theme/theme2.xml><?xml version="1.0" encoding="utf-8"?>
-<a:theme xmlns:a="http://schemas.openxmlformats.org/drawingml/2006/main" xmlns:r="http://schemas.openxmlformats.org/officeDocument/2006/relationships">
-  <a:themeElements>
-    <a:clrScheme name="Default">
-      <a:dk1>
-        <a:srgbClr val="000000"/>
-      </a:dk1>
-      <a:lt1>
-        <a:srgbClr val="FFFFFF"/>
-      </a:lt1>
-      <a:dk2>
-        <a:srgbClr val="158158"/>
-      </a:dk2>
-      <a:lt2>
-        <a:srgbClr val="F3F3F3"/>
-      </a:lt2>
-      <a:accent1>
-        <a:srgbClr val="058DC7"/>
-      </a:accent1>
-      <a:accent2>
-        <a:srgbClr val="50B432"/>
-      </a:accent2>
-      <a:accent3>
-        <a:srgbClr val="ED561B"/>
-      </a:accent3>
-      <a:accent4>
-        <a:srgbClr val="EDEF00"/>
-      </a:accent4>
-      <a:accent5>
-        <a:srgbClr val="24CBE5"/>
-      </a:accent5>
-      <a:accent6>
-        <a:srgbClr val="64E572"/>
-      </a:accent6>
-      <a:hlink>
-        <a:srgbClr val="2200CC"/>
-      </a:hlink>
-      <a:folHlink>
-        <a:srgbClr val="551A8B"/>
-      </a:folHlink>
-    </a:clrScheme>
-    <a:fontScheme name="Office">
-      <a:majorFont>
-        <a:latin typeface="Arial"/>
-        <a:ea typeface=""/>
-        <a:cs typeface=""/>
-        <a:font script="Jpan" typeface="ＭＳ Ｐゴシック"/>
-        <a:font script="Hang" typeface="맑은 고딕"/>
-        <a:font script="Hans" typeface="宋体"/>
-        <a:font script="Hant" typeface="新細明體"/>
-        <a:font script="Arab" typeface="Times New Roman"/>
-        <a:font script="Hebr" typeface="Times New Roman"/>
-        <a:font script="Thai" typeface="Angsana New"/>
-        <a:font script="Ethi" typeface="Nyala"/>
-        <a:font script="Beng" typeface="Vrinda"/>
-        <a:font script="Gujr" typeface="Shruti"/>
-        <a:font script="Khmr" typeface="MoolBoran"/>
-        <a:font script="Knda" typeface="Tunga"/>
-        <a:font script="Guru" typeface="Raavi"/>
-        <a:font script="Cans" typeface="Euphemia"/>
-        <a:font script="Cher" typeface="Plantagenet Cherokee"/>
-        <a:font script="Yiii" typeface="Microsoft Yi Baiti"/>
-        <a:font script="Tibt" typeface="Microsoft Himalaya"/>
-        <a:font script="Thaa" typeface="MV Boli"/>
-        <a:font script="Deva" typeface="Mangal"/>
-        <a:font script="Telu" typeface="Gautami"/>
-        <a:font script="Taml" typeface="Latha"/>
-        <a:font script="Syrc" typeface="Estrangelo Edessa"/>
-        <a:font script="Orya" typeface="Kalinga"/>
-        <a:font script="Mlym" typeface="Kartika"/>
-        <a:font script="Laoo" typeface="DokChampa"/>
-        <a:font script="Sinh" typeface="Iskoola Pota"/>
-        <a:font script="Mong" typeface="Mongolian Baiti"/>
-        <a:font script="Viet" typeface="Times New Roman"/>
-        <a:font script="Uigh" typeface="Microsoft Uighur"/>
-        <a:font script="Geor" typeface="Sylfaen"/>
-      </a:majorFont>
-      <a:minorFont>
-        <a:latin typeface="Arial"/>
-        <a:ea typeface=""/>
-        <a:cs typeface=""/>
-        <a:font script="Jpan" typeface="ＭＳ Ｐゴシック"/>
-        <a:font script="Hang" typeface="맑은 고딕"/>
-        <a:font script="Hans" typeface="宋体"/>
-        <a:font script="Hant" typeface="新細明體"/>
-        <a:font script="Arab" typeface="Arial"/>
-        <a:font script="Hebr" typeface="Arial"/>
-        <a:font script="Thai" typeface="Cordia New"/>
-        <a:font script="Ethi" typeface="Nyala"/>
-        <a:font script="Beng" typeface="Vrinda"/>
-        <a:font script="Gujr" typeface="Shruti"/>
-        <a:font script="Khmr" typeface="DaunPenh"/>
-        <a:font script="Knda" typeface="Tunga"/>
-        <a:font script="Guru" typeface="Raavi"/>
-        <a:font script="Cans" typeface="Euphemia"/>
-        <a:font script="Cher" typeface="Plantagenet Cherokee"/>
-        <a:font script="Yiii" typeface="Microsoft Yi Baiti"/>
-        <a:font script="Tibt" typeface="Microsoft Himalaya"/>
-        <a:font script="Thaa" typeface="MV Boli"/>
-        <a:font script="Deva" typeface="Mangal"/>
-        <a:font script="Telu" typeface="Gautami"/>
-        <a:font script="Taml" typeface="Latha"/>
-        <a:font script="Syrc" typeface="Estrangelo Edessa"/>
-        <a:font script="Orya" typeface="Kalinga"/>
-        <a:font script="Mlym" typeface="Kartika"/>
-        <a:font script="Laoo" typeface="DokChampa"/>
-        <a:font script="Sinh" typeface="Iskoola Pota"/>
-        <a:font script="Mong" typeface="Mongolian Baiti"/>
-        <a:font script="Viet" typeface="Arial"/>
-        <a:font script="Uigh" typeface="Microsoft Uighur"/>
-        <a:font script="Geor" typeface="Sylfaen"/>
-      </a:minorFont>
-    </a:fontScheme>
-    <a:fmtScheme name="Office">
-      <a:fillStyleLst>
-        <a:solidFill>
-          <a:schemeClr val="phClr"/>
-        </a:solidFill>
-        <a:gradFill rotWithShape="1">
-          <a:gsLst>
-            <a:gs pos="0">
-              <a:schemeClr val="phClr">
-                <a:tint val="50000"/>
-                <a:satMod val="300000"/>
-              </a:schemeClr>
-            </a:gs>
-            <a:gs pos="35000">
-              <a:schemeClr val="phClr">
-                <a:tint val="37000"/>
-                <a:satMod val="300000"/>
-              </a:schemeClr>
-            </a:gs>
-            <a:gs pos="100000">
-              <a:schemeClr val="phClr">
-                <a:tint val="15000"/>
-                <a:satMod val="350000"/>
-              </a:schemeClr>
-            </a:gs>
-          </a:gsLst>
-          <a:lin ang="16200000" scaled="1"/>
-        </a:gradFill>
-        <a:gradFill rotWithShape="1">
-          <a:gsLst>
-            <a:gs pos="0">
-              <a:schemeClr val="phClr">
-                <a:tint val="100000"/>
-                <a:shade val="100000"/>
-                <a:satMod val="130000"/>
-              </a:schemeClr>
-            </a:gs>
-            <a:gs pos="100000">
-              <a:schemeClr val="phClr">
-                <a:tint val="50000"/>
-                <a:shade val="100000"/>
-                <a:satMod val="350000"/>
-              </a:schemeClr>
-            </a:gs>
-          </a:gsLst>
-          <a:lin ang="16200000" scaled="0"/>
-        </a:gradFill>
-      </a:fillStyleLst>
-      <a:lnStyleLst>
-        <a:ln w="9525" cap="flat" cmpd="sng" algn="ctr">
-          <a:solidFill>
-            <a:schemeClr val="phClr">
-              <a:shade val="95000"/>
-              <a:satMod val="105000"/>
-            </a:schemeClr>
-          </a:solidFill>
-          <a:prstDash val="solid"/>
-        </a:ln>
-        <a:ln w="25400" cap="flat" cmpd="sng" algn="ctr">
-          <a:solidFill>
-            <a:schemeClr val="phClr"/>
-          </a:solidFill>
-          <a:prstDash val="solid"/>
-        </a:ln>
-        <a:ln w="38100" cap="flat" cmpd="sng" algn="ctr">
-          <a:solidFill>
-            <a:schemeClr val="phClr"/>
-          </a:solidFill>
-          <a:prstDash val="solid"/>
-        </a:ln>
-      </a:lnStyleLst>
-      <a:effectStyleLst>
-        <a:effectStyle>
-          <a:effectLst>
-            <a:outerShdw blurRad="40000" dist="20000" dir="5400000" rotWithShape="0">
-              <a:srgbClr val="000000">
-                <a:alpha val="38000"/>
-              </a:srgbClr>
-            </a:outerShdw>
-          </a:effectLst>
-        </a:effectStyle>
-        <a:effectStyle>
-          <a:effectLst>
-            <a:outerShdw blurRad="40000" dist="23000" dir="5400000" rotWithShape="0">
-              <a:srgbClr val="000000">
-                <a:alpha val="35000"/>
-              </a:srgbClr>
-            </a:outerShdw>
-          </a:effectLst>
-        </a:effectStyle>
-        <a:effectStyle>
-          <a:effectLst>
-            <a:outerShdw blurRad="40000" dist="23000" dir="5400000" rotWithShape="0">
-              <a:srgbClr val="000000">
-                <a:alpha val="35000"/>
-              </a:srgbClr>
-            </a:outerShdw>
-          </a:effectLst>
-          <a:scene3d>
-            <a:camera prst="orthographicFront">
-              <a:rot lat="0" lon="0" rev="0"/>
-            </a:camera>
-            <a:lightRig rig="threePt" dir="t">
-              <a:rot lat="0" lon="0" rev="1200000"/>
-            </a:lightRig>
-          </a:scene3d>
-          <a:sp3d>
-            <a:bevelT w="63500" h="25400"/>
-          </a:sp3d>
-        </a:effectStyle>
-      </a:effectStyleLst>
-      <a:bgFillStyleLst>
-        <a:solidFill>
-          <a:schemeClr val="phClr"/>
-        </a:solidFill>
-        <a:gradFill rotWithShape="1">
-          <a:gsLst>
-            <a:gs pos="0">
-              <a:schemeClr val="phClr">
-                <a:tint val="40000"/>
-                <a:satMod val="350000"/>
-              </a:schemeClr>
-            </a:gs>
-            <a:gs pos="40000">
-              <a:schemeClr val="phClr">
-                <a:tint val="45000"/>
-                <a:shade val="99000"/>
-                <a:satMod val="350000"/>
-              </a:schemeClr>
-            </a:gs>
-            <a:gs pos="100000">
-              <a:schemeClr val="phClr">
-                <a:shade val="20000"/>
-                <a:satMod val="255000"/>
-              </a:schemeClr>
-            </a:gs>
-          </a:gsLst>
-          <a:path path="circle">
-            <a:fillToRect l="50000" t="-80000" r="50000" b="180000"/>
-          </a:path>
-        </a:gradFill>
-        <a:gradFill rotWithShape="1">
-          <a:gsLst>
-            <a:gs pos="0">
-              <a:schemeClr val="phClr">
-                <a:tint val="80000"/>
-                <a:satMod val="300000"/>
-              </a:schemeClr>
-            </a:gs>
-            <a:gs pos="100000">
-              <a:schemeClr val="phClr">
-                <a:shade val="30000"/>
-                <a:satMod val="200000"/>
-              </a:schemeClr>
-            </a:gs>
-          </a:gsLst>
-          <a:path path="circle">
-            <a:fillToRect l="50000" t="50000" r="50000" b="50000"/>
-          </a:path>
-        </a:gradFill>
-      </a:bgFillStyleLst>
-    </a:fmtScheme>
-  </a:themeElements>
-</a:theme>
 </file>
</xml_diff>

<commit_message>
Added presentation with all edits incorporated and png of first slide
Version #5
</commit_message>
<xml_diff>
--- a/Vaccine Hesitancy Presentation.pptx
+++ b/Vaccine Hesitancy Presentation.pptx
@@ -1306,7 +1306,7 @@
   <p:cSld>
     <p:spTree>
       <p:nvGrpSpPr>
-        <p:cNvPr id="168" name="Shape 168"/>
+        <p:cNvPr id="169" name="Shape 169"/>
         <p:cNvGrpSpPr/>
         <p:nvPr/>
       </p:nvGrpSpPr>
@@ -1320,7 +1320,7 @@
       </p:grpSpPr>
       <p:sp>
         <p:nvSpPr>
-          <p:cNvPr id="169" name="Google Shape;169;gded4d5debe_0_16:notes"/>
+          <p:cNvPr id="170" name="Google Shape;170;gded4d5debe_0_16:notes"/>
           <p:cNvSpPr/>
           <p:nvPr>
             <p:ph idx="2" type="sldImg"/>
@@ -1355,7 +1355,7 @@
       </p:sp>
       <p:sp>
         <p:nvSpPr>
-          <p:cNvPr id="170" name="Google Shape;170;gded4d5debe_0_16:notes"/>
+          <p:cNvPr id="171" name="Google Shape;171;gded4d5debe_0_16:notes"/>
           <p:cNvSpPr txBox="1"/>
           <p:nvPr>
             <p:ph idx="1" type="body"/>
@@ -1405,7 +1405,7 @@
   <p:cSld>
     <p:spTree>
       <p:nvGrpSpPr>
-        <p:cNvPr id="180" name="Shape 180"/>
+        <p:cNvPr id="181" name="Shape 181"/>
         <p:cNvGrpSpPr/>
         <p:nvPr/>
       </p:nvGrpSpPr>
@@ -1419,7 +1419,7 @@
       </p:grpSpPr>
       <p:sp>
         <p:nvSpPr>
-          <p:cNvPr id="181" name="Google Shape;181;gda8216b607_2_47:notes"/>
+          <p:cNvPr id="182" name="Google Shape;182;gda8216b607_2_47:notes"/>
           <p:cNvSpPr/>
           <p:nvPr>
             <p:ph idx="2" type="sldImg"/>
@@ -1454,7 +1454,7 @@
       </p:sp>
       <p:sp>
         <p:nvSpPr>
-          <p:cNvPr id="182" name="Google Shape;182;gda8216b607_2_47:notes"/>
+          <p:cNvPr id="183" name="Google Shape;183;gda8216b607_2_47:notes"/>
           <p:cNvSpPr txBox="1"/>
           <p:nvPr>
             <p:ph idx="1" type="body"/>
@@ -2855,6 +2855,9 @@
               <a:solidFill>
                 <a:srgbClr val="24292E"/>
               </a:solidFill>
+              <a:highlight>
+                <a:srgbClr val="FFFFFF"/>
+              </a:highlight>
             </a:endParaRPr>
           </a:p>
           <a:p>
@@ -2957,12 +2960,74 @@
           </a:bodyPr>
           <a:lstStyle/>
           <a:p>
+            <a:pPr indent="-304800" lvl="0" marL="457200" rtl="0" algn="l">
+              <a:lnSpc>
+                <a:spcPct val="115000"/>
+              </a:lnSpc>
+              <a:spcBef>
+                <a:spcPts val="0"/>
+              </a:spcBef>
+              <a:spcAft>
+                <a:spcPts val="0"/>
+              </a:spcAft>
+              <a:buClr>
+                <a:srgbClr val="24292E"/>
+              </a:buClr>
+              <a:buSzPts val="1200"/>
+              <a:buAutoNum type="arabicPeriod"/>
+            </a:pPr>
+            <a:r>
+              <a:rPr lang="en" sz="1200">
+                <a:solidFill>
+                  <a:srgbClr val="24292E"/>
+                </a:solidFill>
+              </a:rPr>
+              <a:t>Simple Linear Regression - The data was not split into training and testing datasets. All of the features were used to train the model and provide a predicted target. </a:t>
+            </a:r>
+            <a:endParaRPr sz="1200">
+              <a:solidFill>
+                <a:srgbClr val="24292E"/>
+              </a:solidFill>
+            </a:endParaRPr>
+          </a:p>
+          <a:p>
+            <a:pPr indent="-304800" lvl="0" marL="457200" rtl="0" algn="l">
+              <a:lnSpc>
+                <a:spcPct val="115000"/>
+              </a:lnSpc>
+              <a:spcBef>
+                <a:spcPts val="0"/>
+              </a:spcBef>
+              <a:spcAft>
+                <a:spcPts val="0"/>
+              </a:spcAft>
+              <a:buClr>
+                <a:srgbClr val="24292E"/>
+              </a:buClr>
+              <a:buSzPts val="1200"/>
+              <a:buAutoNum type="arabicPeriod"/>
+            </a:pPr>
+            <a:r>
+              <a:rPr lang="en" sz="1200">
+                <a:solidFill>
+                  <a:srgbClr val="24292E"/>
+                </a:solidFill>
+              </a:rPr>
+              <a:t>Multiple Linear Regression - The data was split into training and testing datasets where 70% of the data was used to train and 30% of the data was used to test the model. </a:t>
+            </a:r>
+            <a:endParaRPr sz="1200">
+              <a:solidFill>
+                <a:srgbClr val="24292E"/>
+              </a:solidFill>
+            </a:endParaRPr>
+          </a:p>
+          <a:p>
             <a:pPr indent="0" lvl="0" marL="0" rtl="0" algn="l">
               <a:lnSpc>
                 <a:spcPct val="115000"/>
               </a:lnSpc>
               <a:spcBef>
-                <a:spcPts val="0"/>
+                <a:spcPts val="1200"/>
               </a:spcBef>
               <a:spcAft>
                 <a:spcPts val="0"/>
@@ -9931,8 +9996,8 @@
         </p:nvSpPr>
         <p:spPr>
           <a:xfrm>
-            <a:off x="206700" y="1356900"/>
-            <a:ext cx="8727900" cy="1098900"/>
+            <a:off x="82375" y="1314000"/>
+            <a:ext cx="4557900" cy="3829500"/>
           </a:xfrm>
           <a:prstGeom prst="rect">
             <a:avLst/>
@@ -9961,7 +10026,7 @@
               <a:buNone/>
             </a:pPr>
             <a:r>
-              <a:rPr b="1" lang="en" sz="1800">
+              <a:rPr b="1" lang="en" sz="1600">
                 <a:solidFill>
                   <a:srgbClr val="24292E"/>
                 </a:solidFill>
@@ -9969,9 +10034,9 @@
                   <a:srgbClr val="FFFFFF"/>
                 </a:highlight>
               </a:rPr>
-              <a:t>Ontario Context</a:t>
-            </a:r>
-            <a:endParaRPr b="1" sz="1800">
+              <a:t>Lessons Learned:</a:t>
+            </a:r>
+            <a:endParaRPr b="1" sz="1600">
               <a:solidFill>
                 <a:srgbClr val="24292E"/>
               </a:solidFill>
@@ -9981,7 +10046,7 @@
             </a:endParaRPr>
           </a:p>
           <a:p>
-            <a:pPr indent="-342900" lvl="0" marL="457200" rtl="0" algn="l">
+            <a:pPr indent="-330200" lvl="0" marL="457200" rtl="0" algn="l">
               <a:lnSpc>
                 <a:spcPct val="115000"/>
               </a:lnSpc>
@@ -9994,11 +10059,11 @@
               <a:buClr>
                 <a:srgbClr val="24292E"/>
               </a:buClr>
-              <a:buSzPts val="1800"/>
+              <a:buSzPts val="1600"/>
               <a:buChar char="●"/>
             </a:pPr>
             <a:r>
-              <a:rPr lang="en" sz="1800">
+              <a:rPr lang="en" sz="1600">
                 <a:solidFill>
                   <a:srgbClr val="24292E"/>
                 </a:solidFill>
@@ -10006,9 +10071,260 @@
                   <a:srgbClr val="FFFFFF"/>
                 </a:highlight>
               </a:rPr>
-              <a:t>With an emphasis on collecting sociodemographic data in public health, future exploration of vaccine hesitancy with a more robust dataset would be beneficial.</a:t>
-            </a:r>
-            <a:endParaRPr sz="1800">
+              <a:t>Differences between classification and regression ML models</a:t>
+            </a:r>
+            <a:endParaRPr sz="1600">
+              <a:solidFill>
+                <a:srgbClr val="24292E"/>
+              </a:solidFill>
+              <a:highlight>
+                <a:srgbClr val="FFFFFF"/>
+              </a:highlight>
+            </a:endParaRPr>
+          </a:p>
+          <a:p>
+            <a:pPr indent="-330200" lvl="0" marL="457200" rtl="0" algn="l">
+              <a:lnSpc>
+                <a:spcPct val="115000"/>
+              </a:lnSpc>
+              <a:spcBef>
+                <a:spcPts val="0"/>
+              </a:spcBef>
+              <a:spcAft>
+                <a:spcPts val="0"/>
+              </a:spcAft>
+              <a:buClr>
+                <a:srgbClr val="24292E"/>
+              </a:buClr>
+              <a:buSzPts val="1600"/>
+              <a:buChar char="●"/>
+            </a:pPr>
+            <a:r>
+              <a:rPr lang="en" sz="1600">
+                <a:solidFill>
+                  <a:srgbClr val="24292E"/>
+                </a:solidFill>
+                <a:highlight>
+                  <a:srgbClr val="FFFFFF"/>
+                </a:highlight>
+              </a:rPr>
+              <a:t>Potentially sacrificing accuracy scores for practical and applicable results</a:t>
+            </a:r>
+            <a:endParaRPr sz="1600">
+              <a:solidFill>
+                <a:srgbClr val="24292E"/>
+              </a:solidFill>
+              <a:highlight>
+                <a:srgbClr val="FFFFFF"/>
+              </a:highlight>
+            </a:endParaRPr>
+          </a:p>
+          <a:p>
+            <a:pPr indent="-330200" lvl="0" marL="457200" rtl="0" algn="l">
+              <a:lnSpc>
+                <a:spcPct val="115000"/>
+              </a:lnSpc>
+              <a:spcBef>
+                <a:spcPts val="0"/>
+              </a:spcBef>
+              <a:spcAft>
+                <a:spcPts val="0"/>
+              </a:spcAft>
+              <a:buClr>
+                <a:srgbClr val="24292E"/>
+              </a:buClr>
+              <a:buSzPts val="1600"/>
+              <a:buChar char="●"/>
+            </a:pPr>
+            <a:r>
+              <a:rPr lang="en" sz="1600">
+                <a:solidFill>
+                  <a:srgbClr val="24292E"/>
+                </a:solidFill>
+                <a:highlight>
+                  <a:srgbClr val="FFFFFF"/>
+                </a:highlight>
+              </a:rPr>
+              <a:t>Determining vaccine hesitancy is complex!</a:t>
+            </a:r>
+            <a:endParaRPr sz="1600">
+              <a:solidFill>
+                <a:srgbClr val="24292E"/>
+              </a:solidFill>
+              <a:highlight>
+                <a:srgbClr val="FFFFFF"/>
+              </a:highlight>
+            </a:endParaRPr>
+          </a:p>
+          <a:p>
+            <a:pPr indent="0" lvl="0" marL="0" rtl="0" algn="l">
+              <a:lnSpc>
+                <a:spcPct val="115000"/>
+              </a:lnSpc>
+              <a:spcBef>
+                <a:spcPts val="0"/>
+              </a:spcBef>
+              <a:spcAft>
+                <a:spcPts val="0"/>
+              </a:spcAft>
+              <a:buNone/>
+            </a:pPr>
+            <a:r>
+              <a:rPr b="1" lang="en" sz="1600">
+                <a:solidFill>
+                  <a:srgbClr val="24292E"/>
+                </a:solidFill>
+                <a:highlight>
+                  <a:srgbClr val="FFFFFF"/>
+                </a:highlight>
+              </a:rPr>
+              <a:t>Considerations:</a:t>
+            </a:r>
+            <a:endParaRPr b="1" sz="1600">
+              <a:solidFill>
+                <a:srgbClr val="24292E"/>
+              </a:solidFill>
+              <a:highlight>
+                <a:srgbClr val="FFFFFF"/>
+              </a:highlight>
+            </a:endParaRPr>
+          </a:p>
+          <a:p>
+            <a:pPr indent="-330200" lvl="0" marL="457200" rtl="0" algn="l">
+              <a:lnSpc>
+                <a:spcPct val="115000"/>
+              </a:lnSpc>
+              <a:spcBef>
+                <a:spcPts val="0"/>
+              </a:spcBef>
+              <a:spcAft>
+                <a:spcPts val="0"/>
+              </a:spcAft>
+              <a:buClr>
+                <a:srgbClr val="24292E"/>
+              </a:buClr>
+              <a:buSzPts val="1600"/>
+              <a:buChar char="●"/>
+            </a:pPr>
+            <a:r>
+              <a:rPr lang="en" sz="1600">
+                <a:solidFill>
+                  <a:srgbClr val="24292E"/>
+                </a:solidFill>
+                <a:highlight>
+                  <a:srgbClr val="FFFFFF"/>
+                </a:highlight>
+              </a:rPr>
+              <a:t>Explore different types of regression models to compare results</a:t>
+            </a:r>
+            <a:endParaRPr sz="1600">
+              <a:solidFill>
+                <a:srgbClr val="24292E"/>
+              </a:solidFill>
+              <a:highlight>
+                <a:srgbClr val="FFFFFF"/>
+              </a:highlight>
+            </a:endParaRPr>
+          </a:p>
+          <a:p>
+            <a:pPr indent="-330200" lvl="0" marL="457200" rtl="0" algn="l">
+              <a:lnSpc>
+                <a:spcPct val="115000"/>
+              </a:lnSpc>
+              <a:spcBef>
+                <a:spcPts val="0"/>
+              </a:spcBef>
+              <a:spcAft>
+                <a:spcPts val="0"/>
+              </a:spcAft>
+              <a:buClr>
+                <a:srgbClr val="24292E"/>
+              </a:buClr>
+              <a:buSzPts val="1600"/>
+              <a:buChar char="●"/>
+            </a:pPr>
+            <a:r>
+              <a:rPr lang="en" sz="1600">
+                <a:solidFill>
+                  <a:srgbClr val="24292E"/>
+                </a:solidFill>
+                <a:highlight>
+                  <a:srgbClr val="FFFFFF"/>
+                </a:highlight>
+              </a:rPr>
+              <a:t>Investigate larger datasets with additional feature inputs</a:t>
+            </a:r>
+            <a:endParaRPr sz="1600">
+              <a:solidFill>
+                <a:srgbClr val="24292E"/>
+              </a:solidFill>
+              <a:highlight>
+                <a:srgbClr val="FFFFFF"/>
+              </a:highlight>
+            </a:endParaRPr>
+          </a:p>
+          <a:p>
+            <a:pPr indent="0" lvl="0" marL="0" rtl="0" algn="l">
+              <a:lnSpc>
+                <a:spcPct val="115000"/>
+              </a:lnSpc>
+              <a:spcBef>
+                <a:spcPts val="0"/>
+              </a:spcBef>
+              <a:spcAft>
+                <a:spcPts val="0"/>
+              </a:spcAft>
+              <a:buNone/>
+            </a:pPr>
+            <a:r>
+              <a:rPr b="1" lang="en" sz="1600">
+                <a:solidFill>
+                  <a:srgbClr val="24292E"/>
+                </a:solidFill>
+                <a:highlight>
+                  <a:srgbClr val="FFFFFF"/>
+                </a:highlight>
+              </a:rPr>
+              <a:t>Next Steps:</a:t>
+            </a:r>
+            <a:endParaRPr b="1" sz="1600">
+              <a:solidFill>
+                <a:srgbClr val="24292E"/>
+              </a:solidFill>
+              <a:highlight>
+                <a:srgbClr val="FFFFFF"/>
+              </a:highlight>
+            </a:endParaRPr>
+          </a:p>
+          <a:p>
+            <a:pPr indent="-330200" lvl="0" marL="457200" rtl="0" algn="l">
+              <a:lnSpc>
+                <a:spcPct val="115000"/>
+              </a:lnSpc>
+              <a:spcBef>
+                <a:spcPts val="0"/>
+              </a:spcBef>
+              <a:spcAft>
+                <a:spcPts val="0"/>
+              </a:spcAft>
+              <a:buClr>
+                <a:srgbClr val="24292E"/>
+              </a:buClr>
+              <a:buSzPts val="1600"/>
+              <a:buChar char="●"/>
+            </a:pPr>
+            <a:r>
+              <a:rPr lang="en" sz="1600">
+                <a:solidFill>
+                  <a:srgbClr val="24292E"/>
+                </a:solidFill>
+                <a:highlight>
+                  <a:srgbClr val="FFFFFF"/>
+                </a:highlight>
+              </a:rPr>
+              <a:t>Connect our dashboard to a webpage </a:t>
+            </a:r>
+            <a:endParaRPr sz="1600">
               <a:solidFill>
                 <a:srgbClr val="24292E"/>
               </a:solidFill>
@@ -10087,6 +10403,47 @@
           </a:ln>
         </p:spPr>
       </p:pic>
+      <p:pic>
+        <p:nvPicPr>
+          <p:cNvPr id="168" name="Google Shape;168;p24"/>
+          <p:cNvPicPr preferRelativeResize="0"/>
+          <p:nvPr/>
+        </p:nvPicPr>
+        <p:blipFill>
+          <a:blip r:embed="rId4">
+            <a:alphaModFix/>
+          </a:blip>
+          <a:stretch>
+            <a:fillRect/>
+          </a:stretch>
+        </p:blipFill>
+        <p:spPr>
+          <a:xfrm>
+            <a:off x="4572000" y="1603850"/>
+            <a:ext cx="4333051" cy="3059375"/>
+          </a:xfrm>
+          <a:prstGeom prst="rect">
+            <a:avLst/>
+          </a:prstGeom>
+          <a:noFill/>
+          <a:ln cap="flat" cmpd="sng" w="9525">
+            <a:solidFill>
+              <a:schemeClr val="dk2"/>
+            </a:solidFill>
+            <a:prstDash val="solid"/>
+            <a:round/>
+            <a:headEnd len="sm" w="sm" type="none"/>
+            <a:tailEnd len="sm" w="sm" type="none"/>
+          </a:ln>
+          <a:effectLst>
+            <a:outerShdw blurRad="57150" rotWithShape="0" algn="bl" dir="5400000" dist="19050">
+              <a:srgbClr val="000000">
+                <a:alpha val="50000"/>
+              </a:srgbClr>
+            </a:outerShdw>
+          </a:effectLst>
+        </p:spPr>
+      </p:pic>
     </p:spTree>
   </p:cSld>
   <p:clrMapOvr>
@@ -10100,7 +10457,7 @@
   <p:cSld>
     <p:spTree>
       <p:nvGrpSpPr>
-        <p:cNvPr id="171" name="Shape 171"/>
+        <p:cNvPr id="172" name="Shape 172"/>
         <p:cNvGrpSpPr/>
         <p:nvPr/>
       </p:nvGrpSpPr>
@@ -10114,7 +10471,7 @@
       </p:grpSpPr>
       <p:sp>
         <p:nvSpPr>
-          <p:cNvPr id="172" name="Google Shape;172;p25"/>
+          <p:cNvPr id="173" name="Google Shape;173;p25"/>
           <p:cNvSpPr txBox="1"/>
           <p:nvPr>
             <p:ph type="title"/>
@@ -10154,7 +10511,7 @@
       </p:sp>
       <p:sp>
         <p:nvSpPr>
-          <p:cNvPr id="173" name="Google Shape;173;p25"/>
+          <p:cNvPr id="174" name="Google Shape;174;p25"/>
           <p:cNvSpPr txBox="1"/>
           <p:nvPr>
             <p:ph idx="12" type="sldNum"/>
@@ -10194,7 +10551,7 @@
       </p:sp>
       <p:pic>
         <p:nvPicPr>
-          <p:cNvPr id="174" name="Google Shape;174;p25"/>
+          <p:cNvPr id="175" name="Google Shape;175;p25"/>
           <p:cNvPicPr preferRelativeResize="0"/>
           <p:nvPr/>
         </p:nvPicPr>
@@ -10222,7 +10579,7 @@
       </p:pic>
       <p:sp>
         <p:nvSpPr>
-          <p:cNvPr id="175" name="Google Shape;175;p25"/>
+          <p:cNvPr id="176" name="Google Shape;176;p25"/>
           <p:cNvSpPr txBox="1"/>
           <p:nvPr/>
         </p:nvSpPr>
@@ -10513,7 +10870,7 @@
       </p:sp>
       <p:pic>
         <p:nvPicPr>
-          <p:cNvPr id="176" name="Google Shape;176;p25"/>
+          <p:cNvPr id="177" name="Google Shape;177;p25"/>
           <p:cNvPicPr preferRelativeResize="0"/>
           <p:nvPr/>
         </p:nvPicPr>
@@ -10541,7 +10898,7 @@
       </p:pic>
       <p:pic>
         <p:nvPicPr>
-          <p:cNvPr id="177" name="Google Shape;177;p25"/>
+          <p:cNvPr id="178" name="Google Shape;178;p25"/>
           <p:cNvPicPr preferRelativeResize="0"/>
           <p:nvPr/>
         </p:nvPicPr>
@@ -10568,7 +10925,7 @@
       </p:pic>
       <p:pic>
         <p:nvPicPr>
-          <p:cNvPr id="178" name="Google Shape;178;p25"/>
+          <p:cNvPr id="179" name="Google Shape;179;p25"/>
           <p:cNvPicPr preferRelativeResize="0"/>
           <p:nvPr/>
         </p:nvPicPr>
@@ -10595,7 +10952,7 @@
       </p:pic>
       <p:pic>
         <p:nvPicPr>
-          <p:cNvPr id="179" name="Google Shape;179;p25"/>
+          <p:cNvPr id="180" name="Google Shape;180;p25"/>
           <p:cNvPicPr preferRelativeResize="0"/>
           <p:nvPr/>
         </p:nvPicPr>
@@ -10634,7 +10991,7 @@
   <p:cSld>
     <p:spTree>
       <p:nvGrpSpPr>
-        <p:cNvPr id="183" name="Shape 183"/>
+        <p:cNvPr id="184" name="Shape 184"/>
         <p:cNvGrpSpPr/>
         <p:nvPr/>
       </p:nvGrpSpPr>
@@ -10648,7 +11005,7 @@
       </p:grpSpPr>
       <p:sp>
         <p:nvSpPr>
-          <p:cNvPr id="184" name="Google Shape;184;p26"/>
+          <p:cNvPr id="185" name="Google Shape;185;p26"/>
           <p:cNvSpPr txBox="1"/>
           <p:nvPr>
             <p:ph type="ctrTitle"/>
@@ -10704,7 +11061,7 @@
       </p:sp>
       <p:pic>
         <p:nvPicPr>
-          <p:cNvPr id="185" name="Google Shape;185;p26"/>
+          <p:cNvPr id="186" name="Google Shape;186;p26"/>
           <p:cNvPicPr preferRelativeResize="0"/>
           <p:nvPr/>
         </p:nvPicPr>
@@ -11213,7 +11570,7 @@
         <p:spPr>
           <a:xfrm>
             <a:off x="165600" y="1659925"/>
-            <a:ext cx="4558800" cy="2955300"/>
+            <a:ext cx="4558800" cy="2806500"/>
           </a:xfrm>
           <a:prstGeom prst="rect">
             <a:avLst/>
@@ -11250,27 +11607,12 @@
             <a:endParaRPr sz="1800"/>
           </a:p>
           <a:p>
-            <a:pPr indent="0" lvl="0" marL="457200" rtl="0" algn="l">
-              <a:spcBef>
-                <a:spcPts val="0"/>
-              </a:spcBef>
-              <a:spcAft>
-                <a:spcPts val="0"/>
-              </a:spcAft>
-              <a:buNone/>
-            </a:pPr>
-            <a:r>
-              <a:t/>
-            </a:r>
-            <a:endParaRPr sz="1800"/>
-          </a:p>
-          <a:p>
             <a:pPr indent="-342900" lvl="0" marL="457200" rtl="0" algn="l">
               <a:spcBef>
-                <a:spcPts val="0"/>
-              </a:spcBef>
-              <a:spcAft>
-                <a:spcPts val="0"/>
+                <a:spcPts val="1000"/>
+              </a:spcBef>
+              <a:spcAft>
+                <a:spcPts val="1000"/>
               </a:spcAft>
               <a:buSzPts val="1800"/>
               <a:buFont typeface="Roboto"/>
@@ -12125,7 +12467,7 @@
         <p:spPr>
           <a:xfrm>
             <a:off x="206700" y="1356900"/>
-            <a:ext cx="4516500" cy="3714300"/>
+            <a:ext cx="4516500" cy="3340200"/>
           </a:xfrm>
           <a:prstGeom prst="rect">
             <a:avLst/>
@@ -12143,7 +12485,7 @@
           <a:p>
             <a:pPr indent="0" lvl="0" marL="0" rtl="0" algn="l">
               <a:lnSpc>
-                <a:spcPct val="115000"/>
+                <a:spcPct val="100000"/>
               </a:lnSpc>
               <a:spcBef>
                 <a:spcPts val="300"/>
@@ -12170,7 +12512,7 @@
           <a:p>
             <a:pPr indent="-342900" lvl="0" marL="457200" rtl="0" algn="l">
               <a:lnSpc>
-                <a:spcPct val="115000"/>
+                <a:spcPct val="100000"/>
               </a:lnSpc>
               <a:spcBef>
                 <a:spcPts val="1000"/>
@@ -12209,7 +12551,7 @@
           <a:p>
             <a:pPr indent="-342900" lvl="0" marL="457200" rtl="0" algn="l">
               <a:lnSpc>
-                <a:spcPct val="115000"/>
+                <a:spcPct val="100000"/>
               </a:lnSpc>
               <a:spcBef>
                 <a:spcPts val="0"/>
@@ -12240,7 +12582,7 @@
           <a:p>
             <a:pPr indent="0" lvl="0" marL="0" rtl="0" algn="l">
               <a:lnSpc>
-                <a:spcPct val="115000"/>
+                <a:spcPct val="100000"/>
               </a:lnSpc>
               <a:spcBef>
                 <a:spcPts val="1000"/>
@@ -12275,7 +12617,7 @@
           <a:p>
             <a:pPr indent="-342900" lvl="0" marL="457200" rtl="0" algn="l">
               <a:lnSpc>
-                <a:spcPct val="115000"/>
+                <a:spcPct val="100000"/>
               </a:lnSpc>
               <a:spcBef>
                 <a:spcPts val="1000"/>
@@ -12320,7 +12662,7 @@
           <a:p>
             <a:pPr indent="-342900" lvl="0" marL="457200" rtl="0" algn="l">
               <a:lnSpc>
-                <a:spcPct val="115000"/>
+                <a:spcPct val="100000"/>
               </a:lnSpc>
               <a:spcBef>
                 <a:spcPts val="0"/>
@@ -12437,7 +12779,7 @@
         </p:blipFill>
         <p:spPr>
           <a:xfrm>
-            <a:off x="4751275" y="1483500"/>
+            <a:off x="4640875" y="2141863"/>
             <a:ext cx="4267200" cy="1839570"/>
           </a:xfrm>
           <a:prstGeom prst="rect">
@@ -12538,7 +12880,7 @@
         <p:spPr>
           <a:xfrm>
             <a:off x="311725" y="2330025"/>
-            <a:ext cx="3127500" cy="2298000"/>
+            <a:ext cx="3127500" cy="483600"/>
           </a:xfrm>
           <a:prstGeom prst="rect">
             <a:avLst/>
@@ -12546,11 +12888,11 @@
         </p:spPr>
         <p:txBody>
           <a:bodyPr anchorCtr="0" anchor="t" bIns="91425" lIns="91425" spcFirstLastPara="1" rIns="91425" wrap="square" tIns="91425">
-            <a:normAutofit/>
+            <a:noAutofit/>
           </a:bodyPr>
           <a:lstStyle/>
           <a:p>
-            <a:pPr indent="0" lvl="0" marL="0" rtl="0" algn="l">
+            <a:pPr indent="0" lvl="0" marL="0" rtl="0" algn="ctr">
               <a:spcBef>
                 <a:spcPts val="0"/>
               </a:spcBef>
@@ -12560,15 +12902,19 @@
               <a:buNone/>
             </a:pPr>
             <a:r>
-              <a:rPr lang="en" sz="1800">
+              <a:rPr lang="en" sz="2000" u="sng">
+                <a:solidFill>
+                  <a:schemeClr val="hlink"/>
+                </a:solidFill>
                 <a:latin typeface="Arial"/>
                 <a:ea typeface="Arial"/>
                 <a:cs typeface="Arial"/>
                 <a:sym typeface="Arial"/>
+                <a:hlinkClick r:id="rId3"/>
               </a:rPr>
-              <a:t>https://public.tableau.com/views/Vaccine_Hesitancy_Project/Story1?:language=en-US&amp;:display_count=n&amp;:origin=viz_share_link</a:t>
-            </a:r>
-            <a:endParaRPr sz="1800">
+              <a:t>Tableau Dashboard Link</a:t>
+            </a:r>
+            <a:endParaRPr sz="2000">
               <a:latin typeface="Arial"/>
               <a:ea typeface="Arial"/>
               <a:cs typeface="Arial"/>
@@ -12624,7 +12970,7 @@
           <p:nvPr/>
         </p:nvPicPr>
         <p:blipFill>
-          <a:blip r:embed="rId3">
+          <a:blip r:embed="rId4">
             <a:alphaModFix/>
           </a:blip>
           <a:stretch>
@@ -12665,7 +13011,7 @@
           <p:nvPr/>
         </p:nvPicPr>
         <p:blipFill rotWithShape="1">
-          <a:blip r:embed="rId4">
+          <a:blip r:embed="rId5">
             <a:alphaModFix/>
           </a:blip>
           <a:srcRect b="0" l="0" r="0" t="8600"/>
@@ -12705,7 +13051,7 @@
           <p:nvPr/>
         </p:nvPicPr>
         <p:blipFill>
-          <a:blip r:embed="rId5">
+          <a:blip r:embed="rId6">
             <a:alphaModFix/>
           </a:blip>
           <a:stretch>

</xml_diff>

<commit_message>
Update data analysis section of presentation
</commit_message>
<xml_diff>
--- a/Vaccine Hesitancy Presentation.pptx
+++ b/Vaccine Hesitancy Presentation.pptx
@@ -22,23 +22,24 @@
     <p:sldId id="267" r:id="rId17"/>
     <p:sldId id="268" r:id="rId18"/>
     <p:sldId id="269" r:id="rId19"/>
+    <p:sldId id="270" r:id="rId20"/>
   </p:sldIdLst>
   <p:sldSz cy="5143500" cx="9144000"/>
   <p:notesSz cx="6858000" cy="9144000"/>
   <p:embeddedFontLst>
     <p:embeddedFont>
       <p:font typeface="Roboto"/>
-      <p:regular r:id="rId20"/>
-      <p:bold r:id="rId21"/>
-      <p:italic r:id="rId22"/>
-      <p:boldItalic r:id="rId23"/>
+      <p:regular r:id="rId21"/>
+      <p:bold r:id="rId22"/>
+      <p:italic r:id="rId23"/>
+      <p:boldItalic r:id="rId24"/>
     </p:embeddedFont>
     <p:embeddedFont>
       <p:font typeface="Merriweather"/>
-      <p:regular r:id="rId24"/>
-      <p:bold r:id="rId25"/>
-      <p:italic r:id="rId26"/>
-      <p:boldItalic r:id="rId27"/>
+      <p:regular r:id="rId25"/>
+      <p:bold r:id="rId26"/>
+      <p:italic r:id="rId27"/>
+      <p:boldItalic r:id="rId28"/>
     </p:embeddedFont>
   </p:embeddedFontLst>
   <p:defaultTextStyle>
@@ -877,7 +878,7 @@
       </p:grpSpPr>
       <p:sp>
         <p:nvSpPr>
-          <p:cNvPr id="143" name="Google Shape;143;gda8216b607_2_39:notes"/>
+          <p:cNvPr id="143" name="Google Shape;143;gdee5a9d9ad_1_2:notes"/>
           <p:cNvSpPr/>
           <p:nvPr>
             <p:ph idx="2" type="sldImg"/>
@@ -912,7 +913,7 @@
       </p:sp>
       <p:sp>
         <p:nvSpPr>
-          <p:cNvPr id="144" name="Google Shape;144;gda8216b607_2_39:notes"/>
+          <p:cNvPr id="144" name="Google Shape;144;gdee5a9d9ad_1_2:notes"/>
           <p:cNvSpPr txBox="1"/>
           <p:nvPr>
             <p:ph idx="1" type="body"/>
@@ -947,7 +948,7 @@
                 <a:srgbClr val="24292E"/>
               </a:buClr>
               <a:buSzPts val="1200"/>
-              <a:buChar char="●"/>
+              <a:buAutoNum type="arabicPeriod"/>
             </a:pPr>
             <a:r>
               <a:rPr lang="en" sz="1200">
@@ -955,7 +956,7 @@
                   <a:srgbClr val="24292E"/>
                 </a:solidFill>
               </a:rPr>
-              <a:t>Mean Absolute Error (MAE) - the average measure of error between predicted and actual values</a:t>
+              <a:t>Simple Linear Regression - The data was not split into training and testing datasets. All of the features were used to train the model and provide a predicted target. *benefits and limitations*</a:t>
             </a:r>
             <a:endParaRPr sz="1200">
               <a:solidFill>
@@ -978,7 +979,7 @@
                 <a:srgbClr val="24292E"/>
               </a:buClr>
               <a:buSzPts val="1200"/>
-              <a:buChar char="●"/>
+              <a:buAutoNum type="arabicPeriod"/>
             </a:pPr>
             <a:r>
               <a:rPr lang="en" sz="1200">
@@ -986,12 +987,26 @@
                   <a:srgbClr val="24292E"/>
                 </a:solidFill>
               </a:rPr>
-              <a:t>Mean Squared Error (MSE) - the average squared measure of error between predicted and actual values</a:t>
+              <a:t>Multiple Linear Regression - The data was split into training and testing datasets where 70% of the data was used to train and 30% of the data was used to test the model, providing an extra </a:t>
+            </a:r>
+            <a:r>
+              <a:rPr lang="en" sz="1200">
+                <a:solidFill>
+                  <a:srgbClr val="24292E"/>
+                </a:solidFill>
+                <a:highlight>
+                  <a:srgbClr val="FFFFFF"/>
+                </a:highlight>
+              </a:rPr>
+              <a:t>method of validation and confidence on the regression model predictions</a:t>
             </a:r>
             <a:endParaRPr sz="1200">
               <a:solidFill>
                 <a:srgbClr val="24292E"/>
               </a:solidFill>
+              <a:highlight>
+                <a:srgbClr val="FFFFFF"/>
+              </a:highlight>
             </a:endParaRPr>
           </a:p>
           <a:p>
@@ -1009,51 +1024,26 @@
                 <a:srgbClr val="24292E"/>
               </a:buClr>
               <a:buSzPts val="1200"/>
-              <a:buChar char="●"/>
+              <a:buAutoNum type="arabicPeriod"/>
             </a:pPr>
             <a:r>
               <a:rPr lang="en" sz="1200">
                 <a:solidFill>
                   <a:srgbClr val="24292E"/>
                 </a:solidFill>
+                <a:highlight>
+                  <a:srgbClr val="FFFFFF"/>
+                </a:highlight>
               </a:rPr>
-              <a:t>R Squared Score - coefficient of determination; 'goodness of fit', measures how well the model can predict unseen values</a:t>
+              <a:t>Random Forest Regression - The data was also </a:t>
             </a:r>
             <a:endParaRPr sz="1200">
               <a:solidFill>
                 <a:srgbClr val="24292E"/>
               </a:solidFill>
-            </a:endParaRPr>
-          </a:p>
-          <a:p>
-            <a:pPr indent="-304800" lvl="0" marL="457200" rtl="0" algn="l">
-              <a:lnSpc>
-                <a:spcPct val="115000"/>
-              </a:lnSpc>
-              <a:spcBef>
-                <a:spcPts val="0"/>
-              </a:spcBef>
-              <a:spcAft>
-                <a:spcPts val="0"/>
-              </a:spcAft>
-              <a:buClr>
-                <a:srgbClr val="24292E"/>
-              </a:buClr>
-              <a:buSzPts val="1200"/>
-              <a:buChar char="●"/>
-            </a:pPr>
-            <a:r>
-              <a:rPr lang="en" sz="1200">
-                <a:solidFill>
-                  <a:srgbClr val="24292E"/>
-                </a:solidFill>
-              </a:rPr>
-              <a:t>Explained Variance Score - proportional dispersion of data</a:t>
-            </a:r>
-            <a:endParaRPr sz="1200">
-              <a:solidFill>
-                <a:srgbClr val="24292E"/>
-              </a:solidFill>
+              <a:highlight>
+                <a:srgbClr val="FFFFFF"/>
+              </a:highlight>
             </a:endParaRPr>
           </a:p>
           <a:p>
@@ -1108,7 +1098,7 @@
   <p:cSld>
     <p:spTree>
       <p:nvGrpSpPr>
-        <p:cNvPr id="152" name="Shape 152"/>
+        <p:cNvPr id="150" name="Shape 150"/>
         <p:cNvGrpSpPr/>
         <p:nvPr/>
       </p:nvGrpSpPr>
@@ -1122,7 +1112,7 @@
       </p:grpSpPr>
       <p:sp>
         <p:nvSpPr>
-          <p:cNvPr id="153" name="Google Shape;153;gded4d5debe_0_9:notes"/>
+          <p:cNvPr id="151" name="Google Shape;151;gda8216b607_2_39:notes"/>
           <p:cNvSpPr/>
           <p:nvPr>
             <p:ph idx="2" type="sldImg"/>
@@ -1157,7 +1147,7 @@
       </p:sp>
       <p:sp>
         <p:nvSpPr>
-          <p:cNvPr id="154" name="Google Shape;154;gded4d5debe_0_9:notes"/>
+          <p:cNvPr id="152" name="Google Shape;152;gda8216b607_2_39:notes"/>
           <p:cNvSpPr txBox="1"/>
           <p:nvPr>
             <p:ph idx="1" type="body"/>
@@ -1178,9 +1168,279 @@
           </a:bodyPr>
           <a:lstStyle/>
           <a:p>
+            <a:pPr indent="-304800" lvl="0" marL="457200" rtl="0" algn="l">
+              <a:lnSpc>
+                <a:spcPct val="115000"/>
+              </a:lnSpc>
+              <a:spcBef>
+                <a:spcPts val="0"/>
+              </a:spcBef>
+              <a:spcAft>
+                <a:spcPts val="0"/>
+              </a:spcAft>
+              <a:buClr>
+                <a:srgbClr val="24292E"/>
+              </a:buClr>
+              <a:buSzPts val="1200"/>
+              <a:buChar char="●"/>
+            </a:pPr>
+            <a:r>
+              <a:rPr lang="en" sz="1200">
+                <a:solidFill>
+                  <a:srgbClr val="24292E"/>
+                </a:solidFill>
+              </a:rPr>
+              <a:t>Mean Absolute Error (MAE) - the average measure of error between predicted and actual values</a:t>
+            </a:r>
+            <a:endParaRPr sz="1200">
+              <a:solidFill>
+                <a:srgbClr val="24292E"/>
+              </a:solidFill>
+            </a:endParaRPr>
+          </a:p>
+          <a:p>
+            <a:pPr indent="-304800" lvl="1" marL="914400" rtl="0" algn="l">
+              <a:lnSpc>
+                <a:spcPct val="115000"/>
+              </a:lnSpc>
+              <a:spcBef>
+                <a:spcPts val="0"/>
+              </a:spcBef>
+              <a:spcAft>
+                <a:spcPts val="0"/>
+              </a:spcAft>
+              <a:buClr>
+                <a:srgbClr val="24292E"/>
+              </a:buClr>
+              <a:buSzPts val="1200"/>
+              <a:buAutoNum type="alphaLcPeriod"/>
+            </a:pPr>
+            <a:r>
+              <a:rPr lang="en" sz="1200">
+                <a:solidFill>
+                  <a:srgbClr val="24292E"/>
+                </a:solidFill>
+              </a:rPr>
+              <a:t>Ideally close to 0</a:t>
+            </a:r>
+            <a:endParaRPr sz="1200">
+              <a:solidFill>
+                <a:srgbClr val="24292E"/>
+              </a:solidFill>
+            </a:endParaRPr>
+          </a:p>
+          <a:p>
+            <a:pPr indent="-304800" lvl="0" marL="457200" rtl="0" algn="l">
+              <a:lnSpc>
+                <a:spcPct val="115000"/>
+              </a:lnSpc>
+              <a:spcBef>
+                <a:spcPts val="0"/>
+              </a:spcBef>
+              <a:spcAft>
+                <a:spcPts val="0"/>
+              </a:spcAft>
+              <a:buClr>
+                <a:srgbClr val="24292E"/>
+              </a:buClr>
+              <a:buSzPts val="1200"/>
+              <a:buChar char="●"/>
+            </a:pPr>
+            <a:r>
+              <a:rPr lang="en" sz="1200">
+                <a:solidFill>
+                  <a:srgbClr val="24292E"/>
+                </a:solidFill>
+              </a:rPr>
+              <a:t>Mean Squared Error (MSE) - the average squared measure of error between predicted and actual values</a:t>
+            </a:r>
+            <a:endParaRPr sz="1200">
+              <a:solidFill>
+                <a:srgbClr val="24292E"/>
+              </a:solidFill>
+            </a:endParaRPr>
+          </a:p>
+          <a:p>
+            <a:pPr indent="-304800" lvl="1" marL="914400" rtl="0" algn="l">
+              <a:lnSpc>
+                <a:spcPct val="115000"/>
+              </a:lnSpc>
+              <a:spcBef>
+                <a:spcPts val="0"/>
+              </a:spcBef>
+              <a:spcAft>
+                <a:spcPts val="0"/>
+              </a:spcAft>
+              <a:buClr>
+                <a:srgbClr val="24292E"/>
+              </a:buClr>
+              <a:buSzPts val="1200"/>
+              <a:buAutoNum type="alphaLcPeriod"/>
+            </a:pPr>
+            <a:r>
+              <a:rPr lang="en" sz="1200">
+                <a:solidFill>
+                  <a:srgbClr val="24292E"/>
+                </a:solidFill>
+              </a:rPr>
+              <a:t>Ideally close to 0</a:t>
+            </a:r>
+            <a:endParaRPr sz="1200">
+              <a:solidFill>
+                <a:srgbClr val="24292E"/>
+              </a:solidFill>
+            </a:endParaRPr>
+          </a:p>
+          <a:p>
+            <a:pPr indent="-304800" lvl="0" marL="457200" rtl="0" algn="l">
+              <a:lnSpc>
+                <a:spcPct val="115000"/>
+              </a:lnSpc>
+              <a:spcBef>
+                <a:spcPts val="0"/>
+              </a:spcBef>
+              <a:spcAft>
+                <a:spcPts val="0"/>
+              </a:spcAft>
+              <a:buClr>
+                <a:srgbClr val="24292E"/>
+              </a:buClr>
+              <a:buSzPts val="1200"/>
+              <a:buChar char="●"/>
+            </a:pPr>
+            <a:r>
+              <a:rPr lang="en" sz="1200">
+                <a:solidFill>
+                  <a:srgbClr val="24292E"/>
+                </a:solidFill>
+              </a:rPr>
+              <a:t>R Squared Score - coefficient of determination; 'goodness of fit', measures how well the model can predict unseen values</a:t>
+            </a:r>
+            <a:endParaRPr sz="1200">
+              <a:solidFill>
+                <a:srgbClr val="24292E"/>
+              </a:solidFill>
+            </a:endParaRPr>
+          </a:p>
+          <a:p>
+            <a:pPr indent="-304800" lvl="1" marL="914400" rtl="0" algn="l">
+              <a:lnSpc>
+                <a:spcPct val="115000"/>
+              </a:lnSpc>
+              <a:spcBef>
+                <a:spcPts val="0"/>
+              </a:spcBef>
+              <a:spcAft>
+                <a:spcPts val="0"/>
+              </a:spcAft>
+              <a:buClr>
+                <a:srgbClr val="24292E"/>
+              </a:buClr>
+              <a:buSzPts val="1200"/>
+              <a:buAutoNum type="alphaLcPeriod"/>
+            </a:pPr>
+            <a:r>
+              <a:rPr lang="en" sz="1200">
+                <a:solidFill>
+                  <a:srgbClr val="24292E"/>
+                </a:solidFill>
+              </a:rPr>
+              <a:t>Ideally close to 1</a:t>
+            </a:r>
+            <a:endParaRPr sz="1200">
+              <a:solidFill>
+                <a:srgbClr val="24292E"/>
+              </a:solidFill>
+            </a:endParaRPr>
+          </a:p>
+          <a:p>
+            <a:pPr indent="-304800" lvl="0" marL="457200" rtl="0" algn="l">
+              <a:lnSpc>
+                <a:spcPct val="115000"/>
+              </a:lnSpc>
+              <a:spcBef>
+                <a:spcPts val="0"/>
+              </a:spcBef>
+              <a:spcAft>
+                <a:spcPts val="0"/>
+              </a:spcAft>
+              <a:buClr>
+                <a:srgbClr val="24292E"/>
+              </a:buClr>
+              <a:buSzPts val="1200"/>
+              <a:buChar char="●"/>
+            </a:pPr>
+            <a:r>
+              <a:rPr lang="en" sz="1200">
+                <a:solidFill>
+                  <a:srgbClr val="24292E"/>
+                </a:solidFill>
+              </a:rPr>
+              <a:t>Explained Variance Score - proportional dispersion of data</a:t>
+            </a:r>
+            <a:endParaRPr sz="1200">
+              <a:solidFill>
+                <a:srgbClr val="24292E"/>
+              </a:solidFill>
+            </a:endParaRPr>
+          </a:p>
+          <a:p>
+            <a:pPr indent="-304800" lvl="1" marL="914400" rtl="0" algn="l">
+              <a:lnSpc>
+                <a:spcPct val="115000"/>
+              </a:lnSpc>
+              <a:spcBef>
+                <a:spcPts val="0"/>
+              </a:spcBef>
+              <a:spcAft>
+                <a:spcPts val="0"/>
+              </a:spcAft>
+              <a:buClr>
+                <a:srgbClr val="24292E"/>
+              </a:buClr>
+              <a:buSzPts val="1200"/>
+              <a:buAutoNum type="alphaLcPeriod"/>
+            </a:pPr>
+            <a:r>
+              <a:rPr lang="en" sz="1200">
+                <a:solidFill>
+                  <a:srgbClr val="24292E"/>
+                </a:solidFill>
+              </a:rPr>
+              <a:t>Ideally close to 1</a:t>
+            </a:r>
+            <a:endParaRPr sz="1200">
+              <a:solidFill>
+                <a:srgbClr val="24292E"/>
+              </a:solidFill>
+            </a:endParaRPr>
+          </a:p>
+          <a:p>
             <a:pPr indent="0" lvl="0" marL="0" rtl="0" algn="l">
-              <a:spcBef>
-                <a:spcPts val="0"/>
+              <a:lnSpc>
+                <a:spcPct val="115000"/>
+              </a:lnSpc>
+              <a:spcBef>
+                <a:spcPts val="1200"/>
+              </a:spcBef>
+              <a:spcAft>
+                <a:spcPts val="0"/>
+              </a:spcAft>
+              <a:buNone/>
+            </a:pPr>
+            <a:r>
+              <a:t/>
+            </a:r>
+            <a:endParaRPr sz="1200">
+              <a:solidFill>
+                <a:srgbClr val="24292E"/>
+              </a:solidFill>
+            </a:endParaRPr>
+          </a:p>
+          <a:p>
+            <a:pPr indent="0" lvl="0" marL="0" rtl="0" algn="l">
+              <a:spcBef>
+                <a:spcPts val="1200"/>
               </a:spcBef>
               <a:spcAft>
                 <a:spcPts val="0"/>
@@ -1221,7 +1481,7 @@
       </p:grpSpPr>
       <p:sp>
         <p:nvSpPr>
-          <p:cNvPr id="161" name="Google Shape;161;gded4d5debe_0_22:notes"/>
+          <p:cNvPr id="161" name="Google Shape;161;gded4d5debe_0_9:notes"/>
           <p:cNvSpPr/>
           <p:nvPr>
             <p:ph idx="2" type="sldImg"/>
@@ -1256,7 +1516,7 @@
       </p:sp>
       <p:sp>
         <p:nvSpPr>
-          <p:cNvPr id="162" name="Google Shape;162;gded4d5debe_0_22:notes"/>
+          <p:cNvPr id="162" name="Google Shape;162;gded4d5debe_0_9:notes"/>
           <p:cNvSpPr txBox="1"/>
           <p:nvPr>
             <p:ph idx="1" type="body"/>
@@ -1306,7 +1566,7 @@
   <p:cSld>
     <p:spTree>
       <p:nvGrpSpPr>
-        <p:cNvPr id="169" name="Shape 169"/>
+        <p:cNvPr id="168" name="Shape 168"/>
         <p:cNvGrpSpPr/>
         <p:nvPr/>
       </p:nvGrpSpPr>
@@ -1320,7 +1580,7 @@
       </p:grpSpPr>
       <p:sp>
         <p:nvSpPr>
-          <p:cNvPr id="170" name="Google Shape;170;gded4d5debe_0_16:notes"/>
+          <p:cNvPr id="169" name="Google Shape;169;gded4d5debe_0_22:notes"/>
           <p:cNvSpPr/>
           <p:nvPr>
             <p:ph idx="2" type="sldImg"/>
@@ -1355,7 +1615,7 @@
       </p:sp>
       <p:sp>
         <p:nvSpPr>
-          <p:cNvPr id="171" name="Google Shape;171;gded4d5debe_0_16:notes"/>
+          <p:cNvPr id="170" name="Google Shape;170;gded4d5debe_0_22:notes"/>
           <p:cNvSpPr txBox="1"/>
           <p:nvPr>
             <p:ph idx="1" type="body"/>
@@ -1405,7 +1665,7 @@
   <p:cSld>
     <p:spTree>
       <p:nvGrpSpPr>
-        <p:cNvPr id="181" name="Shape 181"/>
+        <p:cNvPr id="177" name="Shape 177"/>
         <p:cNvGrpSpPr/>
         <p:nvPr/>
       </p:nvGrpSpPr>
@@ -1419,7 +1679,7 @@
       </p:grpSpPr>
       <p:sp>
         <p:nvSpPr>
-          <p:cNvPr id="182" name="Google Shape;182;gda8216b607_2_47:notes"/>
+          <p:cNvPr id="178" name="Google Shape;178;gded4d5debe_0_16:notes"/>
           <p:cNvSpPr/>
           <p:nvPr>
             <p:ph idx="2" type="sldImg"/>
@@ -1454,7 +1714,106 @@
       </p:sp>
       <p:sp>
         <p:nvSpPr>
-          <p:cNvPr id="183" name="Google Shape;183;gda8216b607_2_47:notes"/>
+          <p:cNvPr id="179" name="Google Shape;179;gded4d5debe_0_16:notes"/>
+          <p:cNvSpPr txBox="1"/>
+          <p:nvPr>
+            <p:ph idx="1" type="body"/>
+          </p:nvPr>
+        </p:nvSpPr>
+        <p:spPr>
+          <a:xfrm>
+            <a:off x="685800" y="4343400"/>
+            <a:ext cx="5486400" cy="4114800"/>
+          </a:xfrm>
+          <a:prstGeom prst="rect">
+            <a:avLst/>
+          </a:prstGeom>
+        </p:spPr>
+        <p:txBody>
+          <a:bodyPr anchorCtr="0" anchor="t" bIns="91425" lIns="91425" spcFirstLastPara="1" rIns="91425" wrap="square" tIns="91425">
+            <a:noAutofit/>
+          </a:bodyPr>
+          <a:lstStyle/>
+          <a:p>
+            <a:pPr indent="0" lvl="0" marL="0" rtl="0" algn="l">
+              <a:spcBef>
+                <a:spcPts val="0"/>
+              </a:spcBef>
+              <a:spcAft>
+                <a:spcPts val="0"/>
+              </a:spcAft>
+              <a:buNone/>
+            </a:pPr>
+            <a:r>
+              <a:t/>
+            </a:r>
+            <a:endParaRPr/>
+          </a:p>
+        </p:txBody>
+      </p:sp>
+    </p:spTree>
+  </p:cSld>
+  <p:clrMapOvr>
+    <a:masterClrMapping/>
+  </p:clrMapOvr>
+</p:notes>
+</file>
+
+<file path=ppt/notesSlides/notesSlide15.xml><?xml version="1.0" encoding="utf-8"?>
+<p:notes xmlns:a="http://schemas.openxmlformats.org/drawingml/2006/main" xmlns:r="http://schemas.openxmlformats.org/officeDocument/2006/relationships" xmlns:mc="http://schemas.openxmlformats.org/markup-compatibility/2006" xmlns:mv="urn:schemas-microsoft-com:mac:vml" xmlns:p="http://schemas.openxmlformats.org/presentationml/2006/main" xmlns:c="http://schemas.openxmlformats.org/drawingml/2006/chart" xmlns:dgm="http://schemas.openxmlformats.org/drawingml/2006/diagram" xmlns:o="urn:schemas-microsoft-com:office:office" xmlns:v="urn:schemas-microsoft-com:vml" xmlns:pvml="urn:schemas-microsoft-com:office:powerpoint" xmlns:com="http://schemas.openxmlformats.org/drawingml/2006/compatibility" xmlns:p14="http://schemas.microsoft.com/office/powerpoint/2010/main" xmlns:p15="http://schemas.microsoft.com/office/powerpoint/2012/main" xmlns:ahyp="http://schemas.microsoft.com/office/drawing/2018/hyperlinkcolor" showMasterPhAnim="0" showMasterSp="0">
+  <p:cSld>
+    <p:spTree>
+      <p:nvGrpSpPr>
+        <p:cNvPr id="189" name="Shape 189"/>
+        <p:cNvGrpSpPr/>
+        <p:nvPr/>
+      </p:nvGrpSpPr>
+      <p:grpSpPr>
+        <a:xfrm>
+          <a:off x="0" y="0"/>
+          <a:ext cx="0" cy="0"/>
+          <a:chOff x="0" y="0"/>
+          <a:chExt cx="0" cy="0"/>
+        </a:xfrm>
+      </p:grpSpPr>
+      <p:sp>
+        <p:nvSpPr>
+          <p:cNvPr id="190" name="Google Shape;190;gda8216b607_2_47:notes"/>
+          <p:cNvSpPr/>
+          <p:nvPr>
+            <p:ph idx="2" type="sldImg"/>
+          </p:nvPr>
+        </p:nvSpPr>
+        <p:spPr>
+          <a:xfrm>
+            <a:off x="381300" y="685800"/>
+            <a:ext cx="6096000" cy="3429000"/>
+          </a:xfrm>
+          <a:custGeom>
+            <a:rect b="b" l="l" r="r" t="t"/>
+            <a:pathLst>
+              <a:path extrusionOk="0" h="120000" w="120000">
+                <a:moveTo>
+                  <a:pt x="0" y="0"/>
+                </a:moveTo>
+                <a:lnTo>
+                  <a:pt x="120000" y="0"/>
+                </a:lnTo>
+                <a:lnTo>
+                  <a:pt x="120000" y="120000"/>
+                </a:lnTo>
+                <a:lnTo>
+                  <a:pt x="0" y="120000"/>
+                </a:lnTo>
+                <a:close/>
+              </a:path>
+            </a:pathLst>
+          </a:custGeom>
+        </p:spPr>
+      </p:sp>
+      <p:sp>
+        <p:nvSpPr>
+          <p:cNvPr id="191" name="Google Shape;191;gda8216b607_2_47:notes"/>
           <p:cNvSpPr txBox="1"/>
           <p:nvPr>
             <p:ph idx="1" type="body"/>
@@ -2982,7 +3341,7 @@
                   <a:srgbClr val="24292E"/>
                 </a:solidFill>
               </a:rPr>
-              <a:t>Simple Linear Regression - The data was not split into training and testing datasets. All of the features were used to train the model and provide a predicted target. </a:t>
+              <a:t>Simple Linear Regression - The data was not split into training and testing datasets. All of the features were used to train the model and provide a predicted target. *benefits and limitations*</a:t>
             </a:r>
             <a:endParaRPr sz="1200">
               <a:solidFill>
@@ -3013,12 +3372,63 @@
                   <a:srgbClr val="24292E"/>
                 </a:solidFill>
               </a:rPr>
-              <a:t>Multiple Linear Regression - The data was split into training and testing datasets where 70% of the data was used to train and 30% of the data was used to test the model. </a:t>
+              <a:t>Multiple Linear Regression - The data was split into training and testing datasets where 70% of the data was used to train and 30% of the data was used to test the model, providing an extra </a:t>
+            </a:r>
+            <a:r>
+              <a:rPr lang="en" sz="1200">
+                <a:solidFill>
+                  <a:srgbClr val="24292E"/>
+                </a:solidFill>
+                <a:highlight>
+                  <a:srgbClr val="FFFFFF"/>
+                </a:highlight>
+              </a:rPr>
+              <a:t>method of validation and confidence on the regression model predictions</a:t>
             </a:r>
             <a:endParaRPr sz="1200">
               <a:solidFill>
                 <a:srgbClr val="24292E"/>
               </a:solidFill>
+              <a:highlight>
+                <a:srgbClr val="FFFFFF"/>
+              </a:highlight>
+            </a:endParaRPr>
+          </a:p>
+          <a:p>
+            <a:pPr indent="-304800" lvl="0" marL="457200" rtl="0" algn="l">
+              <a:lnSpc>
+                <a:spcPct val="115000"/>
+              </a:lnSpc>
+              <a:spcBef>
+                <a:spcPts val="0"/>
+              </a:spcBef>
+              <a:spcAft>
+                <a:spcPts val="0"/>
+              </a:spcAft>
+              <a:buClr>
+                <a:srgbClr val="24292E"/>
+              </a:buClr>
+              <a:buSzPts val="1200"/>
+              <a:buAutoNum type="arabicPeriod"/>
+            </a:pPr>
+            <a:r>
+              <a:rPr lang="en" sz="1200">
+                <a:solidFill>
+                  <a:srgbClr val="24292E"/>
+                </a:solidFill>
+                <a:highlight>
+                  <a:srgbClr val="FFFFFF"/>
+                </a:highlight>
+              </a:rPr>
+              <a:t>Random Forest Regression - The data was also </a:t>
+            </a:r>
+            <a:endParaRPr sz="1200">
+              <a:solidFill>
+                <a:srgbClr val="24292E"/>
+              </a:solidFill>
+              <a:highlight>
+                <a:srgbClr val="FFFFFF"/>
+              </a:highlight>
             </a:endParaRPr>
           </a:p>
           <a:p>
@@ -9510,7 +9920,7 @@
             </a:pPr>
             <a:r>
               <a:rPr lang="en"/>
-              <a:t>Data Analysis - Results</a:t>
+              <a:t>Data Analysis - Benefits and Limitations</a:t>
             </a:r>
             <a:endParaRPr/>
           </a:p>
@@ -9600,6 +10010,167 @@
         </p:blipFill>
         <p:spPr>
           <a:xfrm>
+            <a:off x="943875" y="1355575"/>
+            <a:ext cx="7256249" cy="3611976"/>
+          </a:xfrm>
+          <a:prstGeom prst="rect">
+            <a:avLst/>
+          </a:prstGeom>
+          <a:noFill/>
+          <a:ln>
+            <a:noFill/>
+          </a:ln>
+        </p:spPr>
+      </p:pic>
+    </p:spTree>
+  </p:cSld>
+  <p:clrMapOvr>
+    <a:masterClrMapping/>
+  </p:clrMapOvr>
+</p:sld>
+</file>
+
+<file path=ppt/slides/slide11.xml><?xml version="1.0" encoding="utf-8"?>
+<p:sld xmlns:a="http://schemas.openxmlformats.org/drawingml/2006/main" xmlns:r="http://schemas.openxmlformats.org/officeDocument/2006/relationships" xmlns:mc="http://schemas.openxmlformats.org/markup-compatibility/2006" xmlns:mv="urn:schemas-microsoft-com:mac:vml" xmlns:p="http://schemas.openxmlformats.org/presentationml/2006/main" xmlns:c="http://schemas.openxmlformats.org/drawingml/2006/chart" xmlns:dgm="http://schemas.openxmlformats.org/drawingml/2006/diagram" xmlns:o="urn:schemas-microsoft-com:office:office" xmlns:v="urn:schemas-microsoft-com:vml" xmlns:pvml="urn:schemas-microsoft-com:office:powerpoint" xmlns:com="http://schemas.openxmlformats.org/drawingml/2006/compatibility" xmlns:p14="http://schemas.microsoft.com/office/powerpoint/2010/main" xmlns:p15="http://schemas.microsoft.com/office/powerpoint/2012/main" xmlns:ahyp="http://schemas.microsoft.com/office/drawing/2018/hyperlinkcolor">
+  <p:cSld>
+    <p:spTree>
+      <p:nvGrpSpPr>
+        <p:cNvPr id="153" name="Shape 153"/>
+        <p:cNvGrpSpPr/>
+        <p:nvPr/>
+      </p:nvGrpSpPr>
+      <p:grpSpPr>
+        <a:xfrm>
+          <a:off x="0" y="0"/>
+          <a:ext cx="0" cy="0"/>
+          <a:chOff x="0" y="0"/>
+          <a:chExt cx="0" cy="0"/>
+        </a:xfrm>
+      </p:grpSpPr>
+      <p:sp>
+        <p:nvSpPr>
+          <p:cNvPr id="154" name="Google Shape;154;p23"/>
+          <p:cNvSpPr txBox="1"/>
+          <p:nvPr>
+            <p:ph type="title"/>
+          </p:nvPr>
+        </p:nvSpPr>
+        <p:spPr>
+          <a:xfrm>
+            <a:off x="311725" y="500925"/>
+            <a:ext cx="8520600" cy="623700"/>
+          </a:xfrm>
+          <a:prstGeom prst="rect">
+            <a:avLst/>
+          </a:prstGeom>
+        </p:spPr>
+        <p:txBody>
+          <a:bodyPr anchorCtr="0" anchor="t" bIns="91425" lIns="91425" spcFirstLastPara="1" rIns="91425" wrap="square" tIns="91425">
+            <a:normAutofit/>
+          </a:bodyPr>
+          <a:lstStyle/>
+          <a:p>
+            <a:pPr indent="0" lvl="0" marL="0" rtl="0" algn="l">
+              <a:spcBef>
+                <a:spcPts val="0"/>
+              </a:spcBef>
+              <a:spcAft>
+                <a:spcPts val="0"/>
+              </a:spcAft>
+              <a:buNone/>
+            </a:pPr>
+            <a:r>
+              <a:rPr lang="en"/>
+              <a:t>Data Analysis - Results</a:t>
+            </a:r>
+            <a:endParaRPr/>
+          </a:p>
+        </p:txBody>
+      </p:sp>
+      <p:sp>
+        <p:nvSpPr>
+          <p:cNvPr id="155" name="Google Shape;155;p23"/>
+          <p:cNvSpPr txBox="1"/>
+          <p:nvPr>
+            <p:ph idx="12" type="sldNum"/>
+          </p:nvPr>
+        </p:nvSpPr>
+        <p:spPr>
+          <a:xfrm>
+            <a:off x="8472458" y="4663217"/>
+            <a:ext cx="548700" cy="393600"/>
+          </a:xfrm>
+          <a:prstGeom prst="rect">
+            <a:avLst/>
+          </a:prstGeom>
+        </p:spPr>
+        <p:txBody>
+          <a:bodyPr anchorCtr="0" anchor="ctr" bIns="91425" lIns="91425" spcFirstLastPara="1" rIns="91425" wrap="square" tIns="91425">
+            <a:normAutofit/>
+          </a:bodyPr>
+          <a:lstStyle/>
+          <a:p>
+            <a:pPr indent="0" lvl="0" marL="0" rtl="0" algn="r">
+              <a:spcBef>
+                <a:spcPts val="0"/>
+              </a:spcBef>
+              <a:spcAft>
+                <a:spcPts val="0"/>
+              </a:spcAft>
+              <a:buNone/>
+            </a:pPr>
+            <a:fld id="{00000000-1234-1234-1234-123412341234}" type="slidenum">
+              <a:rPr lang="en"/>
+              <a:t>‹#›</a:t>
+            </a:fld>
+            <a:endParaRPr/>
+          </a:p>
+        </p:txBody>
+      </p:sp>
+      <p:pic>
+        <p:nvPicPr>
+          <p:cNvPr id="156" name="Google Shape;156;p23"/>
+          <p:cNvPicPr preferRelativeResize="0"/>
+          <p:nvPr/>
+        </p:nvPicPr>
+        <p:blipFill>
+          <a:blip r:embed="rId3">
+            <a:alphaModFix/>
+          </a:blip>
+          <a:stretch>
+            <a:fillRect/>
+          </a:stretch>
+        </p:blipFill>
+        <p:spPr>
+          <a:xfrm>
+            <a:off x="7808775" y="124650"/>
+            <a:ext cx="1057301" cy="1057301"/>
+          </a:xfrm>
+          <a:prstGeom prst="rect">
+            <a:avLst/>
+          </a:prstGeom>
+          <a:noFill/>
+          <a:ln>
+            <a:noFill/>
+          </a:ln>
+        </p:spPr>
+      </p:pic>
+      <p:pic>
+        <p:nvPicPr>
+          <p:cNvPr id="157" name="Google Shape;157;p23"/>
+          <p:cNvPicPr preferRelativeResize="0"/>
+          <p:nvPr/>
+        </p:nvPicPr>
+        <p:blipFill>
+          <a:blip r:embed="rId4">
+            <a:alphaModFix/>
+          </a:blip>
+          <a:stretch>
+            <a:fillRect/>
+          </a:stretch>
+        </p:blipFill>
+        <p:spPr>
+          <a:xfrm>
             <a:off x="228600" y="1353225"/>
             <a:ext cx="4280759" cy="3714075"/>
           </a:xfrm>
@@ -9627,7 +10198,7 @@
       </p:pic>
       <p:sp>
         <p:nvSpPr>
-          <p:cNvPr id="150" name="Google Shape;150;p22"/>
+          <p:cNvPr id="158" name="Google Shape;158;p23"/>
           <p:cNvSpPr txBox="1"/>
           <p:nvPr/>
         </p:nvSpPr>
@@ -9717,7 +10288,7 @@
       </p:sp>
       <p:sp>
         <p:nvSpPr>
-          <p:cNvPr id="151" name="Google Shape;151;p22"/>
+          <p:cNvPr id="159" name="Google Shape;159;p23"/>
           <p:cNvSpPr/>
           <p:nvPr/>
         </p:nvSpPr>
@@ -9762,167 +10333,6 @@
           </a:p>
         </p:txBody>
       </p:sp>
-    </p:spTree>
-  </p:cSld>
-  <p:clrMapOvr>
-    <a:masterClrMapping/>
-  </p:clrMapOvr>
-</p:sld>
-</file>
-
-<file path=ppt/slides/slide11.xml><?xml version="1.0" encoding="utf-8"?>
-<p:sld xmlns:a="http://schemas.openxmlformats.org/drawingml/2006/main" xmlns:r="http://schemas.openxmlformats.org/officeDocument/2006/relationships" xmlns:mc="http://schemas.openxmlformats.org/markup-compatibility/2006" xmlns:mv="urn:schemas-microsoft-com:mac:vml" xmlns:p="http://schemas.openxmlformats.org/presentationml/2006/main" xmlns:c="http://schemas.openxmlformats.org/drawingml/2006/chart" xmlns:dgm="http://schemas.openxmlformats.org/drawingml/2006/diagram" xmlns:o="urn:schemas-microsoft-com:office:office" xmlns:v="urn:schemas-microsoft-com:vml" xmlns:pvml="urn:schemas-microsoft-com:office:powerpoint" xmlns:com="http://schemas.openxmlformats.org/drawingml/2006/compatibility" xmlns:p14="http://schemas.microsoft.com/office/powerpoint/2010/main" xmlns:p15="http://schemas.microsoft.com/office/powerpoint/2012/main" xmlns:ahyp="http://schemas.microsoft.com/office/drawing/2018/hyperlinkcolor">
-  <p:cSld>
-    <p:spTree>
-      <p:nvGrpSpPr>
-        <p:cNvPr id="155" name="Shape 155"/>
-        <p:cNvGrpSpPr/>
-        <p:nvPr/>
-      </p:nvGrpSpPr>
-      <p:grpSpPr>
-        <a:xfrm>
-          <a:off x="0" y="0"/>
-          <a:ext cx="0" cy="0"/>
-          <a:chOff x="0" y="0"/>
-          <a:chExt cx="0" cy="0"/>
-        </a:xfrm>
-      </p:grpSpPr>
-      <p:sp>
-        <p:nvSpPr>
-          <p:cNvPr id="156" name="Google Shape;156;p23"/>
-          <p:cNvSpPr txBox="1"/>
-          <p:nvPr>
-            <p:ph type="title"/>
-          </p:nvPr>
-        </p:nvSpPr>
-        <p:spPr>
-          <a:xfrm>
-            <a:off x="311725" y="500925"/>
-            <a:ext cx="8520600" cy="623700"/>
-          </a:xfrm>
-          <a:prstGeom prst="rect">
-            <a:avLst/>
-          </a:prstGeom>
-        </p:spPr>
-        <p:txBody>
-          <a:bodyPr anchorCtr="0" anchor="t" bIns="91425" lIns="91425" spcFirstLastPara="1" rIns="91425" wrap="square" tIns="91425">
-            <a:normAutofit/>
-          </a:bodyPr>
-          <a:lstStyle/>
-          <a:p>
-            <a:pPr indent="0" lvl="0" marL="0" rtl="0" algn="l">
-              <a:spcBef>
-                <a:spcPts val="0"/>
-              </a:spcBef>
-              <a:spcAft>
-                <a:spcPts val="0"/>
-              </a:spcAft>
-              <a:buNone/>
-            </a:pPr>
-            <a:r>
-              <a:rPr lang="en"/>
-              <a:t>Conclusion</a:t>
-            </a:r>
-            <a:endParaRPr/>
-          </a:p>
-        </p:txBody>
-      </p:sp>
-      <p:sp>
-        <p:nvSpPr>
-          <p:cNvPr id="157" name="Google Shape;157;p23"/>
-          <p:cNvSpPr txBox="1"/>
-          <p:nvPr>
-            <p:ph idx="12" type="sldNum"/>
-          </p:nvPr>
-        </p:nvSpPr>
-        <p:spPr>
-          <a:xfrm>
-            <a:off x="8472458" y="4663217"/>
-            <a:ext cx="548700" cy="393600"/>
-          </a:xfrm>
-          <a:prstGeom prst="rect">
-            <a:avLst/>
-          </a:prstGeom>
-        </p:spPr>
-        <p:txBody>
-          <a:bodyPr anchorCtr="0" anchor="ctr" bIns="91425" lIns="91425" spcFirstLastPara="1" rIns="91425" wrap="square" tIns="91425">
-            <a:normAutofit/>
-          </a:bodyPr>
-          <a:lstStyle/>
-          <a:p>
-            <a:pPr indent="0" lvl="0" marL="0" rtl="0" algn="r">
-              <a:spcBef>
-                <a:spcPts val="0"/>
-              </a:spcBef>
-              <a:spcAft>
-                <a:spcPts val="0"/>
-              </a:spcAft>
-              <a:buNone/>
-            </a:pPr>
-            <a:fld id="{00000000-1234-1234-1234-123412341234}" type="slidenum">
-              <a:rPr lang="en"/>
-              <a:t>‹#›</a:t>
-            </a:fld>
-            <a:endParaRPr/>
-          </a:p>
-        </p:txBody>
-      </p:sp>
-      <p:pic>
-        <p:nvPicPr>
-          <p:cNvPr id="158" name="Google Shape;158;p23"/>
-          <p:cNvPicPr preferRelativeResize="0"/>
-          <p:nvPr/>
-        </p:nvPicPr>
-        <p:blipFill>
-          <a:blip r:embed="rId3">
-            <a:alphaModFix/>
-          </a:blip>
-          <a:stretch>
-            <a:fillRect/>
-          </a:stretch>
-        </p:blipFill>
-        <p:spPr>
-          <a:xfrm>
-            <a:off x="7808775" y="124650"/>
-            <a:ext cx="1057301" cy="1057301"/>
-          </a:xfrm>
-          <a:prstGeom prst="rect">
-            <a:avLst/>
-          </a:prstGeom>
-          <a:noFill/>
-          <a:ln>
-            <a:noFill/>
-          </a:ln>
-        </p:spPr>
-      </p:pic>
-      <p:pic>
-        <p:nvPicPr>
-          <p:cNvPr id="159" name="Google Shape;159;p23"/>
-          <p:cNvPicPr preferRelativeResize="0"/>
-          <p:nvPr/>
-        </p:nvPicPr>
-        <p:blipFill>
-          <a:blip r:embed="rId4">
-            <a:alphaModFix/>
-          </a:blip>
-          <a:stretch>
-            <a:fillRect/>
-          </a:stretch>
-        </p:blipFill>
-        <p:spPr>
-          <a:xfrm>
-            <a:off x="914600" y="1342750"/>
-            <a:ext cx="7242935" cy="3714076"/>
-          </a:xfrm>
-          <a:prstGeom prst="rect">
-            <a:avLst/>
-          </a:prstGeom>
-          <a:noFill/>
-          <a:ln>
-            <a:noFill/>
-          </a:ln>
-        </p:spPr>
-      </p:pic>
     </p:spTree>
   </p:cSld>
   <p:clrMapOvr>
@@ -9982,7 +10392,7 @@
             </a:pPr>
             <a:r>
               <a:rPr lang="en"/>
-              <a:t>Lessons Learned and Next Steps</a:t>
+              <a:t>Conclusion</a:t>
             </a:r>
             <a:endParaRPr/>
           </a:p>
@@ -9991,353 +10401,6 @@
       <p:sp>
         <p:nvSpPr>
           <p:cNvPr id="165" name="Google Shape;165;p24"/>
-          <p:cNvSpPr txBox="1"/>
-          <p:nvPr/>
-        </p:nvSpPr>
-        <p:spPr>
-          <a:xfrm>
-            <a:off x="82375" y="1314000"/>
-            <a:ext cx="4557900" cy="3829500"/>
-          </a:xfrm>
-          <a:prstGeom prst="rect">
-            <a:avLst/>
-          </a:prstGeom>
-          <a:noFill/>
-          <a:ln>
-            <a:noFill/>
-          </a:ln>
-        </p:spPr>
-        <p:txBody>
-          <a:bodyPr anchorCtr="0" anchor="t" bIns="91425" lIns="91425" spcFirstLastPara="1" rIns="91425" wrap="square" tIns="91425">
-            <a:spAutoFit/>
-          </a:bodyPr>
-          <a:lstStyle/>
-          <a:p>
-            <a:pPr indent="0" lvl="0" marL="0" rtl="0" algn="l">
-              <a:lnSpc>
-                <a:spcPct val="115000"/>
-              </a:lnSpc>
-              <a:spcBef>
-                <a:spcPts val="0"/>
-              </a:spcBef>
-              <a:spcAft>
-                <a:spcPts val="0"/>
-              </a:spcAft>
-              <a:buNone/>
-            </a:pPr>
-            <a:r>
-              <a:rPr b="1" lang="en" sz="1600">
-                <a:solidFill>
-                  <a:srgbClr val="24292E"/>
-                </a:solidFill>
-                <a:highlight>
-                  <a:srgbClr val="FFFFFF"/>
-                </a:highlight>
-              </a:rPr>
-              <a:t>Lessons Learned:</a:t>
-            </a:r>
-            <a:endParaRPr b="1" sz="1600">
-              <a:solidFill>
-                <a:srgbClr val="24292E"/>
-              </a:solidFill>
-              <a:highlight>
-                <a:srgbClr val="FFFFFF"/>
-              </a:highlight>
-            </a:endParaRPr>
-          </a:p>
-          <a:p>
-            <a:pPr indent="-330200" lvl="0" marL="457200" rtl="0" algn="l">
-              <a:lnSpc>
-                <a:spcPct val="115000"/>
-              </a:lnSpc>
-              <a:spcBef>
-                <a:spcPts val="0"/>
-              </a:spcBef>
-              <a:spcAft>
-                <a:spcPts val="0"/>
-              </a:spcAft>
-              <a:buClr>
-                <a:srgbClr val="24292E"/>
-              </a:buClr>
-              <a:buSzPts val="1600"/>
-              <a:buChar char="●"/>
-            </a:pPr>
-            <a:r>
-              <a:rPr lang="en" sz="1600">
-                <a:solidFill>
-                  <a:srgbClr val="24292E"/>
-                </a:solidFill>
-                <a:highlight>
-                  <a:srgbClr val="FFFFFF"/>
-                </a:highlight>
-              </a:rPr>
-              <a:t>Differences between classification and regression ML models</a:t>
-            </a:r>
-            <a:endParaRPr sz="1600">
-              <a:solidFill>
-                <a:srgbClr val="24292E"/>
-              </a:solidFill>
-              <a:highlight>
-                <a:srgbClr val="FFFFFF"/>
-              </a:highlight>
-            </a:endParaRPr>
-          </a:p>
-          <a:p>
-            <a:pPr indent="-330200" lvl="0" marL="457200" rtl="0" algn="l">
-              <a:lnSpc>
-                <a:spcPct val="115000"/>
-              </a:lnSpc>
-              <a:spcBef>
-                <a:spcPts val="0"/>
-              </a:spcBef>
-              <a:spcAft>
-                <a:spcPts val="0"/>
-              </a:spcAft>
-              <a:buClr>
-                <a:srgbClr val="24292E"/>
-              </a:buClr>
-              <a:buSzPts val="1600"/>
-              <a:buChar char="●"/>
-            </a:pPr>
-            <a:r>
-              <a:rPr lang="en" sz="1600">
-                <a:solidFill>
-                  <a:srgbClr val="24292E"/>
-                </a:solidFill>
-                <a:highlight>
-                  <a:srgbClr val="FFFFFF"/>
-                </a:highlight>
-              </a:rPr>
-              <a:t>Potentially sacrificing accuracy scores for practical and applicable results</a:t>
-            </a:r>
-            <a:endParaRPr sz="1600">
-              <a:solidFill>
-                <a:srgbClr val="24292E"/>
-              </a:solidFill>
-              <a:highlight>
-                <a:srgbClr val="FFFFFF"/>
-              </a:highlight>
-            </a:endParaRPr>
-          </a:p>
-          <a:p>
-            <a:pPr indent="-330200" lvl="0" marL="457200" rtl="0" algn="l">
-              <a:lnSpc>
-                <a:spcPct val="115000"/>
-              </a:lnSpc>
-              <a:spcBef>
-                <a:spcPts val="0"/>
-              </a:spcBef>
-              <a:spcAft>
-                <a:spcPts val="0"/>
-              </a:spcAft>
-              <a:buClr>
-                <a:srgbClr val="24292E"/>
-              </a:buClr>
-              <a:buSzPts val="1600"/>
-              <a:buChar char="●"/>
-            </a:pPr>
-            <a:r>
-              <a:rPr lang="en" sz="1600">
-                <a:solidFill>
-                  <a:srgbClr val="24292E"/>
-                </a:solidFill>
-                <a:highlight>
-                  <a:srgbClr val="FFFFFF"/>
-                </a:highlight>
-              </a:rPr>
-              <a:t>Determining vaccine hesitancy is complex!</a:t>
-            </a:r>
-            <a:endParaRPr sz="1600">
-              <a:solidFill>
-                <a:srgbClr val="24292E"/>
-              </a:solidFill>
-              <a:highlight>
-                <a:srgbClr val="FFFFFF"/>
-              </a:highlight>
-            </a:endParaRPr>
-          </a:p>
-          <a:p>
-            <a:pPr indent="0" lvl="0" marL="0" rtl="0" algn="l">
-              <a:lnSpc>
-                <a:spcPct val="115000"/>
-              </a:lnSpc>
-              <a:spcBef>
-                <a:spcPts val="0"/>
-              </a:spcBef>
-              <a:spcAft>
-                <a:spcPts val="0"/>
-              </a:spcAft>
-              <a:buNone/>
-            </a:pPr>
-            <a:r>
-              <a:rPr b="1" lang="en" sz="1600">
-                <a:solidFill>
-                  <a:srgbClr val="24292E"/>
-                </a:solidFill>
-                <a:highlight>
-                  <a:srgbClr val="FFFFFF"/>
-                </a:highlight>
-              </a:rPr>
-              <a:t>Considerations:</a:t>
-            </a:r>
-            <a:endParaRPr b="1" sz="1600">
-              <a:solidFill>
-                <a:srgbClr val="24292E"/>
-              </a:solidFill>
-              <a:highlight>
-                <a:srgbClr val="FFFFFF"/>
-              </a:highlight>
-            </a:endParaRPr>
-          </a:p>
-          <a:p>
-            <a:pPr indent="-330200" lvl="0" marL="457200" rtl="0" algn="l">
-              <a:lnSpc>
-                <a:spcPct val="115000"/>
-              </a:lnSpc>
-              <a:spcBef>
-                <a:spcPts val="0"/>
-              </a:spcBef>
-              <a:spcAft>
-                <a:spcPts val="0"/>
-              </a:spcAft>
-              <a:buClr>
-                <a:srgbClr val="24292E"/>
-              </a:buClr>
-              <a:buSzPts val="1600"/>
-              <a:buChar char="●"/>
-            </a:pPr>
-            <a:r>
-              <a:rPr lang="en" sz="1600">
-                <a:solidFill>
-                  <a:srgbClr val="24292E"/>
-                </a:solidFill>
-                <a:highlight>
-                  <a:srgbClr val="FFFFFF"/>
-                </a:highlight>
-              </a:rPr>
-              <a:t>Explore different types of regression models to compare results</a:t>
-            </a:r>
-            <a:endParaRPr sz="1600">
-              <a:solidFill>
-                <a:srgbClr val="24292E"/>
-              </a:solidFill>
-              <a:highlight>
-                <a:srgbClr val="FFFFFF"/>
-              </a:highlight>
-            </a:endParaRPr>
-          </a:p>
-          <a:p>
-            <a:pPr indent="-330200" lvl="0" marL="457200" rtl="0" algn="l">
-              <a:lnSpc>
-                <a:spcPct val="115000"/>
-              </a:lnSpc>
-              <a:spcBef>
-                <a:spcPts val="0"/>
-              </a:spcBef>
-              <a:spcAft>
-                <a:spcPts val="0"/>
-              </a:spcAft>
-              <a:buClr>
-                <a:srgbClr val="24292E"/>
-              </a:buClr>
-              <a:buSzPts val="1600"/>
-              <a:buChar char="●"/>
-            </a:pPr>
-            <a:r>
-              <a:rPr lang="en" sz="1600">
-                <a:solidFill>
-                  <a:srgbClr val="24292E"/>
-                </a:solidFill>
-                <a:highlight>
-                  <a:srgbClr val="FFFFFF"/>
-                </a:highlight>
-              </a:rPr>
-              <a:t>Investigate larger datasets with additional feature inputs</a:t>
-            </a:r>
-            <a:endParaRPr sz="1600">
-              <a:solidFill>
-                <a:srgbClr val="24292E"/>
-              </a:solidFill>
-              <a:highlight>
-                <a:srgbClr val="FFFFFF"/>
-              </a:highlight>
-            </a:endParaRPr>
-          </a:p>
-          <a:p>
-            <a:pPr indent="0" lvl="0" marL="0" rtl="0" algn="l">
-              <a:lnSpc>
-                <a:spcPct val="115000"/>
-              </a:lnSpc>
-              <a:spcBef>
-                <a:spcPts val="0"/>
-              </a:spcBef>
-              <a:spcAft>
-                <a:spcPts val="0"/>
-              </a:spcAft>
-              <a:buNone/>
-            </a:pPr>
-            <a:r>
-              <a:rPr b="1" lang="en" sz="1600">
-                <a:solidFill>
-                  <a:srgbClr val="24292E"/>
-                </a:solidFill>
-                <a:highlight>
-                  <a:srgbClr val="FFFFFF"/>
-                </a:highlight>
-              </a:rPr>
-              <a:t>Next Steps:</a:t>
-            </a:r>
-            <a:endParaRPr b="1" sz="1600">
-              <a:solidFill>
-                <a:srgbClr val="24292E"/>
-              </a:solidFill>
-              <a:highlight>
-                <a:srgbClr val="FFFFFF"/>
-              </a:highlight>
-            </a:endParaRPr>
-          </a:p>
-          <a:p>
-            <a:pPr indent="-330200" lvl="0" marL="457200" rtl="0" algn="l">
-              <a:lnSpc>
-                <a:spcPct val="115000"/>
-              </a:lnSpc>
-              <a:spcBef>
-                <a:spcPts val="0"/>
-              </a:spcBef>
-              <a:spcAft>
-                <a:spcPts val="0"/>
-              </a:spcAft>
-              <a:buClr>
-                <a:srgbClr val="24292E"/>
-              </a:buClr>
-              <a:buSzPts val="1600"/>
-              <a:buChar char="●"/>
-            </a:pPr>
-            <a:r>
-              <a:rPr lang="en" sz="1600">
-                <a:solidFill>
-                  <a:srgbClr val="24292E"/>
-                </a:solidFill>
-                <a:highlight>
-                  <a:srgbClr val="FFFFFF"/>
-                </a:highlight>
-              </a:rPr>
-              <a:t>Connect our dashboard to a webpage </a:t>
-            </a:r>
-            <a:endParaRPr sz="1600">
-              <a:solidFill>
-                <a:srgbClr val="24292E"/>
-              </a:solidFill>
-              <a:highlight>
-                <a:srgbClr val="FFFFFF"/>
-              </a:highlight>
-            </a:endParaRPr>
-          </a:p>
-        </p:txBody>
-      </p:sp>
-      <p:sp>
-        <p:nvSpPr>
-          <p:cNvPr id="166" name="Google Shape;166;p24"/>
           <p:cNvSpPr txBox="1"/>
           <p:nvPr>
             <p:ph idx="12" type="sldNum"/>
@@ -10377,7 +10440,7 @@
       </p:sp>
       <p:pic>
         <p:nvPicPr>
-          <p:cNvPr id="167" name="Google Shape;167;p24"/>
+          <p:cNvPr id="166" name="Google Shape;166;p24"/>
           <p:cNvPicPr preferRelativeResize="0"/>
           <p:nvPr/>
         </p:nvPicPr>
@@ -10405,7 +10468,515 @@
       </p:pic>
       <p:pic>
         <p:nvPicPr>
-          <p:cNvPr id="168" name="Google Shape;168;p24"/>
+          <p:cNvPr id="167" name="Google Shape;167;p24"/>
+          <p:cNvPicPr preferRelativeResize="0"/>
+          <p:nvPr/>
+        </p:nvPicPr>
+        <p:blipFill>
+          <a:blip r:embed="rId4">
+            <a:alphaModFix/>
+          </a:blip>
+          <a:stretch>
+            <a:fillRect/>
+          </a:stretch>
+        </p:blipFill>
+        <p:spPr>
+          <a:xfrm>
+            <a:off x="914600" y="1342750"/>
+            <a:ext cx="7242935" cy="3714076"/>
+          </a:xfrm>
+          <a:prstGeom prst="rect">
+            <a:avLst/>
+          </a:prstGeom>
+          <a:noFill/>
+          <a:ln>
+            <a:noFill/>
+          </a:ln>
+        </p:spPr>
+      </p:pic>
+    </p:spTree>
+  </p:cSld>
+  <p:clrMapOvr>
+    <a:masterClrMapping/>
+  </p:clrMapOvr>
+</p:sld>
+</file>
+
+<file path=ppt/slides/slide13.xml><?xml version="1.0" encoding="utf-8"?>
+<p:sld xmlns:a="http://schemas.openxmlformats.org/drawingml/2006/main" xmlns:r="http://schemas.openxmlformats.org/officeDocument/2006/relationships" xmlns:mc="http://schemas.openxmlformats.org/markup-compatibility/2006" xmlns:mv="urn:schemas-microsoft-com:mac:vml" xmlns:p="http://schemas.openxmlformats.org/presentationml/2006/main" xmlns:c="http://schemas.openxmlformats.org/drawingml/2006/chart" xmlns:dgm="http://schemas.openxmlformats.org/drawingml/2006/diagram" xmlns:o="urn:schemas-microsoft-com:office:office" xmlns:v="urn:schemas-microsoft-com:vml" xmlns:pvml="urn:schemas-microsoft-com:office:powerpoint" xmlns:com="http://schemas.openxmlformats.org/drawingml/2006/compatibility" xmlns:p14="http://schemas.microsoft.com/office/powerpoint/2010/main" xmlns:p15="http://schemas.microsoft.com/office/powerpoint/2012/main" xmlns:ahyp="http://schemas.microsoft.com/office/drawing/2018/hyperlinkcolor">
+  <p:cSld>
+    <p:spTree>
+      <p:nvGrpSpPr>
+        <p:cNvPr id="171" name="Shape 171"/>
+        <p:cNvGrpSpPr/>
+        <p:nvPr/>
+      </p:nvGrpSpPr>
+      <p:grpSpPr>
+        <a:xfrm>
+          <a:off x="0" y="0"/>
+          <a:ext cx="0" cy="0"/>
+          <a:chOff x="0" y="0"/>
+          <a:chExt cx="0" cy="0"/>
+        </a:xfrm>
+      </p:grpSpPr>
+      <p:sp>
+        <p:nvSpPr>
+          <p:cNvPr id="172" name="Google Shape;172;p25"/>
+          <p:cNvSpPr txBox="1"/>
+          <p:nvPr>
+            <p:ph type="title"/>
+          </p:nvPr>
+        </p:nvSpPr>
+        <p:spPr>
+          <a:xfrm>
+            <a:off x="311725" y="500925"/>
+            <a:ext cx="8520600" cy="623700"/>
+          </a:xfrm>
+          <a:prstGeom prst="rect">
+            <a:avLst/>
+          </a:prstGeom>
+        </p:spPr>
+        <p:txBody>
+          <a:bodyPr anchorCtr="0" anchor="t" bIns="91425" lIns="91425" spcFirstLastPara="1" rIns="91425" wrap="square" tIns="91425">
+            <a:normAutofit/>
+          </a:bodyPr>
+          <a:lstStyle/>
+          <a:p>
+            <a:pPr indent="0" lvl="0" marL="0" rtl="0" algn="l">
+              <a:spcBef>
+                <a:spcPts val="0"/>
+              </a:spcBef>
+              <a:spcAft>
+                <a:spcPts val="0"/>
+              </a:spcAft>
+              <a:buNone/>
+            </a:pPr>
+            <a:r>
+              <a:rPr lang="en"/>
+              <a:t>Lessons Learned and Next Steps</a:t>
+            </a:r>
+            <a:endParaRPr/>
+          </a:p>
+        </p:txBody>
+      </p:sp>
+      <p:sp>
+        <p:nvSpPr>
+          <p:cNvPr id="173" name="Google Shape;173;p25"/>
+          <p:cNvSpPr txBox="1"/>
+          <p:nvPr/>
+        </p:nvSpPr>
+        <p:spPr>
+          <a:xfrm>
+            <a:off x="82375" y="1314000"/>
+            <a:ext cx="4557900" cy="3829500"/>
+          </a:xfrm>
+          <a:prstGeom prst="rect">
+            <a:avLst/>
+          </a:prstGeom>
+          <a:noFill/>
+          <a:ln>
+            <a:noFill/>
+          </a:ln>
+        </p:spPr>
+        <p:txBody>
+          <a:bodyPr anchorCtr="0" anchor="t" bIns="91425" lIns="91425" spcFirstLastPara="1" rIns="91425" wrap="square" tIns="91425">
+            <a:spAutoFit/>
+          </a:bodyPr>
+          <a:lstStyle/>
+          <a:p>
+            <a:pPr indent="0" lvl="0" marL="0" rtl="0" algn="l">
+              <a:lnSpc>
+                <a:spcPct val="115000"/>
+              </a:lnSpc>
+              <a:spcBef>
+                <a:spcPts val="0"/>
+              </a:spcBef>
+              <a:spcAft>
+                <a:spcPts val="0"/>
+              </a:spcAft>
+              <a:buNone/>
+            </a:pPr>
+            <a:r>
+              <a:rPr b="1" lang="en" sz="1600">
+                <a:solidFill>
+                  <a:srgbClr val="24292E"/>
+                </a:solidFill>
+                <a:highlight>
+                  <a:srgbClr val="FFFFFF"/>
+                </a:highlight>
+              </a:rPr>
+              <a:t>Lessons Learned:</a:t>
+            </a:r>
+            <a:endParaRPr b="1" sz="1600">
+              <a:solidFill>
+                <a:srgbClr val="24292E"/>
+              </a:solidFill>
+              <a:highlight>
+                <a:srgbClr val="FFFFFF"/>
+              </a:highlight>
+            </a:endParaRPr>
+          </a:p>
+          <a:p>
+            <a:pPr indent="-330200" lvl="0" marL="457200" rtl="0" algn="l">
+              <a:lnSpc>
+                <a:spcPct val="115000"/>
+              </a:lnSpc>
+              <a:spcBef>
+                <a:spcPts val="0"/>
+              </a:spcBef>
+              <a:spcAft>
+                <a:spcPts val="0"/>
+              </a:spcAft>
+              <a:buClr>
+                <a:srgbClr val="24292E"/>
+              </a:buClr>
+              <a:buSzPts val="1600"/>
+              <a:buChar char="●"/>
+            </a:pPr>
+            <a:r>
+              <a:rPr lang="en" sz="1600">
+                <a:solidFill>
+                  <a:srgbClr val="24292E"/>
+                </a:solidFill>
+                <a:highlight>
+                  <a:srgbClr val="FFFFFF"/>
+                </a:highlight>
+              </a:rPr>
+              <a:t>Differences between classification and regression ML models</a:t>
+            </a:r>
+            <a:endParaRPr sz="1600">
+              <a:solidFill>
+                <a:srgbClr val="24292E"/>
+              </a:solidFill>
+              <a:highlight>
+                <a:srgbClr val="FFFFFF"/>
+              </a:highlight>
+            </a:endParaRPr>
+          </a:p>
+          <a:p>
+            <a:pPr indent="-330200" lvl="0" marL="457200" rtl="0" algn="l">
+              <a:lnSpc>
+                <a:spcPct val="115000"/>
+              </a:lnSpc>
+              <a:spcBef>
+                <a:spcPts val="0"/>
+              </a:spcBef>
+              <a:spcAft>
+                <a:spcPts val="0"/>
+              </a:spcAft>
+              <a:buClr>
+                <a:srgbClr val="24292E"/>
+              </a:buClr>
+              <a:buSzPts val="1600"/>
+              <a:buChar char="●"/>
+            </a:pPr>
+            <a:r>
+              <a:rPr lang="en" sz="1600">
+                <a:solidFill>
+                  <a:srgbClr val="24292E"/>
+                </a:solidFill>
+                <a:highlight>
+                  <a:srgbClr val="FFFFFF"/>
+                </a:highlight>
+              </a:rPr>
+              <a:t>Potentially sacrificing accuracy scores for practical and applicable results</a:t>
+            </a:r>
+            <a:endParaRPr sz="1600">
+              <a:solidFill>
+                <a:srgbClr val="24292E"/>
+              </a:solidFill>
+              <a:highlight>
+                <a:srgbClr val="FFFFFF"/>
+              </a:highlight>
+            </a:endParaRPr>
+          </a:p>
+          <a:p>
+            <a:pPr indent="-330200" lvl="0" marL="457200" rtl="0" algn="l">
+              <a:lnSpc>
+                <a:spcPct val="115000"/>
+              </a:lnSpc>
+              <a:spcBef>
+                <a:spcPts val="0"/>
+              </a:spcBef>
+              <a:spcAft>
+                <a:spcPts val="0"/>
+              </a:spcAft>
+              <a:buClr>
+                <a:srgbClr val="24292E"/>
+              </a:buClr>
+              <a:buSzPts val="1600"/>
+              <a:buChar char="●"/>
+            </a:pPr>
+            <a:r>
+              <a:rPr lang="en" sz="1600">
+                <a:solidFill>
+                  <a:srgbClr val="24292E"/>
+                </a:solidFill>
+                <a:highlight>
+                  <a:srgbClr val="FFFFFF"/>
+                </a:highlight>
+              </a:rPr>
+              <a:t>Determining vaccine hesitancy is complex!</a:t>
+            </a:r>
+            <a:endParaRPr sz="1600">
+              <a:solidFill>
+                <a:srgbClr val="24292E"/>
+              </a:solidFill>
+              <a:highlight>
+                <a:srgbClr val="FFFFFF"/>
+              </a:highlight>
+            </a:endParaRPr>
+          </a:p>
+          <a:p>
+            <a:pPr indent="0" lvl="0" marL="0" rtl="0" algn="l">
+              <a:lnSpc>
+                <a:spcPct val="115000"/>
+              </a:lnSpc>
+              <a:spcBef>
+                <a:spcPts val="0"/>
+              </a:spcBef>
+              <a:spcAft>
+                <a:spcPts val="0"/>
+              </a:spcAft>
+              <a:buNone/>
+            </a:pPr>
+            <a:r>
+              <a:rPr b="1" lang="en" sz="1600">
+                <a:solidFill>
+                  <a:srgbClr val="24292E"/>
+                </a:solidFill>
+                <a:highlight>
+                  <a:srgbClr val="FFFFFF"/>
+                </a:highlight>
+              </a:rPr>
+              <a:t>Considerations:</a:t>
+            </a:r>
+            <a:endParaRPr b="1" sz="1600">
+              <a:solidFill>
+                <a:srgbClr val="24292E"/>
+              </a:solidFill>
+              <a:highlight>
+                <a:srgbClr val="FFFFFF"/>
+              </a:highlight>
+            </a:endParaRPr>
+          </a:p>
+          <a:p>
+            <a:pPr indent="-330200" lvl="0" marL="457200" rtl="0" algn="l">
+              <a:lnSpc>
+                <a:spcPct val="115000"/>
+              </a:lnSpc>
+              <a:spcBef>
+                <a:spcPts val="0"/>
+              </a:spcBef>
+              <a:spcAft>
+                <a:spcPts val="0"/>
+              </a:spcAft>
+              <a:buClr>
+                <a:srgbClr val="24292E"/>
+              </a:buClr>
+              <a:buSzPts val="1600"/>
+              <a:buChar char="●"/>
+            </a:pPr>
+            <a:r>
+              <a:rPr lang="en" sz="1600">
+                <a:solidFill>
+                  <a:srgbClr val="24292E"/>
+                </a:solidFill>
+                <a:highlight>
+                  <a:srgbClr val="FFFFFF"/>
+                </a:highlight>
+              </a:rPr>
+              <a:t>Explore different types of regression models to compare results</a:t>
+            </a:r>
+            <a:endParaRPr sz="1600">
+              <a:solidFill>
+                <a:srgbClr val="24292E"/>
+              </a:solidFill>
+              <a:highlight>
+                <a:srgbClr val="FFFFFF"/>
+              </a:highlight>
+            </a:endParaRPr>
+          </a:p>
+          <a:p>
+            <a:pPr indent="-330200" lvl="0" marL="457200" rtl="0" algn="l">
+              <a:lnSpc>
+                <a:spcPct val="115000"/>
+              </a:lnSpc>
+              <a:spcBef>
+                <a:spcPts val="0"/>
+              </a:spcBef>
+              <a:spcAft>
+                <a:spcPts val="0"/>
+              </a:spcAft>
+              <a:buClr>
+                <a:srgbClr val="24292E"/>
+              </a:buClr>
+              <a:buSzPts val="1600"/>
+              <a:buChar char="●"/>
+            </a:pPr>
+            <a:r>
+              <a:rPr lang="en" sz="1600">
+                <a:solidFill>
+                  <a:srgbClr val="24292E"/>
+                </a:solidFill>
+                <a:highlight>
+                  <a:srgbClr val="FFFFFF"/>
+                </a:highlight>
+              </a:rPr>
+              <a:t>Investigate larger datasets with additional feature inputs</a:t>
+            </a:r>
+            <a:endParaRPr sz="1600">
+              <a:solidFill>
+                <a:srgbClr val="24292E"/>
+              </a:solidFill>
+              <a:highlight>
+                <a:srgbClr val="FFFFFF"/>
+              </a:highlight>
+            </a:endParaRPr>
+          </a:p>
+          <a:p>
+            <a:pPr indent="0" lvl="0" marL="0" rtl="0" algn="l">
+              <a:lnSpc>
+                <a:spcPct val="115000"/>
+              </a:lnSpc>
+              <a:spcBef>
+                <a:spcPts val="0"/>
+              </a:spcBef>
+              <a:spcAft>
+                <a:spcPts val="0"/>
+              </a:spcAft>
+              <a:buNone/>
+            </a:pPr>
+            <a:r>
+              <a:rPr b="1" lang="en" sz="1600">
+                <a:solidFill>
+                  <a:srgbClr val="24292E"/>
+                </a:solidFill>
+                <a:highlight>
+                  <a:srgbClr val="FFFFFF"/>
+                </a:highlight>
+              </a:rPr>
+              <a:t>Next Steps:</a:t>
+            </a:r>
+            <a:endParaRPr b="1" sz="1600">
+              <a:solidFill>
+                <a:srgbClr val="24292E"/>
+              </a:solidFill>
+              <a:highlight>
+                <a:srgbClr val="FFFFFF"/>
+              </a:highlight>
+            </a:endParaRPr>
+          </a:p>
+          <a:p>
+            <a:pPr indent="-330200" lvl="0" marL="457200" rtl="0" algn="l">
+              <a:lnSpc>
+                <a:spcPct val="115000"/>
+              </a:lnSpc>
+              <a:spcBef>
+                <a:spcPts val="0"/>
+              </a:spcBef>
+              <a:spcAft>
+                <a:spcPts val="0"/>
+              </a:spcAft>
+              <a:buClr>
+                <a:srgbClr val="24292E"/>
+              </a:buClr>
+              <a:buSzPts val="1600"/>
+              <a:buChar char="●"/>
+            </a:pPr>
+            <a:r>
+              <a:rPr lang="en" sz="1600">
+                <a:solidFill>
+                  <a:srgbClr val="24292E"/>
+                </a:solidFill>
+                <a:highlight>
+                  <a:srgbClr val="FFFFFF"/>
+                </a:highlight>
+              </a:rPr>
+              <a:t>Connect our dashboard to a webpage </a:t>
+            </a:r>
+            <a:endParaRPr sz="1600">
+              <a:solidFill>
+                <a:srgbClr val="24292E"/>
+              </a:solidFill>
+              <a:highlight>
+                <a:srgbClr val="FFFFFF"/>
+              </a:highlight>
+            </a:endParaRPr>
+          </a:p>
+        </p:txBody>
+      </p:sp>
+      <p:sp>
+        <p:nvSpPr>
+          <p:cNvPr id="174" name="Google Shape;174;p25"/>
+          <p:cNvSpPr txBox="1"/>
+          <p:nvPr>
+            <p:ph idx="12" type="sldNum"/>
+          </p:nvPr>
+        </p:nvSpPr>
+        <p:spPr>
+          <a:xfrm>
+            <a:off x="8472458" y="4663217"/>
+            <a:ext cx="548700" cy="393600"/>
+          </a:xfrm>
+          <a:prstGeom prst="rect">
+            <a:avLst/>
+          </a:prstGeom>
+        </p:spPr>
+        <p:txBody>
+          <a:bodyPr anchorCtr="0" anchor="ctr" bIns="91425" lIns="91425" spcFirstLastPara="1" rIns="91425" wrap="square" tIns="91425">
+            <a:normAutofit/>
+          </a:bodyPr>
+          <a:lstStyle/>
+          <a:p>
+            <a:pPr indent="0" lvl="0" marL="0" rtl="0" algn="r">
+              <a:spcBef>
+                <a:spcPts val="0"/>
+              </a:spcBef>
+              <a:spcAft>
+                <a:spcPts val="0"/>
+              </a:spcAft>
+              <a:buNone/>
+            </a:pPr>
+            <a:fld id="{00000000-1234-1234-1234-123412341234}" type="slidenum">
+              <a:rPr lang="en"/>
+              <a:t>‹#›</a:t>
+            </a:fld>
+            <a:endParaRPr/>
+          </a:p>
+        </p:txBody>
+      </p:sp>
+      <p:pic>
+        <p:nvPicPr>
+          <p:cNvPr id="175" name="Google Shape;175;p25"/>
+          <p:cNvPicPr preferRelativeResize="0"/>
+          <p:nvPr/>
+        </p:nvPicPr>
+        <p:blipFill>
+          <a:blip r:embed="rId3">
+            <a:alphaModFix/>
+          </a:blip>
+          <a:stretch>
+            <a:fillRect/>
+          </a:stretch>
+        </p:blipFill>
+        <p:spPr>
+          <a:xfrm>
+            <a:off x="7808775" y="124650"/>
+            <a:ext cx="1057301" cy="1057301"/>
+          </a:xfrm>
+          <a:prstGeom prst="rect">
+            <a:avLst/>
+          </a:prstGeom>
+          <a:noFill/>
+          <a:ln>
+            <a:noFill/>
+          </a:ln>
+        </p:spPr>
+      </p:pic>
+      <p:pic>
+        <p:nvPicPr>
+          <p:cNvPr id="176" name="Google Shape;176;p25"/>
           <p:cNvPicPr preferRelativeResize="0"/>
           <p:nvPr/>
         </p:nvPicPr>
@@ -10452,12 +11023,12 @@
 </p:sld>
 </file>
 
-<file path=ppt/slides/slide13.xml><?xml version="1.0" encoding="utf-8"?>
+<file path=ppt/slides/slide14.xml><?xml version="1.0" encoding="utf-8"?>
 <p:sld xmlns:a="http://schemas.openxmlformats.org/drawingml/2006/main" xmlns:r="http://schemas.openxmlformats.org/officeDocument/2006/relationships" xmlns:mc="http://schemas.openxmlformats.org/markup-compatibility/2006" xmlns:mv="urn:schemas-microsoft-com:mac:vml" xmlns:p="http://schemas.openxmlformats.org/presentationml/2006/main" xmlns:c="http://schemas.openxmlformats.org/drawingml/2006/chart" xmlns:dgm="http://schemas.openxmlformats.org/drawingml/2006/diagram" xmlns:o="urn:schemas-microsoft-com:office:office" xmlns:v="urn:schemas-microsoft-com:vml" xmlns:pvml="urn:schemas-microsoft-com:office:powerpoint" xmlns:com="http://schemas.openxmlformats.org/drawingml/2006/compatibility" xmlns:p14="http://schemas.microsoft.com/office/powerpoint/2010/main" xmlns:p15="http://schemas.microsoft.com/office/powerpoint/2012/main" xmlns:ahyp="http://schemas.microsoft.com/office/drawing/2018/hyperlinkcolor">
   <p:cSld>
     <p:spTree>
       <p:nvGrpSpPr>
-        <p:cNvPr id="172" name="Shape 172"/>
+        <p:cNvPr id="180" name="Shape 180"/>
         <p:cNvGrpSpPr/>
         <p:nvPr/>
       </p:nvGrpSpPr>
@@ -10471,7 +11042,7 @@
       </p:grpSpPr>
       <p:sp>
         <p:nvSpPr>
-          <p:cNvPr id="173" name="Google Shape;173;p25"/>
+          <p:cNvPr id="181" name="Google Shape;181;p26"/>
           <p:cNvSpPr txBox="1"/>
           <p:nvPr>
             <p:ph type="title"/>
@@ -10511,7 +11082,7 @@
       </p:sp>
       <p:sp>
         <p:nvSpPr>
-          <p:cNvPr id="174" name="Google Shape;174;p25"/>
+          <p:cNvPr id="182" name="Google Shape;182;p26"/>
           <p:cNvSpPr txBox="1"/>
           <p:nvPr>
             <p:ph idx="12" type="sldNum"/>
@@ -10551,7 +11122,7 @@
       </p:sp>
       <p:pic>
         <p:nvPicPr>
-          <p:cNvPr id="175" name="Google Shape;175;p25"/>
+          <p:cNvPr id="183" name="Google Shape;183;p26"/>
           <p:cNvPicPr preferRelativeResize="0"/>
           <p:nvPr/>
         </p:nvPicPr>
@@ -10579,7 +11150,7 @@
       </p:pic>
       <p:sp>
         <p:nvSpPr>
-          <p:cNvPr id="176" name="Google Shape;176;p25"/>
+          <p:cNvPr id="184" name="Google Shape;184;p26"/>
           <p:cNvSpPr txBox="1"/>
           <p:nvPr/>
         </p:nvSpPr>
@@ -10870,7 +11441,7 @@
       </p:sp>
       <p:pic>
         <p:nvPicPr>
-          <p:cNvPr id="177" name="Google Shape;177;p25"/>
+          <p:cNvPr id="185" name="Google Shape;185;p26"/>
           <p:cNvPicPr preferRelativeResize="0"/>
           <p:nvPr/>
         </p:nvPicPr>
@@ -10898,7 +11469,7 @@
       </p:pic>
       <p:pic>
         <p:nvPicPr>
-          <p:cNvPr id="178" name="Google Shape;178;p25"/>
+          <p:cNvPr id="186" name="Google Shape;186;p26"/>
           <p:cNvPicPr preferRelativeResize="0"/>
           <p:nvPr/>
         </p:nvPicPr>
@@ -10925,7 +11496,7 @@
       </p:pic>
       <p:pic>
         <p:nvPicPr>
-          <p:cNvPr id="179" name="Google Shape;179;p25"/>
+          <p:cNvPr id="187" name="Google Shape;187;p26"/>
           <p:cNvPicPr preferRelativeResize="0"/>
           <p:nvPr/>
         </p:nvPicPr>
@@ -10952,7 +11523,7 @@
       </p:pic>
       <p:pic>
         <p:nvPicPr>
-          <p:cNvPr id="180" name="Google Shape;180;p25"/>
+          <p:cNvPr id="188" name="Google Shape;188;p26"/>
           <p:cNvPicPr preferRelativeResize="0"/>
           <p:nvPr/>
         </p:nvPicPr>
@@ -10986,12 +11557,12 @@
 </p:sld>
 </file>
 
-<file path=ppt/slides/slide14.xml><?xml version="1.0" encoding="utf-8"?>
+<file path=ppt/slides/slide15.xml><?xml version="1.0" encoding="utf-8"?>
 <p:sld xmlns:a="http://schemas.openxmlformats.org/drawingml/2006/main" xmlns:r="http://schemas.openxmlformats.org/officeDocument/2006/relationships" xmlns:mc="http://schemas.openxmlformats.org/markup-compatibility/2006" xmlns:mv="urn:schemas-microsoft-com:mac:vml" xmlns:p="http://schemas.openxmlformats.org/presentationml/2006/main" xmlns:c="http://schemas.openxmlformats.org/drawingml/2006/chart" xmlns:dgm="http://schemas.openxmlformats.org/drawingml/2006/diagram" xmlns:o="urn:schemas-microsoft-com:office:office" xmlns:v="urn:schemas-microsoft-com:vml" xmlns:pvml="urn:schemas-microsoft-com:office:powerpoint" xmlns:com="http://schemas.openxmlformats.org/drawingml/2006/compatibility" xmlns:p14="http://schemas.microsoft.com/office/powerpoint/2010/main" xmlns:p15="http://schemas.microsoft.com/office/powerpoint/2012/main" xmlns:ahyp="http://schemas.microsoft.com/office/drawing/2018/hyperlinkcolor">
   <p:cSld>
     <p:spTree>
       <p:nvGrpSpPr>
-        <p:cNvPr id="184" name="Shape 184"/>
+        <p:cNvPr id="192" name="Shape 192"/>
         <p:cNvGrpSpPr/>
         <p:nvPr/>
       </p:nvGrpSpPr>
@@ -11005,7 +11576,7 @@
       </p:grpSpPr>
       <p:sp>
         <p:nvSpPr>
-          <p:cNvPr id="185" name="Google Shape;185;p26"/>
+          <p:cNvPr id="193" name="Google Shape;193;p27"/>
           <p:cNvSpPr txBox="1"/>
           <p:nvPr>
             <p:ph type="ctrTitle"/>
@@ -11061,7 +11632,7 @@
       </p:sp>
       <p:pic>
         <p:nvPicPr>
-          <p:cNvPr id="186" name="Google Shape;186;p26"/>
+          <p:cNvPr id="194" name="Google Shape;194;p27"/>
           <p:cNvPicPr preferRelativeResize="0"/>
           <p:nvPr/>
         </p:nvPicPr>
@@ -13368,8 +13939,8 @@
         </p:blipFill>
         <p:spPr>
           <a:xfrm>
-            <a:off x="508025" y="1434405"/>
-            <a:ext cx="8269227" cy="3151489"/>
+            <a:off x="215725" y="1511350"/>
+            <a:ext cx="8712601" cy="3321300"/>
           </a:xfrm>
           <a:prstGeom prst="rect">
             <a:avLst/>
@@ -13439,11 +14010,7 @@
             </a:pPr>
             <a:r>
               <a:rPr lang="en"/>
-              <a:t>Data Analysis - </a:t>
-            </a:r>
-            <a:r>
-              <a:rPr lang="en"/>
-              <a:t>Benefits and Limitations</a:t>
+              <a:t>Data Analysis - Regression Models</a:t>
             </a:r>
             <a:endParaRPr/>
           </a:p>
@@ -13533,8 +14100,8 @@
         </p:blipFill>
         <p:spPr>
           <a:xfrm>
-            <a:off x="1061150" y="1342750"/>
-            <a:ext cx="7072362" cy="3714075"/>
+            <a:off x="1116588" y="1404175"/>
+            <a:ext cx="6910876" cy="3491674"/>
           </a:xfrm>
           <a:prstGeom prst="rect">
             <a:avLst/>
@@ -13554,6 +14121,285 @@
 </file>
 
 <file path=ppt/theme/theme1.xml><?xml version="1.0" encoding="utf-8"?>
+<a:theme xmlns:a="http://schemas.openxmlformats.org/drawingml/2006/main" xmlns:r="http://schemas.openxmlformats.org/officeDocument/2006/relationships">
+  <a:themeElements>
+    <a:clrScheme name="Default">
+      <a:dk1>
+        <a:srgbClr val="000000"/>
+      </a:dk1>
+      <a:lt1>
+        <a:srgbClr val="FFFFFF"/>
+      </a:lt1>
+      <a:dk2>
+        <a:srgbClr val="158158"/>
+      </a:dk2>
+      <a:lt2>
+        <a:srgbClr val="F3F3F3"/>
+      </a:lt2>
+      <a:accent1>
+        <a:srgbClr val="058DC7"/>
+      </a:accent1>
+      <a:accent2>
+        <a:srgbClr val="50B432"/>
+      </a:accent2>
+      <a:accent3>
+        <a:srgbClr val="ED561B"/>
+      </a:accent3>
+      <a:accent4>
+        <a:srgbClr val="EDEF00"/>
+      </a:accent4>
+      <a:accent5>
+        <a:srgbClr val="24CBE5"/>
+      </a:accent5>
+      <a:accent6>
+        <a:srgbClr val="64E572"/>
+      </a:accent6>
+      <a:hlink>
+        <a:srgbClr val="2200CC"/>
+      </a:hlink>
+      <a:folHlink>
+        <a:srgbClr val="551A8B"/>
+      </a:folHlink>
+    </a:clrScheme>
+    <a:fontScheme name="Office">
+      <a:majorFont>
+        <a:latin typeface="Arial"/>
+        <a:ea typeface=""/>
+        <a:cs typeface=""/>
+        <a:font script="Jpan" typeface="ＭＳ Ｐゴシック"/>
+        <a:font script="Hang" typeface="맑은 고딕"/>
+        <a:font script="Hans" typeface="宋体"/>
+        <a:font script="Hant" typeface="新細明體"/>
+        <a:font script="Arab" typeface="Times New Roman"/>
+        <a:font script="Hebr" typeface="Times New Roman"/>
+        <a:font script="Thai" typeface="Angsana New"/>
+        <a:font script="Ethi" typeface="Nyala"/>
+        <a:font script="Beng" typeface="Vrinda"/>
+        <a:font script="Gujr" typeface="Shruti"/>
+        <a:font script="Khmr" typeface="MoolBoran"/>
+        <a:font script="Knda" typeface="Tunga"/>
+        <a:font script="Guru" typeface="Raavi"/>
+        <a:font script="Cans" typeface="Euphemia"/>
+        <a:font script="Cher" typeface="Plantagenet Cherokee"/>
+        <a:font script="Yiii" typeface="Microsoft Yi Baiti"/>
+        <a:font script="Tibt" typeface="Microsoft Himalaya"/>
+        <a:font script="Thaa" typeface="MV Boli"/>
+        <a:font script="Deva" typeface="Mangal"/>
+        <a:font script="Telu" typeface="Gautami"/>
+        <a:font script="Taml" typeface="Latha"/>
+        <a:font script="Syrc" typeface="Estrangelo Edessa"/>
+        <a:font script="Orya" typeface="Kalinga"/>
+        <a:font script="Mlym" typeface="Kartika"/>
+        <a:font script="Laoo" typeface="DokChampa"/>
+        <a:font script="Sinh" typeface="Iskoola Pota"/>
+        <a:font script="Mong" typeface="Mongolian Baiti"/>
+        <a:font script="Viet" typeface="Times New Roman"/>
+        <a:font script="Uigh" typeface="Microsoft Uighur"/>
+        <a:font script="Geor" typeface="Sylfaen"/>
+      </a:majorFont>
+      <a:minorFont>
+        <a:latin typeface="Arial"/>
+        <a:ea typeface=""/>
+        <a:cs typeface=""/>
+        <a:font script="Jpan" typeface="ＭＳ Ｐゴシック"/>
+        <a:font script="Hang" typeface="맑은 고딕"/>
+        <a:font script="Hans" typeface="宋体"/>
+        <a:font script="Hant" typeface="新細明體"/>
+        <a:font script="Arab" typeface="Arial"/>
+        <a:font script="Hebr" typeface="Arial"/>
+        <a:font script="Thai" typeface="Cordia New"/>
+        <a:font script="Ethi" typeface="Nyala"/>
+        <a:font script="Beng" typeface="Vrinda"/>
+        <a:font script="Gujr" typeface="Shruti"/>
+        <a:font script="Khmr" typeface="DaunPenh"/>
+        <a:font script="Knda" typeface="Tunga"/>
+        <a:font script="Guru" typeface="Raavi"/>
+        <a:font script="Cans" typeface="Euphemia"/>
+        <a:font script="Cher" typeface="Plantagenet Cherokee"/>
+        <a:font script="Yiii" typeface="Microsoft Yi Baiti"/>
+        <a:font script="Tibt" typeface="Microsoft Himalaya"/>
+        <a:font script="Thaa" typeface="MV Boli"/>
+        <a:font script="Deva" typeface="Mangal"/>
+        <a:font script="Telu" typeface="Gautami"/>
+        <a:font script="Taml" typeface="Latha"/>
+        <a:font script="Syrc" typeface="Estrangelo Edessa"/>
+        <a:font script="Orya" typeface="Kalinga"/>
+        <a:font script="Mlym" typeface="Kartika"/>
+        <a:font script="Laoo" typeface="DokChampa"/>
+        <a:font script="Sinh" typeface="Iskoola Pota"/>
+        <a:font script="Mong" typeface="Mongolian Baiti"/>
+        <a:font script="Viet" typeface="Arial"/>
+        <a:font script="Uigh" typeface="Microsoft Uighur"/>
+        <a:font script="Geor" typeface="Sylfaen"/>
+      </a:minorFont>
+    </a:fontScheme>
+    <a:fmtScheme name="Office">
+      <a:fillStyleLst>
+        <a:solidFill>
+          <a:schemeClr val="phClr"/>
+        </a:solidFill>
+        <a:gradFill rotWithShape="1">
+          <a:gsLst>
+            <a:gs pos="0">
+              <a:schemeClr val="phClr">
+                <a:tint val="50000"/>
+                <a:satMod val="300000"/>
+              </a:schemeClr>
+            </a:gs>
+            <a:gs pos="35000">
+              <a:schemeClr val="phClr">
+                <a:tint val="37000"/>
+                <a:satMod val="300000"/>
+              </a:schemeClr>
+            </a:gs>
+            <a:gs pos="100000">
+              <a:schemeClr val="phClr">
+                <a:tint val="15000"/>
+                <a:satMod val="350000"/>
+              </a:schemeClr>
+            </a:gs>
+          </a:gsLst>
+          <a:lin ang="16200000" scaled="1"/>
+        </a:gradFill>
+        <a:gradFill rotWithShape="1">
+          <a:gsLst>
+            <a:gs pos="0">
+              <a:schemeClr val="phClr">
+                <a:tint val="100000"/>
+                <a:shade val="100000"/>
+                <a:satMod val="130000"/>
+              </a:schemeClr>
+            </a:gs>
+            <a:gs pos="100000">
+              <a:schemeClr val="phClr">
+                <a:tint val="50000"/>
+                <a:shade val="100000"/>
+                <a:satMod val="350000"/>
+              </a:schemeClr>
+            </a:gs>
+          </a:gsLst>
+          <a:lin ang="16200000" scaled="0"/>
+        </a:gradFill>
+      </a:fillStyleLst>
+      <a:lnStyleLst>
+        <a:ln w="9525" cap="flat" cmpd="sng" algn="ctr">
+          <a:solidFill>
+            <a:schemeClr val="phClr">
+              <a:shade val="95000"/>
+              <a:satMod val="105000"/>
+            </a:schemeClr>
+          </a:solidFill>
+          <a:prstDash val="solid"/>
+        </a:ln>
+        <a:ln w="25400" cap="flat" cmpd="sng" algn="ctr">
+          <a:solidFill>
+            <a:schemeClr val="phClr"/>
+          </a:solidFill>
+          <a:prstDash val="solid"/>
+        </a:ln>
+        <a:ln w="38100" cap="flat" cmpd="sng" algn="ctr">
+          <a:solidFill>
+            <a:schemeClr val="phClr"/>
+          </a:solidFill>
+          <a:prstDash val="solid"/>
+        </a:ln>
+      </a:lnStyleLst>
+      <a:effectStyleLst>
+        <a:effectStyle>
+          <a:effectLst>
+            <a:outerShdw blurRad="40000" dist="20000" dir="5400000" rotWithShape="0">
+              <a:srgbClr val="000000">
+                <a:alpha val="38000"/>
+              </a:srgbClr>
+            </a:outerShdw>
+          </a:effectLst>
+        </a:effectStyle>
+        <a:effectStyle>
+          <a:effectLst>
+            <a:outerShdw blurRad="40000" dist="23000" dir="5400000" rotWithShape="0">
+              <a:srgbClr val="000000">
+                <a:alpha val="35000"/>
+              </a:srgbClr>
+            </a:outerShdw>
+          </a:effectLst>
+        </a:effectStyle>
+        <a:effectStyle>
+          <a:effectLst>
+            <a:outerShdw blurRad="40000" dist="23000" dir="5400000" rotWithShape="0">
+              <a:srgbClr val="000000">
+                <a:alpha val="35000"/>
+              </a:srgbClr>
+            </a:outerShdw>
+          </a:effectLst>
+          <a:scene3d>
+            <a:camera prst="orthographicFront">
+              <a:rot lat="0" lon="0" rev="0"/>
+            </a:camera>
+            <a:lightRig rig="threePt" dir="t">
+              <a:rot lat="0" lon="0" rev="1200000"/>
+            </a:lightRig>
+          </a:scene3d>
+          <a:sp3d>
+            <a:bevelT w="63500" h="25400"/>
+          </a:sp3d>
+        </a:effectStyle>
+      </a:effectStyleLst>
+      <a:bgFillStyleLst>
+        <a:solidFill>
+          <a:schemeClr val="phClr"/>
+        </a:solidFill>
+        <a:gradFill rotWithShape="1">
+          <a:gsLst>
+            <a:gs pos="0">
+              <a:schemeClr val="phClr">
+                <a:tint val="40000"/>
+                <a:satMod val="350000"/>
+              </a:schemeClr>
+            </a:gs>
+            <a:gs pos="40000">
+              <a:schemeClr val="phClr">
+                <a:tint val="45000"/>
+                <a:shade val="99000"/>
+                <a:satMod val="350000"/>
+              </a:schemeClr>
+            </a:gs>
+            <a:gs pos="100000">
+              <a:schemeClr val="phClr">
+                <a:shade val="20000"/>
+                <a:satMod val="255000"/>
+              </a:schemeClr>
+            </a:gs>
+          </a:gsLst>
+          <a:path path="circle">
+            <a:fillToRect l="50000" t="-80000" r="50000" b="180000"/>
+          </a:path>
+        </a:gradFill>
+        <a:gradFill rotWithShape="1">
+          <a:gsLst>
+            <a:gs pos="0">
+              <a:schemeClr val="phClr">
+                <a:tint val="80000"/>
+                <a:satMod val="300000"/>
+              </a:schemeClr>
+            </a:gs>
+            <a:gs pos="100000">
+              <a:schemeClr val="phClr">
+                <a:shade val="30000"/>
+                <a:satMod val="200000"/>
+              </a:schemeClr>
+            </a:gs>
+          </a:gsLst>
+          <a:path path="circle">
+            <a:fillToRect l="50000" t="50000" r="50000" b="50000"/>
+          </a:path>
+        </a:gradFill>
+      </a:bgFillStyleLst>
+    </a:fmtScheme>
+  </a:themeElements>
+</a:theme>
+</file>
+
+<file path=ppt/theme/theme2.xml><?xml version="1.0" encoding="utf-8"?>
 <a:theme xmlns:a="http://schemas.openxmlformats.org/drawingml/2006/main" xmlns:r="http://schemas.openxmlformats.org/officeDocument/2006/relationships" name="Paradigm">
   <a:themeElements>
     <a:clrScheme name="Paradigm">
@@ -13830,283 +14676,4 @@
     </a:fmtScheme>
   </a:themeElements>
 </a:theme>
-</file>
-
-<file path=ppt/theme/theme2.xml><?xml version="1.0" encoding="utf-8"?>
-<a:theme xmlns:a="http://schemas.openxmlformats.org/drawingml/2006/main" xmlns:r="http://schemas.openxmlformats.org/officeDocument/2006/relationships">
-  <a:themeElements>
-    <a:clrScheme name="Default">
-      <a:dk1>
-        <a:srgbClr val="000000"/>
-      </a:dk1>
-      <a:lt1>
-        <a:srgbClr val="FFFFFF"/>
-      </a:lt1>
-      <a:dk2>
-        <a:srgbClr val="158158"/>
-      </a:dk2>
-      <a:lt2>
-        <a:srgbClr val="F3F3F3"/>
-      </a:lt2>
-      <a:accent1>
-        <a:srgbClr val="058DC7"/>
-      </a:accent1>
-      <a:accent2>
-        <a:srgbClr val="50B432"/>
-      </a:accent2>
-      <a:accent3>
-        <a:srgbClr val="ED561B"/>
-      </a:accent3>
-      <a:accent4>
-        <a:srgbClr val="EDEF00"/>
-      </a:accent4>
-      <a:accent5>
-        <a:srgbClr val="24CBE5"/>
-      </a:accent5>
-      <a:accent6>
-        <a:srgbClr val="64E572"/>
-      </a:accent6>
-      <a:hlink>
-        <a:srgbClr val="2200CC"/>
-      </a:hlink>
-      <a:folHlink>
-        <a:srgbClr val="551A8B"/>
-      </a:folHlink>
-    </a:clrScheme>
-    <a:fontScheme name="Office">
-      <a:majorFont>
-        <a:latin typeface="Arial"/>
-        <a:ea typeface=""/>
-        <a:cs typeface=""/>
-        <a:font script="Jpan" typeface="ＭＳ Ｐゴシック"/>
-        <a:font script="Hang" typeface="맑은 고딕"/>
-        <a:font script="Hans" typeface="宋体"/>
-        <a:font script="Hant" typeface="新細明體"/>
-        <a:font script="Arab" typeface="Times New Roman"/>
-        <a:font script="Hebr" typeface="Times New Roman"/>
-        <a:font script="Thai" typeface="Angsana New"/>
-        <a:font script="Ethi" typeface="Nyala"/>
-        <a:font script="Beng" typeface="Vrinda"/>
-        <a:font script="Gujr" typeface="Shruti"/>
-        <a:font script="Khmr" typeface="MoolBoran"/>
-        <a:font script="Knda" typeface="Tunga"/>
-        <a:font script="Guru" typeface="Raavi"/>
-        <a:font script="Cans" typeface="Euphemia"/>
-        <a:font script="Cher" typeface="Plantagenet Cherokee"/>
-        <a:font script="Yiii" typeface="Microsoft Yi Baiti"/>
-        <a:font script="Tibt" typeface="Microsoft Himalaya"/>
-        <a:font script="Thaa" typeface="MV Boli"/>
-        <a:font script="Deva" typeface="Mangal"/>
-        <a:font script="Telu" typeface="Gautami"/>
-        <a:font script="Taml" typeface="Latha"/>
-        <a:font script="Syrc" typeface="Estrangelo Edessa"/>
-        <a:font script="Orya" typeface="Kalinga"/>
-        <a:font script="Mlym" typeface="Kartika"/>
-        <a:font script="Laoo" typeface="DokChampa"/>
-        <a:font script="Sinh" typeface="Iskoola Pota"/>
-        <a:font script="Mong" typeface="Mongolian Baiti"/>
-        <a:font script="Viet" typeface="Times New Roman"/>
-        <a:font script="Uigh" typeface="Microsoft Uighur"/>
-        <a:font script="Geor" typeface="Sylfaen"/>
-      </a:majorFont>
-      <a:minorFont>
-        <a:latin typeface="Arial"/>
-        <a:ea typeface=""/>
-        <a:cs typeface=""/>
-        <a:font script="Jpan" typeface="ＭＳ Ｐゴシック"/>
-        <a:font script="Hang" typeface="맑은 고딕"/>
-        <a:font script="Hans" typeface="宋体"/>
-        <a:font script="Hant" typeface="新細明體"/>
-        <a:font script="Arab" typeface="Arial"/>
-        <a:font script="Hebr" typeface="Arial"/>
-        <a:font script="Thai" typeface="Cordia New"/>
-        <a:font script="Ethi" typeface="Nyala"/>
-        <a:font script="Beng" typeface="Vrinda"/>
-        <a:font script="Gujr" typeface="Shruti"/>
-        <a:font script="Khmr" typeface="DaunPenh"/>
-        <a:font script="Knda" typeface="Tunga"/>
-        <a:font script="Guru" typeface="Raavi"/>
-        <a:font script="Cans" typeface="Euphemia"/>
-        <a:font script="Cher" typeface="Plantagenet Cherokee"/>
-        <a:font script="Yiii" typeface="Microsoft Yi Baiti"/>
-        <a:font script="Tibt" typeface="Microsoft Himalaya"/>
-        <a:font script="Thaa" typeface="MV Boli"/>
-        <a:font script="Deva" typeface="Mangal"/>
-        <a:font script="Telu" typeface="Gautami"/>
-        <a:font script="Taml" typeface="Latha"/>
-        <a:font script="Syrc" typeface="Estrangelo Edessa"/>
-        <a:font script="Orya" typeface="Kalinga"/>
-        <a:font script="Mlym" typeface="Kartika"/>
-        <a:font script="Laoo" typeface="DokChampa"/>
-        <a:font script="Sinh" typeface="Iskoola Pota"/>
-        <a:font script="Mong" typeface="Mongolian Baiti"/>
-        <a:font script="Viet" typeface="Arial"/>
-        <a:font script="Uigh" typeface="Microsoft Uighur"/>
-        <a:font script="Geor" typeface="Sylfaen"/>
-      </a:minorFont>
-    </a:fontScheme>
-    <a:fmtScheme name="Office">
-      <a:fillStyleLst>
-        <a:solidFill>
-          <a:schemeClr val="phClr"/>
-        </a:solidFill>
-        <a:gradFill rotWithShape="1">
-          <a:gsLst>
-            <a:gs pos="0">
-              <a:schemeClr val="phClr">
-                <a:tint val="50000"/>
-                <a:satMod val="300000"/>
-              </a:schemeClr>
-            </a:gs>
-            <a:gs pos="35000">
-              <a:schemeClr val="phClr">
-                <a:tint val="37000"/>
-                <a:satMod val="300000"/>
-              </a:schemeClr>
-            </a:gs>
-            <a:gs pos="100000">
-              <a:schemeClr val="phClr">
-                <a:tint val="15000"/>
-                <a:satMod val="350000"/>
-              </a:schemeClr>
-            </a:gs>
-          </a:gsLst>
-          <a:lin ang="16200000" scaled="1"/>
-        </a:gradFill>
-        <a:gradFill rotWithShape="1">
-          <a:gsLst>
-            <a:gs pos="0">
-              <a:schemeClr val="phClr">
-                <a:tint val="100000"/>
-                <a:shade val="100000"/>
-                <a:satMod val="130000"/>
-              </a:schemeClr>
-            </a:gs>
-            <a:gs pos="100000">
-              <a:schemeClr val="phClr">
-                <a:tint val="50000"/>
-                <a:shade val="100000"/>
-                <a:satMod val="350000"/>
-              </a:schemeClr>
-            </a:gs>
-          </a:gsLst>
-          <a:lin ang="16200000" scaled="0"/>
-        </a:gradFill>
-      </a:fillStyleLst>
-      <a:lnStyleLst>
-        <a:ln w="9525" cap="flat" cmpd="sng" algn="ctr">
-          <a:solidFill>
-            <a:schemeClr val="phClr">
-              <a:shade val="95000"/>
-              <a:satMod val="105000"/>
-            </a:schemeClr>
-          </a:solidFill>
-          <a:prstDash val="solid"/>
-        </a:ln>
-        <a:ln w="25400" cap="flat" cmpd="sng" algn="ctr">
-          <a:solidFill>
-            <a:schemeClr val="phClr"/>
-          </a:solidFill>
-          <a:prstDash val="solid"/>
-        </a:ln>
-        <a:ln w="38100" cap="flat" cmpd="sng" algn="ctr">
-          <a:solidFill>
-            <a:schemeClr val="phClr"/>
-          </a:solidFill>
-          <a:prstDash val="solid"/>
-        </a:ln>
-      </a:lnStyleLst>
-      <a:effectStyleLst>
-        <a:effectStyle>
-          <a:effectLst>
-            <a:outerShdw blurRad="40000" dist="20000" dir="5400000" rotWithShape="0">
-              <a:srgbClr val="000000">
-                <a:alpha val="38000"/>
-              </a:srgbClr>
-            </a:outerShdw>
-          </a:effectLst>
-        </a:effectStyle>
-        <a:effectStyle>
-          <a:effectLst>
-            <a:outerShdw blurRad="40000" dist="23000" dir="5400000" rotWithShape="0">
-              <a:srgbClr val="000000">
-                <a:alpha val="35000"/>
-              </a:srgbClr>
-            </a:outerShdw>
-          </a:effectLst>
-        </a:effectStyle>
-        <a:effectStyle>
-          <a:effectLst>
-            <a:outerShdw blurRad="40000" dist="23000" dir="5400000" rotWithShape="0">
-              <a:srgbClr val="000000">
-                <a:alpha val="35000"/>
-              </a:srgbClr>
-            </a:outerShdw>
-          </a:effectLst>
-          <a:scene3d>
-            <a:camera prst="orthographicFront">
-              <a:rot lat="0" lon="0" rev="0"/>
-            </a:camera>
-            <a:lightRig rig="threePt" dir="t">
-              <a:rot lat="0" lon="0" rev="1200000"/>
-            </a:lightRig>
-          </a:scene3d>
-          <a:sp3d>
-            <a:bevelT w="63500" h="25400"/>
-          </a:sp3d>
-        </a:effectStyle>
-      </a:effectStyleLst>
-      <a:bgFillStyleLst>
-        <a:solidFill>
-          <a:schemeClr val="phClr"/>
-        </a:solidFill>
-        <a:gradFill rotWithShape="1">
-          <a:gsLst>
-            <a:gs pos="0">
-              <a:schemeClr val="phClr">
-                <a:tint val="40000"/>
-                <a:satMod val="350000"/>
-              </a:schemeClr>
-            </a:gs>
-            <a:gs pos="40000">
-              <a:schemeClr val="phClr">
-                <a:tint val="45000"/>
-                <a:shade val="99000"/>
-                <a:satMod val="350000"/>
-              </a:schemeClr>
-            </a:gs>
-            <a:gs pos="100000">
-              <a:schemeClr val="phClr">
-                <a:shade val="20000"/>
-                <a:satMod val="255000"/>
-              </a:schemeClr>
-            </a:gs>
-          </a:gsLst>
-          <a:path path="circle">
-            <a:fillToRect l="50000" t="-80000" r="50000" b="180000"/>
-          </a:path>
-        </a:gradFill>
-        <a:gradFill rotWithShape="1">
-          <a:gsLst>
-            <a:gs pos="0">
-              <a:schemeClr val="phClr">
-                <a:tint val="80000"/>
-                <a:satMod val="300000"/>
-              </a:schemeClr>
-            </a:gs>
-            <a:gs pos="100000">
-              <a:schemeClr val="phClr">
-                <a:shade val="30000"/>
-                <a:satMod val="200000"/>
-              </a:schemeClr>
-            </a:gs>
-          </a:gsLst>
-          <a:path path="circle">
-            <a:fillToRect l="50000" t="50000" r="50000" b="50000"/>
-          </a:path>
-        </a:gradFill>
-      </a:bgFillStyleLst>
-    </a:fmtScheme>
-  </a:themeElements>
-</a:theme>
 </file>
</xml_diff>

<commit_message>
Added final version of presentation that was presented to class
Includes speaking points for each presenter
</commit_message>
<xml_diff>
--- a/Vaccine Hesitancy Presentation.pptx
+++ b/Vaccine Hesitancy Presentation.pptx
@@ -792,60 +792,125 @@
           <a:lstStyle/>
           <a:p>
             <a:pPr indent="-304800" lvl="0" marL="457200" rtl="0" algn="l">
-              <a:spcBef>
-                <a:spcPts val="0"/>
-              </a:spcBef>
-              <a:spcAft>
-                <a:spcPts val="0"/>
-              </a:spcAft>
+              <a:lnSpc>
+                <a:spcPct val="115000"/>
+              </a:lnSpc>
+              <a:spcBef>
+                <a:spcPts val="0"/>
+              </a:spcBef>
+              <a:spcAft>
+                <a:spcPts val="0"/>
+              </a:spcAft>
+              <a:buClr>
+                <a:schemeClr val="dk1"/>
+              </a:buClr>
               <a:buSzPts val="1200"/>
-              <a:buChar char="●"/>
-            </a:pPr>
-            <a:r>
-              <a:rPr lang="en" sz="1200"/>
-              <a:t>Hi everyone, our team consisted of Hayden, Tiffany, Aarani and Amy. </a:t>
-            </a:r>
-            <a:endParaRPr sz="1200"/>
+              <a:buChar char="-"/>
+            </a:pPr>
+            <a:r>
+              <a:rPr lang="en" sz="1200">
+                <a:solidFill>
+                  <a:schemeClr val="dk1"/>
+                </a:solidFill>
+              </a:rPr>
+              <a:t>Hi everyone, our chosen topic is sociodemographic indicators and their influences on vaccine hesitancy</a:t>
+            </a:r>
+            <a:endParaRPr sz="1200">
+              <a:solidFill>
+                <a:schemeClr val="dk1"/>
+              </a:solidFill>
+            </a:endParaRPr>
           </a:p>
           <a:p>
             <a:pPr indent="-304800" lvl="0" marL="457200" rtl="0" algn="l">
-              <a:spcBef>
-                <a:spcPts val="0"/>
-              </a:spcBef>
-              <a:spcAft>
-                <a:spcPts val="0"/>
-              </a:spcAft>
+              <a:lnSpc>
+                <a:spcPct val="115000"/>
+              </a:lnSpc>
+              <a:spcBef>
+                <a:spcPts val="0"/>
+              </a:spcBef>
+              <a:spcAft>
+                <a:spcPts val="0"/>
+              </a:spcAft>
+              <a:buClr>
+                <a:schemeClr val="dk1"/>
+              </a:buClr>
               <a:buSzPts val="1200"/>
-              <a:buChar char="●"/>
-            </a:pPr>
-            <a:r>
-              <a:rPr lang="en" sz="1200"/>
-              <a:t>We explored sociodemographic indicators and their influences on vaccine </a:t>
-            </a:r>
-            <a:r>
-              <a:rPr lang="en" sz="1200"/>
-              <a:t>hesitancy</a:t>
-            </a:r>
-            <a:r>
-              <a:rPr lang="en" sz="1200"/>
-              <a:t> through machine learning. </a:t>
-            </a:r>
-            <a:endParaRPr sz="1200"/>
+              <a:buChar char="-"/>
+            </a:pPr>
+            <a:r>
+              <a:rPr lang="en" sz="1200">
+                <a:solidFill>
+                  <a:schemeClr val="dk1"/>
+                </a:solidFill>
+              </a:rPr>
+              <a:t>Our team consisted of Hayden, Tiffany, Aarani and Amy, and together we explored how vaccine hesitancy can be impacted and </a:t>
+            </a:r>
+            <a:r>
+              <a:rPr lang="en" sz="1200">
+                <a:solidFill>
+                  <a:schemeClr val="dk1"/>
+                </a:solidFill>
+              </a:rPr>
+              <a:t>influenced</a:t>
+            </a:r>
+            <a:r>
+              <a:rPr lang="en" sz="1200">
+                <a:solidFill>
+                  <a:schemeClr val="dk1"/>
+                </a:solidFill>
+              </a:rPr>
+              <a:t> with various indicators through machine learning</a:t>
+            </a:r>
+            <a:endParaRPr sz="1200">
+              <a:solidFill>
+                <a:schemeClr val="dk1"/>
+              </a:solidFill>
+            </a:endParaRPr>
           </a:p>
           <a:p>
             <a:pPr indent="-304800" lvl="0" marL="457200" rtl="0" algn="l">
-              <a:spcBef>
-                <a:spcPts val="0"/>
-              </a:spcBef>
-              <a:spcAft>
-                <a:spcPts val="0"/>
-              </a:spcAft>
+              <a:lnSpc>
+                <a:spcPct val="115000"/>
+              </a:lnSpc>
+              <a:spcBef>
+                <a:spcPts val="0"/>
+              </a:spcBef>
+              <a:spcAft>
+                <a:spcPts val="0"/>
+              </a:spcAft>
+              <a:buClr>
+                <a:schemeClr val="dk1"/>
+              </a:buClr>
               <a:buSzPts val="1200"/>
-              <a:buChar char="●"/>
-            </a:pPr>
-            <a:r>
-              <a:rPr lang="en" sz="1200"/>
-              <a:t>We’ll walk you through our presentation now and we are happy to take questions at the end.</a:t>
+              <a:buChar char="-"/>
+            </a:pPr>
+            <a:r>
+              <a:rPr lang="en" sz="1200">
+                <a:solidFill>
+                  <a:schemeClr val="dk1"/>
+                </a:solidFill>
+              </a:rPr>
+              <a:t>We’ll walk you through our presentation now and at the end we are more than happy to take questions</a:t>
+            </a:r>
+            <a:endParaRPr sz="1200">
+              <a:solidFill>
+                <a:schemeClr val="dk1"/>
+              </a:solidFill>
+            </a:endParaRPr>
+          </a:p>
+          <a:p>
+            <a:pPr indent="0" lvl="0" marL="0" rtl="0" algn="l">
+              <a:spcBef>
+                <a:spcPts val="0"/>
+              </a:spcBef>
+              <a:spcAft>
+                <a:spcPts val="0"/>
+              </a:spcAft>
+              <a:buNone/>
+            </a:pPr>
+            <a:r>
+              <a:t/>
             </a:r>
             <a:endParaRPr sz="1200"/>
           </a:p>
@@ -934,7 +999,7 @@
           </a:bodyPr>
           <a:lstStyle/>
           <a:p>
-            <a:pPr indent="-304800" lvl="0" marL="457200" rtl="0" algn="l">
+            <a:pPr indent="0" lvl="0" marL="0" rtl="0" algn="l">
               <a:lnSpc>
                 <a:spcPct val="115000"/>
               </a:lnSpc>
@@ -944,11 +1009,7 @@
               <a:spcAft>
                 <a:spcPts val="0"/>
               </a:spcAft>
-              <a:buClr>
-                <a:srgbClr val="24292E"/>
-              </a:buClr>
-              <a:buSzPts val="1200"/>
-              <a:buAutoNum type="arabicPeriod"/>
+              <a:buNone/>
             </a:pPr>
             <a:r>
               <a:rPr lang="en" sz="1200">
@@ -956,7 +1017,7 @@
                   <a:srgbClr val="24292E"/>
                 </a:solidFill>
               </a:rPr>
-              <a:t>Simple Linear Regression - The data was not split into training and testing datasets. All of the features were used to train the model and provide a predicted target. *benefits and limitations*</a:t>
+              <a:t>Before we can effectively understand the results, we need to understand the benefits and limitations of each model and how they affect our regression scores. </a:t>
             </a:r>
             <a:endParaRPr sz="1200">
               <a:solidFill>
@@ -970,7 +1031,7 @@
                 <a:spcPct val="115000"/>
               </a:lnSpc>
               <a:spcBef>
-                <a:spcPts val="0"/>
+                <a:spcPts val="1200"/>
               </a:spcBef>
               <a:spcAft>
                 <a:spcPts val="0"/>
@@ -987,26 +1048,12 @@
                   <a:srgbClr val="24292E"/>
                 </a:solidFill>
               </a:rPr>
-              <a:t>Multiple Linear Regression - The data was split into training and testing datasets where 70% of the data was used to train and 30% of the data was used to test the model, providing an extra </a:t>
-            </a:r>
-            <a:r>
-              <a:rPr lang="en" sz="1200">
-                <a:solidFill>
-                  <a:srgbClr val="24292E"/>
-                </a:solidFill>
-                <a:highlight>
-                  <a:srgbClr val="FFFFFF"/>
-                </a:highlight>
-              </a:rPr>
-              <a:t>method of validation and confidence on the regression model predictions</a:t>
+              <a:t>For a simple linear regression, it is fast and efficient for initial analysis, but likely our least effective model as there is no method of validation for predictions </a:t>
             </a:r>
             <a:endParaRPr sz="1200">
               <a:solidFill>
                 <a:srgbClr val="24292E"/>
               </a:solidFill>
-              <a:highlight>
-                <a:srgbClr val="FFFFFF"/>
-              </a:highlight>
             </a:endParaRPr>
           </a:p>
           <a:p>
@@ -1031,11 +1078,39 @@
                 <a:solidFill>
                   <a:srgbClr val="24292E"/>
                 </a:solidFill>
-                <a:highlight>
-                  <a:srgbClr val="FFFFFF"/>
-                </a:highlight>
               </a:rPr>
-              <a:t>Random Forest Regression - The data was also </a:t>
+              <a:t>For our multiple linear regression, it has the additional validation layer for training and testing data, giving us greater confidence on the effectiveness of the model. However, as it is a linear regression, it can be sensitive to outliers, especially with a bigger dataset like ours. </a:t>
+            </a:r>
+            <a:endParaRPr sz="1200">
+              <a:solidFill>
+                <a:srgbClr val="24292E"/>
+              </a:solidFill>
+            </a:endParaRPr>
+          </a:p>
+          <a:p>
+            <a:pPr indent="-304800" lvl="0" marL="457200" rtl="0" algn="l">
+              <a:lnSpc>
+                <a:spcPct val="115000"/>
+              </a:lnSpc>
+              <a:spcBef>
+                <a:spcPts val="0"/>
+              </a:spcBef>
+              <a:spcAft>
+                <a:spcPts val="0"/>
+              </a:spcAft>
+              <a:buClr>
+                <a:srgbClr val="24292E"/>
+              </a:buClr>
+              <a:buSzPts val="1200"/>
+              <a:buAutoNum type="arabicPeriod"/>
+            </a:pPr>
+            <a:r>
+              <a:rPr lang="en" sz="1200">
+                <a:solidFill>
+                  <a:srgbClr val="24292E"/>
+                </a:solidFill>
+              </a:rPr>
+              <a:t>Lastly, for our random forest model, it is a powerful algorithm that is not sensitive to outliers and can handle our bigger dataset, but it is computationally expensive due to the multitude of decision trees.  </a:t>
             </a:r>
             <a:endParaRPr sz="1200">
               <a:solidFill>
@@ -1168,7 +1243,7 @@
           </a:bodyPr>
           <a:lstStyle/>
           <a:p>
-            <a:pPr indent="-304800" lvl="0" marL="457200" rtl="0" algn="l">
+            <a:pPr indent="0" lvl="0" marL="0" rtl="0" algn="l">
               <a:lnSpc>
                 <a:spcPct val="115000"/>
               </a:lnSpc>
@@ -1178,11 +1253,7 @@
               <a:spcAft>
                 <a:spcPts val="0"/>
               </a:spcAft>
-              <a:buClr>
-                <a:srgbClr val="24292E"/>
-              </a:buClr>
-              <a:buSzPts val="1200"/>
-              <a:buChar char="●"/>
+              <a:buNone/>
             </a:pPr>
             <a:r>
               <a:rPr lang="en" sz="1200">
@@ -1190,7 +1261,7 @@
                   <a:srgbClr val="24292E"/>
                 </a:solidFill>
               </a:rPr>
-              <a:t>Mean Absolute Error (MAE) - the average measure of error between predicted and actual values</a:t>
+              <a:t>So what did our models tell us? Our assumptions were correct in guessing that our most complex model, the random forest regression model, would be our most successful model. We used the following metrics to determine this: </a:t>
             </a:r>
             <a:endParaRPr sz="1200">
               <a:solidFill>
@@ -1199,12 +1270,12 @@
             </a:endParaRPr>
           </a:p>
           <a:p>
-            <a:pPr indent="-304800" lvl="1" marL="914400" rtl="0" algn="l">
+            <a:pPr indent="-304800" lvl="0" marL="457200" rtl="0" algn="l">
               <a:lnSpc>
                 <a:spcPct val="115000"/>
               </a:lnSpc>
               <a:spcBef>
-                <a:spcPts val="0"/>
+                <a:spcPts val="1200"/>
               </a:spcBef>
               <a:spcAft>
                 <a:spcPts val="0"/>
@@ -1213,7 +1284,7 @@
                 <a:srgbClr val="24292E"/>
               </a:buClr>
               <a:buSzPts val="1200"/>
-              <a:buAutoNum type="alphaLcPeriod"/>
+              <a:buChar char="●"/>
             </a:pPr>
             <a:r>
               <a:rPr lang="en" sz="1200">
@@ -1221,7 +1292,7 @@
                   <a:srgbClr val="24292E"/>
                 </a:solidFill>
               </a:rPr>
-              <a:t>Ideally close to 0</a:t>
+              <a:t>Mean Absolute Error (MAE) - the average measure of error between predicted and actual values</a:t>
             </a:r>
             <a:endParaRPr sz="1200">
               <a:solidFill>
@@ -1230,7 +1301,7 @@
             </a:endParaRPr>
           </a:p>
           <a:p>
-            <a:pPr indent="-304800" lvl="0" marL="457200" rtl="0" algn="l">
+            <a:pPr indent="-304800" lvl="1" marL="914400" rtl="0" algn="l">
               <a:lnSpc>
                 <a:spcPct val="115000"/>
               </a:lnSpc>
@@ -1244,7 +1315,7 @@
                 <a:srgbClr val="24292E"/>
               </a:buClr>
               <a:buSzPts val="1200"/>
-              <a:buChar char="●"/>
+              <a:buAutoNum type="alphaLcPeriod"/>
             </a:pPr>
             <a:r>
               <a:rPr lang="en" sz="1200">
@@ -1252,7 +1323,7 @@
                   <a:srgbClr val="24292E"/>
                 </a:solidFill>
               </a:rPr>
-              <a:t>Mean Squared Error (MSE) - the average squared measure of error between predicted and actual values</a:t>
+              <a:t>Ideally close to 0</a:t>
             </a:r>
             <a:endParaRPr sz="1200">
               <a:solidFill>
@@ -1261,7 +1332,7 @@
             </a:endParaRPr>
           </a:p>
           <a:p>
-            <a:pPr indent="-304800" lvl="1" marL="914400" rtl="0" algn="l">
+            <a:pPr indent="-304800" lvl="0" marL="457200" rtl="0" algn="l">
               <a:lnSpc>
                 <a:spcPct val="115000"/>
               </a:lnSpc>
@@ -1275,7 +1346,7 @@
                 <a:srgbClr val="24292E"/>
               </a:buClr>
               <a:buSzPts val="1200"/>
-              <a:buAutoNum type="alphaLcPeriod"/>
+              <a:buChar char="●"/>
             </a:pPr>
             <a:r>
               <a:rPr lang="en" sz="1200">
@@ -1283,7 +1354,7 @@
                   <a:srgbClr val="24292E"/>
                 </a:solidFill>
               </a:rPr>
-              <a:t>Ideally close to 0</a:t>
+              <a:t>Mean Squared Error (MSE) - the average squared measure of error between predicted and actual values</a:t>
             </a:r>
             <a:endParaRPr sz="1200">
               <a:solidFill>
@@ -1292,7 +1363,7 @@
             </a:endParaRPr>
           </a:p>
           <a:p>
-            <a:pPr indent="-304800" lvl="0" marL="457200" rtl="0" algn="l">
+            <a:pPr indent="-304800" lvl="1" marL="914400" rtl="0" algn="l">
               <a:lnSpc>
                 <a:spcPct val="115000"/>
               </a:lnSpc>
@@ -1306,7 +1377,7 @@
                 <a:srgbClr val="24292E"/>
               </a:buClr>
               <a:buSzPts val="1200"/>
-              <a:buChar char="●"/>
+              <a:buAutoNum type="alphaLcPeriod"/>
             </a:pPr>
             <a:r>
               <a:rPr lang="en" sz="1200">
@@ -1314,7 +1385,7 @@
                   <a:srgbClr val="24292E"/>
                 </a:solidFill>
               </a:rPr>
-              <a:t>R Squared Score - coefficient of determination; 'goodness of fit', measures how well the model can predict unseen values</a:t>
+              <a:t>Ideally close to 0</a:t>
             </a:r>
             <a:endParaRPr sz="1200">
               <a:solidFill>
@@ -1323,7 +1394,7 @@
             </a:endParaRPr>
           </a:p>
           <a:p>
-            <a:pPr indent="-304800" lvl="1" marL="914400" rtl="0" algn="l">
+            <a:pPr indent="-304800" lvl="0" marL="457200" rtl="0" algn="l">
               <a:lnSpc>
                 <a:spcPct val="115000"/>
               </a:lnSpc>
@@ -1337,7 +1408,7 @@
                 <a:srgbClr val="24292E"/>
               </a:buClr>
               <a:buSzPts val="1200"/>
-              <a:buAutoNum type="alphaLcPeriod"/>
+              <a:buChar char="●"/>
             </a:pPr>
             <a:r>
               <a:rPr lang="en" sz="1200">
@@ -1345,7 +1416,7 @@
                   <a:srgbClr val="24292E"/>
                 </a:solidFill>
               </a:rPr>
-              <a:t>Ideally close to 1</a:t>
+              <a:t>R Squared Score - coefficient of determination; 'goodness of fit', measures how well the model can predict unseen values</a:t>
             </a:r>
             <a:endParaRPr sz="1200">
               <a:solidFill>
@@ -1354,7 +1425,7 @@
             </a:endParaRPr>
           </a:p>
           <a:p>
-            <a:pPr indent="-304800" lvl="0" marL="457200" rtl="0" algn="l">
+            <a:pPr indent="-304800" lvl="1" marL="914400" rtl="0" algn="l">
               <a:lnSpc>
                 <a:spcPct val="115000"/>
               </a:lnSpc>
@@ -1368,7 +1439,7 @@
                 <a:srgbClr val="24292E"/>
               </a:buClr>
               <a:buSzPts val="1200"/>
-              <a:buChar char="●"/>
+              <a:buAutoNum type="alphaLcPeriod"/>
             </a:pPr>
             <a:r>
               <a:rPr lang="en" sz="1200">
@@ -1376,7 +1447,7 @@
                   <a:srgbClr val="24292E"/>
                 </a:solidFill>
               </a:rPr>
-              <a:t>Explained Variance Score - proportional dispersion of data</a:t>
+              <a:t>Ideally close to 1</a:t>
             </a:r>
             <a:endParaRPr sz="1200">
               <a:solidFill>
@@ -1385,6 +1456,37 @@
             </a:endParaRPr>
           </a:p>
           <a:p>
+            <a:pPr indent="-304800" lvl="0" marL="457200" rtl="0" algn="l">
+              <a:lnSpc>
+                <a:spcPct val="115000"/>
+              </a:lnSpc>
+              <a:spcBef>
+                <a:spcPts val="0"/>
+              </a:spcBef>
+              <a:spcAft>
+                <a:spcPts val="0"/>
+              </a:spcAft>
+              <a:buClr>
+                <a:srgbClr val="24292E"/>
+              </a:buClr>
+              <a:buSzPts val="1200"/>
+              <a:buChar char="●"/>
+            </a:pPr>
+            <a:r>
+              <a:rPr lang="en" sz="1200">
+                <a:solidFill>
+                  <a:srgbClr val="24292E"/>
+                </a:solidFill>
+              </a:rPr>
+              <a:t>Explained Variance Score - proportional dispersion of data</a:t>
+            </a:r>
+            <a:endParaRPr sz="1200">
+              <a:solidFill>
+                <a:srgbClr val="24292E"/>
+              </a:solidFill>
+            </a:endParaRPr>
+          </a:p>
+          <a:p>
             <a:pPr indent="-304800" lvl="1" marL="914400" rtl="0" algn="l">
               <a:lnSpc>
                 <a:spcPct val="115000"/>
@@ -1408,6 +1510,99 @@
                 </a:solidFill>
               </a:rPr>
               <a:t>Ideally close to 1</a:t>
+            </a:r>
+            <a:endParaRPr sz="1200">
+              <a:solidFill>
+                <a:srgbClr val="24292E"/>
+              </a:solidFill>
+            </a:endParaRPr>
+          </a:p>
+          <a:p>
+            <a:pPr indent="-304800" lvl="0" marL="457200" rtl="0" algn="l">
+              <a:lnSpc>
+                <a:spcPct val="115000"/>
+              </a:lnSpc>
+              <a:spcBef>
+                <a:spcPts val="0"/>
+              </a:spcBef>
+              <a:spcAft>
+                <a:spcPts val="0"/>
+              </a:spcAft>
+              <a:buClr>
+                <a:srgbClr val="24292E"/>
+              </a:buClr>
+              <a:buSzPts val="1200"/>
+              <a:buChar char="●"/>
+            </a:pPr>
+            <a:r>
+              <a:rPr lang="en" sz="1200">
+                <a:solidFill>
+                  <a:srgbClr val="24292E"/>
+                </a:solidFill>
+              </a:rPr>
+              <a:t>You can clearly see that the random forest mean absolute error and mean squared error is lower than their equivalent in the other 2 models. Additionally, the random forest model produced the highest R squared score of 0.437, indicating the highest ‘goodness of fit’ and greatest ability to predict unseen data. </a:t>
+            </a:r>
+            <a:endParaRPr sz="1200">
+              <a:solidFill>
+                <a:srgbClr val="24292E"/>
+              </a:solidFill>
+            </a:endParaRPr>
+          </a:p>
+          <a:p>
+            <a:pPr indent="-304800" lvl="0" marL="457200" rtl="0" algn="l">
+              <a:lnSpc>
+                <a:spcPct val="115000"/>
+              </a:lnSpc>
+              <a:spcBef>
+                <a:spcPts val="0"/>
+              </a:spcBef>
+              <a:spcAft>
+                <a:spcPts val="0"/>
+              </a:spcAft>
+              <a:buClr>
+                <a:srgbClr val="24292E"/>
+              </a:buClr>
+              <a:buSzPts val="1200"/>
+              <a:buChar char="●"/>
+            </a:pPr>
+            <a:r>
+              <a:rPr lang="en" sz="1200">
+                <a:solidFill>
+                  <a:srgbClr val="24292E"/>
+                </a:solidFill>
+              </a:rPr>
+              <a:t>Therefore, our preferred model of choice for predicting vaccine hesitancy in Ontario would be the random forest model</a:t>
+            </a:r>
+            <a:endParaRPr sz="1200">
+              <a:solidFill>
+                <a:srgbClr val="24292E"/>
+              </a:solidFill>
+            </a:endParaRPr>
+          </a:p>
+          <a:p>
+            <a:pPr indent="-304800" lvl="0" marL="457200" rtl="0" algn="l">
+              <a:lnSpc>
+                <a:spcPct val="115000"/>
+              </a:lnSpc>
+              <a:spcBef>
+                <a:spcPts val="0"/>
+              </a:spcBef>
+              <a:spcAft>
+                <a:spcPts val="0"/>
+              </a:spcAft>
+              <a:buClr>
+                <a:srgbClr val="24292E"/>
+              </a:buClr>
+              <a:buSzPts val="1200"/>
+              <a:buChar char="●"/>
+            </a:pPr>
+            <a:r>
+              <a:rPr lang="en" sz="1200">
+                <a:solidFill>
+                  <a:srgbClr val="24292E"/>
+                </a:solidFill>
+              </a:rPr>
+              <a:t>Next, I’ll pass it over to Aarani to discuss our conclusions</a:t>
             </a:r>
             <a:endParaRPr sz="1200">
               <a:solidFill>
@@ -1537,19 +1732,116 @@
           </a:bodyPr>
           <a:lstStyle/>
           <a:p>
-            <a:pPr indent="0" lvl="0" marL="0" rtl="0" algn="l">
-              <a:spcBef>
-                <a:spcPts val="0"/>
-              </a:spcBef>
-              <a:spcAft>
-                <a:spcPts val="0"/>
-              </a:spcAft>
-              <a:buNone/>
-            </a:pPr>
-            <a:r>
-              <a:t/>
-            </a:r>
-            <a:endParaRPr/>
+            <a:pPr indent="-304800" lvl="0" marL="457200" rtl="0" algn="l">
+              <a:spcBef>
+                <a:spcPts val="0"/>
+              </a:spcBef>
+              <a:spcAft>
+                <a:spcPts val="0"/>
+              </a:spcAft>
+              <a:buClr>
+                <a:schemeClr val="dk1"/>
+              </a:buClr>
+              <a:buSzPts val="1200"/>
+              <a:buChar char="●"/>
+            </a:pPr>
+            <a:r>
+              <a:rPr lang="en" sz="1200">
+                <a:solidFill>
+                  <a:schemeClr val="dk1"/>
+                </a:solidFill>
+              </a:rPr>
+              <a:t>Looping back to the original questions we outlined when analyzing our dataset:</a:t>
+            </a:r>
+            <a:endParaRPr sz="1200">
+              <a:solidFill>
+                <a:schemeClr val="dk1"/>
+              </a:solidFill>
+            </a:endParaRPr>
+          </a:p>
+          <a:p>
+            <a:pPr indent="-304800" lvl="0" marL="457200" rtl="0" algn="l">
+              <a:spcBef>
+                <a:spcPts val="0"/>
+              </a:spcBef>
+              <a:spcAft>
+                <a:spcPts val="0"/>
+              </a:spcAft>
+              <a:buClr>
+                <a:schemeClr val="dk1"/>
+              </a:buClr>
+              <a:buSzPts val="1200"/>
+              <a:buChar char="●"/>
+            </a:pPr>
+            <a:r>
+              <a:rPr lang="en" sz="1200">
+                <a:solidFill>
+                  <a:schemeClr val="dk1"/>
+                </a:solidFill>
+              </a:rPr>
+              <a:t>In terms of impacts - </a:t>
+            </a:r>
+            <a:endParaRPr sz="1200">
+              <a:solidFill>
+                <a:schemeClr val="dk1"/>
+              </a:solidFill>
+            </a:endParaRPr>
+          </a:p>
+          <a:p>
+            <a:pPr indent="-304800" lvl="0" marL="457200" rtl="0" algn="l">
+              <a:spcBef>
+                <a:spcPts val="0"/>
+              </a:spcBef>
+              <a:spcAft>
+                <a:spcPts val="0"/>
+              </a:spcAft>
+              <a:buClr>
+                <a:schemeClr val="dk1"/>
+              </a:buClr>
+              <a:buSzPts val="1200"/>
+              <a:buChar char="●"/>
+            </a:pPr>
+            <a:r>
+              <a:rPr lang="en" sz="1200">
+                <a:solidFill>
+                  <a:schemeClr val="dk1"/>
+                </a:solidFill>
+              </a:rPr>
+              <a:t>Our analysis suggests - </a:t>
+            </a:r>
+            <a:endParaRPr sz="1200">
+              <a:solidFill>
+                <a:schemeClr val="dk1"/>
+              </a:solidFill>
+            </a:endParaRPr>
+          </a:p>
+          <a:p>
+            <a:pPr indent="-304800" lvl="0" marL="457200" rtl="0" algn="l">
+              <a:spcBef>
+                <a:spcPts val="0"/>
+              </a:spcBef>
+              <a:spcAft>
+                <a:spcPts val="0"/>
+              </a:spcAft>
+              <a:buClr>
+                <a:schemeClr val="dk1"/>
+              </a:buClr>
+              <a:buSzPts val="1200"/>
+              <a:buChar char="●"/>
+            </a:pPr>
+            <a:r>
+              <a:rPr lang="en" sz="1200">
+                <a:solidFill>
+                  <a:schemeClr val="dk1"/>
+                </a:solidFill>
+              </a:rPr>
+              <a:t>And to extrapolate - </a:t>
+            </a:r>
+            <a:endParaRPr sz="1200">
+              <a:solidFill>
+                <a:schemeClr val="dk1"/>
+              </a:solidFill>
+            </a:endParaRPr>
           </a:p>
         </p:txBody>
       </p:sp>
@@ -1637,18 +1929,449 @@
           <a:lstStyle/>
           <a:p>
             <a:pPr indent="0" lvl="0" marL="0" rtl="0" algn="l">
-              <a:spcBef>
-                <a:spcPts val="0"/>
-              </a:spcBef>
-              <a:spcAft>
-                <a:spcPts val="0"/>
-              </a:spcAft>
-              <a:buNone/>
-            </a:pPr>
-            <a:r>
-              <a:t/>
-            </a:r>
-            <a:endParaRPr/>
+              <a:lnSpc>
+                <a:spcPct val="115000"/>
+              </a:lnSpc>
+              <a:spcBef>
+                <a:spcPts val="0"/>
+              </a:spcBef>
+              <a:spcAft>
+                <a:spcPts val="0"/>
+              </a:spcAft>
+              <a:buNone/>
+            </a:pPr>
+            <a:r>
+              <a:rPr lang="en" sz="1200">
+                <a:solidFill>
+                  <a:srgbClr val="24292E"/>
+                </a:solidFill>
+                <a:highlight>
+                  <a:schemeClr val="lt1"/>
+                </a:highlight>
+              </a:rPr>
+              <a:t>Our team had several </a:t>
+            </a:r>
+            <a:r>
+              <a:rPr b="1" lang="en" sz="1200">
+                <a:solidFill>
+                  <a:srgbClr val="24292E"/>
+                </a:solidFill>
+                <a:highlight>
+                  <a:schemeClr val="lt1"/>
+                </a:highlight>
+              </a:rPr>
+              <a:t>lessons learned</a:t>
+            </a:r>
+            <a:r>
+              <a:rPr lang="en" sz="1200">
+                <a:solidFill>
+                  <a:srgbClr val="24292E"/>
+                </a:solidFill>
+                <a:highlight>
+                  <a:schemeClr val="lt1"/>
+                </a:highlight>
+              </a:rPr>
+              <a:t> throughout this project. </a:t>
+            </a:r>
+            <a:endParaRPr sz="1200">
+              <a:solidFill>
+                <a:srgbClr val="24292E"/>
+              </a:solidFill>
+              <a:highlight>
+                <a:schemeClr val="lt1"/>
+              </a:highlight>
+            </a:endParaRPr>
+          </a:p>
+          <a:p>
+            <a:pPr indent="-304800" lvl="0" marL="457200" rtl="0" algn="l">
+              <a:lnSpc>
+                <a:spcPct val="115000"/>
+              </a:lnSpc>
+              <a:spcBef>
+                <a:spcPts val="0"/>
+              </a:spcBef>
+              <a:spcAft>
+                <a:spcPts val="0"/>
+              </a:spcAft>
+              <a:buClr>
+                <a:srgbClr val="24292E"/>
+              </a:buClr>
+              <a:buSzPts val="1200"/>
+              <a:buChar char="●"/>
+            </a:pPr>
+            <a:r>
+              <a:rPr lang="en" sz="1200">
+                <a:solidFill>
+                  <a:srgbClr val="24292E"/>
+                </a:solidFill>
+                <a:highlight>
+                  <a:schemeClr val="lt1"/>
+                </a:highlight>
+              </a:rPr>
+              <a:t>Understanding the differences between classification and regression ML models was an early take-away. Where we explored options of setting a threshold for our outcome of choice and using a classification model. </a:t>
+            </a:r>
+            <a:endParaRPr sz="1200">
+              <a:solidFill>
+                <a:srgbClr val="24292E"/>
+              </a:solidFill>
+              <a:highlight>
+                <a:schemeClr val="lt1"/>
+              </a:highlight>
+            </a:endParaRPr>
+          </a:p>
+          <a:p>
+            <a:pPr indent="-304800" lvl="0" marL="457200" rtl="0" algn="l">
+              <a:lnSpc>
+                <a:spcPct val="115000"/>
+              </a:lnSpc>
+              <a:spcBef>
+                <a:spcPts val="0"/>
+              </a:spcBef>
+              <a:spcAft>
+                <a:spcPts val="0"/>
+              </a:spcAft>
+              <a:buClr>
+                <a:srgbClr val="24292E"/>
+              </a:buClr>
+              <a:buSzPts val="1200"/>
+              <a:buChar char="●"/>
+            </a:pPr>
+            <a:r>
+              <a:rPr lang="en" sz="1200">
+                <a:solidFill>
+                  <a:srgbClr val="24292E"/>
+                </a:solidFill>
+                <a:highlight>
+                  <a:schemeClr val="lt1"/>
+                </a:highlight>
+              </a:rPr>
+              <a:t>But we felt that although accuracy scores may have been higher, applicability of these results were more valuable. </a:t>
+            </a:r>
+            <a:endParaRPr sz="1200">
+              <a:solidFill>
+                <a:srgbClr val="24292E"/>
+              </a:solidFill>
+              <a:highlight>
+                <a:schemeClr val="lt1"/>
+              </a:highlight>
+            </a:endParaRPr>
+          </a:p>
+          <a:p>
+            <a:pPr indent="-304800" lvl="0" marL="457200" rtl="0" algn="l">
+              <a:lnSpc>
+                <a:spcPct val="115000"/>
+              </a:lnSpc>
+              <a:spcBef>
+                <a:spcPts val="0"/>
+              </a:spcBef>
+              <a:spcAft>
+                <a:spcPts val="0"/>
+              </a:spcAft>
+              <a:buClr>
+                <a:srgbClr val="24292E"/>
+              </a:buClr>
+              <a:buSzPts val="1200"/>
+              <a:buChar char="●"/>
+            </a:pPr>
+            <a:r>
+              <a:rPr lang="en" sz="1200">
+                <a:solidFill>
+                  <a:srgbClr val="24292E"/>
+                </a:solidFill>
+                <a:highlight>
+                  <a:schemeClr val="lt1"/>
+                </a:highlight>
+              </a:rPr>
+              <a:t>Our biggest take-away, was determining vaccine hesitancy is complex! Capturing this type of information in an accurate and precise manner is complicated, and therefore there are many influencing factors that will likely affect vaccine hesitancy in individuals and a population overall. </a:t>
+            </a:r>
+            <a:endParaRPr sz="1200">
+              <a:solidFill>
+                <a:srgbClr val="24292E"/>
+              </a:solidFill>
+              <a:highlight>
+                <a:schemeClr val="lt1"/>
+              </a:highlight>
+            </a:endParaRPr>
+          </a:p>
+          <a:p>
+            <a:pPr indent="0" lvl="0" marL="0" rtl="0" algn="l">
+              <a:lnSpc>
+                <a:spcPct val="115000"/>
+              </a:lnSpc>
+              <a:spcBef>
+                <a:spcPts val="0"/>
+              </a:spcBef>
+              <a:spcAft>
+                <a:spcPts val="0"/>
+              </a:spcAft>
+              <a:buNone/>
+            </a:pPr>
+            <a:r>
+              <a:rPr lang="en" sz="1200">
+                <a:solidFill>
+                  <a:srgbClr val="24292E"/>
+                </a:solidFill>
+                <a:highlight>
+                  <a:schemeClr val="lt1"/>
+                </a:highlight>
+              </a:rPr>
+              <a:t>For </a:t>
+            </a:r>
+            <a:r>
+              <a:rPr b="1" lang="en" sz="1200">
+                <a:solidFill>
+                  <a:srgbClr val="24292E"/>
+                </a:solidFill>
+                <a:highlight>
+                  <a:schemeClr val="lt1"/>
+                </a:highlight>
+              </a:rPr>
+              <a:t>Considerations:</a:t>
+            </a:r>
+            <a:endParaRPr b="1" sz="1200">
+              <a:solidFill>
+                <a:srgbClr val="24292E"/>
+              </a:solidFill>
+              <a:highlight>
+                <a:schemeClr val="lt1"/>
+              </a:highlight>
+            </a:endParaRPr>
+          </a:p>
+          <a:p>
+            <a:pPr indent="-304800" lvl="0" marL="457200" rtl="0" algn="l">
+              <a:lnSpc>
+                <a:spcPct val="115000"/>
+              </a:lnSpc>
+              <a:spcBef>
+                <a:spcPts val="0"/>
+              </a:spcBef>
+              <a:spcAft>
+                <a:spcPts val="0"/>
+              </a:spcAft>
+              <a:buClr>
+                <a:srgbClr val="24292E"/>
+              </a:buClr>
+              <a:buSzPts val="1200"/>
+              <a:buChar char="●"/>
+            </a:pPr>
+            <a:r>
+              <a:rPr lang="en" sz="1200">
+                <a:solidFill>
+                  <a:srgbClr val="24292E"/>
+                </a:solidFill>
+                <a:highlight>
+                  <a:schemeClr val="lt1"/>
+                </a:highlight>
+              </a:rPr>
+              <a:t>We can explore different types of regression models to compare results</a:t>
+            </a:r>
+            <a:endParaRPr sz="1200">
+              <a:solidFill>
+                <a:srgbClr val="24292E"/>
+              </a:solidFill>
+              <a:highlight>
+                <a:schemeClr val="lt1"/>
+              </a:highlight>
+            </a:endParaRPr>
+          </a:p>
+          <a:p>
+            <a:pPr indent="-304800" lvl="0" marL="457200" rtl="0" algn="l">
+              <a:lnSpc>
+                <a:spcPct val="115000"/>
+              </a:lnSpc>
+              <a:spcBef>
+                <a:spcPts val="0"/>
+              </a:spcBef>
+              <a:spcAft>
+                <a:spcPts val="0"/>
+              </a:spcAft>
+              <a:buClr>
+                <a:srgbClr val="24292E"/>
+              </a:buClr>
+              <a:buSzPts val="1200"/>
+              <a:buChar char="●"/>
+            </a:pPr>
+            <a:r>
+              <a:rPr lang="en" sz="1200">
+                <a:solidFill>
+                  <a:srgbClr val="24292E"/>
+                </a:solidFill>
+                <a:highlight>
+                  <a:schemeClr val="lt1"/>
+                </a:highlight>
+              </a:rPr>
+              <a:t>And we can also investigate larger datasets with additional feature inputs</a:t>
+            </a:r>
+            <a:endParaRPr sz="1200">
+              <a:solidFill>
+                <a:srgbClr val="24292E"/>
+              </a:solidFill>
+              <a:highlight>
+                <a:schemeClr val="lt1"/>
+              </a:highlight>
+            </a:endParaRPr>
+          </a:p>
+          <a:p>
+            <a:pPr indent="0" lvl="0" marL="0" rtl="0" algn="l">
+              <a:lnSpc>
+                <a:spcPct val="115000"/>
+              </a:lnSpc>
+              <a:spcBef>
+                <a:spcPts val="0"/>
+              </a:spcBef>
+              <a:spcAft>
+                <a:spcPts val="0"/>
+              </a:spcAft>
+              <a:buNone/>
+            </a:pPr>
+            <a:r>
+              <a:rPr lang="en" sz="1200">
+                <a:solidFill>
+                  <a:srgbClr val="24292E"/>
+                </a:solidFill>
+                <a:highlight>
+                  <a:schemeClr val="lt1"/>
+                </a:highlight>
+              </a:rPr>
+              <a:t>In terms of </a:t>
+            </a:r>
+            <a:r>
+              <a:rPr b="1" lang="en" sz="1200">
+                <a:solidFill>
+                  <a:srgbClr val="24292E"/>
+                </a:solidFill>
+                <a:highlight>
+                  <a:schemeClr val="lt1"/>
+                </a:highlight>
+              </a:rPr>
+              <a:t>Next Steps:</a:t>
+            </a:r>
+            <a:endParaRPr b="1" sz="1200">
+              <a:solidFill>
+                <a:srgbClr val="24292E"/>
+              </a:solidFill>
+              <a:highlight>
+                <a:schemeClr val="lt1"/>
+              </a:highlight>
+            </a:endParaRPr>
+          </a:p>
+          <a:p>
+            <a:pPr indent="-304800" lvl="0" marL="457200" rtl="0" algn="l">
+              <a:lnSpc>
+                <a:spcPct val="115000"/>
+              </a:lnSpc>
+              <a:spcBef>
+                <a:spcPts val="0"/>
+              </a:spcBef>
+              <a:spcAft>
+                <a:spcPts val="0"/>
+              </a:spcAft>
+              <a:buClr>
+                <a:srgbClr val="24292E"/>
+              </a:buClr>
+              <a:buSzPts val="1200"/>
+              <a:buChar char="●"/>
+            </a:pPr>
+            <a:r>
+              <a:rPr lang="en" sz="1200">
+                <a:solidFill>
+                  <a:srgbClr val="24292E"/>
+                </a:solidFill>
+                <a:highlight>
+                  <a:schemeClr val="lt1"/>
+                </a:highlight>
+              </a:rPr>
+              <a:t>We plan to connect our dashboard to a webpage </a:t>
+            </a:r>
+            <a:endParaRPr sz="1200">
+              <a:solidFill>
+                <a:srgbClr val="24292E"/>
+              </a:solidFill>
+              <a:highlight>
+                <a:schemeClr val="lt1"/>
+              </a:highlight>
+            </a:endParaRPr>
+          </a:p>
+          <a:p>
+            <a:pPr indent="0" lvl="0" marL="0" rtl="0" algn="l">
+              <a:lnSpc>
+                <a:spcPct val="115000"/>
+              </a:lnSpc>
+              <a:spcBef>
+                <a:spcPts val="0"/>
+              </a:spcBef>
+              <a:spcAft>
+                <a:spcPts val="0"/>
+              </a:spcAft>
+              <a:buNone/>
+            </a:pPr>
+            <a:r>
+              <a:rPr lang="en" sz="1200">
+                <a:solidFill>
+                  <a:srgbClr val="24292E"/>
+                </a:solidFill>
+                <a:highlight>
+                  <a:schemeClr val="lt1"/>
+                </a:highlight>
+              </a:rPr>
+              <a:t>Also - to speak to this</a:t>
+            </a:r>
+            <a:r>
+              <a:rPr b="1" lang="en" sz="1200">
+                <a:solidFill>
+                  <a:srgbClr val="24292E"/>
+                </a:solidFill>
+                <a:highlight>
+                  <a:schemeClr val="lt1"/>
+                </a:highlight>
+              </a:rPr>
+              <a:t> image:</a:t>
+            </a:r>
+            <a:endParaRPr b="1" sz="1200">
+              <a:solidFill>
+                <a:srgbClr val="24292E"/>
+              </a:solidFill>
+              <a:highlight>
+                <a:schemeClr val="lt1"/>
+              </a:highlight>
+            </a:endParaRPr>
+          </a:p>
+          <a:p>
+            <a:pPr indent="-304800" lvl="0" marL="457200" rtl="0" algn="l">
+              <a:lnSpc>
+                <a:spcPct val="115000"/>
+              </a:lnSpc>
+              <a:spcBef>
+                <a:spcPts val="0"/>
+              </a:spcBef>
+              <a:spcAft>
+                <a:spcPts val="0"/>
+              </a:spcAft>
+              <a:buClr>
+                <a:srgbClr val="24292E"/>
+              </a:buClr>
+              <a:buSzPts val="1200"/>
+              <a:buChar char="●"/>
+            </a:pPr>
+            <a:r>
+              <a:rPr lang="en" sz="1200">
+                <a:solidFill>
+                  <a:srgbClr val="24292E"/>
+                </a:solidFill>
+                <a:highlight>
+                  <a:schemeClr val="lt1"/>
+                </a:highlight>
+              </a:rPr>
+              <a:t>This is a line graph representing vaccination coverage in Canada, as you can see approximately 60% of Canadian have received their first vaccine dose by June 5th. In the coming months we’ll determine if vaccine hesitancy acts as a barrier for reaching herd immunity. </a:t>
+            </a:r>
+            <a:endParaRPr sz="1200">
+              <a:solidFill>
+                <a:srgbClr val="24292E"/>
+              </a:solidFill>
+              <a:highlight>
+                <a:schemeClr val="lt1"/>
+              </a:highlight>
+            </a:endParaRPr>
           </a:p>
         </p:txBody>
       </p:sp>
@@ -1735,19 +2458,37 @@
           </a:bodyPr>
           <a:lstStyle/>
           <a:p>
-            <a:pPr indent="0" lvl="0" marL="0" rtl="0" algn="l">
-              <a:spcBef>
-                <a:spcPts val="0"/>
-              </a:spcBef>
-              <a:spcAft>
-                <a:spcPts val="0"/>
-              </a:spcAft>
-              <a:buNone/>
-            </a:pPr>
-            <a:r>
-              <a:t/>
-            </a:r>
-            <a:endParaRPr/>
+            <a:pPr indent="-304800" lvl="0" marL="457200" rtl="0" algn="l">
+              <a:spcBef>
+                <a:spcPts val="0"/>
+              </a:spcBef>
+              <a:spcAft>
+                <a:spcPts val="0"/>
+              </a:spcAft>
+              <a:buSzPts val="1200"/>
+              <a:buChar char="●"/>
+            </a:pPr>
+            <a:r>
+              <a:rPr lang="en" sz="1200"/>
+              <a:t>Lastly, we’ll provide an overview of </a:t>
+            </a:r>
+            <a:r>
+              <a:rPr lang="en" sz="1200"/>
+              <a:t>technologies</a:t>
+            </a:r>
+            <a:r>
+              <a:rPr lang="en" sz="1200"/>
+              <a:t> and </a:t>
+            </a:r>
+            <a:r>
+              <a:rPr lang="en" sz="1200"/>
+              <a:t>tools</a:t>
+            </a:r>
+            <a:r>
+              <a:rPr lang="en" sz="1200"/>
+              <a:t> used in this project:</a:t>
+            </a:r>
+            <a:endParaRPr sz="1200"/>
           </a:p>
         </p:txBody>
       </p:sp>
@@ -1941,11 +2682,27 @@
                 <a:spcPts val="0"/>
               </a:spcAft>
               <a:buSzPts val="1200"/>
-              <a:buChar char="●"/>
+              <a:buChar char="-"/>
             </a:pPr>
             <a:r>
               <a:rPr lang="en" sz="1200"/>
-              <a:t>As an outline for our presentation, we plan to walk you through [read slide].</a:t>
+              <a:t>As an outline for our presentation, we plan to walk you through the topic selection and rationale behind it, the description of our data source, our proposed questions we aim to answers, data exploration and visualization, the analysis of our data, as well as </a:t>
+            </a:r>
+            <a:r>
+              <a:rPr lang="en" sz="1200"/>
+              <a:t>conclusion</a:t>
+            </a:r>
+            <a:r>
+              <a:rPr lang="en" sz="1200"/>
+              <a:t>, lessons learned, next steps, and </a:t>
+            </a:r>
+            <a:r>
+              <a:rPr lang="en" sz="1200">
+                <a:solidFill>
+                  <a:schemeClr val="dk1"/>
+                </a:solidFill>
+              </a:rPr>
+              <a:t>technologies and tools utilized</a:t>
             </a:r>
             <a:endParaRPr sz="1200"/>
           </a:p>
@@ -2034,7 +2791,10 @@
           </a:bodyPr>
           <a:lstStyle/>
           <a:p>
-            <a:pPr indent="-304800" lvl="0" marL="457200" rtl="0" algn="l">
+            <a:pPr indent="-228600" lvl="0" marL="457200" rtl="0" algn="l">
+              <a:lnSpc>
+                <a:spcPct val="115000"/>
+              </a:lnSpc>
               <a:spcBef>
                 <a:spcPts val="0"/>
               </a:spcBef>
@@ -2044,8 +2804,9 @@
               <a:buClr>
                 <a:schemeClr val="dk1"/>
               </a:buClr>
-              <a:buSzPts val="1200"/>
-              <a:buChar char="●"/>
+              <a:buSzPts val="1100"/>
+              <a:buFont typeface="Arial"/>
+              <a:buNone/>
             </a:pPr>
             <a:r>
               <a:rPr lang="en" sz="1200">
@@ -2053,7 +2814,19 @@
                   <a:schemeClr val="dk1"/>
                 </a:solidFill>
               </a:rPr>
-              <a:t>Our selected topic is </a:t>
+              <a:t>-</a:t>
+            </a:r>
+            <a:r>
+              <a:rPr lang="en" sz="700">
+                <a:solidFill>
+                  <a:schemeClr val="dk1"/>
+                </a:solidFill>
+                <a:latin typeface="Times New Roman"/>
+                <a:ea typeface="Times New Roman"/>
+                <a:cs typeface="Times New Roman"/>
+                <a:sym typeface="Times New Roman"/>
+              </a:rPr>
+              <a:t>   	</a:t>
             </a:r>
             <a:r>
               <a:rPr lang="en" sz="1200">
@@ -2061,15 +2834,7 @@
                   <a:schemeClr val="dk1"/>
                 </a:solidFill>
               </a:rPr>
-              <a:t>s</a:t>
-            </a:r>
-            <a:r>
-              <a:rPr lang="en" sz="1200">
-                <a:solidFill>
-                  <a:schemeClr val="dk1"/>
-                </a:solidFill>
-              </a:rPr>
-              <a:t>ociodemographic data and COVID-19 vaccine hesitancy in the United States.</a:t>
+              <a:t>Our topic is how the sociodemographic data across various counties relates to COVID-19 vaccine hesitancy in the United States</a:t>
             </a:r>
             <a:endParaRPr sz="1200">
               <a:solidFill>
@@ -2078,7 +2843,10 @@
             </a:endParaRPr>
           </a:p>
           <a:p>
-            <a:pPr indent="-304800" lvl="0" marL="457200" rtl="0" algn="l">
+            <a:pPr indent="-228600" lvl="0" marL="457200" rtl="0" algn="l">
+              <a:lnSpc>
+                <a:spcPct val="115000"/>
+              </a:lnSpc>
               <a:spcBef>
                 <a:spcPts val="0"/>
               </a:spcBef>
@@ -2088,19 +2856,37 @@
               <a:buClr>
                 <a:schemeClr val="dk1"/>
               </a:buClr>
-              <a:buSzPts val="1200"/>
-              <a:buChar char="●"/>
+              <a:buSzPts val="1100"/>
+              <a:buFont typeface="Arial"/>
+              <a:buNone/>
             </a:pPr>
             <a:r>
               <a:rPr lang="en" sz="1200">
                 <a:solidFill>
                   <a:schemeClr val="dk1"/>
                 </a:solidFill>
-                <a:highlight>
-                  <a:schemeClr val="lt1"/>
-                </a:highlight>
               </a:rPr>
-              <a:t>Given the global presence of COVID-19 and the implementation of vaccines in recent months. Our team decided to look into vaccine hesitancy to understand this issue better.</a:t>
+              <a:t>-</a:t>
+            </a:r>
+            <a:r>
+              <a:rPr lang="en" sz="700">
+                <a:solidFill>
+                  <a:schemeClr val="dk1"/>
+                </a:solidFill>
+                <a:latin typeface="Times New Roman"/>
+                <a:ea typeface="Times New Roman"/>
+                <a:cs typeface="Times New Roman"/>
+                <a:sym typeface="Times New Roman"/>
+              </a:rPr>
+              <a:t>   	</a:t>
+            </a:r>
+            <a:r>
+              <a:rPr lang="en" sz="1200">
+                <a:solidFill>
+                  <a:schemeClr val="dk1"/>
+                </a:solidFill>
+              </a:rPr>
+              <a:t>Sociodemographic variables within out dataset includes age, sex, ethnicity, education, employment, and income</a:t>
             </a:r>
             <a:endParaRPr sz="1200">
               <a:solidFill>
@@ -2109,7 +2895,10 @@
             </a:endParaRPr>
           </a:p>
           <a:p>
-            <a:pPr indent="-304800" lvl="0" marL="457200" rtl="0" algn="l">
+            <a:pPr indent="-228600" lvl="0" marL="457200" rtl="0" algn="l">
+              <a:lnSpc>
+                <a:spcPct val="115000"/>
+              </a:lnSpc>
               <a:spcBef>
                 <a:spcPts val="0"/>
               </a:spcBef>
@@ -2119,8 +2908,9 @@
               <a:buClr>
                 <a:schemeClr val="dk1"/>
               </a:buClr>
-              <a:buSzPts val="1200"/>
-              <a:buChar char="●"/>
+              <a:buSzPts val="1100"/>
+              <a:buFont typeface="Arial"/>
+              <a:buNone/>
             </a:pPr>
             <a:r>
               <a:rPr lang="en" sz="1200">
@@ -2128,7 +2918,19 @@
                   <a:schemeClr val="dk1"/>
                 </a:solidFill>
               </a:rPr>
-              <a:t>Research suggests COVID-19 has </a:t>
+              <a:t>-</a:t>
+            </a:r>
+            <a:r>
+              <a:rPr lang="en" sz="700">
+                <a:solidFill>
+                  <a:schemeClr val="dk1"/>
+                </a:solidFill>
+                <a:latin typeface="Times New Roman"/>
+                <a:ea typeface="Times New Roman"/>
+                <a:cs typeface="Times New Roman"/>
+                <a:sym typeface="Times New Roman"/>
+              </a:rPr>
+              <a:t>   	</a:t>
             </a:r>
             <a:r>
               <a:rPr lang="en" sz="1200">
@@ -2136,47 +2938,7 @@
                   <a:schemeClr val="dk1"/>
                 </a:solidFill>
               </a:rPr>
-              <a:t>disproportionately</a:t>
-            </a:r>
-            <a:r>
-              <a:rPr lang="en" sz="1200">
-                <a:solidFill>
-                  <a:schemeClr val="dk1"/>
-                </a:solidFill>
-              </a:rPr>
-              <a:t> affected priority populations greater, and our team was interested in </a:t>
-            </a:r>
-            <a:r>
-              <a:rPr lang="en" sz="1200">
-                <a:solidFill>
-                  <a:schemeClr val="dk1"/>
-                </a:solidFill>
-              </a:rPr>
-              <a:t>determining</a:t>
-            </a:r>
-            <a:r>
-              <a:rPr lang="en" sz="1200">
-                <a:solidFill>
-                  <a:schemeClr val="dk1"/>
-                </a:solidFill>
-              </a:rPr>
-              <a:t> correlations between vaccine </a:t>
-            </a:r>
-            <a:r>
-              <a:rPr lang="en" sz="1200">
-                <a:solidFill>
-                  <a:schemeClr val="dk1"/>
-                </a:solidFill>
-              </a:rPr>
-              <a:t>hesitancy</a:t>
-            </a:r>
-            <a:r>
-              <a:rPr lang="en" sz="1200">
-                <a:solidFill>
-                  <a:schemeClr val="dk1"/>
-                </a:solidFill>
-              </a:rPr>
-              <a:t> and sociodemographic data. </a:t>
+              <a:t>Given the global presence of COVID-19 and the implementation of vaccines in recent months</a:t>
             </a:r>
             <a:endParaRPr sz="1200">
               <a:solidFill>
@@ -2185,7 +2947,10 @@
             </a:endParaRPr>
           </a:p>
           <a:p>
-            <a:pPr indent="-304800" lvl="0" marL="457200" rtl="0" algn="l">
+            <a:pPr indent="-228600" lvl="0" marL="457200" rtl="0" algn="l">
+              <a:lnSpc>
+                <a:spcPct val="115000"/>
+              </a:lnSpc>
               <a:spcBef>
                 <a:spcPts val="0"/>
               </a:spcBef>
@@ -2195,8 +2960,9 @@
               <a:buClr>
                 <a:schemeClr val="dk1"/>
               </a:buClr>
-              <a:buSzPts val="1200"/>
-              <a:buChar char="●"/>
+              <a:buSzPts val="1100"/>
+              <a:buFont typeface="Arial"/>
+              <a:buNone/>
             </a:pPr>
             <a:r>
               <a:rPr lang="en" sz="1200">
@@ -2204,40 +2970,90 @@
                   <a:schemeClr val="dk1"/>
                 </a:solidFill>
               </a:rPr>
-              <a:t>Socio-demographic variables</a:t>
+              <a:t>-</a:t>
+            </a:r>
+            <a:r>
+              <a:rPr lang="en" sz="700">
+                <a:solidFill>
+                  <a:schemeClr val="dk1"/>
+                </a:solidFill>
+                <a:latin typeface="Times New Roman"/>
+                <a:ea typeface="Times New Roman"/>
+                <a:cs typeface="Times New Roman"/>
+                <a:sym typeface="Times New Roman"/>
+              </a:rPr>
+              <a:t>   	</a:t>
             </a:r>
             <a:r>
               <a:rPr lang="en" sz="1200">
                 <a:solidFill>
                   <a:schemeClr val="dk1"/>
                 </a:solidFill>
-                <a:highlight>
-                  <a:srgbClr val="FFFFFF"/>
-                </a:highlight>
               </a:rPr>
-              <a:t> include, for example: age, sex, </a:t>
-            </a:r>
+              <a:t>Our team actually decided to look into vaccine hesitancy to understand this issue better</a:t>
+            </a:r>
+            <a:endParaRPr sz="1200">
+              <a:solidFill>
+                <a:schemeClr val="dk1"/>
+              </a:solidFill>
+            </a:endParaRPr>
+          </a:p>
+          <a:p>
+            <a:pPr indent="-228600" lvl="0" marL="457200" rtl="0" algn="l">
+              <a:lnSpc>
+                <a:spcPct val="115000"/>
+              </a:lnSpc>
+              <a:spcBef>
+                <a:spcPts val="0"/>
+              </a:spcBef>
+              <a:spcAft>
+                <a:spcPts val="0"/>
+              </a:spcAft>
+              <a:buNone/>
+            </a:pPr>
             <a:r>
               <a:rPr lang="en" sz="1200">
                 <a:solidFill>
                   <a:schemeClr val="dk1"/>
                 </a:solidFill>
-                <a:highlight>
-                  <a:srgbClr val="FFFFFF"/>
-                </a:highlight>
               </a:rPr>
-              <a:t>ethnicity, </a:t>
+              <a:t>-</a:t>
+            </a:r>
+            <a:r>
+              <a:rPr lang="en" sz="700">
+                <a:solidFill>
+                  <a:schemeClr val="dk1"/>
+                </a:solidFill>
+                <a:latin typeface="Times New Roman"/>
+                <a:ea typeface="Times New Roman"/>
+                <a:cs typeface="Times New Roman"/>
+                <a:sym typeface="Times New Roman"/>
+              </a:rPr>
+              <a:t>   	</a:t>
             </a:r>
             <a:r>
               <a:rPr lang="en" sz="1200">
                 <a:solidFill>
                   <a:schemeClr val="dk1"/>
                 </a:solidFill>
-                <a:highlight>
-                  <a:srgbClr val="FFFFFF"/>
-                </a:highlight>
               </a:rPr>
-              <a:t>education, employment and income. </a:t>
+              <a:t>Research suggests that COVID-19 has </a:t>
+            </a:r>
+            <a:r>
+              <a:rPr lang="en" sz="1200">
+                <a:solidFill>
+                  <a:schemeClr val="dk1"/>
+                </a:solidFill>
+              </a:rPr>
+              <a:t>disproportionately</a:t>
+            </a:r>
+            <a:r>
+              <a:rPr lang="en" sz="1200">
+                <a:solidFill>
+                  <a:schemeClr val="dk1"/>
+                </a:solidFill>
+              </a:rPr>
+              <a:t> affected priority populations greater, and our team was interested in determining correlations between vaccine hesitancy and sociodemographic data</a:t>
             </a:r>
             <a:endParaRPr sz="1200">
               <a:solidFill>
@@ -2331,6 +3147,9 @@
           <a:lstStyle/>
           <a:p>
             <a:pPr indent="-304800" lvl="0" marL="457200" rtl="0" algn="l">
+              <a:lnSpc>
+                <a:spcPct val="115000"/>
+              </a:lnSpc>
               <a:spcBef>
                 <a:spcPts val="0"/>
               </a:spcBef>
@@ -2341,7 +3160,7 @@
                 <a:srgbClr val="252525"/>
               </a:buClr>
               <a:buSzPts val="1200"/>
-              <a:buChar char="●"/>
+              <a:buChar char="-"/>
             </a:pPr>
             <a:r>
               <a:rPr lang="en" sz="1200">
@@ -2349,7 +3168,7 @@
                   <a:srgbClr val="252525"/>
                 </a:solidFill>
               </a:rPr>
-              <a:t>Our team secured a dataset from Kaggle that captures US county-level data. </a:t>
+              <a:t>In terms of our data sources, our team secured a dataset from Kaggle that captures US county-level data</a:t>
             </a:r>
             <a:endParaRPr sz="1200">
               <a:solidFill>
@@ -2359,6 +3178,9 @@
           </a:p>
           <a:p>
             <a:pPr indent="-304800" lvl="0" marL="457200" rtl="0" algn="l">
+              <a:lnSpc>
+                <a:spcPct val="115000"/>
+              </a:lnSpc>
               <a:spcBef>
                 <a:spcPts val="0"/>
               </a:spcBef>
@@ -2369,7 +3191,7 @@
                 <a:srgbClr val="252525"/>
               </a:buClr>
               <a:buSzPts val="1200"/>
-              <a:buChar char="●"/>
+              <a:buChar char="-"/>
             </a:pPr>
             <a:r>
               <a:rPr lang="en" sz="1200">
@@ -2377,7 +3199,7 @@
                   <a:srgbClr val="252525"/>
                 </a:solidFill>
               </a:rPr>
-              <a:t>This Kaggle data was sourced from data.gov an open-source US data platform. </a:t>
+              <a:t>This Kaggle data was sourced from data.gov, which is an open-source US data platform </a:t>
             </a:r>
             <a:endParaRPr sz="1200">
               <a:solidFill>
@@ -2387,6 +3209,9 @@
           </a:p>
           <a:p>
             <a:pPr indent="-304800" lvl="0" marL="457200" rtl="0" algn="l">
+              <a:lnSpc>
+                <a:spcPct val="115000"/>
+              </a:lnSpc>
               <a:spcBef>
                 <a:spcPts val="0"/>
               </a:spcBef>
@@ -2397,7 +3222,7 @@
                 <a:srgbClr val="252525"/>
               </a:buClr>
               <a:buSzPts val="1200"/>
-              <a:buChar char="●"/>
+              <a:buChar char="-"/>
             </a:pPr>
             <a:r>
               <a:rPr lang="en" sz="1200">
@@ -2405,27 +3230,34 @@
                   <a:srgbClr val="252525"/>
                 </a:solidFill>
               </a:rPr>
-              <a:t>The dataset is broken down into sociodemographics of the counties - represented by % of population that are: Hispanic, Black, Asian, White, Indigenous Americans/Indigenous Alaskans, Hawaiian/Pacific Islander</a:t>
+              <a:t>The dataset is broken down into sociodemographics of the counties - represented by the % of population that are: Hispanic, Black, Asian, White, Indigenous Americans/Indigenous Alaskans, Hawaiian/Pacific Islander, and other</a:t>
             </a:r>
             <a:endParaRPr sz="1200">
               <a:solidFill>
+                <a:schemeClr val="dk1"/>
+              </a:solidFill>
+              <a:latin typeface="Times New Roman"/>
+              <a:ea typeface="Times New Roman"/>
+              <a:cs typeface="Times New Roman"/>
+              <a:sym typeface="Times New Roman"/>
+            </a:endParaRPr>
+          </a:p>
+          <a:p>
+            <a:pPr indent="-304800" lvl="0" marL="457200" rtl="0" algn="l">
+              <a:lnSpc>
+                <a:spcPct val="115000"/>
+              </a:lnSpc>
+              <a:spcBef>
+                <a:spcPts val="0"/>
+              </a:spcBef>
+              <a:spcAft>
+                <a:spcPts val="0"/>
+              </a:spcAft>
+              <a:buClr>
                 <a:srgbClr val="252525"/>
-              </a:solidFill>
-            </a:endParaRPr>
-          </a:p>
-          <a:p>
-            <a:pPr indent="-304800" lvl="0" marL="457200" rtl="0" algn="l">
-              <a:spcBef>
-                <a:spcPts val="0"/>
-              </a:spcBef>
-              <a:spcAft>
-                <a:spcPts val="0"/>
-              </a:spcAft>
-              <a:buClr>
-                <a:srgbClr val="252525"/>
               </a:buClr>
               <a:buSzPts val="1200"/>
-              <a:buChar char="●"/>
+              <a:buChar char="-"/>
             </a:pPr>
             <a:r>
               <a:rPr lang="en" sz="1200">
@@ -2433,53 +3265,25 @@
                   <a:srgbClr val="252525"/>
                 </a:solidFill>
                 <a:highlight>
-                  <a:schemeClr val="lt1"/>
+                  <a:srgbClr val="FFFFFF"/>
                 </a:highlight>
               </a:rPr>
-              <a:t>The CDC's Social Vulnerability Index (SVI) summarizes the extent to which a community is socially vulnerable to disaster. SVI values range from 0 (least vulnerable) to 1 (most vulnerable). </a:t>
-            </a:r>
-            <a:endParaRPr sz="1200">
-              <a:solidFill>
-                <a:srgbClr val="252525"/>
-              </a:solidFill>
-            </a:endParaRPr>
-          </a:p>
-          <a:p>
-            <a:pPr indent="-304800" lvl="0" marL="457200" rtl="0" algn="l">
-              <a:spcBef>
-                <a:spcPts val="0"/>
-              </a:spcBef>
-              <a:spcAft>
-                <a:spcPts val="0"/>
-              </a:spcAft>
-              <a:buClr>
-                <a:srgbClr val="252525"/>
-              </a:buClr>
-              <a:buSzPts val="1200"/>
-              <a:buChar char="●"/>
-            </a:pPr>
-            <a:r>
-              <a:rPr lang="en" sz="1200">
-                <a:solidFill>
-                  <a:srgbClr val="252525"/>
-                </a:solidFill>
-                <a:highlight>
-                  <a:schemeClr val="lt1"/>
-                </a:highlight>
-              </a:rPr>
-              <a:t>Vaccine implementation indicators include: CVAC level of concern - which measures the level of concern for a difficult rollout on a range from 0 (lowest concern) to 1 (highest concern).</a:t>
+              <a:t>The CDC's Social Vulnerability Index, or SVI, summarizes the extent to which a community is socially vulnerable to disaster. SVI values range from 0 (so the least vulnerable) to 1 (most vulnerable). </a:t>
             </a:r>
             <a:endParaRPr sz="1200">
               <a:solidFill>
                 <a:srgbClr val="252525"/>
               </a:solidFill>
               <a:highlight>
-                <a:schemeClr val="lt1"/>
+                <a:srgbClr val="FFFFFF"/>
               </a:highlight>
             </a:endParaRPr>
           </a:p>
           <a:p>
             <a:pPr indent="-304800" lvl="0" marL="457200" rtl="0" algn="l">
+              <a:lnSpc>
+                <a:spcPct val="115000"/>
+              </a:lnSpc>
               <a:spcBef>
                 <a:spcPts val="0"/>
               </a:spcBef>
@@ -2490,7 +3294,7 @@
                 <a:srgbClr val="252525"/>
               </a:buClr>
               <a:buSzPts val="1200"/>
-              <a:buChar char="●"/>
+              <a:buChar char="-"/>
             </a:pPr>
             <a:r>
               <a:rPr lang="en" sz="1200">
@@ -2498,22 +3302,25 @@
                   <a:srgbClr val="252525"/>
                 </a:solidFill>
                 <a:highlight>
-                  <a:schemeClr val="lt1"/>
+                  <a:srgbClr val="FFFFFF"/>
                 </a:highlight>
               </a:rPr>
-              <a:t>Our outcomes of interest was the % of population that was estimated to be vaccine hesitant and the % of population that was estimated to be strongly vaccine hesitant.</a:t>
+              <a:t>Vaccine implementation indicators include the CVAC level of concern which basically measures the level of concern for a difficult rollout on a range from 0 (lowest concern) to 1 (highest concern)</a:t>
             </a:r>
             <a:endParaRPr sz="1200">
               <a:solidFill>
                 <a:srgbClr val="252525"/>
               </a:solidFill>
               <a:highlight>
-                <a:schemeClr val="lt1"/>
+                <a:srgbClr val="FFFFFF"/>
               </a:highlight>
             </a:endParaRPr>
           </a:p>
           <a:p>
             <a:pPr indent="-304800" lvl="0" marL="457200" rtl="0" algn="l">
+              <a:lnSpc>
+                <a:spcPct val="115000"/>
+              </a:lnSpc>
               <a:spcBef>
                 <a:spcPts val="0"/>
               </a:spcBef>
@@ -2524,7 +3331,7 @@
                 <a:srgbClr val="252525"/>
               </a:buClr>
               <a:buSzPts val="1200"/>
-              <a:buChar char="●"/>
+              <a:buChar char="-"/>
             </a:pPr>
             <a:r>
               <a:rPr lang="en" sz="1200">
@@ -2532,10 +3339,69 @@
                   <a:srgbClr val="252525"/>
                 </a:solidFill>
                 <a:highlight>
-                  <a:schemeClr val="lt1"/>
+                  <a:srgbClr val="FFFFFF"/>
                 </a:highlight>
               </a:rPr>
-              <a:t>Overall our dataset contained information from 3,142 counties in the US.</a:t>
+              <a:t>Our outcomes of interest was the % of population that was estimated to be vaccine hesitant and the % of population that was estimated to be strongly vaccine hesitant.</a:t>
+            </a:r>
+            <a:endParaRPr sz="1200">
+              <a:solidFill>
+                <a:srgbClr val="252525"/>
+              </a:solidFill>
+              <a:highlight>
+                <a:srgbClr val="FFFFFF"/>
+              </a:highlight>
+            </a:endParaRPr>
+          </a:p>
+          <a:p>
+            <a:pPr indent="-304800" lvl="0" marL="457200" rtl="0" algn="l">
+              <a:lnSpc>
+                <a:spcPct val="115000"/>
+              </a:lnSpc>
+              <a:spcBef>
+                <a:spcPts val="0"/>
+              </a:spcBef>
+              <a:spcAft>
+                <a:spcPts val="0"/>
+              </a:spcAft>
+              <a:buClr>
+                <a:srgbClr val="252525"/>
+              </a:buClr>
+              <a:buSzPts val="1200"/>
+              <a:buChar char="-"/>
+            </a:pPr>
+            <a:r>
+              <a:rPr lang="en" sz="1200">
+                <a:solidFill>
+                  <a:srgbClr val="252525"/>
+                </a:solidFill>
+                <a:highlight>
+                  <a:srgbClr val="FFFFFF"/>
+                </a:highlight>
+              </a:rPr>
+              <a:t>And overall our dataset contained information from 3,142 counties in the US.</a:t>
+            </a:r>
+            <a:endParaRPr sz="1200">
+              <a:solidFill>
+                <a:srgbClr val="252525"/>
+              </a:solidFill>
+              <a:highlight>
+                <a:srgbClr val="FFFFFF"/>
+              </a:highlight>
+            </a:endParaRPr>
+          </a:p>
+          <a:p>
+            <a:pPr indent="0" lvl="0" marL="0" rtl="0" algn="l">
+              <a:spcBef>
+                <a:spcPts val="0"/>
+              </a:spcBef>
+              <a:spcAft>
+                <a:spcPts val="0"/>
+              </a:spcAft>
+              <a:buNone/>
+            </a:pPr>
+            <a:r>
+              <a:t/>
             </a:r>
             <a:endParaRPr sz="1200">
               <a:solidFill>
@@ -2628,7 +3494,250 @@
           </a:bodyPr>
           <a:lstStyle/>
           <a:p>
-            <a:pPr indent="0" lvl="0" marL="0" rtl="0" algn="l">
+            <a:pPr indent="-228600" lvl="0" marL="457200" rtl="0" algn="l">
+              <a:lnSpc>
+                <a:spcPct val="115000"/>
+              </a:lnSpc>
+              <a:spcBef>
+                <a:spcPts val="0"/>
+              </a:spcBef>
+              <a:spcAft>
+                <a:spcPts val="0"/>
+              </a:spcAft>
+              <a:buClr>
+                <a:schemeClr val="dk1"/>
+              </a:buClr>
+              <a:buSzPts val="1100"/>
+              <a:buFont typeface="Arial"/>
+              <a:buNone/>
+            </a:pPr>
+            <a:r>
+              <a:rPr lang="en" sz="1000">
+                <a:solidFill>
+                  <a:schemeClr val="dk1"/>
+                </a:solidFill>
+              </a:rPr>
+              <a:t>-</a:t>
+            </a:r>
+            <a:r>
+              <a:rPr lang="en" sz="700">
+                <a:solidFill>
+                  <a:schemeClr val="dk1"/>
+                </a:solidFill>
+                <a:latin typeface="Times New Roman"/>
+                <a:ea typeface="Times New Roman"/>
+                <a:cs typeface="Times New Roman"/>
+                <a:sym typeface="Times New Roman"/>
+              </a:rPr>
+              <a:t>    	</a:t>
+            </a:r>
+            <a:r>
+              <a:rPr lang="en" sz="1200">
+                <a:solidFill>
+                  <a:schemeClr val="dk1"/>
+                </a:solidFill>
+              </a:rPr>
+              <a:t>The following are the proposed questions that we aimed to find answers to while analysing our dataset, and we have broken it up into 4 sections: predict, impact, analysis, and extrapolate</a:t>
+            </a:r>
+            <a:endParaRPr sz="1200">
+              <a:solidFill>
+                <a:schemeClr val="dk1"/>
+              </a:solidFill>
+            </a:endParaRPr>
+          </a:p>
+          <a:p>
+            <a:pPr indent="-228600" lvl="0" marL="457200" rtl="0" algn="l">
+              <a:lnSpc>
+                <a:spcPct val="115000"/>
+              </a:lnSpc>
+              <a:spcBef>
+                <a:spcPts val="0"/>
+              </a:spcBef>
+              <a:spcAft>
+                <a:spcPts val="0"/>
+              </a:spcAft>
+              <a:buNone/>
+            </a:pPr>
+            <a:r>
+              <a:rPr lang="en" sz="1000">
+                <a:solidFill>
+                  <a:schemeClr val="dk1"/>
+                </a:solidFill>
+              </a:rPr>
+              <a:t>-</a:t>
+            </a:r>
+            <a:r>
+              <a:rPr lang="en" sz="700">
+                <a:solidFill>
+                  <a:schemeClr val="dk1"/>
+                </a:solidFill>
+                <a:latin typeface="Times New Roman"/>
+                <a:ea typeface="Times New Roman"/>
+                <a:cs typeface="Times New Roman"/>
+                <a:sym typeface="Times New Roman"/>
+              </a:rPr>
+              <a:t>    	</a:t>
+            </a:r>
+            <a:r>
+              <a:rPr lang="en" sz="1200">
+                <a:solidFill>
+                  <a:schemeClr val="dk1"/>
+                </a:solidFill>
+              </a:rPr>
+              <a:t>For predict, we want to determine if it is possible to predict vaccine hesitancy in the US counties based on the sociodemographic indicators available, so basically, do the SVI and CVAC levels correlate with overall vaccine hesitancy?</a:t>
+            </a:r>
+            <a:endParaRPr sz="1200">
+              <a:solidFill>
+                <a:schemeClr val="dk1"/>
+              </a:solidFill>
+            </a:endParaRPr>
+          </a:p>
+          <a:p>
+            <a:pPr indent="-228600" lvl="0" marL="457200" rtl="0" algn="l">
+              <a:lnSpc>
+                <a:spcPct val="115000"/>
+              </a:lnSpc>
+              <a:spcBef>
+                <a:spcPts val="0"/>
+              </a:spcBef>
+              <a:spcAft>
+                <a:spcPts val="0"/>
+              </a:spcAft>
+              <a:buNone/>
+            </a:pPr>
+            <a:r>
+              <a:rPr lang="en" sz="1000">
+                <a:solidFill>
+                  <a:schemeClr val="dk1"/>
+                </a:solidFill>
+              </a:rPr>
+              <a:t>-</a:t>
+            </a:r>
+            <a:r>
+              <a:rPr lang="en" sz="700">
+                <a:solidFill>
+                  <a:schemeClr val="dk1"/>
+                </a:solidFill>
+                <a:latin typeface="Times New Roman"/>
+                <a:ea typeface="Times New Roman"/>
+                <a:cs typeface="Times New Roman"/>
+                <a:sym typeface="Times New Roman"/>
+              </a:rPr>
+              <a:t>    	</a:t>
+            </a:r>
+            <a:r>
+              <a:rPr lang="en" sz="1200">
+                <a:solidFill>
+                  <a:schemeClr val="dk1"/>
+                </a:solidFill>
+              </a:rPr>
+              <a:t>Impacts involve taking a deeper look at the sociodemographic indicators such as SVI and CVAC, and understanding if they have an impact on vaccine hesitancy</a:t>
+            </a:r>
+            <a:endParaRPr sz="1200">
+              <a:solidFill>
+                <a:schemeClr val="dk1"/>
+              </a:solidFill>
+            </a:endParaRPr>
+          </a:p>
+          <a:p>
+            <a:pPr indent="-228600" lvl="0" marL="457200" rtl="0" algn="l">
+              <a:lnSpc>
+                <a:spcPct val="115000"/>
+              </a:lnSpc>
+              <a:spcBef>
+                <a:spcPts val="0"/>
+              </a:spcBef>
+              <a:spcAft>
+                <a:spcPts val="0"/>
+              </a:spcAft>
+              <a:buNone/>
+            </a:pPr>
+            <a:r>
+              <a:rPr lang="en" sz="1000">
+                <a:solidFill>
+                  <a:schemeClr val="dk1"/>
+                </a:solidFill>
+              </a:rPr>
+              <a:t>-</a:t>
+            </a:r>
+            <a:r>
+              <a:rPr lang="en" sz="700">
+                <a:solidFill>
+                  <a:schemeClr val="dk1"/>
+                </a:solidFill>
+                <a:latin typeface="Times New Roman"/>
+                <a:ea typeface="Times New Roman"/>
+                <a:cs typeface="Times New Roman"/>
+                <a:sym typeface="Times New Roman"/>
+              </a:rPr>
+              <a:t>    	</a:t>
+            </a:r>
+            <a:r>
+              <a:rPr lang="en" sz="1200">
+                <a:solidFill>
+                  <a:schemeClr val="dk1"/>
+                </a:solidFill>
+              </a:rPr>
+              <a:t>Based on the level of impact these indicators have, do they present as barriers within the population, and if so, is there any way to mitigate them?</a:t>
+            </a:r>
+            <a:endParaRPr sz="1200">
+              <a:solidFill>
+                <a:schemeClr val="dk1"/>
+              </a:solidFill>
+            </a:endParaRPr>
+          </a:p>
+          <a:p>
+            <a:pPr indent="-228600" lvl="0" marL="457200" rtl="0" algn="l">
+              <a:lnSpc>
+                <a:spcPct val="115000"/>
+              </a:lnSpc>
+              <a:spcBef>
+                <a:spcPts val="0"/>
+              </a:spcBef>
+              <a:spcAft>
+                <a:spcPts val="0"/>
+              </a:spcAft>
+              <a:buNone/>
+            </a:pPr>
+            <a:r>
+              <a:rPr lang="en" sz="1000">
+                <a:solidFill>
+                  <a:schemeClr val="dk1"/>
+                </a:solidFill>
+              </a:rPr>
+              <a:t>-</a:t>
+            </a:r>
+            <a:r>
+              <a:rPr lang="en" sz="700">
+                <a:solidFill>
+                  <a:schemeClr val="dk1"/>
+                </a:solidFill>
+                <a:latin typeface="Times New Roman"/>
+                <a:ea typeface="Times New Roman"/>
+                <a:cs typeface="Times New Roman"/>
+                <a:sym typeface="Times New Roman"/>
+              </a:rPr>
+              <a:t>    	</a:t>
+            </a:r>
+            <a:r>
+              <a:rPr lang="en" sz="1200">
+                <a:solidFill>
+                  <a:schemeClr val="dk1"/>
+                </a:solidFill>
+              </a:rPr>
+              <a:t>And finally, in terms of extrapolation, can our findings from the US counties vaccine hesitancy analysis be applied to vaccine strategies within our own communities on Ontario?</a:t>
+            </a:r>
+            <a:endParaRPr sz="1200">
+              <a:solidFill>
+                <a:schemeClr val="dk1"/>
+              </a:solidFill>
+            </a:endParaRPr>
+          </a:p>
+          <a:p>
+            <a:pPr indent="-228600" lvl="0" marL="457200" rtl="0" algn="l">
+              <a:lnSpc>
+                <a:spcPct val="115000"/>
+              </a:lnSpc>
               <a:spcBef>
                 <a:spcPts val="0"/>
               </a:spcBef>
@@ -2640,7 +3749,11 @@
             <a:r>
               <a:t/>
             </a:r>
-            <a:endParaRPr/>
+            <a:endParaRPr sz="1200">
+              <a:solidFill>
+                <a:schemeClr val="dk1"/>
+              </a:solidFill>
+            </a:endParaRPr>
           </a:p>
         </p:txBody>
       </p:sp>
@@ -3171,7 +4284,7 @@
                   <a:schemeClr val="lt1"/>
                 </a:highlight>
               </a:rPr>
-              <a:t>We chose to use supervised machine learning as the target variable was available and identified in our dataset </a:t>
+              <a:t>Next, I will go over our data analysis, beginning with the model choice. </a:t>
             </a:r>
             <a:endParaRPr sz="1200">
               <a:solidFill>
@@ -3205,17 +4318,91 @@
                   <a:srgbClr val="24292E"/>
                 </a:solidFill>
                 <a:highlight>
-                  <a:srgbClr val="FFFFFF"/>
+                  <a:schemeClr val="lt1"/>
                 </a:highlight>
               </a:rPr>
-              <a:t>We chose regression models as the dataset has a continuous target outcome (% of population vaccine hesitant) that could be used for the model predictions within the numeric range of 0-1.</a:t>
+              <a:t>Since we already had a target variable available from the kaggle dataset, we decided to go with supervised machine learning </a:t>
             </a:r>
             <a:endParaRPr sz="1200">
               <a:solidFill>
                 <a:srgbClr val="24292E"/>
               </a:solidFill>
               <a:highlight>
-                <a:srgbClr val="FFFFFF"/>
+                <a:schemeClr val="lt1"/>
+              </a:highlight>
+            </a:endParaRPr>
+          </a:p>
+          <a:p>
+            <a:pPr indent="-304800" lvl="0" marL="457200" rtl="0" algn="l">
+              <a:lnSpc>
+                <a:spcPct val="115000"/>
+              </a:lnSpc>
+              <a:spcBef>
+                <a:spcPts val="0"/>
+              </a:spcBef>
+              <a:spcAft>
+                <a:spcPts val="0"/>
+              </a:spcAft>
+              <a:buClr>
+                <a:srgbClr val="24292E"/>
+              </a:buClr>
+              <a:buSzPts val="1200"/>
+              <a:buChar char="●"/>
+            </a:pPr>
+            <a:r>
+              <a:rPr lang="en" sz="1200">
+                <a:solidFill>
+                  <a:srgbClr val="24292E"/>
+                </a:solidFill>
+                <a:highlight>
+                  <a:schemeClr val="lt1"/>
+                </a:highlight>
+              </a:rPr>
+              <a:t>As mentioned earlier, our target variable is the percent of population that is vaccine hesitant with our features being different sociodemographic and vaccine implementation indicators </a:t>
+            </a:r>
+            <a:endParaRPr sz="1200">
+              <a:solidFill>
+                <a:srgbClr val="24292E"/>
+              </a:solidFill>
+              <a:highlight>
+                <a:schemeClr val="lt1"/>
+              </a:highlight>
+            </a:endParaRPr>
+          </a:p>
+          <a:p>
+            <a:pPr indent="-304800" lvl="0" marL="457200" rtl="0" algn="l">
+              <a:lnSpc>
+                <a:spcPct val="115000"/>
+              </a:lnSpc>
+              <a:spcBef>
+                <a:spcPts val="0"/>
+              </a:spcBef>
+              <a:spcAft>
+                <a:spcPts val="0"/>
+              </a:spcAft>
+              <a:buClr>
+                <a:srgbClr val="24292E"/>
+              </a:buClr>
+              <a:buSzPts val="1200"/>
+              <a:buChar char="●"/>
+            </a:pPr>
+            <a:r>
+              <a:rPr lang="en" sz="1200">
+                <a:solidFill>
+                  <a:srgbClr val="24292E"/>
+                </a:solidFill>
+                <a:highlight>
+                  <a:schemeClr val="lt1"/>
+                </a:highlight>
+              </a:rPr>
+              <a:t>This led us to attempt 3 different machine learning regression models: simple linear, multiple linear, and random forest. Each model is increasingly more complex within that order. </a:t>
+            </a:r>
+            <a:endParaRPr sz="1200">
+              <a:solidFill>
+                <a:srgbClr val="24292E"/>
+              </a:solidFill>
+              <a:highlight>
+                <a:schemeClr val="lt1"/>
               </a:highlight>
             </a:endParaRPr>
           </a:p>
@@ -3341,7 +4528,7 @@
                   <a:srgbClr val="24292E"/>
                 </a:solidFill>
               </a:rPr>
-              <a:t>Simple Linear Regression - The data was not split into training and testing datasets. All of the features were used to train the model and provide a predicted target. *benefits and limitations*</a:t>
+              <a:t>First, let’s talk about simple linear where we used it as an initial analysis to model and predict relationships between our independent and dependent variables. For this model, all features were used to train the model and provide a predicted target value. </a:t>
             </a:r>
             <a:endParaRPr sz="1200">
               <a:solidFill>
@@ -3372,26 +4559,12 @@
                   <a:srgbClr val="24292E"/>
                 </a:solidFill>
               </a:rPr>
-              <a:t>Multiple Linear Regression - The data was split into training and testing datasets where 70% of the data was used to train and 30% of the data was used to test the model, providing an extra </a:t>
-            </a:r>
-            <a:r>
-              <a:rPr lang="en" sz="1200">
-                <a:solidFill>
-                  <a:srgbClr val="24292E"/>
-                </a:solidFill>
-                <a:highlight>
-                  <a:srgbClr val="FFFFFF"/>
-                </a:highlight>
-              </a:rPr>
-              <a:t>method of validation and confidence on the regression model predictions</a:t>
+              <a:t>Next, in an attempt to improve our metrics, we added a layer of validation in our multiple linear regression model by splitting the dataset. 70% of our data was used for training and the remaining 30% was used for testing </a:t>
             </a:r>
             <a:endParaRPr sz="1200">
               <a:solidFill>
                 <a:srgbClr val="24292E"/>
               </a:solidFill>
-              <a:highlight>
-                <a:srgbClr val="FFFFFF"/>
-              </a:highlight>
             </a:endParaRPr>
           </a:p>
           <a:p>
@@ -3416,11 +4589,8 @@
                 <a:solidFill>
                   <a:srgbClr val="24292E"/>
                 </a:solidFill>
-                <a:highlight>
-                  <a:srgbClr val="FFFFFF"/>
-                </a:highlight>
               </a:rPr>
-              <a:t>Random Forest Regression - The data was also </a:t>
+              <a:t>Lastly, we used the random forest model to observe if we can obtain even greater scores with a model that is more complex as it is built upon several simple decision trees which are all factored into the prediction. This model also split up the dataset into 70% training and 30% testing.      </a:t>
             </a:r>
             <a:endParaRPr sz="1200">
               <a:solidFill>
@@ -10010,8 +11180,8 @@
         </p:blipFill>
         <p:spPr>
           <a:xfrm>
-            <a:off x="943875" y="1355575"/>
-            <a:ext cx="7256249" cy="3611976"/>
+            <a:off x="841088" y="1181950"/>
+            <a:ext cx="7461874" cy="3881574"/>
           </a:xfrm>
           <a:prstGeom prst="rect">
             <a:avLst/>
@@ -11362,7 +12532,7 @@
                   <a:srgbClr val="24292E"/>
                 </a:solidFill>
               </a:rPr>
-              <a:t>SciKitLearn used to create: Linear regression, Multiple linear regression and Random Forest regression models and results metrics</a:t>
+              <a:t>SciKitLearn used to create: Simple linear, Multiple linear and Random Forest regression models and results metrics</a:t>
             </a:r>
             <a:endParaRPr sz="1600">
               <a:solidFill>
@@ -11961,7 +13131,7 @@
                   <a:srgbClr val="000000"/>
                 </a:solidFill>
               </a:rPr>
-              <a:t>Technologies and tools</a:t>
+              <a:t>Conclusion, lessons learned and next steps</a:t>
             </a:r>
             <a:endParaRPr sz="2200">
               <a:solidFill>
@@ -11984,7 +13154,7 @@
                 <a:srgbClr val="000000"/>
               </a:buClr>
               <a:buSzPts val="2200"/>
-              <a:buFont typeface="Roboto"/>
+              <a:buFont typeface="Arial"/>
               <a:buAutoNum type="arabicPeriod"/>
             </a:pPr>
             <a:r>
@@ -11993,7 +13163,7 @@
                   <a:srgbClr val="000000"/>
                 </a:solidFill>
               </a:rPr>
-              <a:t>Conclusion, lessons learned and next steps</a:t>
+              <a:t>Technologies and tools</a:t>
             </a:r>
             <a:endParaRPr sz="2200"/>
           </a:p>
@@ -12140,8 +13310,8 @@
         </p:nvSpPr>
         <p:spPr>
           <a:xfrm>
-            <a:off x="165600" y="1659925"/>
-            <a:ext cx="4558800" cy="2806500"/>
+            <a:off x="165600" y="1859925"/>
+            <a:ext cx="4558800" cy="2529600"/>
           </a:xfrm>
           <a:prstGeom prst="rect">
             <a:avLst/>
@@ -12206,7 +13376,7 @@
                   <a:srgbClr val="FFFFFF"/>
                 </a:highlight>
               </a:rPr>
-              <a:t>Given the global presence of COVID-19 and the implementation of vaccines in recent months. Our team decided to look into vaccine hesitancy to understand this issue better.</a:t>
+              <a:t>Given the global presence of COVID-19 and the implementation of vaccines in recent months our team was interested in looking into this issue further.</a:t>
             </a:r>
             <a:endParaRPr sz="1800"/>
           </a:p>
@@ -13939,8 +15109,8 @@
         </p:blipFill>
         <p:spPr>
           <a:xfrm>
-            <a:off x="215725" y="1511350"/>
-            <a:ext cx="8712601" cy="3321300"/>
+            <a:off x="491663" y="1648575"/>
+            <a:ext cx="8160727" cy="3110925"/>
           </a:xfrm>
           <a:prstGeom prst="rect">
             <a:avLst/>
@@ -14100,8 +15270,8 @@
         </p:blipFill>
         <p:spPr>
           <a:xfrm>
-            <a:off x="1116588" y="1404175"/>
-            <a:ext cx="6910876" cy="3491674"/>
+            <a:off x="957254" y="1404175"/>
+            <a:ext cx="7229483" cy="3652650"/>
           </a:xfrm>
           <a:prstGeom prst="rect">
             <a:avLst/>

</xml_diff>